<commit_message>
more plots of real data with good results
</commit_message>
<xml_diff>
--- a/Help/Figures3.pptx
+++ b/Help/Figures3.pptx
@@ -10,9 +10,8 @@
     <p:sldId id="258" r:id="rId4"/>
     <p:sldId id="259" r:id="rId5"/>
     <p:sldId id="261" r:id="rId6"/>
-    <p:sldId id="262" r:id="rId7"/>
-    <p:sldId id="263" r:id="rId8"/>
-    <p:sldId id="264" r:id="rId9"/>
+    <p:sldId id="265" r:id="rId7"/>
+    <p:sldId id="264" r:id="rId8"/>
   </p:sldIdLst>
   <p:sldSz cx="12192000" cy="6858000"/>
   <p:notesSz cx="6858000" cy="9144000"/>
@@ -261,7 +260,7 @@
           <a:p>
             <a:fld id="{054E8CB3-1D98-4ECD-B6B7-C0FB8C78DDA1}" type="datetimeFigureOut">
               <a:rPr lang="en-US" smtClean="0"/>
-              <a:t>2019-09-29</a:t>
+              <a:t>2019-11-15</a:t>
             </a:fld>
             <a:endParaRPr lang="en-US"/>
           </a:p>
@@ -431,7 +430,7 @@
           <a:p>
             <a:fld id="{054E8CB3-1D98-4ECD-B6B7-C0FB8C78DDA1}" type="datetimeFigureOut">
               <a:rPr lang="en-US" smtClean="0"/>
-              <a:t>2019-09-29</a:t>
+              <a:t>2019-11-15</a:t>
             </a:fld>
             <a:endParaRPr lang="en-US"/>
           </a:p>
@@ -611,7 +610,7 @@
           <a:p>
             <a:fld id="{054E8CB3-1D98-4ECD-B6B7-C0FB8C78DDA1}" type="datetimeFigureOut">
               <a:rPr lang="en-US" smtClean="0"/>
-              <a:t>2019-09-29</a:t>
+              <a:t>2019-11-15</a:t>
             </a:fld>
             <a:endParaRPr lang="en-US"/>
           </a:p>
@@ -781,7 +780,7 @@
           <a:p>
             <a:fld id="{054E8CB3-1D98-4ECD-B6B7-C0FB8C78DDA1}" type="datetimeFigureOut">
               <a:rPr lang="en-US" smtClean="0"/>
-              <a:t>2019-09-29</a:t>
+              <a:t>2019-11-15</a:t>
             </a:fld>
             <a:endParaRPr lang="en-US"/>
           </a:p>
@@ -1027,7 +1026,7 @@
           <a:p>
             <a:fld id="{054E8CB3-1D98-4ECD-B6B7-C0FB8C78DDA1}" type="datetimeFigureOut">
               <a:rPr lang="en-US" smtClean="0"/>
-              <a:t>2019-09-29</a:t>
+              <a:t>2019-11-15</a:t>
             </a:fld>
             <a:endParaRPr lang="en-US"/>
           </a:p>
@@ -1259,7 +1258,7 @@
           <a:p>
             <a:fld id="{054E8CB3-1D98-4ECD-B6B7-C0FB8C78DDA1}" type="datetimeFigureOut">
               <a:rPr lang="en-US" smtClean="0"/>
-              <a:t>2019-09-29</a:t>
+              <a:t>2019-11-15</a:t>
             </a:fld>
             <a:endParaRPr lang="en-US"/>
           </a:p>
@@ -1626,7 +1625,7 @@
           <a:p>
             <a:fld id="{054E8CB3-1D98-4ECD-B6B7-C0FB8C78DDA1}" type="datetimeFigureOut">
               <a:rPr lang="en-US" smtClean="0"/>
-              <a:t>2019-09-29</a:t>
+              <a:t>2019-11-15</a:t>
             </a:fld>
             <a:endParaRPr lang="en-US"/>
           </a:p>
@@ -1744,7 +1743,7 @@
           <a:p>
             <a:fld id="{054E8CB3-1D98-4ECD-B6B7-C0FB8C78DDA1}" type="datetimeFigureOut">
               <a:rPr lang="en-US" smtClean="0"/>
-              <a:t>2019-09-29</a:t>
+              <a:t>2019-11-15</a:t>
             </a:fld>
             <a:endParaRPr lang="en-US"/>
           </a:p>
@@ -1839,7 +1838,7 @@
           <a:p>
             <a:fld id="{054E8CB3-1D98-4ECD-B6B7-C0FB8C78DDA1}" type="datetimeFigureOut">
               <a:rPr lang="en-US" smtClean="0"/>
-              <a:t>2019-09-29</a:t>
+              <a:t>2019-11-15</a:t>
             </a:fld>
             <a:endParaRPr lang="en-US"/>
           </a:p>
@@ -2116,7 +2115,7 @@
           <a:p>
             <a:fld id="{054E8CB3-1D98-4ECD-B6B7-C0FB8C78DDA1}" type="datetimeFigureOut">
               <a:rPr lang="en-US" smtClean="0"/>
-              <a:t>2019-09-29</a:t>
+              <a:t>2019-11-15</a:t>
             </a:fld>
             <a:endParaRPr lang="en-US"/>
           </a:p>
@@ -2369,7 +2368,7 @@
           <a:p>
             <a:fld id="{054E8CB3-1D98-4ECD-B6B7-C0FB8C78DDA1}" type="datetimeFigureOut">
               <a:rPr lang="en-US" smtClean="0"/>
-              <a:t>2019-09-29</a:t>
+              <a:t>2019-11-15</a:t>
             </a:fld>
             <a:endParaRPr lang="en-US"/>
           </a:p>
@@ -2582,7 +2581,7 @@
           <a:p>
             <a:fld id="{054E8CB3-1D98-4ECD-B6B7-C0FB8C78DDA1}" type="datetimeFigureOut">
               <a:rPr lang="en-US" smtClean="0"/>
-              <a:t>2019-09-29</a:t>
+              <a:t>2019-11-15</a:t>
             </a:fld>
             <a:endParaRPr lang="en-US"/>
           </a:p>
@@ -3145,7 +3144,7 @@
             <p:cNvPr id="10" name="Rectangle 9">
               <a:extLst>
                 <a:ext uri="{FF2B5EF4-FFF2-40B4-BE49-F238E27FC236}">
-                  <a16:creationId xmlns:a16="http://schemas.microsoft.com/office/drawing/2014/main" xmlns:a14="http://schemas.microsoft.com/office/drawing/2010/main" xmlns:mc="http://schemas.openxmlformats.org/markup-compatibility/2006" xmlns="" id="{2E36643D-EEA2-42A8-BBCF-DC12D9FC8BA4}"/>
+                  <a16:creationId xmlns="" xmlns:mc="http://schemas.openxmlformats.org/markup-compatibility/2006" xmlns:a14="http://schemas.microsoft.com/office/drawing/2010/main" xmlns:a16="http://schemas.microsoft.com/office/drawing/2014/main" id="{2E36643D-EEA2-42A8-BBCF-DC12D9FC8BA4}"/>
                 </a:ext>
               </a:extLst>
             </p:cNvPr>
@@ -3211,7 +3210,7 @@
             <p:cNvPr id="12" name="Rectangle 11">
               <a:extLst>
                 <a:ext uri="{FF2B5EF4-FFF2-40B4-BE49-F238E27FC236}">
-                  <a16:creationId xmlns:a16="http://schemas.microsoft.com/office/drawing/2014/main" xmlns:a14="http://schemas.microsoft.com/office/drawing/2010/main" xmlns:mc="http://schemas.openxmlformats.org/markup-compatibility/2006" xmlns="" id="{6D2C8BE0-B0D2-4978-A1B5-FFF5137A4C82}"/>
+                  <a16:creationId xmlns="" xmlns:mc="http://schemas.openxmlformats.org/markup-compatibility/2006" xmlns:a14="http://schemas.microsoft.com/office/drawing/2010/main" xmlns:a16="http://schemas.microsoft.com/office/drawing/2014/main" id="{6D2C8BE0-B0D2-4978-A1B5-FFF5137A4C82}"/>
                 </a:ext>
               </a:extLst>
             </p:cNvPr>
@@ -3564,7 +3563,7 @@
             <p:cNvPr id="19" name="Rectangle 18">
               <a:extLst>
                 <a:ext uri="{FF2B5EF4-FFF2-40B4-BE49-F238E27FC236}">
-                  <a16:creationId xmlns:a16="http://schemas.microsoft.com/office/drawing/2014/main" xmlns:a14="http://schemas.microsoft.com/office/drawing/2010/main" xmlns:mc="http://schemas.openxmlformats.org/markup-compatibility/2006" xmlns="" id="{2E36643D-EEA2-42A8-BBCF-DC12D9FC8BA4}"/>
+                  <a16:creationId xmlns="" xmlns:mc="http://schemas.openxmlformats.org/markup-compatibility/2006" xmlns:a14="http://schemas.microsoft.com/office/drawing/2010/main" xmlns:a16="http://schemas.microsoft.com/office/drawing/2014/main" id="{2E36643D-EEA2-42A8-BBCF-DC12D9FC8BA4}"/>
                 </a:ext>
               </a:extLst>
             </p:cNvPr>
@@ -3630,7 +3629,7 @@
             <p:cNvPr id="20" name="Rectangle 19">
               <a:extLst>
                 <a:ext uri="{FF2B5EF4-FFF2-40B4-BE49-F238E27FC236}">
-                  <a16:creationId xmlns:a16="http://schemas.microsoft.com/office/drawing/2014/main" xmlns:a14="http://schemas.microsoft.com/office/drawing/2010/main" xmlns:mc="http://schemas.openxmlformats.org/markup-compatibility/2006" xmlns="" id="{6D2C8BE0-B0D2-4978-A1B5-FFF5137A4C82}"/>
+                  <a16:creationId xmlns="" xmlns:mc="http://schemas.openxmlformats.org/markup-compatibility/2006" xmlns:a14="http://schemas.microsoft.com/office/drawing/2010/main" xmlns:a16="http://schemas.microsoft.com/office/drawing/2014/main" id="{6D2C8BE0-B0D2-4978-A1B5-FFF5137A4C82}"/>
                 </a:ext>
               </a:extLst>
             </p:cNvPr>
@@ -3686,7 +3685,7 @@
             <p:cNvPr id="21" name="Rectangle 20">
               <a:extLst>
                 <a:ext uri="{FF2B5EF4-FFF2-40B4-BE49-F238E27FC236}">
-                  <a16:creationId xmlns:a16="http://schemas.microsoft.com/office/drawing/2014/main" xmlns:a14="http://schemas.microsoft.com/office/drawing/2010/main" xmlns:mc="http://schemas.openxmlformats.org/markup-compatibility/2006" xmlns="" id="{6D2C8BE0-B0D2-4978-A1B5-FFF5137A4C82}"/>
+                  <a16:creationId xmlns="" xmlns:mc="http://schemas.openxmlformats.org/markup-compatibility/2006" xmlns:a14="http://schemas.microsoft.com/office/drawing/2010/main" xmlns:a16="http://schemas.microsoft.com/office/drawing/2014/main" id="{6D2C8BE0-B0D2-4978-A1B5-FFF5137A4C82}"/>
                 </a:ext>
               </a:extLst>
             </p:cNvPr>
@@ -3755,7 +3754,7 @@
             <p:cNvPr id="22" name="Rectangle 21">
               <a:extLst>
                 <a:ext uri="{FF2B5EF4-FFF2-40B4-BE49-F238E27FC236}">
-                  <a16:creationId xmlns:a16="http://schemas.microsoft.com/office/drawing/2014/main" xmlns:a14="http://schemas.microsoft.com/office/drawing/2010/main" xmlns:mc="http://schemas.openxmlformats.org/markup-compatibility/2006" xmlns="" id="{6D2C8BE0-B0D2-4978-A1B5-FFF5137A4C82}"/>
+                  <a16:creationId xmlns="" xmlns:mc="http://schemas.openxmlformats.org/markup-compatibility/2006" xmlns:a14="http://schemas.microsoft.com/office/drawing/2010/main" xmlns:a16="http://schemas.microsoft.com/office/drawing/2014/main" id="{6D2C8BE0-B0D2-4978-A1B5-FFF5137A4C82}"/>
                 </a:ext>
               </a:extLst>
             </p:cNvPr>
@@ -3995,7 +3994,7 @@
                   <p:cNvPr id="37" name="Rectangle 36">
                     <a:extLst>
                       <a:ext uri="{FF2B5EF4-FFF2-40B4-BE49-F238E27FC236}">
-                        <a16:creationId xmlns:a16="http://schemas.microsoft.com/office/drawing/2014/main" xmlns="" id="{2E36643D-EEA2-42A8-BBCF-DC12D9FC8BA4}"/>
+                        <a16:creationId xmlns="" xmlns:a16="http://schemas.microsoft.com/office/drawing/2014/main" id="{2E36643D-EEA2-42A8-BBCF-DC12D9FC8BA4}"/>
                       </a:ext>
                     </a:extLst>
                   </p:cNvPr>
@@ -4129,7 +4128,7 @@
                   <p:cNvPr id="42" name="Rectangle 41">
                     <a:extLst>
                       <a:ext uri="{FF2B5EF4-FFF2-40B4-BE49-F238E27FC236}">
-                        <a16:creationId xmlns:a16="http://schemas.microsoft.com/office/drawing/2014/main" xmlns="" id="{2E36643D-EEA2-42A8-BBCF-DC12D9FC8BA4}"/>
+                        <a16:creationId xmlns="" xmlns:a16="http://schemas.microsoft.com/office/drawing/2014/main" id="{2E36643D-EEA2-42A8-BBCF-DC12D9FC8BA4}"/>
                       </a:ext>
                     </a:extLst>
                   </p:cNvPr>
@@ -4261,7 +4260,7 @@
               <p:cNvPr id="43" name="Rectangle 42">
                 <a:extLst>
                   <a:ext uri="{FF2B5EF4-FFF2-40B4-BE49-F238E27FC236}">
-                    <a16:creationId xmlns:a16="http://schemas.microsoft.com/office/drawing/2014/main" xmlns:a14="http://schemas.microsoft.com/office/drawing/2010/main" xmlns:mc="http://schemas.openxmlformats.org/markup-compatibility/2006" xmlns="" id="{6D2C8BE0-B0D2-4978-A1B5-FFF5137A4C82}"/>
+                    <a16:creationId xmlns="" xmlns:mc="http://schemas.openxmlformats.org/markup-compatibility/2006" xmlns:a14="http://schemas.microsoft.com/office/drawing/2010/main" xmlns:a16="http://schemas.microsoft.com/office/drawing/2014/main" id="{6D2C8BE0-B0D2-4978-A1B5-FFF5137A4C82}"/>
                   </a:ext>
                 </a:extLst>
               </p:cNvPr>
@@ -4317,7 +4316,7 @@
               <p:cNvPr id="44" name="Rectangle 43">
                 <a:extLst>
                   <a:ext uri="{FF2B5EF4-FFF2-40B4-BE49-F238E27FC236}">
-                    <a16:creationId xmlns:a16="http://schemas.microsoft.com/office/drawing/2014/main" xmlns:a14="http://schemas.microsoft.com/office/drawing/2010/main" xmlns:mc="http://schemas.openxmlformats.org/markup-compatibility/2006" xmlns="" id="{6D2C8BE0-B0D2-4978-A1B5-FFF5137A4C82}"/>
+                    <a16:creationId xmlns="" xmlns:mc="http://schemas.openxmlformats.org/markup-compatibility/2006" xmlns:a14="http://schemas.microsoft.com/office/drawing/2010/main" xmlns:a16="http://schemas.microsoft.com/office/drawing/2014/main" id="{6D2C8BE0-B0D2-4978-A1B5-FFF5137A4C82}"/>
                   </a:ext>
                 </a:extLst>
               </p:cNvPr>
@@ -4386,7 +4385,7 @@
               <p:cNvPr id="45" name="Rectangle 44">
                 <a:extLst>
                   <a:ext uri="{FF2B5EF4-FFF2-40B4-BE49-F238E27FC236}">
-                    <a16:creationId xmlns:a16="http://schemas.microsoft.com/office/drawing/2014/main" xmlns:a14="http://schemas.microsoft.com/office/drawing/2010/main" xmlns:mc="http://schemas.openxmlformats.org/markup-compatibility/2006" xmlns="" id="{6D2C8BE0-B0D2-4978-A1B5-FFF5137A4C82}"/>
+                    <a16:creationId xmlns="" xmlns:mc="http://schemas.openxmlformats.org/markup-compatibility/2006" xmlns:a14="http://schemas.microsoft.com/office/drawing/2010/main" xmlns:a16="http://schemas.microsoft.com/office/drawing/2014/main" id="{6D2C8BE0-B0D2-4978-A1B5-FFF5137A4C82}"/>
                   </a:ext>
                 </a:extLst>
               </p:cNvPr>
@@ -4731,7 +4730,7 @@
                   <p:cNvPr id="13" name="Rectangle 12">
                     <a:extLst>
                       <a:ext uri="{FF2B5EF4-FFF2-40B4-BE49-F238E27FC236}">
-                        <a16:creationId xmlns:a16="http://schemas.microsoft.com/office/drawing/2014/main" xmlns="" id="{6D2C8BE0-B0D2-4978-A1B5-FFF5137A4C82}"/>
+                        <a16:creationId xmlns="" xmlns:a16="http://schemas.microsoft.com/office/drawing/2014/main" id="{6D2C8BE0-B0D2-4978-A1B5-FFF5137A4C82}"/>
                       </a:ext>
                     </a:extLst>
                   </p:cNvPr>
@@ -5084,7 +5083,7 @@
                 <p:cNvPr id="18" name="Rectangle 17">
                   <a:extLst>
                     <a:ext uri="{FF2B5EF4-FFF2-40B4-BE49-F238E27FC236}">
-                      <a16:creationId xmlns:a16="http://schemas.microsoft.com/office/drawing/2014/main" xmlns:a14="http://schemas.microsoft.com/office/drawing/2010/main" xmlns:mc="http://schemas.openxmlformats.org/markup-compatibility/2006" xmlns="" id="{2E36643D-EEA2-42A8-BBCF-DC12D9FC8BA4}"/>
+                      <a16:creationId xmlns="" xmlns:mc="http://schemas.openxmlformats.org/markup-compatibility/2006" xmlns:a14="http://schemas.microsoft.com/office/drawing/2010/main" xmlns:a16="http://schemas.microsoft.com/office/drawing/2014/main" id="{2E36643D-EEA2-42A8-BBCF-DC12D9FC8BA4}"/>
                     </a:ext>
                   </a:extLst>
                 </p:cNvPr>
@@ -5150,7 +5149,7 @@
                 <p:cNvPr id="19" name="Rectangle 18">
                   <a:extLst>
                     <a:ext uri="{FF2B5EF4-FFF2-40B4-BE49-F238E27FC236}">
-                      <a16:creationId xmlns:a16="http://schemas.microsoft.com/office/drawing/2014/main" xmlns:a14="http://schemas.microsoft.com/office/drawing/2010/main" xmlns:mc="http://schemas.openxmlformats.org/markup-compatibility/2006" xmlns="" id="{2E36643D-EEA2-42A8-BBCF-DC12D9FC8BA4}"/>
+                      <a16:creationId xmlns="" xmlns:mc="http://schemas.openxmlformats.org/markup-compatibility/2006" xmlns:a14="http://schemas.microsoft.com/office/drawing/2010/main" xmlns:a16="http://schemas.microsoft.com/office/drawing/2014/main" id="{2E36643D-EEA2-42A8-BBCF-DC12D9FC8BA4}"/>
                     </a:ext>
                   </a:extLst>
                 </p:cNvPr>
@@ -5216,7 +5215,7 @@
                 <p:cNvPr id="20" name="Rectangle 19">
                   <a:extLst>
                     <a:ext uri="{FF2B5EF4-FFF2-40B4-BE49-F238E27FC236}">
-                      <a16:creationId xmlns:a16="http://schemas.microsoft.com/office/drawing/2014/main" xmlns:a14="http://schemas.microsoft.com/office/drawing/2010/main" xmlns:mc="http://schemas.openxmlformats.org/markup-compatibility/2006" xmlns="" id="{6D2C8BE0-B0D2-4978-A1B5-FFF5137A4C82}"/>
+                      <a16:creationId xmlns="" xmlns:mc="http://schemas.openxmlformats.org/markup-compatibility/2006" xmlns:a14="http://schemas.microsoft.com/office/drawing/2010/main" xmlns:a16="http://schemas.microsoft.com/office/drawing/2014/main" id="{6D2C8BE0-B0D2-4978-A1B5-FFF5137A4C82}"/>
                     </a:ext>
                   </a:extLst>
                 </p:cNvPr>
@@ -5272,7 +5271,7 @@
                 <p:cNvPr id="21" name="Rectangle 20">
                   <a:extLst>
                     <a:ext uri="{FF2B5EF4-FFF2-40B4-BE49-F238E27FC236}">
-                      <a16:creationId xmlns:a16="http://schemas.microsoft.com/office/drawing/2014/main" xmlns:a14="http://schemas.microsoft.com/office/drawing/2010/main" xmlns:mc="http://schemas.openxmlformats.org/markup-compatibility/2006" xmlns="" id="{6D2C8BE0-B0D2-4978-A1B5-FFF5137A4C82}"/>
+                      <a16:creationId xmlns="" xmlns:mc="http://schemas.openxmlformats.org/markup-compatibility/2006" xmlns:a14="http://schemas.microsoft.com/office/drawing/2010/main" xmlns:a16="http://schemas.microsoft.com/office/drawing/2014/main" id="{6D2C8BE0-B0D2-4978-A1B5-FFF5137A4C82}"/>
                     </a:ext>
                   </a:extLst>
                 </p:cNvPr>
@@ -5341,7 +5340,7 @@
                 <p:cNvPr id="22" name="Rectangle 21">
                   <a:extLst>
                     <a:ext uri="{FF2B5EF4-FFF2-40B4-BE49-F238E27FC236}">
-                      <a16:creationId xmlns:a16="http://schemas.microsoft.com/office/drawing/2014/main" xmlns:a14="http://schemas.microsoft.com/office/drawing/2010/main" xmlns:mc="http://schemas.openxmlformats.org/markup-compatibility/2006" xmlns="" id="{6D2C8BE0-B0D2-4978-A1B5-FFF5137A4C82}"/>
+                      <a16:creationId xmlns="" xmlns:mc="http://schemas.openxmlformats.org/markup-compatibility/2006" xmlns:a14="http://schemas.microsoft.com/office/drawing/2010/main" xmlns:a16="http://schemas.microsoft.com/office/drawing/2014/main" id="{6D2C8BE0-B0D2-4978-A1B5-FFF5137A4C82}"/>
                     </a:ext>
                   </a:extLst>
                 </p:cNvPr>
@@ -5402,7 +5401,7 @@
                     <p:cNvPr id="24" name="Rectangle 23">
                       <a:extLst>
                         <a:ext uri="{FF2B5EF4-FFF2-40B4-BE49-F238E27FC236}">
-                          <a16:creationId xmlns:a16="http://schemas.microsoft.com/office/drawing/2014/main" xmlns="" id="{6D2C8BE0-B0D2-4978-A1B5-FFF5137A4C82}"/>
+                          <a16:creationId xmlns="" xmlns:a16="http://schemas.microsoft.com/office/drawing/2014/main" id="{6D2C8BE0-B0D2-4978-A1B5-FFF5137A4C82}"/>
                         </a:ext>
                       </a:extLst>
                     </p:cNvPr>
@@ -6353,7 +6352,7 @@
                 <p:cNvPr id="45" name="Rectangle 44">
                   <a:extLst>
                     <a:ext uri="{FF2B5EF4-FFF2-40B4-BE49-F238E27FC236}">
-                      <a16:creationId xmlns:a16="http://schemas.microsoft.com/office/drawing/2014/main" xmlns:a14="http://schemas.microsoft.com/office/drawing/2010/main" xmlns:mc="http://schemas.openxmlformats.org/markup-compatibility/2006" xmlns="" id="{2E36643D-EEA2-42A8-BBCF-DC12D9FC8BA4}"/>
+                      <a16:creationId xmlns="" xmlns:mc="http://schemas.openxmlformats.org/markup-compatibility/2006" xmlns:a14="http://schemas.microsoft.com/office/drawing/2010/main" xmlns:a16="http://schemas.microsoft.com/office/drawing/2014/main" id="{2E36643D-EEA2-42A8-BBCF-DC12D9FC8BA4}"/>
                     </a:ext>
                   </a:extLst>
                 </p:cNvPr>
@@ -6409,7 +6408,7 @@
                 <p:cNvPr id="46" name="Rectangle 45">
                   <a:extLst>
                     <a:ext uri="{FF2B5EF4-FFF2-40B4-BE49-F238E27FC236}">
-                      <a16:creationId xmlns:a16="http://schemas.microsoft.com/office/drawing/2014/main" xmlns:a14="http://schemas.microsoft.com/office/drawing/2010/main" xmlns:mc="http://schemas.openxmlformats.org/markup-compatibility/2006" xmlns="" id="{2E36643D-EEA2-42A8-BBCF-DC12D9FC8BA4}"/>
+                      <a16:creationId xmlns="" xmlns:mc="http://schemas.openxmlformats.org/markup-compatibility/2006" xmlns:a14="http://schemas.microsoft.com/office/drawing/2010/main" xmlns:a16="http://schemas.microsoft.com/office/drawing/2014/main" id="{2E36643D-EEA2-42A8-BBCF-DC12D9FC8BA4}"/>
                     </a:ext>
                   </a:extLst>
                 </p:cNvPr>
@@ -6834,7 +6833,7 @@
               <p:cNvPr id="46" name="Rectangle 45">
                 <a:extLst>
                   <a:ext uri="{FF2B5EF4-FFF2-40B4-BE49-F238E27FC236}">
-                    <a16:creationId xmlns:a16="http://schemas.microsoft.com/office/drawing/2014/main" xmlns:a14="http://schemas.microsoft.com/office/drawing/2010/main" xmlns:mc="http://schemas.openxmlformats.org/markup-compatibility/2006" xmlns="" id="{2E36643D-EEA2-42A8-BBCF-DC12D9FC8BA4}"/>
+                    <a16:creationId xmlns="" xmlns:mc="http://schemas.openxmlformats.org/markup-compatibility/2006" xmlns:a14="http://schemas.microsoft.com/office/drawing/2010/main" xmlns:a16="http://schemas.microsoft.com/office/drawing/2014/main" id="{2E36643D-EEA2-42A8-BBCF-DC12D9FC8BA4}"/>
                   </a:ext>
                 </a:extLst>
               </p:cNvPr>
@@ -6890,7 +6889,7 @@
               <p:cNvPr id="47" name="Rectangle 46">
                 <a:extLst>
                   <a:ext uri="{FF2B5EF4-FFF2-40B4-BE49-F238E27FC236}">
-                    <a16:creationId xmlns:a16="http://schemas.microsoft.com/office/drawing/2014/main" xmlns:a14="http://schemas.microsoft.com/office/drawing/2010/main" xmlns:mc="http://schemas.openxmlformats.org/markup-compatibility/2006" xmlns="" id="{2E36643D-EEA2-42A8-BBCF-DC12D9FC8BA4}"/>
+                    <a16:creationId xmlns="" xmlns:mc="http://schemas.openxmlformats.org/markup-compatibility/2006" xmlns:a14="http://schemas.microsoft.com/office/drawing/2010/main" xmlns:a16="http://schemas.microsoft.com/office/drawing/2014/main" id="{2E36643D-EEA2-42A8-BBCF-DC12D9FC8BA4}"/>
                   </a:ext>
                 </a:extLst>
               </p:cNvPr>
@@ -6956,7 +6955,7 @@
               <p:cNvPr id="48" name="Rectangle 47">
                 <a:extLst>
                   <a:ext uri="{FF2B5EF4-FFF2-40B4-BE49-F238E27FC236}">
-                    <a16:creationId xmlns:a16="http://schemas.microsoft.com/office/drawing/2014/main" xmlns:a14="http://schemas.microsoft.com/office/drawing/2010/main" xmlns:mc="http://schemas.openxmlformats.org/markup-compatibility/2006" xmlns="" id="{2E36643D-EEA2-42A8-BBCF-DC12D9FC8BA4}"/>
+                    <a16:creationId xmlns="" xmlns:mc="http://schemas.openxmlformats.org/markup-compatibility/2006" xmlns:a14="http://schemas.microsoft.com/office/drawing/2010/main" xmlns:a16="http://schemas.microsoft.com/office/drawing/2014/main" id="{2E36643D-EEA2-42A8-BBCF-DC12D9FC8BA4}"/>
                   </a:ext>
                 </a:extLst>
               </p:cNvPr>
@@ -7022,7 +7021,7 @@
               <p:cNvPr id="49" name="Rectangle 48">
                 <a:extLst>
                   <a:ext uri="{FF2B5EF4-FFF2-40B4-BE49-F238E27FC236}">
-                    <a16:creationId xmlns:a16="http://schemas.microsoft.com/office/drawing/2014/main" xmlns:a14="http://schemas.microsoft.com/office/drawing/2010/main" xmlns:mc="http://schemas.openxmlformats.org/markup-compatibility/2006" xmlns="" id="{2E36643D-EEA2-42A8-BBCF-DC12D9FC8BA4}"/>
+                    <a16:creationId xmlns="" xmlns:mc="http://schemas.openxmlformats.org/markup-compatibility/2006" xmlns:a14="http://schemas.microsoft.com/office/drawing/2010/main" xmlns:a16="http://schemas.microsoft.com/office/drawing/2014/main" id="{2E36643D-EEA2-42A8-BBCF-DC12D9FC8BA4}"/>
                   </a:ext>
                 </a:extLst>
               </p:cNvPr>
@@ -7088,7 +7087,7 @@
               <p:cNvPr id="50" name="Rectangle 49">
                 <a:extLst>
                   <a:ext uri="{FF2B5EF4-FFF2-40B4-BE49-F238E27FC236}">
-                    <a16:creationId xmlns:a16="http://schemas.microsoft.com/office/drawing/2014/main" xmlns:a14="http://schemas.microsoft.com/office/drawing/2010/main" xmlns:mc="http://schemas.openxmlformats.org/markup-compatibility/2006" xmlns="" id="{6D2C8BE0-B0D2-4978-A1B5-FFF5137A4C82}"/>
+                    <a16:creationId xmlns="" xmlns:mc="http://schemas.openxmlformats.org/markup-compatibility/2006" xmlns:a14="http://schemas.microsoft.com/office/drawing/2010/main" xmlns:a16="http://schemas.microsoft.com/office/drawing/2014/main" id="{6D2C8BE0-B0D2-4978-A1B5-FFF5137A4C82}"/>
                   </a:ext>
                 </a:extLst>
               </p:cNvPr>
@@ -7144,7 +7143,7 @@
               <p:cNvPr id="53" name="Rectangle 52">
                 <a:extLst>
                   <a:ext uri="{FF2B5EF4-FFF2-40B4-BE49-F238E27FC236}">
-                    <a16:creationId xmlns:a16="http://schemas.microsoft.com/office/drawing/2014/main" xmlns:a14="http://schemas.microsoft.com/office/drawing/2010/main" xmlns:mc="http://schemas.openxmlformats.org/markup-compatibility/2006" xmlns="" id="{2E36643D-EEA2-42A8-BBCF-DC12D9FC8BA4}"/>
+                    <a16:creationId xmlns="" xmlns:mc="http://schemas.openxmlformats.org/markup-compatibility/2006" xmlns:a14="http://schemas.microsoft.com/office/drawing/2010/main" xmlns:a16="http://schemas.microsoft.com/office/drawing/2014/main" id="{2E36643D-EEA2-42A8-BBCF-DC12D9FC8BA4}"/>
                   </a:ext>
                 </a:extLst>
               </p:cNvPr>
@@ -7200,7 +7199,7 @@
               <p:cNvPr id="54" name="Rectangle 53">
                 <a:extLst>
                   <a:ext uri="{FF2B5EF4-FFF2-40B4-BE49-F238E27FC236}">
-                    <a16:creationId xmlns:a16="http://schemas.microsoft.com/office/drawing/2014/main" xmlns:a14="http://schemas.microsoft.com/office/drawing/2010/main" xmlns:mc="http://schemas.openxmlformats.org/markup-compatibility/2006" xmlns="" id="{2E36643D-EEA2-42A8-BBCF-DC12D9FC8BA4}"/>
+                    <a16:creationId xmlns="" xmlns:mc="http://schemas.openxmlformats.org/markup-compatibility/2006" xmlns:a14="http://schemas.microsoft.com/office/drawing/2010/main" xmlns:a16="http://schemas.microsoft.com/office/drawing/2014/main" id="{2E36643D-EEA2-42A8-BBCF-DC12D9FC8BA4}"/>
                   </a:ext>
                 </a:extLst>
               </p:cNvPr>
@@ -7318,7 +7317,7 @@
               <p:cNvPr id="57" name="Rectangle 56">
                 <a:extLst>
                   <a:ext uri="{FF2B5EF4-FFF2-40B4-BE49-F238E27FC236}">
-                    <a16:creationId xmlns:mc="http://schemas.openxmlformats.org/markup-compatibility/2006" xmlns:a14="http://schemas.microsoft.com/office/drawing/2010/main" xmlns:a16="http://schemas.microsoft.com/office/drawing/2014/main" xmlns="" id="{6D2C8BE0-B0D2-4978-A1B5-FFF5137A4C82}"/>
+                    <a16:creationId xmlns="" xmlns:a16="http://schemas.microsoft.com/office/drawing/2014/main" xmlns:a14="http://schemas.microsoft.com/office/drawing/2010/main" xmlns:mc="http://schemas.openxmlformats.org/markup-compatibility/2006" id="{6D2C8BE0-B0D2-4978-A1B5-FFF5137A4C82}"/>
                   </a:ext>
                 </a:extLst>
               </p:cNvPr>
@@ -8158,7 +8157,7 @@
               <p:cNvPr id="66" name="Rectangle 65">
                 <a:extLst>
                   <a:ext uri="{FF2B5EF4-FFF2-40B4-BE49-F238E27FC236}">
-                    <a16:creationId xmlns:mc="http://schemas.openxmlformats.org/markup-compatibility/2006" xmlns:a14="http://schemas.microsoft.com/office/drawing/2010/main" xmlns:a16="http://schemas.microsoft.com/office/drawing/2014/main" xmlns="" id="{6D2C8BE0-B0D2-4978-A1B5-FFF5137A4C82}"/>
+                    <a16:creationId xmlns="" xmlns:a16="http://schemas.microsoft.com/office/drawing/2014/main" xmlns:a14="http://schemas.microsoft.com/office/drawing/2010/main" xmlns:mc="http://schemas.openxmlformats.org/markup-compatibility/2006" id="{6D2C8BE0-B0D2-4978-A1B5-FFF5137A4C82}"/>
                   </a:ext>
                 </a:extLst>
               </p:cNvPr>
@@ -8214,7 +8213,7 @@
               <p:cNvPr id="67" name="Rectangle 66">
                 <a:extLst>
                   <a:ext uri="{FF2B5EF4-FFF2-40B4-BE49-F238E27FC236}">
-                    <a16:creationId xmlns:mc="http://schemas.openxmlformats.org/markup-compatibility/2006" xmlns:a14="http://schemas.microsoft.com/office/drawing/2010/main" xmlns:a16="http://schemas.microsoft.com/office/drawing/2014/main" xmlns="" id="{6D2C8BE0-B0D2-4978-A1B5-FFF5137A4C82}"/>
+                    <a16:creationId xmlns="" xmlns:a16="http://schemas.microsoft.com/office/drawing/2014/main" xmlns:a14="http://schemas.microsoft.com/office/drawing/2010/main" xmlns:mc="http://schemas.openxmlformats.org/markup-compatibility/2006" id="{6D2C8BE0-B0D2-4978-A1B5-FFF5137A4C82}"/>
                   </a:ext>
                 </a:extLst>
               </p:cNvPr>
@@ -8270,7 +8269,7 @@
               <p:cNvPr id="52" name="Rectangle 51">
                 <a:extLst>
                   <a:ext uri="{FF2B5EF4-FFF2-40B4-BE49-F238E27FC236}">
-                    <a16:creationId xmlns:a16="http://schemas.microsoft.com/office/drawing/2014/main" xmlns:a14="http://schemas.microsoft.com/office/drawing/2010/main" xmlns:mc="http://schemas.openxmlformats.org/markup-compatibility/2006" xmlns="" id="{6D2C8BE0-B0D2-4978-A1B5-FFF5137A4C82}"/>
+                    <a16:creationId xmlns="" xmlns:mc="http://schemas.openxmlformats.org/markup-compatibility/2006" xmlns:a14="http://schemas.microsoft.com/office/drawing/2010/main" xmlns:a16="http://schemas.microsoft.com/office/drawing/2014/main" id="{6D2C8BE0-B0D2-4978-A1B5-FFF5137A4C82}"/>
                   </a:ext>
                 </a:extLst>
               </p:cNvPr>
@@ -8329,7 +8328,7 @@
               <p:cNvPr id="51" name="Rectangle 50">
                 <a:extLst>
                   <a:ext uri="{FF2B5EF4-FFF2-40B4-BE49-F238E27FC236}">
-                    <a16:creationId xmlns:a16="http://schemas.microsoft.com/office/drawing/2014/main" xmlns:a14="http://schemas.microsoft.com/office/drawing/2010/main" xmlns:mc="http://schemas.openxmlformats.org/markup-compatibility/2006" xmlns="" id="{6D2C8BE0-B0D2-4978-A1B5-FFF5137A4C82}"/>
+                    <a16:creationId xmlns="" xmlns:mc="http://schemas.openxmlformats.org/markup-compatibility/2006" xmlns:a14="http://schemas.microsoft.com/office/drawing/2010/main" xmlns:a16="http://schemas.microsoft.com/office/drawing/2014/main" id="{6D2C8BE0-B0D2-4978-A1B5-FFF5137A4C82}"/>
                   </a:ext>
                 </a:extLst>
               </p:cNvPr>
@@ -8434,7 +8433,7 @@
       </p:grpSpPr>
       <p:grpSp>
         <p:nvGrpSpPr>
-          <p:cNvPr id="20" name="Group 19"/>
+          <p:cNvPr id="3" name="Group 2"/>
           <p:cNvGrpSpPr/>
           <p:nvPr/>
         </p:nvGrpSpPr>
@@ -8442,140 +8441,151 @@
           <a:xfrm>
             <a:off x="0" y="370306"/>
             <a:ext cx="13441678" cy="6117388"/>
-            <a:chOff x="-335280" y="-444207"/>
+            <a:chOff x="0" y="370306"/>
             <a:chExt cx="13441678" cy="6117388"/>
           </a:xfrm>
-          <a:solidFill>
-            <a:schemeClr val="bg1"/>
-          </a:solidFill>
         </p:grpSpPr>
-        <p:grpSp>
-          <p:nvGrpSpPr>
-            <p:cNvPr id="19" name="Group 18"/>
-            <p:cNvGrpSpPr/>
+        <p:sp>
+          <p:nvSpPr>
+            <p:cNvPr id="5" name="Rectangle 4"/>
+            <p:cNvSpPr/>
             <p:nvPr/>
-          </p:nvGrpSpPr>
-          <p:grpSpPr>
+          </p:nvSpPr>
+          <p:spPr>
             <a:xfrm>
-              <a:off x="-335280" y="-444207"/>
-              <a:ext cx="13441678" cy="6117388"/>
-              <a:chOff x="579121" y="731520"/>
-              <a:chExt cx="13441678" cy="6117388"/>
+              <a:off x="4686299" y="370306"/>
+              <a:ext cx="2004060" cy="259080"/>
             </a:xfrm>
-            <a:grpFill/>
-          </p:grpSpPr>
-          <p:sp>
-            <p:nvSpPr>
-              <p:cNvPr id="5" name="Rectangle 4"/>
-              <p:cNvSpPr/>
-              <p:nvPr/>
-            </p:nvSpPr>
-            <p:spPr>
-              <a:xfrm>
-                <a:off x="5265420" y="731520"/>
-                <a:ext cx="2004060" cy="259080"/>
-              </a:xfrm>
-              <a:prstGeom prst="rect">
-                <a:avLst/>
-              </a:prstGeom>
-              <a:grpFill/>
-              <a:ln>
-                <a:solidFill>
-                  <a:schemeClr val="bg1"/>
-                </a:solidFill>
-              </a:ln>
-            </p:spPr>
-            <p:style>
-              <a:lnRef idx="2">
-                <a:schemeClr val="accent1">
-                  <a:shade val="50000"/>
-                </a:schemeClr>
-              </a:lnRef>
-              <a:fillRef idx="1">
-                <a:schemeClr val="accent1"/>
-              </a:fillRef>
-              <a:effectRef idx="0">
-                <a:schemeClr val="accent1"/>
-              </a:effectRef>
-              <a:fontRef idx="minor">
-                <a:schemeClr val="lt1"/>
-              </a:fontRef>
-            </p:style>
-            <p:txBody>
-              <a:bodyPr rtlCol="0" anchor="ctr"/>
-              <a:lstStyle/>
-              <a:p>
-                <a:pPr algn="ctr"/>
-                <a:endParaRPr lang="en-US" dirty="0"/>
-              </a:p>
-            </p:txBody>
-          </p:sp>
-          <p:grpSp>
-            <p:nvGrpSpPr>
-              <p:cNvPr id="10" name="Group 9"/>
-              <p:cNvGrpSpPr/>
-              <p:nvPr/>
-            </p:nvGrpSpPr>
-            <p:grpSpPr>
-              <a:xfrm>
-                <a:off x="1065530" y="861060"/>
-                <a:ext cx="12955269" cy="5987848"/>
-                <a:chOff x="171450" y="481987"/>
-                <a:chExt cx="12955269" cy="5987848"/>
-              </a:xfrm>
-              <a:grpFill/>
-            </p:grpSpPr>
-            <p:pic>
-              <p:nvPicPr>
-                <p:cNvPr id="4" name="Picture 3"/>
-                <p:cNvPicPr>
-                  <a:picLocks noChangeAspect="1"/>
-                </p:cNvPicPr>
-                <p:nvPr/>
-              </p:nvPicPr>
-              <p:blipFill>
-                <a:blip r:embed="rId2">
-                  <a:extLst>
-                    <a:ext uri="{28A0092B-C50C-407E-A947-70E740481C1C}">
-                      <a14:useLocalDpi xmlns:a14="http://schemas.microsoft.com/office/drawing/2010/main" val="0"/>
-                    </a:ext>
-                  </a:extLst>
-                </a:blip>
-                <a:stretch>
-                  <a:fillRect/>
-                </a:stretch>
-              </p:blipFill>
-              <p:spPr>
-                <a:xfrm>
-                  <a:off x="171450" y="526235"/>
-                  <a:ext cx="12192000" cy="5943600"/>
-                </a:xfrm>
-                <a:prstGeom prst="rect">
-                  <a:avLst/>
-                </a:prstGeom>
-                <a:grpFill/>
-                <a:ln>
-                  <a:solidFill>
-                    <a:schemeClr val="bg1"/>
-                  </a:solidFill>
-                </a:ln>
-              </p:spPr>
-            </p:pic>
+            <a:prstGeom prst="rect">
+              <a:avLst/>
+            </a:prstGeom>
+            <a:solidFill>
+              <a:schemeClr val="bg1"/>
+            </a:solidFill>
+            <a:ln>
+              <a:solidFill>
+                <a:schemeClr val="bg1"/>
+              </a:solidFill>
+            </a:ln>
+          </p:spPr>
+          <p:style>
+            <a:lnRef idx="2">
+              <a:schemeClr val="accent1">
+                <a:shade val="50000"/>
+              </a:schemeClr>
+            </a:lnRef>
+            <a:fillRef idx="1">
+              <a:schemeClr val="accent1"/>
+            </a:fillRef>
+            <a:effectRef idx="0">
+              <a:schemeClr val="accent1"/>
+            </a:effectRef>
+            <a:fontRef idx="minor">
+              <a:schemeClr val="lt1"/>
+            </a:fontRef>
+          </p:style>
+          <p:txBody>
+            <a:bodyPr rtlCol="0" anchor="ctr"/>
+            <a:lstStyle/>
+            <a:p>
+              <a:pPr algn="ctr"/>
+              <a:endParaRPr lang="en-US" dirty="0"/>
+            </a:p>
+          </p:txBody>
+        </p:sp>
+        <p:pic>
+          <p:nvPicPr>
+            <p:cNvPr id="4" name="Picture 3"/>
+            <p:cNvPicPr>
+              <a:picLocks noChangeAspect="1"/>
+            </p:cNvPicPr>
+            <p:nvPr/>
+          </p:nvPicPr>
+          <p:blipFill>
+            <a:blip r:embed="rId2">
+              <a:extLst>
+                <a:ext uri="{28A0092B-C50C-407E-A947-70E740481C1C}">
+                  <a14:useLocalDpi xmlns:a14="http://schemas.microsoft.com/office/drawing/2010/main" val="0"/>
+                </a:ext>
+              </a:extLst>
+            </a:blip>
+            <a:stretch>
+              <a:fillRect/>
+            </a:stretch>
+          </p:blipFill>
+          <p:spPr>
+            <a:xfrm>
+              <a:off x="486409" y="544094"/>
+              <a:ext cx="12192000" cy="5943600"/>
+            </a:xfrm>
+            <a:prstGeom prst="rect">
+              <a:avLst/>
+            </a:prstGeom>
+            <a:solidFill>
+              <a:schemeClr val="bg1"/>
+            </a:solidFill>
+            <a:ln>
+              <a:solidFill>
+                <a:schemeClr val="bg1"/>
+              </a:solidFill>
+            </a:ln>
+          </p:spPr>
+        </p:pic>
+        <p:sp>
+          <p:nvSpPr>
+            <p:cNvPr id="9" name="Rectangle 8"/>
+            <p:cNvSpPr/>
+            <p:nvPr/>
+          </p:nvSpPr>
+          <p:spPr>
+            <a:xfrm>
+              <a:off x="10996809" y="499846"/>
+              <a:ext cx="2444869" cy="828317"/>
+            </a:xfrm>
+            <a:prstGeom prst="rect">
+              <a:avLst/>
+            </a:prstGeom>
+            <a:solidFill>
+              <a:schemeClr val="bg1"/>
+            </a:solidFill>
+            <a:ln>
+              <a:solidFill>
+                <a:schemeClr val="bg1"/>
+              </a:solidFill>
+            </a:ln>
+          </p:spPr>
+          <p:txBody>
+            <a:bodyPr wrap="square">
+              <a:spAutoFit/>
+            </a:bodyPr>
+            <a:lstStyle/>
+            <a:p>
+              <a:endParaRPr lang="en-US" sz="1600" dirty="0">
+                <a:latin typeface="Cambria Math" panose="02040503050406030204" pitchFamily="18" charset="0"/>
+                <a:ea typeface="Cambria Math" panose="02040503050406030204" pitchFamily="18" charset="0"/>
+              </a:endParaRPr>
+            </a:p>
+          </p:txBody>
+        </p:sp>
+        <mc:AlternateContent xmlns:mc="http://schemas.openxmlformats.org/markup-compatibility/2006">
+          <mc:Choice xmlns:a14="http://schemas.microsoft.com/office/drawing/2010/main" Requires="a14">
             <p:sp>
               <p:nvSpPr>
-                <p:cNvPr id="9" name="Rectangle 8"/>
+                <p:cNvPr id="8" name="Rectangle 7"/>
                 <p:cNvSpPr/>
                 <p:nvPr/>
               </p:nvSpPr>
               <p:spPr>
                 <a:xfrm>
-                  <a:off x="10681850" y="481987"/>
-                  <a:ext cx="2444869" cy="828317"/>
+                  <a:off x="0" y="3067786"/>
+                  <a:ext cx="1910080" cy="584775"/>
                 </a:xfrm>
                 <a:prstGeom prst="rect">
                   <a:avLst/>
                 </a:prstGeom>
-                <a:grpFill/>
+                <a:solidFill>
+                  <a:schemeClr val="bg1"/>
+                </a:solidFill>
                 <a:ln>
                   <a:solidFill>
                     <a:schemeClr val="bg1"/>
@@ -8588,6 +8598,105 @@
                 </a:bodyPr>
                 <a:lstStyle/>
                 <a:p>
+                  <a:pPr algn="ctr"/>
+                  <a14:m>
+                    <m:oMathPara xmlns:m="http://schemas.openxmlformats.org/officeDocument/2006/math">
+                      <m:oMathParaPr>
+                        <m:jc m:val="centerGroup"/>
+                      </m:oMathParaPr>
+                      <m:oMath xmlns:m="http://schemas.openxmlformats.org/officeDocument/2006/math">
+                        <m:r>
+                          <a:rPr lang="en-US" sz="1600" b="0" i="1" dirty="0" smtClean="0">
+                            <a:latin typeface="Cambria Math" panose="02040503050406030204" pitchFamily="18" charset="0"/>
+                            <a:ea typeface="Cambria Math" panose="02040503050406030204" pitchFamily="18" charset="0"/>
+                          </a:rPr>
+                          <m:t>−</m:t>
+                        </m:r>
+                        <m:r>
+                          <a:rPr lang="en-US" sz="1600" b="0" i="1" dirty="0" smtClean="0">
+                            <a:latin typeface="Cambria Math" panose="02040503050406030204" pitchFamily="18" charset="0"/>
+                            <a:ea typeface="Cambria Math" panose="02040503050406030204" pitchFamily="18" charset="0"/>
+                          </a:rPr>
+                          <m:t>𝑙𝑜</m:t>
+                        </m:r>
+                        <m:sSub>
+                          <m:sSubPr>
+                            <m:ctrlPr>
+                              <a:rPr lang="en-US" sz="1600" b="0" i="1" dirty="0" smtClean="0">
+                                <a:latin typeface="Cambria Math" panose="02040503050406030204" pitchFamily="18" charset="0"/>
+                                <a:ea typeface="Cambria Math" panose="02040503050406030204" pitchFamily="18" charset="0"/>
+                              </a:rPr>
+                            </m:ctrlPr>
+                          </m:sSubPr>
+                          <m:e>
+                            <m:r>
+                              <a:rPr lang="en-US" sz="1600" i="1" dirty="0" smtClean="0">
+                                <a:latin typeface="Cambria Math" panose="02040503050406030204" pitchFamily="18" charset="0"/>
+                                <a:ea typeface="Cambria Math" panose="02040503050406030204" pitchFamily="18" charset="0"/>
+                              </a:rPr>
+                              <m:t>𝑔</m:t>
+                            </m:r>
+                          </m:e>
+                          <m:sub>
+                            <m:r>
+                              <a:rPr lang="en-US" sz="1600" b="0" i="1" dirty="0" smtClean="0">
+                                <a:latin typeface="Cambria Math" panose="02040503050406030204" pitchFamily="18" charset="0"/>
+                                <a:ea typeface="Cambria Math" panose="02040503050406030204" pitchFamily="18" charset="0"/>
+                              </a:rPr>
+                              <m:t>10</m:t>
+                            </m:r>
+                          </m:sub>
+                        </m:sSub>
+                        <m:d>
+                          <m:dPr>
+                            <m:ctrlPr>
+                              <a:rPr lang="en-US" sz="1600" b="0" i="1" dirty="0" smtClean="0">
+                                <a:latin typeface="Cambria Math" panose="02040503050406030204" pitchFamily="18" charset="0"/>
+                                <a:ea typeface="Cambria Math" panose="02040503050406030204" pitchFamily="18" charset="0"/>
+                              </a:rPr>
+                            </m:ctrlPr>
+                          </m:dPr>
+                          <m:e>
+                            <m:r>
+                              <a:rPr lang="en-US" sz="1600" b="0" i="1" dirty="0" smtClean="0">
+                                <a:latin typeface="Cambria Math" panose="02040503050406030204" pitchFamily="18" charset="0"/>
+                                <a:ea typeface="Cambria Math" panose="02040503050406030204" pitchFamily="18" charset="0"/>
+                              </a:rPr>
+                              <m:t>𝑝</m:t>
+                            </m:r>
+                            <m:r>
+                              <a:rPr lang="en-US" sz="1600" b="0" i="1" dirty="0" smtClean="0">
+                                <a:latin typeface="Cambria Math" panose="02040503050406030204" pitchFamily="18" charset="0"/>
+                                <a:ea typeface="Cambria Math" panose="02040503050406030204" pitchFamily="18" charset="0"/>
+                              </a:rPr>
+                              <m:t>−</m:t>
+                            </m:r>
+                            <m:r>
+                              <a:rPr lang="en-US" sz="1600" b="0" i="1" dirty="0" smtClean="0">
+                                <a:latin typeface="Cambria Math" panose="02040503050406030204" pitchFamily="18" charset="0"/>
+                                <a:ea typeface="Cambria Math" panose="02040503050406030204" pitchFamily="18" charset="0"/>
+                              </a:rPr>
+                              <m:t>𝑣𝑎𝑙𝑢𝑒</m:t>
+                            </m:r>
+                          </m:e>
+                        </m:d>
+                      </m:oMath>
+                    </m:oMathPara>
+                  </a14:m>
+                  <a:endParaRPr lang="en-US" sz="1600" b="0" dirty="0" smtClean="0">
+                    <a:latin typeface="Cambria Math" panose="02040503050406030204" pitchFamily="18" charset="0"/>
+                    <a:ea typeface="Cambria Math" panose="02040503050406030204" pitchFamily="18" charset="0"/>
+                  </a:endParaRPr>
+                </a:p>
+                <a:p>
+                  <a:pPr algn="ctr"/>
+                  <a:r>
+                    <a:rPr lang="en-US" sz="1600" dirty="0" smtClean="0">
+                      <a:latin typeface="Cambria Math" panose="02040503050406030204" pitchFamily="18" charset="0"/>
+                      <a:ea typeface="Cambria Math" panose="02040503050406030204" pitchFamily="18" charset="0"/>
+                    </a:rPr>
+                    <a:t>DNase</a:t>
+                  </a:r>
                   <a:endParaRPr lang="en-US" sz="1600" dirty="0">
                     <a:latin typeface="Cambria Math" panose="02040503050406030204" pitchFamily="18" charset="0"/>
                     <a:ea typeface="Cambria Math" panose="02040503050406030204" pitchFamily="18" charset="0"/>
@@ -8595,853 +8704,714 @@
                 </a:p>
               </p:txBody>
             </p:sp>
-          </p:grpSp>
-          <mc:AlternateContent xmlns:mc="http://schemas.openxmlformats.org/markup-compatibility/2006" xmlns:a14="http://schemas.microsoft.com/office/drawing/2010/main">
-            <mc:Choice Requires="a14">
-              <p:sp>
-                <p:nvSpPr>
-                  <p:cNvPr id="8" name="Rectangle 7"/>
-                  <p:cNvSpPr/>
-                  <p:nvPr/>
-                </p:nvSpPr>
-                <p:spPr>
-                  <a:xfrm>
-                    <a:off x="579121" y="3429000"/>
-                    <a:ext cx="1910080" cy="584775"/>
-                  </a:xfrm>
-                  <a:prstGeom prst="rect">
-                    <a:avLst/>
-                  </a:prstGeom>
-                  <a:grpFill/>
-                  <a:ln>
-                    <a:solidFill>
-                      <a:schemeClr val="bg1"/>
-                    </a:solidFill>
-                  </a:ln>
-                </p:spPr>
-                <p:txBody>
-                  <a:bodyPr wrap="square">
-                    <a:spAutoFit/>
-                  </a:bodyPr>
-                  <a:lstStyle/>
-                  <a:p>
-                    <a:pPr algn="ctr"/>
-                    <a14:m>
-                      <m:oMathPara xmlns:m="http://schemas.openxmlformats.org/officeDocument/2006/math">
-                        <m:oMathParaPr>
-                          <m:jc m:val="centerGroup"/>
-                        </m:oMathParaPr>
-                        <m:oMath xmlns:m="http://schemas.openxmlformats.org/officeDocument/2006/math">
-                          <m:r>
-                            <a:rPr lang="en-US" sz="1600" b="0" i="1" dirty="0" smtClean="0">
-                              <a:latin typeface="Cambria Math" panose="02040503050406030204" pitchFamily="18" charset="0"/>
-                              <a:ea typeface="Cambria Math" panose="02040503050406030204" pitchFamily="18" charset="0"/>
-                            </a:rPr>
-                            <m:t>−</m:t>
-                          </m:r>
-                          <m:r>
-                            <a:rPr lang="en-US" sz="1600" b="0" i="1" dirty="0" smtClean="0">
-                              <a:latin typeface="Cambria Math" panose="02040503050406030204" pitchFamily="18" charset="0"/>
-                              <a:ea typeface="Cambria Math" panose="02040503050406030204" pitchFamily="18" charset="0"/>
-                            </a:rPr>
-                            <m:t>𝑙𝑜</m:t>
-                          </m:r>
-                          <m:sSub>
-                            <m:sSubPr>
-                              <m:ctrlPr>
-                                <a:rPr lang="en-US" sz="1600" b="0" i="1" dirty="0" smtClean="0">
-                                  <a:latin typeface="Cambria Math" panose="02040503050406030204" pitchFamily="18" charset="0"/>
-                                  <a:ea typeface="Cambria Math" panose="02040503050406030204" pitchFamily="18" charset="0"/>
-                                </a:rPr>
-                              </m:ctrlPr>
-                            </m:sSubPr>
-                            <m:e>
-                              <m:r>
-                                <a:rPr lang="en-US" sz="1600" i="1" dirty="0" smtClean="0">
-                                  <a:latin typeface="Cambria Math" panose="02040503050406030204" pitchFamily="18" charset="0"/>
-                                  <a:ea typeface="Cambria Math" panose="02040503050406030204" pitchFamily="18" charset="0"/>
-                                </a:rPr>
-                                <m:t>𝑔</m:t>
-                              </m:r>
-                            </m:e>
-                            <m:sub>
-                              <m:r>
-                                <a:rPr lang="en-US" sz="1600" b="0" i="1" dirty="0" smtClean="0">
-                                  <a:latin typeface="Cambria Math" panose="02040503050406030204" pitchFamily="18" charset="0"/>
-                                  <a:ea typeface="Cambria Math" panose="02040503050406030204" pitchFamily="18" charset="0"/>
-                                </a:rPr>
-                                <m:t>10</m:t>
-                              </m:r>
-                            </m:sub>
-                          </m:sSub>
-                          <m:d>
-                            <m:dPr>
-                              <m:ctrlPr>
-                                <a:rPr lang="en-US" sz="1600" b="0" i="1" dirty="0" smtClean="0">
-                                  <a:latin typeface="Cambria Math" panose="02040503050406030204" pitchFamily="18" charset="0"/>
-                                  <a:ea typeface="Cambria Math" panose="02040503050406030204" pitchFamily="18" charset="0"/>
-                                </a:rPr>
-                              </m:ctrlPr>
-                            </m:dPr>
-                            <m:e>
-                              <m:r>
-                                <a:rPr lang="en-US" sz="1600" b="0" i="1" dirty="0" smtClean="0">
-                                  <a:latin typeface="Cambria Math" panose="02040503050406030204" pitchFamily="18" charset="0"/>
-                                  <a:ea typeface="Cambria Math" panose="02040503050406030204" pitchFamily="18" charset="0"/>
-                                </a:rPr>
-                                <m:t>𝑝</m:t>
-                              </m:r>
-                              <m:r>
-                                <a:rPr lang="en-US" sz="1600" b="0" i="1" dirty="0" smtClean="0">
-                                  <a:latin typeface="Cambria Math" panose="02040503050406030204" pitchFamily="18" charset="0"/>
-                                  <a:ea typeface="Cambria Math" panose="02040503050406030204" pitchFamily="18" charset="0"/>
-                                </a:rPr>
-                                <m:t>−</m:t>
-                              </m:r>
-                              <m:r>
-                                <a:rPr lang="en-US" sz="1600" b="0" i="1" dirty="0" smtClean="0">
-                                  <a:latin typeface="Cambria Math" panose="02040503050406030204" pitchFamily="18" charset="0"/>
-                                  <a:ea typeface="Cambria Math" panose="02040503050406030204" pitchFamily="18" charset="0"/>
-                                </a:rPr>
-                                <m:t>𝑣𝑎𝑙𝑢𝑒</m:t>
-                              </m:r>
-                            </m:e>
-                          </m:d>
-                        </m:oMath>
-                      </m:oMathPara>
-                    </a14:m>
-                    <a:endParaRPr lang="en-US" sz="1600" b="0" dirty="0" smtClean="0">
-                      <a:latin typeface="Cambria Math" panose="02040503050406030204" pitchFamily="18" charset="0"/>
-                      <a:ea typeface="Cambria Math" panose="02040503050406030204" pitchFamily="18" charset="0"/>
-                    </a:endParaRPr>
-                  </a:p>
-                  <a:p>
-                    <a:pPr algn="ctr"/>
-                    <a:r>
-                      <a:rPr lang="en-US" sz="1600" dirty="0" smtClean="0">
-                        <a:latin typeface="Cambria Math" panose="02040503050406030204" pitchFamily="18" charset="0"/>
-                        <a:ea typeface="Cambria Math" panose="02040503050406030204" pitchFamily="18" charset="0"/>
-                      </a:rPr>
-                      <a:t>DNase</a:t>
-                    </a:r>
-                    <a:endParaRPr lang="en-US" sz="1600" dirty="0">
-                      <a:latin typeface="Cambria Math" panose="02040503050406030204" pitchFamily="18" charset="0"/>
-                      <a:ea typeface="Cambria Math" panose="02040503050406030204" pitchFamily="18" charset="0"/>
-                    </a:endParaRPr>
-                  </a:p>
-                </p:txBody>
-              </p:sp>
-            </mc:Choice>
-            <mc:Fallback xmlns="">
-              <p:sp>
-                <p:nvSpPr>
-                  <p:cNvPr id="8" name="Rectangle 7"/>
-                  <p:cNvSpPr>
-                    <a:spLocks noRot="1" noChangeAspect="1" noMove="1" noResize="1" noEditPoints="1" noAdjustHandles="1" noChangeArrowheads="1" noChangeShapeType="1" noTextEdit="1"/>
-                  </p:cNvSpPr>
-                  <p:nvPr/>
-                </p:nvSpPr>
-                <p:spPr>
-                  <a:xfrm>
-                    <a:off x="579121" y="3429000"/>
-                    <a:ext cx="1910080" cy="584775"/>
-                  </a:xfrm>
-                  <a:prstGeom prst="rect">
-                    <a:avLst/>
-                  </a:prstGeom>
-                  <a:blipFill rotWithShape="0">
-                    <a:blip r:embed="rId3"/>
-                    <a:stretch>
-                      <a:fillRect b="-10204"/>
-                    </a:stretch>
-                  </a:blipFill>
-                  <a:ln>
-                    <a:solidFill>
-                      <a:schemeClr val="bg1"/>
-                    </a:solidFill>
-                  </a:ln>
-                </p:spPr>
-                <p:txBody>
-                  <a:bodyPr/>
-                  <a:lstStyle/>
-                  <a:p>
-                    <a:r>
-                      <a:rPr lang="en-US">
-                        <a:noFill/>
-                      </a:rPr>
-                      <a:t> </a:t>
-                    </a:r>
-                  </a:p>
-                </p:txBody>
-              </p:sp>
-            </mc:Fallback>
-          </mc:AlternateContent>
-          <mc:AlternateContent xmlns:mc="http://schemas.openxmlformats.org/markup-compatibility/2006" xmlns:a14="http://schemas.microsoft.com/office/drawing/2010/main">
-            <mc:Choice Requires="a14">
-              <p:sp>
-                <p:nvSpPr>
-                  <p:cNvPr id="11" name="Rectangle 10"/>
-                  <p:cNvSpPr/>
-                  <p:nvPr/>
-                </p:nvSpPr>
-                <p:spPr>
-                  <a:xfrm>
-                    <a:off x="579121" y="1689377"/>
-                    <a:ext cx="1910080" cy="584775"/>
-                  </a:xfrm>
-                  <a:prstGeom prst="rect">
-                    <a:avLst/>
-                  </a:prstGeom>
-                  <a:grpFill/>
-                  <a:ln>
-                    <a:solidFill>
-                      <a:schemeClr val="bg1"/>
-                    </a:solidFill>
-                  </a:ln>
-                </p:spPr>
-                <p:txBody>
-                  <a:bodyPr wrap="square">
-                    <a:spAutoFit/>
-                  </a:bodyPr>
-                  <a:lstStyle/>
-                  <a:p>
-                    <a:pPr algn="ctr"/>
-                    <a14:m>
-                      <m:oMathPara xmlns:m="http://schemas.openxmlformats.org/officeDocument/2006/math">
-                        <m:oMathParaPr>
-                          <m:jc m:val="centerGroup"/>
-                        </m:oMathParaPr>
-                        <m:oMath xmlns:m="http://schemas.openxmlformats.org/officeDocument/2006/math">
-                          <m:r>
-                            <a:rPr lang="en-US" sz="1600" b="0" i="1" dirty="0" smtClean="0">
-                              <a:latin typeface="Cambria Math" panose="02040503050406030204" pitchFamily="18" charset="0"/>
-                              <a:ea typeface="Cambria Math" panose="02040503050406030204" pitchFamily="18" charset="0"/>
-                            </a:rPr>
-                            <m:t>−</m:t>
-                          </m:r>
-                          <m:r>
-                            <a:rPr lang="en-US" sz="1600" b="0" i="1" dirty="0" smtClean="0">
-                              <a:latin typeface="Cambria Math" panose="02040503050406030204" pitchFamily="18" charset="0"/>
-                              <a:ea typeface="Cambria Math" panose="02040503050406030204" pitchFamily="18" charset="0"/>
-                            </a:rPr>
-                            <m:t>𝑙𝑜</m:t>
-                          </m:r>
-                          <m:sSub>
-                            <m:sSubPr>
-                              <m:ctrlPr>
-                                <a:rPr lang="en-US" sz="1600" b="0" i="1" dirty="0" smtClean="0">
-                                  <a:latin typeface="Cambria Math" panose="02040503050406030204" pitchFamily="18" charset="0"/>
-                                  <a:ea typeface="Cambria Math" panose="02040503050406030204" pitchFamily="18" charset="0"/>
-                                </a:rPr>
-                              </m:ctrlPr>
-                            </m:sSubPr>
-                            <m:e>
-                              <m:r>
-                                <a:rPr lang="en-US" sz="1600" i="1" dirty="0" smtClean="0">
-                                  <a:latin typeface="Cambria Math" panose="02040503050406030204" pitchFamily="18" charset="0"/>
-                                  <a:ea typeface="Cambria Math" panose="02040503050406030204" pitchFamily="18" charset="0"/>
-                                </a:rPr>
-                                <m:t>𝑔</m:t>
-                              </m:r>
-                            </m:e>
-                            <m:sub>
-                              <m:r>
-                                <a:rPr lang="en-US" sz="1600" b="0" i="1" dirty="0" smtClean="0">
-                                  <a:latin typeface="Cambria Math" panose="02040503050406030204" pitchFamily="18" charset="0"/>
-                                  <a:ea typeface="Cambria Math" panose="02040503050406030204" pitchFamily="18" charset="0"/>
-                                </a:rPr>
-                                <m:t>10</m:t>
-                              </m:r>
-                            </m:sub>
-                          </m:sSub>
-                          <m:d>
-                            <m:dPr>
-                              <m:ctrlPr>
-                                <a:rPr lang="en-US" sz="1600" b="0" i="1" dirty="0" smtClean="0">
-                                  <a:latin typeface="Cambria Math" panose="02040503050406030204" pitchFamily="18" charset="0"/>
-                                  <a:ea typeface="Cambria Math" panose="02040503050406030204" pitchFamily="18" charset="0"/>
-                                </a:rPr>
-                              </m:ctrlPr>
-                            </m:dPr>
-                            <m:e>
-                              <m:r>
-                                <a:rPr lang="en-US" sz="1600" i="1" dirty="0">
-                                  <a:latin typeface="Cambria Math" panose="02040503050406030204" pitchFamily="18" charset="0"/>
-                                  <a:ea typeface="Cambria Math" panose="02040503050406030204" pitchFamily="18" charset="0"/>
-                                </a:rPr>
-                                <m:t>𝑝</m:t>
-                              </m:r>
-                              <m:r>
-                                <a:rPr lang="en-US" sz="1600" i="1" dirty="0">
-                                  <a:latin typeface="Cambria Math" panose="02040503050406030204" pitchFamily="18" charset="0"/>
-                                  <a:ea typeface="Cambria Math" panose="02040503050406030204" pitchFamily="18" charset="0"/>
-                                </a:rPr>
-                                <m:t>−</m:t>
-                              </m:r>
-                              <m:r>
-                                <a:rPr lang="en-US" sz="1600" i="1" dirty="0">
-                                  <a:latin typeface="Cambria Math" panose="02040503050406030204" pitchFamily="18" charset="0"/>
-                                  <a:ea typeface="Cambria Math" panose="02040503050406030204" pitchFamily="18" charset="0"/>
-                                </a:rPr>
-                                <m:t>𝑣𝑎𝑙𝑢𝑒</m:t>
-                              </m:r>
-                            </m:e>
-                          </m:d>
-                        </m:oMath>
-                      </m:oMathPara>
-                    </a14:m>
-                    <a:endParaRPr lang="en-US" sz="1600" b="0" dirty="0" smtClean="0">
-                      <a:latin typeface="Cambria Math" panose="02040503050406030204" pitchFamily="18" charset="0"/>
-                      <a:ea typeface="Cambria Math" panose="02040503050406030204" pitchFamily="18" charset="0"/>
-                    </a:endParaRPr>
-                  </a:p>
-                  <a:p>
-                    <a:pPr algn="ctr"/>
-                    <a:r>
-                      <a:rPr lang="en-US" sz="1600" dirty="0">
-                        <a:latin typeface="Cambria Math" panose="02040503050406030204" pitchFamily="18" charset="0"/>
-                        <a:ea typeface="Cambria Math" panose="02040503050406030204" pitchFamily="18" charset="0"/>
-                      </a:rPr>
-                      <a:t>H3K27ac</a:t>
-                    </a:r>
-                  </a:p>
-                </p:txBody>
-              </p:sp>
-            </mc:Choice>
-            <mc:Fallback xmlns="">
-              <p:sp>
-                <p:nvSpPr>
-                  <p:cNvPr id="11" name="Rectangle 10"/>
-                  <p:cNvSpPr>
-                    <a:spLocks noRot="1" noChangeAspect="1" noMove="1" noResize="1" noEditPoints="1" noAdjustHandles="1" noChangeArrowheads="1" noChangeShapeType="1" noTextEdit="1"/>
-                  </p:cNvSpPr>
-                  <p:nvPr/>
-                </p:nvSpPr>
-                <p:spPr>
-                  <a:xfrm>
-                    <a:off x="579121" y="1689377"/>
-                    <a:ext cx="1910080" cy="584775"/>
-                  </a:xfrm>
-                  <a:prstGeom prst="rect">
-                    <a:avLst/>
-                  </a:prstGeom>
-                  <a:blipFill rotWithShape="0">
-                    <a:blip r:embed="rId4"/>
-                    <a:stretch>
-                      <a:fillRect b="-10204"/>
-                    </a:stretch>
-                  </a:blipFill>
-                  <a:ln>
-                    <a:solidFill>
-                      <a:schemeClr val="bg1"/>
-                    </a:solidFill>
-                  </a:ln>
-                </p:spPr>
-                <p:txBody>
-                  <a:bodyPr/>
-                  <a:lstStyle/>
-                  <a:p>
-                    <a:r>
-                      <a:rPr lang="en-US">
-                        <a:noFill/>
-                      </a:rPr>
-                      <a:t> </a:t>
-                    </a:r>
-                  </a:p>
-                </p:txBody>
-              </p:sp>
-            </mc:Fallback>
-          </mc:AlternateContent>
-          <mc:AlternateContent xmlns:mc="http://schemas.openxmlformats.org/markup-compatibility/2006" xmlns:a14="http://schemas.microsoft.com/office/drawing/2010/main">
-            <mc:Choice Requires="a14">
-              <p:sp>
-                <p:nvSpPr>
-                  <p:cNvPr id="12" name="Rectangle 11"/>
-                  <p:cNvSpPr/>
-                  <p:nvPr/>
-                </p:nvSpPr>
-                <p:spPr>
-                  <a:xfrm>
-                    <a:off x="1530553" y="5346069"/>
-                    <a:ext cx="879774" cy="338554"/>
-                  </a:xfrm>
-                  <a:prstGeom prst="rect">
-                    <a:avLst/>
-                  </a:prstGeom>
-                  <a:grpFill/>
-                  <a:ln>
-                    <a:solidFill>
-                      <a:schemeClr val="bg1"/>
-                    </a:solidFill>
-                  </a:ln>
-                </p:spPr>
-                <p:txBody>
-                  <a:bodyPr wrap="square">
-                    <a:spAutoFit/>
-                  </a:bodyPr>
-                  <a:lstStyle/>
-                  <a:p>
-                    <a:pPr algn="ctr"/>
-                    <a14:m>
-                      <m:oMathPara xmlns:m="http://schemas.openxmlformats.org/officeDocument/2006/math">
-                        <m:oMathParaPr>
-                          <m:jc m:val="centerGroup"/>
-                        </m:oMathParaPr>
-                        <m:oMath xmlns:m="http://schemas.openxmlformats.org/officeDocument/2006/math">
-                          <m:r>
-                            <a:rPr lang="en-US" sz="1600" b="0" i="1" dirty="0" smtClean="0">
-                              <a:latin typeface="Cambria Math" panose="02040503050406030204" pitchFamily="18" charset="0"/>
-                              <a:ea typeface="Cambria Math" panose="02040503050406030204" pitchFamily="18" charset="0"/>
-                            </a:rPr>
-                            <m:t>𝑃</m:t>
-                          </m:r>
-                          <m:d>
-                            <m:dPr>
-                              <m:ctrlPr>
-                                <a:rPr lang="en-US" sz="1600" b="0" i="1" dirty="0" smtClean="0">
-                                  <a:latin typeface="Cambria Math" panose="02040503050406030204" pitchFamily="18" charset="0"/>
-                                  <a:ea typeface="Cambria Math" panose="02040503050406030204" pitchFamily="18" charset="0"/>
-                                </a:rPr>
-                              </m:ctrlPr>
-                            </m:dPr>
-                            <m:e>
-                              <m:sSub>
-                                <m:sSubPr>
-                                  <m:ctrlPr>
-                                    <a:rPr lang="en-US" sz="1600" i="1" dirty="0">
-                                      <a:latin typeface="Cambria Math" panose="02040503050406030204" pitchFamily="18" charset="0"/>
-                                      <a:ea typeface="Cambria Math" panose="02040503050406030204" pitchFamily="18" charset="0"/>
-                                    </a:rPr>
-                                  </m:ctrlPr>
-                                </m:sSubPr>
-                                <m:e>
-                                  <m:r>
-                                    <a:rPr lang="en-US" sz="1600" i="1" dirty="0">
-                                      <a:latin typeface="Cambria Math" panose="02040503050406030204" pitchFamily="18" charset="0"/>
-                                      <a:ea typeface="Cambria Math" panose="02040503050406030204" pitchFamily="18" charset="0"/>
-                                    </a:rPr>
-                                    <m:t>𝑦</m:t>
-                                  </m:r>
-                                </m:e>
-                                <m:sub>
-                                  <m:r>
-                                    <a:rPr lang="en-US" sz="1600" i="1" dirty="0">
-                                      <a:latin typeface="Cambria Math" panose="02040503050406030204" pitchFamily="18" charset="0"/>
-                                      <a:ea typeface="Cambria Math" panose="02040503050406030204" pitchFamily="18" charset="0"/>
-                                    </a:rPr>
-                                    <m:t>𝑡</m:t>
-                                  </m:r>
-                                </m:sub>
-                              </m:sSub>
-                            </m:e>
-                            <m:e>
-                              <m:r>
-                                <a:rPr lang="en-US" sz="1600" b="0" i="1" dirty="0" smtClean="0">
-                                  <a:latin typeface="Cambria Math" panose="02040503050406030204" pitchFamily="18" charset="0"/>
-                                  <a:ea typeface="Cambria Math" panose="02040503050406030204" pitchFamily="18" charset="0"/>
-                                </a:rPr>
-                                <m:t>𝑋</m:t>
-                              </m:r>
-                            </m:e>
-                          </m:d>
-                          <m:r>
-                            <a:rPr lang="en-US" sz="1600" b="0" i="1" dirty="0" smtClean="0">
-                              <a:latin typeface="Cambria Math" panose="02040503050406030204" pitchFamily="18" charset="0"/>
-                              <a:ea typeface="Cambria Math" panose="02040503050406030204" pitchFamily="18" charset="0"/>
-                            </a:rPr>
-                            <m:t> </m:t>
-                          </m:r>
-                        </m:oMath>
-                      </m:oMathPara>
-                    </a14:m>
-                    <a:endParaRPr lang="en-US" sz="1600" dirty="0">
-                      <a:latin typeface="Cambria Math" panose="02040503050406030204" pitchFamily="18" charset="0"/>
-                      <a:ea typeface="Cambria Math" panose="02040503050406030204" pitchFamily="18" charset="0"/>
-                    </a:endParaRPr>
-                  </a:p>
-                </p:txBody>
-              </p:sp>
-            </mc:Choice>
-            <mc:Fallback xmlns="">
-              <p:sp>
-                <p:nvSpPr>
-                  <p:cNvPr id="12" name="Rectangle 11"/>
-                  <p:cNvSpPr>
-                    <a:spLocks noRot="1" noChangeAspect="1" noMove="1" noResize="1" noEditPoints="1" noAdjustHandles="1" noChangeArrowheads="1" noChangeShapeType="1" noTextEdit="1"/>
-                  </p:cNvSpPr>
-                  <p:nvPr/>
-                </p:nvSpPr>
-                <p:spPr>
-                  <a:xfrm>
-                    <a:off x="1530553" y="5346069"/>
-                    <a:ext cx="879774" cy="338554"/>
-                  </a:xfrm>
-                  <a:prstGeom prst="rect">
-                    <a:avLst/>
-                  </a:prstGeom>
-                  <a:blipFill rotWithShape="0">
-                    <a:blip r:embed="rId5"/>
-                    <a:stretch>
-                      <a:fillRect l="-1370" b="-3509"/>
-                    </a:stretch>
-                  </a:blipFill>
-                  <a:ln>
-                    <a:solidFill>
-                      <a:schemeClr val="bg1"/>
-                    </a:solidFill>
-                  </a:ln>
-                </p:spPr>
-                <p:txBody>
-                  <a:bodyPr/>
-                  <a:lstStyle/>
-                  <a:p>
-                    <a:r>
-                      <a:rPr lang="en-US">
-                        <a:noFill/>
-                      </a:rPr>
-                      <a:t> </a:t>
-                    </a:r>
-                  </a:p>
-                </p:txBody>
-              </p:sp>
-            </mc:Fallback>
-          </mc:AlternateContent>
-          <p:sp>
-            <p:nvSpPr>
-              <p:cNvPr id="13" name="Rectangle 12"/>
-              <p:cNvSpPr/>
-              <p:nvPr/>
-            </p:nvSpPr>
-            <p:spPr>
-              <a:xfrm>
-                <a:off x="6402188" y="1164388"/>
-                <a:ext cx="1959492" cy="307777"/>
-              </a:xfrm>
-              <a:prstGeom prst="rect">
-                <a:avLst/>
-              </a:prstGeom>
-              <a:grpFill/>
-              <a:ln>
+          </mc:Choice>
+          <mc:Fallback>
+            <p:sp>
+              <p:nvSpPr>
+                <p:cNvPr id="8" name="Rectangle 7"/>
+                <p:cNvSpPr>
+                  <a:spLocks noRot="1" noChangeAspect="1" noMove="1" noResize="1" noEditPoints="1" noAdjustHandles="1" noChangeArrowheads="1" noChangeShapeType="1" noTextEdit="1"/>
+                </p:cNvSpPr>
+                <p:nvPr/>
+              </p:nvSpPr>
+              <p:spPr>
+                <a:xfrm>
+                  <a:off x="0" y="3067786"/>
+                  <a:ext cx="1910080" cy="584775"/>
+                </a:xfrm>
+                <a:prstGeom prst="rect">
+                  <a:avLst/>
+                </a:prstGeom>
+                <a:blipFill rotWithShape="0">
+                  <a:blip r:embed="rId3"/>
+                  <a:stretch>
+                    <a:fillRect b="-10204"/>
+                  </a:stretch>
+                </a:blipFill>
+                <a:ln>
+                  <a:solidFill>
+                    <a:schemeClr val="bg1"/>
+                  </a:solidFill>
+                </a:ln>
+              </p:spPr>
+              <p:txBody>
+                <a:bodyPr/>
+                <a:lstStyle/>
+                <a:p>
+                  <a:r>
+                    <a:rPr lang="en-US">
+                      <a:noFill/>
+                    </a:rPr>
+                    <a:t> </a:t>
+                  </a:r>
+                </a:p>
+              </p:txBody>
+            </p:sp>
+          </mc:Fallback>
+        </mc:AlternateContent>
+        <mc:AlternateContent xmlns:mc="http://schemas.openxmlformats.org/markup-compatibility/2006">
+          <mc:Choice xmlns:a14="http://schemas.microsoft.com/office/drawing/2010/main" Requires="a14">
+            <p:sp>
+              <p:nvSpPr>
+                <p:cNvPr id="11" name="Rectangle 10"/>
+                <p:cNvSpPr/>
+                <p:nvPr/>
+              </p:nvSpPr>
+              <p:spPr>
+                <a:xfrm>
+                  <a:off x="0" y="1328163"/>
+                  <a:ext cx="1910080" cy="584775"/>
+                </a:xfrm>
+                <a:prstGeom prst="rect">
+                  <a:avLst/>
+                </a:prstGeom>
                 <a:solidFill>
                   <a:schemeClr val="bg1"/>
                 </a:solidFill>
-              </a:ln>
-            </p:spPr>
-            <p:txBody>
-              <a:bodyPr wrap="square">
-                <a:spAutoFit/>
-              </a:bodyPr>
-              <a:lstStyle/>
-              <a:p>
-                <a:pPr algn="ctr"/>
-                <a:endParaRPr lang="en-US" sz="1400" dirty="0">
-                  <a:latin typeface="Cambria Math" panose="02040503050406030204" pitchFamily="18" charset="0"/>
-                  <a:ea typeface="Cambria Math" panose="02040503050406030204" pitchFamily="18" charset="0"/>
-                </a:endParaRPr>
-              </a:p>
-            </p:txBody>
-          </p:sp>
-          <p:sp>
-            <p:nvSpPr>
-              <p:cNvPr id="14" name="Rectangle 13"/>
-              <p:cNvSpPr/>
-              <p:nvPr/>
-            </p:nvSpPr>
-            <p:spPr>
-              <a:xfrm>
-                <a:off x="6281463" y="6365113"/>
-                <a:ext cx="2538612" cy="338554"/>
-              </a:xfrm>
-              <a:prstGeom prst="rect">
-                <a:avLst/>
-              </a:prstGeom>
-              <a:grpFill/>
-              <a:ln>
+                <a:ln>
+                  <a:solidFill>
+                    <a:schemeClr val="bg1"/>
+                  </a:solidFill>
+                </a:ln>
+              </p:spPr>
+              <p:txBody>
+                <a:bodyPr wrap="square">
+                  <a:spAutoFit/>
+                </a:bodyPr>
+                <a:lstStyle/>
+                <a:p>
+                  <a:pPr algn="ctr"/>
+                  <a14:m>
+                    <m:oMathPara xmlns:m="http://schemas.openxmlformats.org/officeDocument/2006/math">
+                      <m:oMathParaPr>
+                        <m:jc m:val="centerGroup"/>
+                      </m:oMathParaPr>
+                      <m:oMath xmlns:m="http://schemas.openxmlformats.org/officeDocument/2006/math">
+                        <m:r>
+                          <a:rPr lang="en-US" sz="1600" b="0" i="1" dirty="0" smtClean="0">
+                            <a:latin typeface="Cambria Math" panose="02040503050406030204" pitchFamily="18" charset="0"/>
+                            <a:ea typeface="Cambria Math" panose="02040503050406030204" pitchFamily="18" charset="0"/>
+                          </a:rPr>
+                          <m:t>−</m:t>
+                        </m:r>
+                        <m:r>
+                          <a:rPr lang="en-US" sz="1600" b="0" i="1" dirty="0" smtClean="0">
+                            <a:latin typeface="Cambria Math" panose="02040503050406030204" pitchFamily="18" charset="0"/>
+                            <a:ea typeface="Cambria Math" panose="02040503050406030204" pitchFamily="18" charset="0"/>
+                          </a:rPr>
+                          <m:t>𝑙𝑜</m:t>
+                        </m:r>
+                        <m:sSub>
+                          <m:sSubPr>
+                            <m:ctrlPr>
+                              <a:rPr lang="en-US" sz="1600" b="0" i="1" dirty="0" smtClean="0">
+                                <a:latin typeface="Cambria Math" panose="02040503050406030204" pitchFamily="18" charset="0"/>
+                                <a:ea typeface="Cambria Math" panose="02040503050406030204" pitchFamily="18" charset="0"/>
+                              </a:rPr>
+                            </m:ctrlPr>
+                          </m:sSubPr>
+                          <m:e>
+                            <m:r>
+                              <a:rPr lang="en-US" sz="1600" i="1" dirty="0" smtClean="0">
+                                <a:latin typeface="Cambria Math" panose="02040503050406030204" pitchFamily="18" charset="0"/>
+                                <a:ea typeface="Cambria Math" panose="02040503050406030204" pitchFamily="18" charset="0"/>
+                              </a:rPr>
+                              <m:t>𝑔</m:t>
+                            </m:r>
+                          </m:e>
+                          <m:sub>
+                            <m:r>
+                              <a:rPr lang="en-US" sz="1600" b="0" i="1" dirty="0" smtClean="0">
+                                <a:latin typeface="Cambria Math" panose="02040503050406030204" pitchFamily="18" charset="0"/>
+                                <a:ea typeface="Cambria Math" panose="02040503050406030204" pitchFamily="18" charset="0"/>
+                              </a:rPr>
+                              <m:t>10</m:t>
+                            </m:r>
+                          </m:sub>
+                        </m:sSub>
+                        <m:d>
+                          <m:dPr>
+                            <m:ctrlPr>
+                              <a:rPr lang="en-US" sz="1600" b="0" i="1" dirty="0" smtClean="0">
+                                <a:latin typeface="Cambria Math" panose="02040503050406030204" pitchFamily="18" charset="0"/>
+                                <a:ea typeface="Cambria Math" panose="02040503050406030204" pitchFamily="18" charset="0"/>
+                              </a:rPr>
+                            </m:ctrlPr>
+                          </m:dPr>
+                          <m:e>
+                            <m:r>
+                              <a:rPr lang="en-US" sz="1600" i="1" dirty="0">
+                                <a:latin typeface="Cambria Math" panose="02040503050406030204" pitchFamily="18" charset="0"/>
+                                <a:ea typeface="Cambria Math" panose="02040503050406030204" pitchFamily="18" charset="0"/>
+                              </a:rPr>
+                              <m:t>𝑝</m:t>
+                            </m:r>
+                            <m:r>
+                              <a:rPr lang="en-US" sz="1600" i="1" dirty="0">
+                                <a:latin typeface="Cambria Math" panose="02040503050406030204" pitchFamily="18" charset="0"/>
+                                <a:ea typeface="Cambria Math" panose="02040503050406030204" pitchFamily="18" charset="0"/>
+                              </a:rPr>
+                              <m:t>−</m:t>
+                            </m:r>
+                            <m:r>
+                              <a:rPr lang="en-US" sz="1600" i="1" dirty="0">
+                                <a:latin typeface="Cambria Math" panose="02040503050406030204" pitchFamily="18" charset="0"/>
+                                <a:ea typeface="Cambria Math" panose="02040503050406030204" pitchFamily="18" charset="0"/>
+                              </a:rPr>
+                              <m:t>𝑣𝑎𝑙𝑢𝑒</m:t>
+                            </m:r>
+                          </m:e>
+                        </m:d>
+                      </m:oMath>
+                    </m:oMathPara>
+                  </a14:m>
+                  <a:endParaRPr lang="en-US" sz="1600" b="0" dirty="0" smtClean="0">
+                    <a:latin typeface="Cambria Math" panose="02040503050406030204" pitchFamily="18" charset="0"/>
+                    <a:ea typeface="Cambria Math" panose="02040503050406030204" pitchFamily="18" charset="0"/>
+                  </a:endParaRPr>
+                </a:p>
+                <a:p>
+                  <a:pPr algn="ctr"/>
+                  <a:r>
+                    <a:rPr lang="en-US" sz="1600" dirty="0">
+                      <a:latin typeface="Cambria Math" panose="02040503050406030204" pitchFamily="18" charset="0"/>
+                      <a:ea typeface="Cambria Math" panose="02040503050406030204" pitchFamily="18" charset="0"/>
+                    </a:rPr>
+                    <a:t>H3K27ac</a:t>
+                  </a:r>
+                </a:p>
+              </p:txBody>
+            </p:sp>
+          </mc:Choice>
+          <mc:Fallback>
+            <p:sp>
+              <p:nvSpPr>
+                <p:cNvPr id="11" name="Rectangle 10"/>
+                <p:cNvSpPr>
+                  <a:spLocks noRot="1" noChangeAspect="1" noMove="1" noResize="1" noEditPoints="1" noAdjustHandles="1" noChangeArrowheads="1" noChangeShapeType="1" noTextEdit="1"/>
+                </p:cNvSpPr>
+                <p:nvPr/>
+              </p:nvSpPr>
+              <p:spPr>
+                <a:xfrm>
+                  <a:off x="0" y="1328163"/>
+                  <a:ext cx="1910080" cy="584775"/>
+                </a:xfrm>
+                <a:prstGeom prst="rect">
+                  <a:avLst/>
+                </a:prstGeom>
+                <a:blipFill rotWithShape="0">
+                  <a:blip r:embed="rId4"/>
+                  <a:stretch>
+                    <a:fillRect b="-10204"/>
+                  </a:stretch>
+                </a:blipFill>
+                <a:ln>
+                  <a:solidFill>
+                    <a:schemeClr val="bg1"/>
+                  </a:solidFill>
+                </a:ln>
+              </p:spPr>
+              <p:txBody>
+                <a:bodyPr/>
+                <a:lstStyle/>
+                <a:p>
+                  <a:r>
+                    <a:rPr lang="en-US">
+                      <a:noFill/>
+                    </a:rPr>
+                    <a:t> </a:t>
+                  </a:r>
+                </a:p>
+              </p:txBody>
+            </p:sp>
+          </mc:Fallback>
+        </mc:AlternateContent>
+        <mc:AlternateContent xmlns:mc="http://schemas.openxmlformats.org/markup-compatibility/2006">
+          <mc:Choice xmlns:a14="http://schemas.microsoft.com/office/drawing/2010/main" Requires="a14">
+            <p:sp>
+              <p:nvSpPr>
+                <p:cNvPr id="12" name="Rectangle 11"/>
+                <p:cNvSpPr/>
+                <p:nvPr/>
+              </p:nvSpPr>
+              <p:spPr>
+                <a:xfrm>
+                  <a:off x="951432" y="4984855"/>
+                  <a:ext cx="879774" cy="338554"/>
+                </a:xfrm>
+                <a:prstGeom prst="rect">
+                  <a:avLst/>
+                </a:prstGeom>
                 <a:solidFill>
                   <a:schemeClr val="bg1"/>
                 </a:solidFill>
-              </a:ln>
-            </p:spPr>
-            <p:txBody>
-              <a:bodyPr wrap="square">
-                <a:spAutoFit/>
-              </a:bodyPr>
-              <a:lstStyle/>
-              <a:p>
-                <a:pPr algn="ctr"/>
-                <a:r>
-                  <a:rPr lang="en-US" sz="1600" dirty="0" smtClean="0">
+                <a:ln>
+                  <a:solidFill>
+                    <a:schemeClr val="bg1"/>
+                  </a:solidFill>
+                </a:ln>
+              </p:spPr>
+              <p:txBody>
+                <a:bodyPr wrap="square">
+                  <a:spAutoFit/>
+                </a:bodyPr>
+                <a:lstStyle/>
+                <a:p>
+                  <a:pPr algn="ctr"/>
+                  <a14:m>
+                    <m:oMathPara xmlns:m="http://schemas.openxmlformats.org/officeDocument/2006/math">
+                      <m:oMathParaPr>
+                        <m:jc m:val="centerGroup"/>
+                      </m:oMathParaPr>
+                      <m:oMath xmlns:m="http://schemas.openxmlformats.org/officeDocument/2006/math">
+                        <m:r>
+                          <a:rPr lang="en-US" sz="1600" b="0" i="1" dirty="0" smtClean="0">
+                            <a:latin typeface="Cambria Math" panose="02040503050406030204" pitchFamily="18" charset="0"/>
+                            <a:ea typeface="Cambria Math" panose="02040503050406030204" pitchFamily="18" charset="0"/>
+                          </a:rPr>
+                          <m:t>𝑃</m:t>
+                        </m:r>
+                        <m:d>
+                          <m:dPr>
+                            <m:ctrlPr>
+                              <a:rPr lang="en-US" sz="1600" b="0" i="1" dirty="0" smtClean="0">
+                                <a:latin typeface="Cambria Math" panose="02040503050406030204" pitchFamily="18" charset="0"/>
+                                <a:ea typeface="Cambria Math" panose="02040503050406030204" pitchFamily="18" charset="0"/>
+                              </a:rPr>
+                            </m:ctrlPr>
+                          </m:dPr>
+                          <m:e>
+                            <m:sSub>
+                              <m:sSubPr>
+                                <m:ctrlPr>
+                                  <a:rPr lang="en-US" sz="1600" i="1" dirty="0">
+                                    <a:latin typeface="Cambria Math" panose="02040503050406030204" pitchFamily="18" charset="0"/>
+                                    <a:ea typeface="Cambria Math" panose="02040503050406030204" pitchFamily="18" charset="0"/>
+                                  </a:rPr>
+                                </m:ctrlPr>
+                              </m:sSubPr>
+                              <m:e>
+                                <m:r>
+                                  <a:rPr lang="en-US" sz="1600" i="1" dirty="0">
+                                    <a:latin typeface="Cambria Math" panose="02040503050406030204" pitchFamily="18" charset="0"/>
+                                    <a:ea typeface="Cambria Math" panose="02040503050406030204" pitchFamily="18" charset="0"/>
+                                  </a:rPr>
+                                  <m:t>𝑦</m:t>
+                                </m:r>
+                              </m:e>
+                              <m:sub>
+                                <m:r>
+                                  <a:rPr lang="en-US" sz="1600" i="1" dirty="0">
+                                    <a:latin typeface="Cambria Math" panose="02040503050406030204" pitchFamily="18" charset="0"/>
+                                    <a:ea typeface="Cambria Math" panose="02040503050406030204" pitchFamily="18" charset="0"/>
+                                  </a:rPr>
+                                  <m:t>𝑡</m:t>
+                                </m:r>
+                              </m:sub>
+                            </m:sSub>
+                          </m:e>
+                          <m:e>
+                            <m:r>
+                              <a:rPr lang="en-US" sz="1600" b="0" i="1" dirty="0" smtClean="0">
+                                <a:latin typeface="Cambria Math" panose="02040503050406030204" pitchFamily="18" charset="0"/>
+                                <a:ea typeface="Cambria Math" panose="02040503050406030204" pitchFamily="18" charset="0"/>
+                              </a:rPr>
+                              <m:t>𝑋</m:t>
+                            </m:r>
+                          </m:e>
+                        </m:d>
+                        <m:r>
+                          <a:rPr lang="en-US" sz="1600" b="0" i="1" dirty="0" smtClean="0">
+                            <a:latin typeface="Cambria Math" panose="02040503050406030204" pitchFamily="18" charset="0"/>
+                            <a:ea typeface="Cambria Math" panose="02040503050406030204" pitchFamily="18" charset="0"/>
+                          </a:rPr>
+                          <m:t> </m:t>
+                        </m:r>
+                      </m:oMath>
+                    </m:oMathPara>
+                  </a14:m>
+                  <a:endParaRPr lang="en-US" sz="1600" dirty="0">
                     <a:latin typeface="Cambria Math" panose="02040503050406030204" pitchFamily="18" charset="0"/>
                     <a:ea typeface="Cambria Math" panose="02040503050406030204" pitchFamily="18" charset="0"/>
-                  </a:rPr>
-                  <a:t>Position In DNA Sequence</a:t>
-                </a:r>
-                <a:endParaRPr lang="en-US" sz="1600" dirty="0">
+                  </a:endParaRPr>
+                </a:p>
+              </p:txBody>
+            </p:sp>
+          </mc:Choice>
+          <mc:Fallback>
+            <p:sp>
+              <p:nvSpPr>
+                <p:cNvPr id="12" name="Rectangle 11"/>
+                <p:cNvSpPr>
+                  <a:spLocks noRot="1" noChangeAspect="1" noMove="1" noResize="1" noEditPoints="1" noAdjustHandles="1" noChangeArrowheads="1" noChangeShapeType="1" noTextEdit="1"/>
+                </p:cNvSpPr>
+                <p:nvPr/>
+              </p:nvSpPr>
+              <p:spPr>
+                <a:xfrm>
+                  <a:off x="951432" y="4984855"/>
+                  <a:ext cx="879774" cy="338554"/>
+                </a:xfrm>
+                <a:prstGeom prst="rect">
+                  <a:avLst/>
+                </a:prstGeom>
+                <a:blipFill rotWithShape="0">
+                  <a:blip r:embed="rId5"/>
+                  <a:stretch>
+                    <a:fillRect l="-1370" b="-3509"/>
+                  </a:stretch>
+                </a:blipFill>
+                <a:ln>
+                  <a:solidFill>
+                    <a:schemeClr val="bg1"/>
+                  </a:solidFill>
+                </a:ln>
+              </p:spPr>
+              <p:txBody>
+                <a:bodyPr/>
+                <a:lstStyle/>
+                <a:p>
+                  <a:r>
+                    <a:rPr lang="en-US">
+                      <a:noFill/>
+                    </a:rPr>
+                    <a:t> </a:t>
+                  </a:r>
+                </a:p>
+              </p:txBody>
+            </p:sp>
+          </mc:Fallback>
+        </mc:AlternateContent>
+        <p:sp>
+          <p:nvSpPr>
+            <p:cNvPr id="13" name="Rectangle 12"/>
+            <p:cNvSpPr/>
+            <p:nvPr/>
+          </p:nvSpPr>
+          <p:spPr>
+            <a:xfrm>
+              <a:off x="5823067" y="803174"/>
+              <a:ext cx="1959492" cy="307777"/>
+            </a:xfrm>
+            <a:prstGeom prst="rect">
+              <a:avLst/>
+            </a:prstGeom>
+            <a:solidFill>
+              <a:schemeClr val="bg1"/>
+            </a:solidFill>
+            <a:ln>
+              <a:solidFill>
+                <a:schemeClr val="bg1"/>
+              </a:solidFill>
+            </a:ln>
+          </p:spPr>
+          <p:txBody>
+            <a:bodyPr wrap="square">
+              <a:spAutoFit/>
+            </a:bodyPr>
+            <a:lstStyle/>
+            <a:p>
+              <a:pPr algn="ctr"/>
+              <a:endParaRPr lang="en-US" sz="1400" dirty="0">
+                <a:latin typeface="Cambria Math" panose="02040503050406030204" pitchFamily="18" charset="0"/>
+                <a:ea typeface="Cambria Math" panose="02040503050406030204" pitchFamily="18" charset="0"/>
+              </a:endParaRPr>
+            </a:p>
+          </p:txBody>
+        </p:sp>
+        <p:sp>
+          <p:nvSpPr>
+            <p:cNvPr id="14" name="Rectangle 13"/>
+            <p:cNvSpPr/>
+            <p:nvPr/>
+          </p:nvSpPr>
+          <p:spPr>
+            <a:xfrm>
+              <a:off x="5702342" y="6003899"/>
+              <a:ext cx="2538612" cy="338554"/>
+            </a:xfrm>
+            <a:prstGeom prst="rect">
+              <a:avLst/>
+            </a:prstGeom>
+            <a:solidFill>
+              <a:schemeClr val="bg1"/>
+            </a:solidFill>
+            <a:ln>
+              <a:solidFill>
+                <a:schemeClr val="bg1"/>
+              </a:solidFill>
+            </a:ln>
+          </p:spPr>
+          <p:txBody>
+            <a:bodyPr wrap="square">
+              <a:spAutoFit/>
+            </a:bodyPr>
+            <a:lstStyle/>
+            <a:p>
+              <a:pPr algn="ctr"/>
+              <a:r>
+                <a:rPr lang="en-US" sz="1600" dirty="0" smtClean="0">
                   <a:latin typeface="Cambria Math" panose="02040503050406030204" pitchFamily="18" charset="0"/>
                   <a:ea typeface="Cambria Math" panose="02040503050406030204" pitchFamily="18" charset="0"/>
-                </a:endParaRPr>
-              </a:p>
-            </p:txBody>
-          </p:sp>
-          <p:sp>
-            <p:nvSpPr>
-              <p:cNvPr id="16" name="Rectangle 15"/>
-              <p:cNvSpPr/>
-              <p:nvPr/>
-            </p:nvSpPr>
-            <p:spPr>
-              <a:xfrm>
-                <a:off x="12115800" y="1592580"/>
-                <a:ext cx="1264920" cy="4663440"/>
-              </a:xfrm>
-              <a:prstGeom prst="rect">
-                <a:avLst/>
-              </a:prstGeom>
-              <a:grpFill/>
-              <a:ln>
-                <a:solidFill>
-                  <a:schemeClr val="bg1"/>
-                </a:solidFill>
-              </a:ln>
-            </p:spPr>
-            <p:style>
-              <a:lnRef idx="2">
-                <a:schemeClr val="accent1">
-                  <a:shade val="50000"/>
-                </a:schemeClr>
-              </a:lnRef>
-              <a:fillRef idx="1">
-                <a:schemeClr val="accent1"/>
-              </a:fillRef>
-              <a:effectRef idx="0">
-                <a:schemeClr val="accent1"/>
-              </a:effectRef>
-              <a:fontRef idx="minor">
-                <a:schemeClr val="lt1"/>
-              </a:fontRef>
-            </p:style>
-            <p:txBody>
-              <a:bodyPr rtlCol="0" anchor="ctr"/>
-              <a:lstStyle/>
-              <a:p>
-                <a:pPr algn="ctr"/>
-                <a:endParaRPr lang="en-US" dirty="0"/>
-              </a:p>
-            </p:txBody>
-          </p:sp>
-          <p:sp>
-            <p:nvSpPr>
-              <p:cNvPr id="17" name="Rectangle 16"/>
-              <p:cNvSpPr/>
-              <p:nvPr/>
-            </p:nvSpPr>
-            <p:spPr>
-              <a:xfrm>
-                <a:off x="1253826" y="5943600"/>
-                <a:ext cx="1234103" cy="307777"/>
-              </a:xfrm>
-              <a:prstGeom prst="rect">
-                <a:avLst/>
-              </a:prstGeom>
-              <a:grpFill/>
-              <a:ln>
-                <a:solidFill>
-                  <a:schemeClr val="bg1"/>
-                </a:solidFill>
-              </a:ln>
-            </p:spPr>
-            <p:txBody>
-              <a:bodyPr wrap="square">
-                <a:spAutoFit/>
-              </a:bodyPr>
-              <a:lstStyle/>
-              <a:p>
-                <a:pPr algn="ctr"/>
-                <a:r>
-                  <a:rPr lang="en-US" sz="1400" dirty="0" smtClean="0">
-                    <a:latin typeface="Cambria Math" panose="02040503050406030204" pitchFamily="18" charset="0"/>
-                    <a:ea typeface="Cambria Math" panose="02040503050406030204" pitchFamily="18" charset="0"/>
-                  </a:rPr>
-                  <a:t>Viterbi Path</a:t>
-                </a:r>
-                <a:endParaRPr lang="en-US" sz="1400" dirty="0">
+                </a:rPr>
+                <a:t>Position In DNA Sequence</a:t>
+              </a:r>
+              <a:endParaRPr lang="en-US" sz="1600" dirty="0">
+                <a:latin typeface="Cambria Math" panose="02040503050406030204" pitchFamily="18" charset="0"/>
+                <a:ea typeface="Cambria Math" panose="02040503050406030204" pitchFamily="18" charset="0"/>
+              </a:endParaRPr>
+            </a:p>
+          </p:txBody>
+        </p:sp>
+        <p:sp>
+          <p:nvSpPr>
+            <p:cNvPr id="16" name="Rectangle 15"/>
+            <p:cNvSpPr/>
+            <p:nvPr/>
+          </p:nvSpPr>
+          <p:spPr>
+            <a:xfrm>
+              <a:off x="11536679" y="1231366"/>
+              <a:ext cx="1264920" cy="4663440"/>
+            </a:xfrm>
+            <a:prstGeom prst="rect">
+              <a:avLst/>
+            </a:prstGeom>
+            <a:solidFill>
+              <a:schemeClr val="bg1"/>
+            </a:solidFill>
+            <a:ln>
+              <a:solidFill>
+                <a:schemeClr val="bg1"/>
+              </a:solidFill>
+            </a:ln>
+          </p:spPr>
+          <p:style>
+            <a:lnRef idx="2">
+              <a:schemeClr val="accent1">
+                <a:shade val="50000"/>
+              </a:schemeClr>
+            </a:lnRef>
+            <a:fillRef idx="1">
+              <a:schemeClr val="accent1"/>
+            </a:fillRef>
+            <a:effectRef idx="0">
+              <a:schemeClr val="accent1"/>
+            </a:effectRef>
+            <a:fontRef idx="minor">
+              <a:schemeClr val="lt1"/>
+            </a:fontRef>
+          </p:style>
+          <p:txBody>
+            <a:bodyPr rtlCol="0" anchor="ctr"/>
+            <a:lstStyle/>
+            <a:p>
+              <a:pPr algn="ctr"/>
+              <a:endParaRPr lang="en-US" dirty="0"/>
+            </a:p>
+          </p:txBody>
+        </p:sp>
+        <p:sp>
+          <p:nvSpPr>
+            <p:cNvPr id="17" name="Rectangle 16"/>
+            <p:cNvSpPr/>
+            <p:nvPr/>
+          </p:nvSpPr>
+          <p:spPr>
+            <a:xfrm>
+              <a:off x="674705" y="5582386"/>
+              <a:ext cx="1234103" cy="307777"/>
+            </a:xfrm>
+            <a:prstGeom prst="rect">
+              <a:avLst/>
+            </a:prstGeom>
+            <a:solidFill>
+              <a:schemeClr val="bg1"/>
+            </a:solidFill>
+            <a:ln>
+              <a:solidFill>
+                <a:schemeClr val="bg1"/>
+              </a:solidFill>
+            </a:ln>
+          </p:spPr>
+          <p:txBody>
+            <a:bodyPr wrap="square">
+              <a:spAutoFit/>
+            </a:bodyPr>
+            <a:lstStyle/>
+            <a:p>
+              <a:pPr algn="ctr"/>
+              <a:r>
+                <a:rPr lang="en-US" sz="1400" dirty="0" smtClean="0">
                   <a:latin typeface="Cambria Math" panose="02040503050406030204" pitchFamily="18" charset="0"/>
                   <a:ea typeface="Cambria Math" panose="02040503050406030204" pitchFamily="18" charset="0"/>
-                </a:endParaRPr>
-              </a:p>
-            </p:txBody>
-          </p:sp>
-        </p:grpSp>
-        <p:grpSp>
-          <p:nvGrpSpPr>
-            <p:cNvPr id="18" name="Group 17"/>
-            <p:cNvGrpSpPr/>
+                </a:rPr>
+                <a:t>Viterbi Path</a:t>
+              </a:r>
+              <a:endParaRPr lang="en-US" sz="1400" dirty="0">
+                <a:latin typeface="Cambria Math" panose="02040503050406030204" pitchFamily="18" charset="0"/>
+                <a:ea typeface="Cambria Math" panose="02040503050406030204" pitchFamily="18" charset="0"/>
+              </a:endParaRPr>
+            </a:p>
+          </p:txBody>
+        </p:sp>
+        <p:sp>
+          <p:nvSpPr>
+            <p:cNvPr id="6" name="Rectangle 5"/>
+            <p:cNvSpPr/>
             <p:nvPr/>
-          </p:nvGrpSpPr>
-          <p:grpSpPr>
+          </p:nvSpPr>
+          <p:spPr>
             <a:xfrm>
-              <a:off x="2136834" y="-36413"/>
-              <a:ext cx="6739771" cy="861774"/>
-              <a:chOff x="1398389" y="85189"/>
-              <a:chExt cx="6739771" cy="861774"/>
+              <a:off x="3115885" y="778100"/>
+              <a:ext cx="6096000" cy="861774"/>
             </a:xfrm>
-            <a:grpFill/>
-          </p:grpSpPr>
-          <p:sp>
-            <p:nvSpPr>
-              <p:cNvPr id="6" name="Rectangle 5"/>
-              <p:cNvSpPr/>
-              <p:nvPr/>
-            </p:nvSpPr>
-            <p:spPr>
-              <a:xfrm>
-                <a:off x="2042160" y="85189"/>
-                <a:ext cx="6096000" cy="861774"/>
-              </a:xfrm>
-              <a:prstGeom prst="rect">
-                <a:avLst/>
-              </a:prstGeom>
+            <a:prstGeom prst="rect">
+              <a:avLst/>
+            </a:prstGeom>
+            <a:noFill/>
+            <a:ln>
               <a:noFill/>
-              <a:ln>
-                <a:noFill/>
-              </a:ln>
-            </p:spPr>
-            <p:txBody>
-              <a:bodyPr>
-                <a:spAutoFit/>
-              </a:bodyPr>
-              <a:lstStyle/>
-              <a:p>
-                <a:r>
-                  <a:rPr lang="en-US" sz="1600" dirty="0" smtClean="0">
-                    <a:latin typeface="Cambria Math" panose="02040503050406030204" pitchFamily="18" charset="0"/>
-                    <a:ea typeface="Cambria Math" panose="02040503050406030204" pitchFamily="18" charset="0"/>
-                  </a:rPr>
-                  <a:t>H1 </a:t>
-                </a:r>
-                <a:r>
-                  <a:rPr lang="en-US" sz="1600" dirty="0">
-                    <a:latin typeface="Cambria Math" panose="02040503050406030204" pitchFamily="18" charset="0"/>
-                    <a:ea typeface="Cambria Math" panose="02040503050406030204" pitchFamily="18" charset="0"/>
-                  </a:rPr>
-                  <a:t>BMP4 Derived </a:t>
-                </a:r>
-                <a:r>
-                  <a:rPr lang="en-US" sz="1600" dirty="0" err="1" smtClean="0">
-                    <a:latin typeface="Cambria Math" panose="02040503050406030204" pitchFamily="18" charset="0"/>
-                    <a:ea typeface="Cambria Math" panose="02040503050406030204" pitchFamily="18" charset="0"/>
-                  </a:rPr>
-                  <a:t>Mesendoderm</a:t>
-                </a:r>
-                <a:r>
-                  <a:rPr lang="en-US" sz="1600" dirty="0" smtClean="0">
-                    <a:latin typeface="Cambria Math" panose="02040503050406030204" pitchFamily="18" charset="0"/>
-                    <a:ea typeface="Cambria Math" panose="02040503050406030204" pitchFamily="18" charset="0"/>
-                  </a:rPr>
-                  <a:t> </a:t>
-                </a:r>
-                <a:r>
-                  <a:rPr lang="en-US" sz="1600" dirty="0">
-                    <a:latin typeface="Cambria Math" panose="02040503050406030204" pitchFamily="18" charset="0"/>
-                    <a:ea typeface="Cambria Math" panose="02040503050406030204" pitchFamily="18" charset="0"/>
-                  </a:rPr>
-                  <a:t>Cultured </a:t>
-                </a:r>
-                <a:r>
-                  <a:rPr lang="en-US" sz="1600" dirty="0" smtClean="0">
-                    <a:latin typeface="Cambria Math" panose="02040503050406030204" pitchFamily="18" charset="0"/>
-                    <a:ea typeface="Cambria Math" panose="02040503050406030204" pitchFamily="18" charset="0"/>
-                  </a:rPr>
-                  <a:t>Cells (E004) </a:t>
-                </a:r>
-                <a:endParaRPr lang="en-US" sz="1600" dirty="0">
+            </a:ln>
+          </p:spPr>
+          <p:txBody>
+            <a:bodyPr>
+              <a:spAutoFit/>
+            </a:bodyPr>
+            <a:lstStyle/>
+            <a:p>
+              <a:r>
+                <a:rPr lang="en-US" sz="1600" dirty="0" smtClean="0">
                   <a:latin typeface="Cambria Math" panose="02040503050406030204" pitchFamily="18" charset="0"/>
                   <a:ea typeface="Cambria Math" panose="02040503050406030204" pitchFamily="18" charset="0"/>
-                </a:endParaRPr>
-              </a:p>
-              <a:p>
-                <a:r>
-                  <a:rPr lang="en-US" sz="1600" dirty="0" smtClean="0">
-                    <a:latin typeface="Cambria Math" panose="02040503050406030204" pitchFamily="18" charset="0"/>
-                    <a:ea typeface="Cambria Math" panose="02040503050406030204" pitchFamily="18" charset="0"/>
-                  </a:rPr>
-                  <a:t>Fetal </a:t>
-                </a:r>
-                <a:r>
-                  <a:rPr lang="en-US" sz="1600" dirty="0">
-                    <a:latin typeface="Cambria Math" panose="02040503050406030204" pitchFamily="18" charset="0"/>
-                    <a:ea typeface="Cambria Math" panose="02040503050406030204" pitchFamily="18" charset="0"/>
-                  </a:rPr>
-                  <a:t>Adrenal </a:t>
-                </a:r>
-                <a:r>
-                  <a:rPr lang="en-US" sz="1600" dirty="0" smtClean="0">
-                    <a:latin typeface="Cambria Math" panose="02040503050406030204" pitchFamily="18" charset="0"/>
-                    <a:ea typeface="Cambria Math" panose="02040503050406030204" pitchFamily="18" charset="0"/>
-                  </a:rPr>
-                  <a:t>Gland (E080)</a:t>
-                </a:r>
-              </a:p>
-              <a:p>
-                <a:r>
-                  <a:rPr lang="en-US" sz="1600" dirty="0" smtClean="0">
-                    <a:latin typeface="Cambria Math" panose="02040503050406030204" pitchFamily="18" charset="0"/>
-                    <a:ea typeface="Cambria Math" panose="02040503050406030204" pitchFamily="18" charset="0"/>
-                  </a:rPr>
-                  <a:t>Background</a:t>
-                </a:r>
-                <a:endParaRPr lang="en-US" sz="1600" dirty="0">
+                </a:rPr>
+                <a:t>H1 </a:t>
+              </a:r>
+              <a:r>
+                <a:rPr lang="en-US" sz="1600" dirty="0">
                   <a:latin typeface="Cambria Math" panose="02040503050406030204" pitchFamily="18" charset="0"/>
                   <a:ea typeface="Cambria Math" panose="02040503050406030204" pitchFamily="18" charset="0"/>
-                </a:endParaRPr>
-              </a:p>
-            </p:txBody>
-          </p:sp>
-          <p:pic>
-            <p:nvPicPr>
-              <p:cNvPr id="7" name="Picture 6"/>
-              <p:cNvPicPr>
-                <a:picLocks noChangeAspect="1"/>
-              </p:cNvPicPr>
-              <p:nvPr/>
-            </p:nvPicPr>
-            <p:blipFill rotWithShape="1">
-              <a:blip r:embed="rId6">
-                <a:extLst>
-                  <a:ext uri="{BEBA8EAE-BF5A-486C-A8C5-ECC9F3942E4B}">
-                    <a14:imgProps xmlns:a14="http://schemas.microsoft.com/office/drawing/2010/main">
-                      <a14:imgLayer r:embed="rId7">
-                        <a14:imgEffect>
-                          <a14:sharpenSoften amount="17000"/>
-                        </a14:imgEffect>
-                      </a14:imgLayer>
-                    </a14:imgProps>
-                  </a:ext>
-                  <a:ext uri="{28A0092B-C50C-407E-A947-70E740481C1C}">
-                    <a14:useLocalDpi xmlns:a14="http://schemas.microsoft.com/office/drawing/2010/main" val="0"/>
-                  </a:ext>
-                </a:extLst>
-              </a:blip>
-              <a:srcRect l="90822" t="4241" r="6321" b="89231"/>
-              <a:stretch/>
-            </p:blipFill>
-            <p:spPr>
-              <a:xfrm>
-                <a:off x="1398389" y="156325"/>
-                <a:ext cx="664091" cy="739821"/>
-              </a:xfrm>
-              <a:prstGeom prst="rect">
-                <a:avLst/>
-              </a:prstGeom>
-              <a:grpFill/>
-              <a:ln>
-                <a:solidFill>
-                  <a:schemeClr val="bg1"/>
-                </a:solidFill>
-              </a:ln>
-            </p:spPr>
-          </p:pic>
-        </p:grpSp>
+                </a:rPr>
+                <a:t>BMP4 Derived </a:t>
+              </a:r>
+              <a:r>
+                <a:rPr lang="en-US" sz="1600" dirty="0" err="1" smtClean="0">
+                  <a:latin typeface="Cambria Math" panose="02040503050406030204" pitchFamily="18" charset="0"/>
+                  <a:ea typeface="Cambria Math" panose="02040503050406030204" pitchFamily="18" charset="0"/>
+                </a:rPr>
+                <a:t>Mesendoderm</a:t>
+              </a:r>
+              <a:r>
+                <a:rPr lang="en-US" sz="1600" dirty="0" smtClean="0">
+                  <a:latin typeface="Cambria Math" panose="02040503050406030204" pitchFamily="18" charset="0"/>
+                  <a:ea typeface="Cambria Math" panose="02040503050406030204" pitchFamily="18" charset="0"/>
+                </a:rPr>
+                <a:t> </a:t>
+              </a:r>
+              <a:r>
+                <a:rPr lang="en-US" sz="1600" dirty="0">
+                  <a:latin typeface="Cambria Math" panose="02040503050406030204" pitchFamily="18" charset="0"/>
+                  <a:ea typeface="Cambria Math" panose="02040503050406030204" pitchFamily="18" charset="0"/>
+                </a:rPr>
+                <a:t>Cultured </a:t>
+              </a:r>
+              <a:r>
+                <a:rPr lang="en-US" sz="1600" dirty="0" smtClean="0">
+                  <a:latin typeface="Cambria Math" panose="02040503050406030204" pitchFamily="18" charset="0"/>
+                  <a:ea typeface="Cambria Math" panose="02040503050406030204" pitchFamily="18" charset="0"/>
+                </a:rPr>
+                <a:t>Cells (E004) </a:t>
+              </a:r>
+              <a:endParaRPr lang="en-US" sz="1600" dirty="0">
+                <a:latin typeface="Cambria Math" panose="02040503050406030204" pitchFamily="18" charset="0"/>
+                <a:ea typeface="Cambria Math" panose="02040503050406030204" pitchFamily="18" charset="0"/>
+              </a:endParaRPr>
+            </a:p>
+            <a:p>
+              <a:r>
+                <a:rPr lang="en-US" sz="1600" dirty="0" smtClean="0">
+                  <a:latin typeface="Cambria Math" panose="02040503050406030204" pitchFamily="18" charset="0"/>
+                  <a:ea typeface="Cambria Math" panose="02040503050406030204" pitchFamily="18" charset="0"/>
+                </a:rPr>
+                <a:t>Fetal </a:t>
+              </a:r>
+              <a:r>
+                <a:rPr lang="en-US" sz="1600" dirty="0">
+                  <a:latin typeface="Cambria Math" panose="02040503050406030204" pitchFamily="18" charset="0"/>
+                  <a:ea typeface="Cambria Math" panose="02040503050406030204" pitchFamily="18" charset="0"/>
+                </a:rPr>
+                <a:t>Adrenal </a:t>
+              </a:r>
+              <a:r>
+                <a:rPr lang="en-US" sz="1600" dirty="0" smtClean="0">
+                  <a:latin typeface="Cambria Math" panose="02040503050406030204" pitchFamily="18" charset="0"/>
+                  <a:ea typeface="Cambria Math" panose="02040503050406030204" pitchFamily="18" charset="0"/>
+                </a:rPr>
+                <a:t>Gland (E080)</a:t>
+              </a:r>
+            </a:p>
+            <a:p>
+              <a:r>
+                <a:rPr lang="en-US" sz="1600" dirty="0" smtClean="0">
+                  <a:latin typeface="Cambria Math" panose="02040503050406030204" pitchFamily="18" charset="0"/>
+                  <a:ea typeface="Cambria Math" panose="02040503050406030204" pitchFamily="18" charset="0"/>
+                </a:rPr>
+                <a:t>Background</a:t>
+              </a:r>
+              <a:endParaRPr lang="en-US" sz="1600" dirty="0">
+                <a:latin typeface="Cambria Math" panose="02040503050406030204" pitchFamily="18" charset="0"/>
+                <a:ea typeface="Cambria Math" panose="02040503050406030204" pitchFamily="18" charset="0"/>
+              </a:endParaRPr>
+            </a:p>
+          </p:txBody>
+        </p:sp>
+        <p:pic>
+          <p:nvPicPr>
+            <p:cNvPr id="7" name="Picture 6"/>
+            <p:cNvPicPr>
+              <a:picLocks noChangeAspect="1"/>
+            </p:cNvPicPr>
+            <p:nvPr/>
+          </p:nvPicPr>
+          <p:blipFill rotWithShape="1">
+            <a:blip r:embed="rId6">
+              <a:extLst>
+                <a:ext uri="{BEBA8EAE-BF5A-486C-A8C5-ECC9F3942E4B}">
+                  <a14:imgProps xmlns:a14="http://schemas.microsoft.com/office/drawing/2010/main">
+                    <a14:imgLayer r:embed="rId7">
+                      <a14:imgEffect>
+                        <a14:sharpenSoften amount="17000"/>
+                      </a14:imgEffect>
+                    </a14:imgLayer>
+                  </a14:imgProps>
+                </a:ext>
+                <a:ext uri="{28A0092B-C50C-407E-A947-70E740481C1C}">
+                  <a14:useLocalDpi xmlns:a14="http://schemas.microsoft.com/office/drawing/2010/main" val="0"/>
+                </a:ext>
+              </a:extLst>
+            </a:blip>
+            <a:srcRect l="90822" t="4241" r="6321" b="89231"/>
+            <a:stretch/>
+          </p:blipFill>
+          <p:spPr>
+            <a:xfrm>
+              <a:off x="2472114" y="849236"/>
+              <a:ext cx="664091" cy="739821"/>
+            </a:xfrm>
+            <a:prstGeom prst="rect">
+              <a:avLst/>
+            </a:prstGeom>
+            <a:solidFill>
+              <a:schemeClr val="bg1"/>
+            </a:solidFill>
+            <a:ln>
+              <a:solidFill>
+                <a:schemeClr val="bg1"/>
+              </a:solidFill>
+            </a:ln>
+          </p:spPr>
+        </p:pic>
       </p:grpSp>
     </p:spTree>
     <p:extLst>
@@ -9480,971 +9450,53 @@
           <a:chExt cx="0" cy="0"/>
         </a:xfrm>
       </p:grpSpPr>
-      <p:grpSp>
-        <p:nvGrpSpPr>
-          <p:cNvPr id="20" name="Group 19"/>
-          <p:cNvGrpSpPr/>
+      <p:sp>
+        <p:nvSpPr>
+          <p:cNvPr id="93" name="Content Placeholder 92"/>
+          <p:cNvSpPr>
+            <a:spLocks noGrp="1"/>
+          </p:cNvSpPr>
+          <p:nvPr>
+            <p:ph idx="1"/>
+          </p:nvPr>
+        </p:nvSpPr>
+        <p:spPr/>
+        <p:txBody>
+          <a:bodyPr/>
+          <a:lstStyle/>
+          <a:p>
+            <a:endParaRPr lang="en-US"/>
+          </a:p>
+        </p:txBody>
+      </p:sp>
+      <p:pic>
+        <p:nvPicPr>
+          <p:cNvPr id="94" name="Picture 93"/>
+          <p:cNvPicPr>
+            <a:picLocks noChangeAspect="1"/>
+          </p:cNvPicPr>
           <p:nvPr/>
-        </p:nvGrpSpPr>
-        <p:grpSpPr>
+        </p:nvPicPr>
+        <p:blipFill>
+          <a:blip r:embed="rId2"/>
+          <a:stretch>
+            <a:fillRect/>
+          </a:stretch>
+        </p:blipFill>
+        <p:spPr>
           <a:xfrm>
-            <a:off x="0" y="370306"/>
-            <a:ext cx="13441678" cy="5963182"/>
-            <a:chOff x="-335280" y="-444207"/>
-            <a:chExt cx="13441678" cy="5963182"/>
+            <a:off x="0" y="170234"/>
+            <a:ext cx="12192000" cy="6517532"/>
           </a:xfrm>
-          <a:solidFill>
-            <a:schemeClr val="bg1"/>
-          </a:solidFill>
-        </p:grpSpPr>
-        <p:grpSp>
-          <p:nvGrpSpPr>
-            <p:cNvPr id="19" name="Group 18"/>
-            <p:cNvGrpSpPr/>
-            <p:nvPr/>
-          </p:nvGrpSpPr>
-          <p:grpSpPr>
-            <a:xfrm>
-              <a:off x="-335280" y="-444207"/>
-              <a:ext cx="13441678" cy="5963182"/>
-              <a:chOff x="579121" y="731520"/>
-              <a:chExt cx="13441678" cy="5963182"/>
-            </a:xfrm>
-            <a:grpFill/>
-          </p:grpSpPr>
-          <p:sp>
-            <p:nvSpPr>
-              <p:cNvPr id="5" name="Rectangle 4"/>
-              <p:cNvSpPr/>
-              <p:nvPr/>
-            </p:nvSpPr>
-            <p:spPr>
-              <a:xfrm>
-                <a:off x="5265420" y="731520"/>
-                <a:ext cx="2004060" cy="259080"/>
-              </a:xfrm>
-              <a:prstGeom prst="rect">
-                <a:avLst/>
-              </a:prstGeom>
-              <a:grpFill/>
-              <a:ln>
-                <a:solidFill>
-                  <a:schemeClr val="bg1"/>
-                </a:solidFill>
-              </a:ln>
-            </p:spPr>
-            <p:style>
-              <a:lnRef idx="2">
-                <a:schemeClr val="accent1">
-                  <a:shade val="50000"/>
-                </a:schemeClr>
-              </a:lnRef>
-              <a:fillRef idx="1">
-                <a:schemeClr val="accent1"/>
-              </a:fillRef>
-              <a:effectRef idx="0">
-                <a:schemeClr val="accent1"/>
-              </a:effectRef>
-              <a:fontRef idx="minor">
-                <a:schemeClr val="lt1"/>
-              </a:fontRef>
-            </p:style>
-            <p:txBody>
-              <a:bodyPr rtlCol="0" anchor="ctr"/>
-              <a:lstStyle/>
-              <a:p>
-                <a:pPr algn="ctr"/>
-                <a:endParaRPr lang="en-US" dirty="0"/>
-              </a:p>
-            </p:txBody>
-          </p:sp>
-          <p:sp>
-            <p:nvSpPr>
-              <p:cNvPr id="9" name="Rectangle 8"/>
-              <p:cNvSpPr/>
-              <p:nvPr/>
-            </p:nvSpPr>
-            <p:spPr>
-              <a:xfrm>
-                <a:off x="11575930" y="861060"/>
-                <a:ext cx="2444869" cy="828317"/>
-              </a:xfrm>
-              <a:prstGeom prst="rect">
-                <a:avLst/>
-              </a:prstGeom>
-              <a:grpFill/>
-              <a:ln>
-                <a:solidFill>
-                  <a:schemeClr val="bg1"/>
-                </a:solidFill>
-              </a:ln>
-            </p:spPr>
-            <p:txBody>
-              <a:bodyPr wrap="square">
-                <a:spAutoFit/>
-              </a:bodyPr>
-              <a:lstStyle/>
-              <a:p>
-                <a:endParaRPr lang="en-US" sz="1600" dirty="0">
-                  <a:latin typeface="Cambria Math" panose="02040503050406030204" pitchFamily="18" charset="0"/>
-                  <a:ea typeface="Cambria Math" panose="02040503050406030204" pitchFamily="18" charset="0"/>
-                </a:endParaRPr>
-              </a:p>
-            </p:txBody>
-          </p:sp>
-          <mc:AlternateContent xmlns:mc="http://schemas.openxmlformats.org/markup-compatibility/2006" xmlns:a14="http://schemas.microsoft.com/office/drawing/2010/main">
-            <mc:Choice Requires="a14">
-              <p:sp>
-                <p:nvSpPr>
-                  <p:cNvPr id="8" name="Rectangle 7"/>
-                  <p:cNvSpPr/>
-                  <p:nvPr/>
-                </p:nvSpPr>
-                <p:spPr>
-                  <a:xfrm>
-                    <a:off x="579121" y="3429000"/>
-                    <a:ext cx="1910080" cy="584775"/>
-                  </a:xfrm>
-                  <a:prstGeom prst="rect">
-                    <a:avLst/>
-                  </a:prstGeom>
-                  <a:grpFill/>
-                  <a:ln>
-                    <a:solidFill>
-                      <a:schemeClr val="bg1"/>
-                    </a:solidFill>
-                  </a:ln>
-                </p:spPr>
-                <p:txBody>
-                  <a:bodyPr wrap="square">
-                    <a:spAutoFit/>
-                  </a:bodyPr>
-                  <a:lstStyle/>
-                  <a:p>
-                    <a:pPr algn="ctr"/>
-                    <a14:m>
-                      <m:oMathPara xmlns:m="http://schemas.openxmlformats.org/officeDocument/2006/math">
-                        <m:oMathParaPr>
-                          <m:jc m:val="centerGroup"/>
-                        </m:oMathParaPr>
-                        <m:oMath xmlns:m="http://schemas.openxmlformats.org/officeDocument/2006/math">
-                          <m:r>
-                            <a:rPr lang="en-US" sz="1600" b="0" i="1" dirty="0" smtClean="0">
-                              <a:latin typeface="Cambria Math" panose="02040503050406030204" pitchFamily="18" charset="0"/>
-                              <a:ea typeface="Cambria Math" panose="02040503050406030204" pitchFamily="18" charset="0"/>
-                            </a:rPr>
-                            <m:t>−</m:t>
-                          </m:r>
-                          <m:r>
-                            <a:rPr lang="en-US" sz="1600" b="0" i="1" dirty="0" smtClean="0">
-                              <a:latin typeface="Cambria Math" panose="02040503050406030204" pitchFamily="18" charset="0"/>
-                              <a:ea typeface="Cambria Math" panose="02040503050406030204" pitchFamily="18" charset="0"/>
-                            </a:rPr>
-                            <m:t>𝑙𝑜</m:t>
-                          </m:r>
-                          <m:sSub>
-                            <m:sSubPr>
-                              <m:ctrlPr>
-                                <a:rPr lang="en-US" sz="1600" b="0" i="1" dirty="0" smtClean="0">
-                                  <a:latin typeface="Cambria Math" panose="02040503050406030204" pitchFamily="18" charset="0"/>
-                                  <a:ea typeface="Cambria Math" panose="02040503050406030204" pitchFamily="18" charset="0"/>
-                                </a:rPr>
-                              </m:ctrlPr>
-                            </m:sSubPr>
-                            <m:e>
-                              <m:r>
-                                <a:rPr lang="en-US" sz="1600" i="1" dirty="0" smtClean="0">
-                                  <a:latin typeface="Cambria Math" panose="02040503050406030204" pitchFamily="18" charset="0"/>
-                                  <a:ea typeface="Cambria Math" panose="02040503050406030204" pitchFamily="18" charset="0"/>
-                                </a:rPr>
-                                <m:t>𝑔</m:t>
-                              </m:r>
-                            </m:e>
-                            <m:sub>
-                              <m:r>
-                                <a:rPr lang="en-US" sz="1600" b="0" i="1" dirty="0" smtClean="0">
-                                  <a:latin typeface="Cambria Math" panose="02040503050406030204" pitchFamily="18" charset="0"/>
-                                  <a:ea typeface="Cambria Math" panose="02040503050406030204" pitchFamily="18" charset="0"/>
-                                </a:rPr>
-                                <m:t>10</m:t>
-                              </m:r>
-                            </m:sub>
-                          </m:sSub>
-                          <m:d>
-                            <m:dPr>
-                              <m:ctrlPr>
-                                <a:rPr lang="en-US" sz="1600" b="0" i="1" dirty="0" smtClean="0">
-                                  <a:latin typeface="Cambria Math" panose="02040503050406030204" pitchFamily="18" charset="0"/>
-                                  <a:ea typeface="Cambria Math" panose="02040503050406030204" pitchFamily="18" charset="0"/>
-                                </a:rPr>
-                              </m:ctrlPr>
-                            </m:dPr>
-                            <m:e>
-                              <m:r>
-                                <a:rPr lang="en-US" sz="1600" b="0" i="1" dirty="0" smtClean="0">
-                                  <a:latin typeface="Cambria Math" panose="02040503050406030204" pitchFamily="18" charset="0"/>
-                                  <a:ea typeface="Cambria Math" panose="02040503050406030204" pitchFamily="18" charset="0"/>
-                                </a:rPr>
-                                <m:t>𝑝</m:t>
-                              </m:r>
-                              <m:r>
-                                <a:rPr lang="en-US" sz="1600" b="0" i="1" dirty="0" smtClean="0">
-                                  <a:latin typeface="Cambria Math" panose="02040503050406030204" pitchFamily="18" charset="0"/>
-                                  <a:ea typeface="Cambria Math" panose="02040503050406030204" pitchFamily="18" charset="0"/>
-                                </a:rPr>
-                                <m:t>−</m:t>
-                              </m:r>
-                              <m:r>
-                                <a:rPr lang="en-US" sz="1600" b="0" i="1" dirty="0" smtClean="0">
-                                  <a:latin typeface="Cambria Math" panose="02040503050406030204" pitchFamily="18" charset="0"/>
-                                  <a:ea typeface="Cambria Math" panose="02040503050406030204" pitchFamily="18" charset="0"/>
-                                </a:rPr>
-                                <m:t>𝑣𝑎𝑙𝑢𝑒</m:t>
-                              </m:r>
-                            </m:e>
-                          </m:d>
-                        </m:oMath>
-                      </m:oMathPara>
-                    </a14:m>
-                    <a:endParaRPr lang="en-US" sz="1600" b="0" dirty="0" smtClean="0">
-                      <a:latin typeface="Cambria Math" panose="02040503050406030204" pitchFamily="18" charset="0"/>
-                      <a:ea typeface="Cambria Math" panose="02040503050406030204" pitchFamily="18" charset="0"/>
-                    </a:endParaRPr>
-                  </a:p>
-                  <a:p>
-                    <a:pPr algn="ctr"/>
-                    <a:r>
-                      <a:rPr lang="en-US" sz="1600" dirty="0" smtClean="0">
-                        <a:latin typeface="Cambria Math" panose="02040503050406030204" pitchFamily="18" charset="0"/>
-                        <a:ea typeface="Cambria Math" panose="02040503050406030204" pitchFamily="18" charset="0"/>
-                      </a:rPr>
-                      <a:t>DNase</a:t>
-                    </a:r>
-                    <a:endParaRPr lang="en-US" sz="1600" dirty="0">
-                      <a:latin typeface="Cambria Math" panose="02040503050406030204" pitchFamily="18" charset="0"/>
-                      <a:ea typeface="Cambria Math" panose="02040503050406030204" pitchFamily="18" charset="0"/>
-                    </a:endParaRPr>
-                  </a:p>
-                </p:txBody>
-              </p:sp>
-            </mc:Choice>
-            <mc:Fallback xmlns="">
-              <p:sp>
-                <p:nvSpPr>
-                  <p:cNvPr id="8" name="Rectangle 7"/>
-                  <p:cNvSpPr>
-                    <a:spLocks noRot="1" noChangeAspect="1" noMove="1" noResize="1" noEditPoints="1" noAdjustHandles="1" noChangeArrowheads="1" noChangeShapeType="1" noTextEdit="1"/>
-                  </p:cNvSpPr>
-                  <p:nvPr/>
-                </p:nvSpPr>
-                <p:spPr>
-                  <a:xfrm>
-                    <a:off x="579121" y="3429000"/>
-                    <a:ext cx="1910080" cy="584775"/>
-                  </a:xfrm>
-                  <a:prstGeom prst="rect">
-                    <a:avLst/>
-                  </a:prstGeom>
-                  <a:blipFill rotWithShape="0">
-                    <a:blip r:embed="rId2"/>
-                    <a:stretch>
-                      <a:fillRect b="-10204"/>
-                    </a:stretch>
-                  </a:blipFill>
-                  <a:ln>
-                    <a:solidFill>
-                      <a:schemeClr val="bg1"/>
-                    </a:solidFill>
-                  </a:ln>
-                </p:spPr>
-                <p:txBody>
-                  <a:bodyPr/>
-                  <a:lstStyle/>
-                  <a:p>
-                    <a:r>
-                      <a:rPr lang="en-US">
-                        <a:noFill/>
-                      </a:rPr>
-                      <a:t> </a:t>
-                    </a:r>
-                  </a:p>
-                </p:txBody>
-              </p:sp>
-            </mc:Fallback>
-          </mc:AlternateContent>
-          <mc:AlternateContent xmlns:mc="http://schemas.openxmlformats.org/markup-compatibility/2006" xmlns:a14="http://schemas.microsoft.com/office/drawing/2010/main">
-            <mc:Choice Requires="a14">
-              <p:sp>
-                <p:nvSpPr>
-                  <p:cNvPr id="11" name="Rectangle 10"/>
-                  <p:cNvSpPr/>
-                  <p:nvPr/>
-                </p:nvSpPr>
-                <p:spPr>
-                  <a:xfrm>
-                    <a:off x="579121" y="1689377"/>
-                    <a:ext cx="1910080" cy="584775"/>
-                  </a:xfrm>
-                  <a:prstGeom prst="rect">
-                    <a:avLst/>
-                  </a:prstGeom>
-                  <a:grpFill/>
-                  <a:ln>
-                    <a:solidFill>
-                      <a:schemeClr val="bg1"/>
-                    </a:solidFill>
-                  </a:ln>
-                </p:spPr>
-                <p:txBody>
-                  <a:bodyPr wrap="square">
-                    <a:spAutoFit/>
-                  </a:bodyPr>
-                  <a:lstStyle/>
-                  <a:p>
-                    <a:pPr algn="ctr"/>
-                    <a14:m>
-                      <m:oMathPara xmlns:m="http://schemas.openxmlformats.org/officeDocument/2006/math">
-                        <m:oMathParaPr>
-                          <m:jc m:val="centerGroup"/>
-                        </m:oMathParaPr>
-                        <m:oMath xmlns:m="http://schemas.openxmlformats.org/officeDocument/2006/math">
-                          <m:r>
-                            <a:rPr lang="en-US" sz="1600" b="0" i="1" dirty="0" smtClean="0">
-                              <a:latin typeface="Cambria Math" panose="02040503050406030204" pitchFamily="18" charset="0"/>
-                              <a:ea typeface="Cambria Math" panose="02040503050406030204" pitchFamily="18" charset="0"/>
-                            </a:rPr>
-                            <m:t>−</m:t>
-                          </m:r>
-                          <m:r>
-                            <a:rPr lang="en-US" sz="1600" b="0" i="1" dirty="0" smtClean="0">
-                              <a:latin typeface="Cambria Math" panose="02040503050406030204" pitchFamily="18" charset="0"/>
-                              <a:ea typeface="Cambria Math" panose="02040503050406030204" pitchFamily="18" charset="0"/>
-                            </a:rPr>
-                            <m:t>𝑙𝑜</m:t>
-                          </m:r>
-                          <m:sSub>
-                            <m:sSubPr>
-                              <m:ctrlPr>
-                                <a:rPr lang="en-US" sz="1600" b="0" i="1" dirty="0" smtClean="0">
-                                  <a:latin typeface="Cambria Math" panose="02040503050406030204" pitchFamily="18" charset="0"/>
-                                  <a:ea typeface="Cambria Math" panose="02040503050406030204" pitchFamily="18" charset="0"/>
-                                </a:rPr>
-                              </m:ctrlPr>
-                            </m:sSubPr>
-                            <m:e>
-                              <m:r>
-                                <a:rPr lang="en-US" sz="1600" i="1" dirty="0" smtClean="0">
-                                  <a:latin typeface="Cambria Math" panose="02040503050406030204" pitchFamily="18" charset="0"/>
-                                  <a:ea typeface="Cambria Math" panose="02040503050406030204" pitchFamily="18" charset="0"/>
-                                </a:rPr>
-                                <m:t>𝑔</m:t>
-                              </m:r>
-                            </m:e>
-                            <m:sub>
-                              <m:r>
-                                <a:rPr lang="en-US" sz="1600" b="0" i="1" dirty="0" smtClean="0">
-                                  <a:latin typeface="Cambria Math" panose="02040503050406030204" pitchFamily="18" charset="0"/>
-                                  <a:ea typeface="Cambria Math" panose="02040503050406030204" pitchFamily="18" charset="0"/>
-                                </a:rPr>
-                                <m:t>10</m:t>
-                              </m:r>
-                            </m:sub>
-                          </m:sSub>
-                          <m:d>
-                            <m:dPr>
-                              <m:ctrlPr>
-                                <a:rPr lang="en-US" sz="1600" b="0" i="1" dirty="0" smtClean="0">
-                                  <a:latin typeface="Cambria Math" panose="02040503050406030204" pitchFamily="18" charset="0"/>
-                                  <a:ea typeface="Cambria Math" panose="02040503050406030204" pitchFamily="18" charset="0"/>
-                                </a:rPr>
-                              </m:ctrlPr>
-                            </m:dPr>
-                            <m:e>
-                              <m:r>
-                                <a:rPr lang="en-US" sz="1600" i="1" dirty="0">
-                                  <a:latin typeface="Cambria Math" panose="02040503050406030204" pitchFamily="18" charset="0"/>
-                                  <a:ea typeface="Cambria Math" panose="02040503050406030204" pitchFamily="18" charset="0"/>
-                                </a:rPr>
-                                <m:t>𝑝</m:t>
-                              </m:r>
-                              <m:r>
-                                <a:rPr lang="en-US" sz="1600" i="1" dirty="0">
-                                  <a:latin typeface="Cambria Math" panose="02040503050406030204" pitchFamily="18" charset="0"/>
-                                  <a:ea typeface="Cambria Math" panose="02040503050406030204" pitchFamily="18" charset="0"/>
-                                </a:rPr>
-                                <m:t>−</m:t>
-                              </m:r>
-                              <m:r>
-                                <a:rPr lang="en-US" sz="1600" i="1" dirty="0">
-                                  <a:latin typeface="Cambria Math" panose="02040503050406030204" pitchFamily="18" charset="0"/>
-                                  <a:ea typeface="Cambria Math" panose="02040503050406030204" pitchFamily="18" charset="0"/>
-                                </a:rPr>
-                                <m:t>𝑣𝑎𝑙𝑢𝑒</m:t>
-                              </m:r>
-                            </m:e>
-                          </m:d>
-                        </m:oMath>
-                      </m:oMathPara>
-                    </a14:m>
-                    <a:endParaRPr lang="en-US" sz="1600" b="0" dirty="0" smtClean="0">
-                      <a:latin typeface="Cambria Math" panose="02040503050406030204" pitchFamily="18" charset="0"/>
-                      <a:ea typeface="Cambria Math" panose="02040503050406030204" pitchFamily="18" charset="0"/>
-                    </a:endParaRPr>
-                  </a:p>
-                  <a:p>
-                    <a:pPr algn="ctr"/>
-                    <a:r>
-                      <a:rPr lang="en-US" sz="1600" dirty="0">
-                        <a:latin typeface="Cambria Math" panose="02040503050406030204" pitchFamily="18" charset="0"/>
-                        <a:ea typeface="Cambria Math" panose="02040503050406030204" pitchFamily="18" charset="0"/>
-                      </a:rPr>
-                      <a:t>H3K27ac</a:t>
-                    </a:r>
-                  </a:p>
-                </p:txBody>
-              </p:sp>
-            </mc:Choice>
-            <mc:Fallback xmlns="">
-              <p:sp>
-                <p:nvSpPr>
-                  <p:cNvPr id="11" name="Rectangle 10"/>
-                  <p:cNvSpPr>
-                    <a:spLocks noRot="1" noChangeAspect="1" noMove="1" noResize="1" noEditPoints="1" noAdjustHandles="1" noChangeArrowheads="1" noChangeShapeType="1" noTextEdit="1"/>
-                  </p:cNvSpPr>
-                  <p:nvPr/>
-                </p:nvSpPr>
-                <p:spPr>
-                  <a:xfrm>
-                    <a:off x="579121" y="1689377"/>
-                    <a:ext cx="1910080" cy="584775"/>
-                  </a:xfrm>
-                  <a:prstGeom prst="rect">
-                    <a:avLst/>
-                  </a:prstGeom>
-                  <a:blipFill rotWithShape="0">
-                    <a:blip r:embed="rId3"/>
-                    <a:stretch>
-                      <a:fillRect b="-10204"/>
-                    </a:stretch>
-                  </a:blipFill>
-                  <a:ln>
-                    <a:solidFill>
-                      <a:schemeClr val="bg1"/>
-                    </a:solidFill>
-                  </a:ln>
-                </p:spPr>
-                <p:txBody>
-                  <a:bodyPr/>
-                  <a:lstStyle/>
-                  <a:p>
-                    <a:r>
-                      <a:rPr lang="en-US">
-                        <a:noFill/>
-                      </a:rPr>
-                      <a:t> </a:t>
-                    </a:r>
-                  </a:p>
-                </p:txBody>
-              </p:sp>
-            </mc:Fallback>
-          </mc:AlternateContent>
-          <mc:AlternateContent xmlns:mc="http://schemas.openxmlformats.org/markup-compatibility/2006" xmlns:a14="http://schemas.microsoft.com/office/drawing/2010/main">
-            <mc:Choice Requires="a14">
-              <p:sp>
-                <p:nvSpPr>
-                  <p:cNvPr id="12" name="Rectangle 11"/>
-                  <p:cNvSpPr/>
-                  <p:nvPr/>
-                </p:nvSpPr>
-                <p:spPr>
-                  <a:xfrm>
-                    <a:off x="1602273" y="5346069"/>
-                    <a:ext cx="879774" cy="338554"/>
-                  </a:xfrm>
-                  <a:prstGeom prst="rect">
-                    <a:avLst/>
-                  </a:prstGeom>
-                  <a:grpFill/>
-                  <a:ln>
-                    <a:solidFill>
-                      <a:schemeClr val="bg1"/>
-                    </a:solidFill>
-                  </a:ln>
-                </p:spPr>
-                <p:txBody>
-                  <a:bodyPr wrap="square">
-                    <a:spAutoFit/>
-                  </a:bodyPr>
-                  <a:lstStyle/>
-                  <a:p>
-                    <a:pPr algn="ctr"/>
-                    <a14:m>
-                      <m:oMathPara xmlns:m="http://schemas.openxmlformats.org/officeDocument/2006/math">
-                        <m:oMathParaPr>
-                          <m:jc m:val="centerGroup"/>
-                        </m:oMathParaPr>
-                        <m:oMath xmlns:m="http://schemas.openxmlformats.org/officeDocument/2006/math">
-                          <m:r>
-                            <a:rPr lang="en-US" sz="1600" b="0" i="1" dirty="0" smtClean="0">
-                              <a:latin typeface="Cambria Math" panose="02040503050406030204" pitchFamily="18" charset="0"/>
-                              <a:ea typeface="Cambria Math" panose="02040503050406030204" pitchFamily="18" charset="0"/>
-                            </a:rPr>
-                            <m:t>𝑃</m:t>
-                          </m:r>
-                          <m:d>
-                            <m:dPr>
-                              <m:ctrlPr>
-                                <a:rPr lang="en-US" sz="1600" b="0" i="1" dirty="0" smtClean="0">
-                                  <a:latin typeface="Cambria Math" panose="02040503050406030204" pitchFamily="18" charset="0"/>
-                                  <a:ea typeface="Cambria Math" panose="02040503050406030204" pitchFamily="18" charset="0"/>
-                                </a:rPr>
-                              </m:ctrlPr>
-                            </m:dPr>
-                            <m:e>
-                              <m:sSub>
-                                <m:sSubPr>
-                                  <m:ctrlPr>
-                                    <a:rPr lang="en-US" sz="1600" i="1" dirty="0">
-                                      <a:latin typeface="Cambria Math" panose="02040503050406030204" pitchFamily="18" charset="0"/>
-                                      <a:ea typeface="Cambria Math" panose="02040503050406030204" pitchFamily="18" charset="0"/>
-                                    </a:rPr>
-                                  </m:ctrlPr>
-                                </m:sSubPr>
-                                <m:e>
-                                  <m:r>
-                                    <a:rPr lang="en-US" sz="1600" i="1" dirty="0">
-                                      <a:latin typeface="Cambria Math" panose="02040503050406030204" pitchFamily="18" charset="0"/>
-                                      <a:ea typeface="Cambria Math" panose="02040503050406030204" pitchFamily="18" charset="0"/>
-                                    </a:rPr>
-                                    <m:t>𝑦</m:t>
-                                  </m:r>
-                                </m:e>
-                                <m:sub>
-                                  <m:r>
-                                    <a:rPr lang="en-US" sz="1600" i="1" dirty="0">
-                                      <a:latin typeface="Cambria Math" panose="02040503050406030204" pitchFamily="18" charset="0"/>
-                                      <a:ea typeface="Cambria Math" panose="02040503050406030204" pitchFamily="18" charset="0"/>
-                                    </a:rPr>
-                                    <m:t>𝑡</m:t>
-                                  </m:r>
-                                </m:sub>
-                              </m:sSub>
-                            </m:e>
-                            <m:e>
-                              <m:r>
-                                <a:rPr lang="en-US" sz="1600" b="0" i="1" dirty="0" smtClean="0">
-                                  <a:latin typeface="Cambria Math" panose="02040503050406030204" pitchFamily="18" charset="0"/>
-                                  <a:ea typeface="Cambria Math" panose="02040503050406030204" pitchFamily="18" charset="0"/>
-                                </a:rPr>
-                                <m:t>𝑋</m:t>
-                              </m:r>
-                            </m:e>
-                          </m:d>
-                          <m:r>
-                            <a:rPr lang="en-US" sz="1600" b="0" i="1" dirty="0" smtClean="0">
-                              <a:latin typeface="Cambria Math" panose="02040503050406030204" pitchFamily="18" charset="0"/>
-                              <a:ea typeface="Cambria Math" panose="02040503050406030204" pitchFamily="18" charset="0"/>
-                            </a:rPr>
-                            <m:t> </m:t>
-                          </m:r>
-                        </m:oMath>
-                      </m:oMathPara>
-                    </a14:m>
-                    <a:endParaRPr lang="en-US" sz="1600" dirty="0">
-                      <a:latin typeface="Cambria Math" panose="02040503050406030204" pitchFamily="18" charset="0"/>
-                      <a:ea typeface="Cambria Math" panose="02040503050406030204" pitchFamily="18" charset="0"/>
-                    </a:endParaRPr>
-                  </a:p>
-                </p:txBody>
-              </p:sp>
-            </mc:Choice>
-            <mc:Fallback xmlns="">
-              <p:sp>
-                <p:nvSpPr>
-                  <p:cNvPr id="12" name="Rectangle 11"/>
-                  <p:cNvSpPr>
-                    <a:spLocks noRot="1" noChangeAspect="1" noMove="1" noResize="1" noEditPoints="1" noAdjustHandles="1" noChangeArrowheads="1" noChangeShapeType="1" noTextEdit="1"/>
-                  </p:cNvSpPr>
-                  <p:nvPr/>
-                </p:nvSpPr>
-                <p:spPr>
-                  <a:xfrm>
-                    <a:off x="1602273" y="5346069"/>
-                    <a:ext cx="879774" cy="338554"/>
-                  </a:xfrm>
-                  <a:prstGeom prst="rect">
-                    <a:avLst/>
-                  </a:prstGeom>
-                  <a:blipFill rotWithShape="0">
-                    <a:blip r:embed="rId4"/>
-                    <a:stretch>
-                      <a:fillRect l="-1370" b="-3509"/>
-                    </a:stretch>
-                  </a:blipFill>
-                  <a:ln>
-                    <a:solidFill>
-                      <a:schemeClr val="bg1"/>
-                    </a:solidFill>
-                  </a:ln>
-                </p:spPr>
-                <p:txBody>
-                  <a:bodyPr/>
-                  <a:lstStyle/>
-                  <a:p>
-                    <a:r>
-                      <a:rPr lang="en-US">
-                        <a:noFill/>
-                      </a:rPr>
-                      <a:t> </a:t>
-                    </a:r>
-                  </a:p>
-                </p:txBody>
-              </p:sp>
-            </mc:Fallback>
-          </mc:AlternateContent>
-          <p:sp>
-            <p:nvSpPr>
-              <p:cNvPr id="13" name="Rectangle 12"/>
-              <p:cNvSpPr/>
-              <p:nvPr/>
-            </p:nvSpPr>
-            <p:spPr>
-              <a:xfrm>
-                <a:off x="6402188" y="1164388"/>
-                <a:ext cx="1959492" cy="307777"/>
-              </a:xfrm>
-              <a:prstGeom prst="rect">
-                <a:avLst/>
-              </a:prstGeom>
-              <a:grpFill/>
-              <a:ln>
-                <a:solidFill>
-                  <a:schemeClr val="bg1"/>
-                </a:solidFill>
-              </a:ln>
-            </p:spPr>
-            <p:txBody>
-              <a:bodyPr wrap="square">
-                <a:spAutoFit/>
-              </a:bodyPr>
-              <a:lstStyle/>
-              <a:p>
-                <a:pPr algn="ctr"/>
-                <a:endParaRPr lang="en-US" sz="1400" dirty="0">
-                  <a:latin typeface="Cambria Math" panose="02040503050406030204" pitchFamily="18" charset="0"/>
-                  <a:ea typeface="Cambria Math" panose="02040503050406030204" pitchFamily="18" charset="0"/>
-                </a:endParaRPr>
-              </a:p>
-            </p:txBody>
-          </p:sp>
-          <p:sp>
-            <p:nvSpPr>
-              <p:cNvPr id="14" name="Rectangle 13"/>
-              <p:cNvSpPr/>
-              <p:nvPr/>
-            </p:nvSpPr>
-            <p:spPr>
-              <a:xfrm>
-                <a:off x="6290428" y="6356148"/>
-                <a:ext cx="2538612" cy="338554"/>
-              </a:xfrm>
-              <a:prstGeom prst="rect">
-                <a:avLst/>
-              </a:prstGeom>
-              <a:grpFill/>
-              <a:ln>
-                <a:solidFill>
-                  <a:schemeClr val="bg1"/>
-                </a:solidFill>
-              </a:ln>
-            </p:spPr>
-            <p:txBody>
-              <a:bodyPr wrap="square">
-                <a:spAutoFit/>
-              </a:bodyPr>
-              <a:lstStyle/>
-              <a:p>
-                <a:pPr algn="ctr"/>
-                <a:r>
-                  <a:rPr lang="en-US" sz="1600" dirty="0" smtClean="0">
-                    <a:latin typeface="Cambria Math" panose="02040503050406030204" pitchFamily="18" charset="0"/>
-                    <a:ea typeface="Cambria Math" panose="02040503050406030204" pitchFamily="18" charset="0"/>
-                  </a:rPr>
-                  <a:t>Position In DNA Sequence</a:t>
-                </a:r>
-                <a:endParaRPr lang="en-US" sz="1600" dirty="0">
-                  <a:latin typeface="Cambria Math" panose="02040503050406030204" pitchFamily="18" charset="0"/>
-                  <a:ea typeface="Cambria Math" panose="02040503050406030204" pitchFamily="18" charset="0"/>
-                </a:endParaRPr>
-              </a:p>
-            </p:txBody>
-          </p:sp>
-          <p:sp>
-            <p:nvSpPr>
-              <p:cNvPr id="16" name="Rectangle 15"/>
-              <p:cNvSpPr/>
-              <p:nvPr/>
-            </p:nvSpPr>
-            <p:spPr>
-              <a:xfrm>
-                <a:off x="12115800" y="1592580"/>
-                <a:ext cx="1264920" cy="4663440"/>
-              </a:xfrm>
-              <a:prstGeom prst="rect">
-                <a:avLst/>
-              </a:prstGeom>
-              <a:grpFill/>
-              <a:ln>
-                <a:solidFill>
-                  <a:schemeClr val="bg1"/>
-                </a:solidFill>
-              </a:ln>
-            </p:spPr>
-            <p:style>
-              <a:lnRef idx="2">
-                <a:schemeClr val="accent1">
-                  <a:shade val="50000"/>
-                </a:schemeClr>
-              </a:lnRef>
-              <a:fillRef idx="1">
-                <a:schemeClr val="accent1"/>
-              </a:fillRef>
-              <a:effectRef idx="0">
-                <a:schemeClr val="accent1"/>
-              </a:effectRef>
-              <a:fontRef idx="minor">
-                <a:schemeClr val="lt1"/>
-              </a:fontRef>
-            </p:style>
-            <p:txBody>
-              <a:bodyPr rtlCol="0" anchor="ctr"/>
-              <a:lstStyle/>
-              <a:p>
-                <a:pPr algn="ctr"/>
-                <a:endParaRPr lang="en-US" dirty="0"/>
-              </a:p>
-            </p:txBody>
-          </p:sp>
-          <p:sp>
-            <p:nvSpPr>
-              <p:cNvPr id="17" name="Rectangle 16"/>
-              <p:cNvSpPr/>
-              <p:nvPr/>
-            </p:nvSpPr>
-            <p:spPr>
-              <a:xfrm>
-                <a:off x="1253826" y="5943600"/>
-                <a:ext cx="1234103" cy="307777"/>
-              </a:xfrm>
-              <a:prstGeom prst="rect">
-                <a:avLst/>
-              </a:prstGeom>
-              <a:grpFill/>
-              <a:ln>
-                <a:solidFill>
-                  <a:schemeClr val="bg1"/>
-                </a:solidFill>
-              </a:ln>
-            </p:spPr>
-            <p:txBody>
-              <a:bodyPr wrap="square">
-                <a:spAutoFit/>
-              </a:bodyPr>
-              <a:lstStyle/>
-              <a:p>
-                <a:pPr algn="ctr"/>
-                <a:r>
-                  <a:rPr lang="en-US" sz="1400" dirty="0" smtClean="0">
-                    <a:latin typeface="Cambria Math" panose="02040503050406030204" pitchFamily="18" charset="0"/>
-                    <a:ea typeface="Cambria Math" panose="02040503050406030204" pitchFamily="18" charset="0"/>
-                  </a:rPr>
-                  <a:t>Viterbi Path</a:t>
-                </a:r>
-                <a:endParaRPr lang="en-US" sz="1400" dirty="0">
-                  <a:latin typeface="Cambria Math" panose="02040503050406030204" pitchFamily="18" charset="0"/>
-                  <a:ea typeface="Cambria Math" panose="02040503050406030204" pitchFamily="18" charset="0"/>
-                </a:endParaRPr>
-              </a:p>
-            </p:txBody>
-          </p:sp>
-        </p:grpSp>
-        <p:grpSp>
-          <p:nvGrpSpPr>
-            <p:cNvPr id="18" name="Group 17"/>
-            <p:cNvGrpSpPr/>
-            <p:nvPr/>
-          </p:nvGrpSpPr>
-          <p:grpSpPr>
-            <a:xfrm>
-              <a:off x="2136834" y="-36413"/>
-              <a:ext cx="6739771" cy="861774"/>
-              <a:chOff x="1398389" y="85189"/>
-              <a:chExt cx="6739771" cy="861774"/>
-            </a:xfrm>
-            <a:grpFill/>
-          </p:grpSpPr>
-          <p:sp>
-            <p:nvSpPr>
-              <p:cNvPr id="6" name="Rectangle 5"/>
-              <p:cNvSpPr/>
-              <p:nvPr/>
-            </p:nvSpPr>
-            <p:spPr>
-              <a:xfrm>
-                <a:off x="2042160" y="85189"/>
-                <a:ext cx="6096000" cy="861774"/>
-              </a:xfrm>
-              <a:prstGeom prst="rect">
-                <a:avLst/>
-              </a:prstGeom>
-              <a:grpFill/>
-              <a:ln>
-                <a:solidFill>
-                  <a:schemeClr val="bg1"/>
-                </a:solidFill>
-              </a:ln>
-            </p:spPr>
-            <p:txBody>
-              <a:bodyPr>
-                <a:spAutoFit/>
-              </a:bodyPr>
-              <a:lstStyle/>
-              <a:p>
-                <a:r>
-                  <a:rPr lang="en-US" sz="1600" dirty="0" smtClean="0">
-                    <a:latin typeface="Cambria Math" panose="02040503050406030204" pitchFamily="18" charset="0"/>
-                    <a:ea typeface="Cambria Math" panose="02040503050406030204" pitchFamily="18" charset="0"/>
-                  </a:rPr>
-                  <a:t>H1 </a:t>
-                </a:r>
-                <a:r>
-                  <a:rPr lang="en-US" sz="1600" dirty="0">
-                    <a:latin typeface="Cambria Math" panose="02040503050406030204" pitchFamily="18" charset="0"/>
-                    <a:ea typeface="Cambria Math" panose="02040503050406030204" pitchFamily="18" charset="0"/>
-                  </a:rPr>
-                  <a:t>BMP4 Derived </a:t>
-                </a:r>
-                <a:r>
-                  <a:rPr lang="en-US" sz="1600" dirty="0" err="1" smtClean="0">
-                    <a:latin typeface="Cambria Math" panose="02040503050406030204" pitchFamily="18" charset="0"/>
-                    <a:ea typeface="Cambria Math" panose="02040503050406030204" pitchFamily="18" charset="0"/>
-                  </a:rPr>
-                  <a:t>Mesendoderm</a:t>
-                </a:r>
-                <a:r>
-                  <a:rPr lang="en-US" sz="1600" dirty="0" smtClean="0">
-                    <a:latin typeface="Cambria Math" panose="02040503050406030204" pitchFamily="18" charset="0"/>
-                    <a:ea typeface="Cambria Math" panose="02040503050406030204" pitchFamily="18" charset="0"/>
-                  </a:rPr>
-                  <a:t> </a:t>
-                </a:r>
-                <a:r>
-                  <a:rPr lang="en-US" sz="1600" dirty="0">
-                    <a:latin typeface="Cambria Math" panose="02040503050406030204" pitchFamily="18" charset="0"/>
-                    <a:ea typeface="Cambria Math" panose="02040503050406030204" pitchFamily="18" charset="0"/>
-                  </a:rPr>
-                  <a:t>Cultured </a:t>
-                </a:r>
-                <a:r>
-                  <a:rPr lang="en-US" sz="1600" dirty="0" smtClean="0">
-                    <a:latin typeface="Cambria Math" panose="02040503050406030204" pitchFamily="18" charset="0"/>
-                    <a:ea typeface="Cambria Math" panose="02040503050406030204" pitchFamily="18" charset="0"/>
-                  </a:rPr>
-                  <a:t>Cells (E004) </a:t>
-                </a:r>
-                <a:endParaRPr lang="en-US" sz="1600" dirty="0">
-                  <a:latin typeface="Cambria Math" panose="02040503050406030204" pitchFamily="18" charset="0"/>
-                  <a:ea typeface="Cambria Math" panose="02040503050406030204" pitchFamily="18" charset="0"/>
-                </a:endParaRPr>
-              </a:p>
-              <a:p>
-                <a:r>
-                  <a:rPr lang="en-US" sz="1600" dirty="0" smtClean="0">
-                    <a:latin typeface="Cambria Math" panose="02040503050406030204" pitchFamily="18" charset="0"/>
-                    <a:ea typeface="Cambria Math" panose="02040503050406030204" pitchFamily="18" charset="0"/>
-                  </a:rPr>
-                  <a:t>Fetal </a:t>
-                </a:r>
-                <a:r>
-                  <a:rPr lang="en-US" sz="1600" dirty="0">
-                    <a:latin typeface="Cambria Math" panose="02040503050406030204" pitchFamily="18" charset="0"/>
-                    <a:ea typeface="Cambria Math" panose="02040503050406030204" pitchFamily="18" charset="0"/>
-                  </a:rPr>
-                  <a:t>Adrenal </a:t>
-                </a:r>
-                <a:r>
-                  <a:rPr lang="en-US" sz="1600" dirty="0" smtClean="0">
-                    <a:latin typeface="Cambria Math" panose="02040503050406030204" pitchFamily="18" charset="0"/>
-                    <a:ea typeface="Cambria Math" panose="02040503050406030204" pitchFamily="18" charset="0"/>
-                  </a:rPr>
-                  <a:t>Gland (E080)</a:t>
-                </a:r>
-              </a:p>
-              <a:p>
-                <a:r>
-                  <a:rPr lang="en-US" sz="1600" dirty="0" smtClean="0">
-                    <a:latin typeface="Cambria Math" panose="02040503050406030204" pitchFamily="18" charset="0"/>
-                    <a:ea typeface="Cambria Math" panose="02040503050406030204" pitchFamily="18" charset="0"/>
-                  </a:rPr>
-                  <a:t>Background</a:t>
-                </a:r>
-                <a:endParaRPr lang="en-US" sz="1600" dirty="0">
-                  <a:latin typeface="Cambria Math" panose="02040503050406030204" pitchFamily="18" charset="0"/>
-                  <a:ea typeface="Cambria Math" panose="02040503050406030204" pitchFamily="18" charset="0"/>
-                </a:endParaRPr>
-              </a:p>
-            </p:txBody>
-          </p:sp>
-          <p:pic>
-            <p:nvPicPr>
-              <p:cNvPr id="7" name="Picture 6"/>
-              <p:cNvPicPr>
-                <a:picLocks noChangeAspect="1"/>
-              </p:cNvPicPr>
-              <p:nvPr/>
-            </p:nvPicPr>
-            <p:blipFill rotWithShape="1">
-              <a:blip r:embed="rId5">
-                <a:extLst>
-                  <a:ext uri="{BEBA8EAE-BF5A-486C-A8C5-ECC9F3942E4B}">
-                    <a14:imgProps xmlns:a14="http://schemas.microsoft.com/office/drawing/2010/main">
-                      <a14:imgLayer r:embed="rId6">
-                        <a14:imgEffect>
-                          <a14:sharpenSoften amount="17000"/>
-                        </a14:imgEffect>
-                      </a14:imgLayer>
-                    </a14:imgProps>
-                  </a:ext>
-                  <a:ext uri="{28A0092B-C50C-407E-A947-70E740481C1C}">
-                    <a14:useLocalDpi xmlns:a14="http://schemas.microsoft.com/office/drawing/2010/main" val="0"/>
-                  </a:ext>
-                </a:extLst>
-              </a:blip>
-              <a:srcRect l="90822" t="4241" r="6321" b="89231"/>
-              <a:stretch/>
-            </p:blipFill>
-            <p:spPr>
-              <a:xfrm>
-                <a:off x="1398389" y="156325"/>
-                <a:ext cx="664091" cy="739821"/>
-              </a:xfrm>
-              <a:prstGeom prst="rect">
-                <a:avLst/>
-              </a:prstGeom>
-              <a:grpFill/>
-              <a:ln>
-                <a:solidFill>
-                  <a:schemeClr val="bg1"/>
-                </a:solidFill>
-              </a:ln>
-            </p:spPr>
-          </p:pic>
-        </p:grpSp>
-      </p:grpSp>
+          <a:prstGeom prst="rect">
+            <a:avLst/>
+          </a:prstGeom>
+        </p:spPr>
+      </p:pic>
     </p:spTree>
     <p:extLst>
       <p:ext uri="{BB962C8B-B14F-4D97-AF65-F5344CB8AC3E}">
-        <p14:creationId xmlns:p14="http://schemas.microsoft.com/office/powerpoint/2010/main" val="1361001117"/>
+        <p14:creationId xmlns:p14="http://schemas.microsoft.com/office/powerpoint/2010/main" val="884690727"/>
       </p:ext>
     </p:extLst>
   </p:cSld>
@@ -10462,784 +9514,6 @@
 </file>
 
 <file path=ppt/slides/slide7.xml><?xml version="1.0" encoding="utf-8"?>
-<p:sld xmlns:a="http://schemas.openxmlformats.org/drawingml/2006/main" xmlns:r="http://schemas.openxmlformats.org/officeDocument/2006/relationships" xmlns:p="http://schemas.openxmlformats.org/presentationml/2006/main">
-  <p:cSld>
-    <p:spTree>
-      <p:nvGrpSpPr>
-        <p:cNvPr id="1" name=""/>
-        <p:cNvGrpSpPr/>
-        <p:nvPr/>
-      </p:nvGrpSpPr>
-      <p:grpSpPr>
-        <a:xfrm>
-          <a:off x="0" y="0"/>
-          <a:ext cx="0" cy="0"/>
-          <a:chOff x="0" y="0"/>
-          <a:chExt cx="0" cy="0"/>
-        </a:xfrm>
-      </p:grpSpPr>
-      <p:grpSp>
-        <p:nvGrpSpPr>
-          <p:cNvPr id="16" name="Group 15"/>
-          <p:cNvGrpSpPr/>
-          <p:nvPr/>
-        </p:nvGrpSpPr>
-        <p:grpSpPr>
-          <a:xfrm>
-            <a:off x="386080" y="460496"/>
-            <a:ext cx="9457715" cy="6397503"/>
-            <a:chOff x="386080" y="460496"/>
-            <a:chExt cx="9457715" cy="6397503"/>
-          </a:xfrm>
-        </p:grpSpPr>
-        <p:pic>
-          <p:nvPicPr>
-            <p:cNvPr id="4" name="Picture 3"/>
-            <p:cNvPicPr>
-              <a:picLocks noChangeAspect="1"/>
-            </p:cNvPicPr>
-            <p:nvPr/>
-          </p:nvPicPr>
-          <p:blipFill>
-            <a:blip r:embed="rId2">
-              <a:extLst>
-                <a:ext uri="{28A0092B-C50C-407E-A947-70E740481C1C}">
-                  <a14:useLocalDpi xmlns:a14="http://schemas.microsoft.com/office/drawing/2010/main" val="0"/>
-                </a:ext>
-              </a:extLst>
-            </a:blip>
-            <a:stretch>
-              <a:fillRect/>
-            </a:stretch>
-          </p:blipFill>
-          <p:spPr>
-            <a:xfrm>
-              <a:off x="1766818" y="460496"/>
-              <a:ext cx="8076977" cy="6397503"/>
-            </a:xfrm>
-            <a:prstGeom prst="rect">
-              <a:avLst/>
-            </a:prstGeom>
-          </p:spPr>
-        </p:pic>
-        <mc:AlternateContent xmlns:mc="http://schemas.openxmlformats.org/markup-compatibility/2006" xmlns:a14="http://schemas.microsoft.com/office/drawing/2010/main">
-          <mc:Choice Requires="a14">
-            <p:sp>
-              <p:nvSpPr>
-                <p:cNvPr id="5" name="Rectangle 4"/>
-                <p:cNvSpPr/>
-                <p:nvPr/>
-              </p:nvSpPr>
-              <p:spPr>
-                <a:xfrm>
-                  <a:off x="386080" y="3166398"/>
-                  <a:ext cx="2033970" cy="584775"/>
-                </a:xfrm>
-                <a:prstGeom prst="rect">
-                  <a:avLst/>
-                </a:prstGeom>
-                <a:solidFill>
-                  <a:schemeClr val="bg1"/>
-                </a:solidFill>
-                <a:ln>
-                  <a:solidFill>
-                    <a:schemeClr val="bg1"/>
-                  </a:solidFill>
-                </a:ln>
-              </p:spPr>
-              <p:txBody>
-                <a:bodyPr wrap="square">
-                  <a:spAutoFit/>
-                </a:bodyPr>
-                <a:lstStyle/>
-                <a:p>
-                  <a:pPr algn="ctr"/>
-                  <a14:m>
-                    <m:oMathPara xmlns:m="http://schemas.openxmlformats.org/officeDocument/2006/math">
-                      <m:oMathParaPr>
-                        <m:jc m:val="centerGroup"/>
-                      </m:oMathParaPr>
-                      <m:oMath xmlns:m="http://schemas.openxmlformats.org/officeDocument/2006/math">
-                        <m:r>
-                          <a:rPr lang="en-US" sz="1600" b="0" i="1" dirty="0" smtClean="0">
-                            <a:latin typeface="Cambria Math" panose="02040503050406030204" pitchFamily="18" charset="0"/>
-                            <a:ea typeface="Cambria Math" panose="02040503050406030204" pitchFamily="18" charset="0"/>
-                          </a:rPr>
-                          <m:t>𝑇𝑟𝑢𝑒</m:t>
-                        </m:r>
-                        <m:r>
-                          <a:rPr lang="en-US" sz="1600" b="0" i="1" dirty="0" smtClean="0">
-                            <a:latin typeface="Cambria Math" panose="02040503050406030204" pitchFamily="18" charset="0"/>
-                            <a:ea typeface="Cambria Math" panose="02040503050406030204" pitchFamily="18" charset="0"/>
-                          </a:rPr>
-                          <m:t> </m:t>
-                        </m:r>
-                        <m:r>
-                          <a:rPr lang="en-US" sz="1600" b="0" i="1" dirty="0" smtClean="0">
-                            <a:latin typeface="Cambria Math" panose="02040503050406030204" pitchFamily="18" charset="0"/>
-                            <a:ea typeface="Cambria Math" panose="02040503050406030204" pitchFamily="18" charset="0"/>
-                          </a:rPr>
-                          <m:t>𝑣𝑠</m:t>
-                        </m:r>
-                        <m:r>
-                          <a:rPr lang="en-US" sz="1600" b="0" i="1" dirty="0" smtClean="0">
-                            <a:latin typeface="Cambria Math" panose="02040503050406030204" pitchFamily="18" charset="0"/>
-                            <a:ea typeface="Cambria Math" panose="02040503050406030204" pitchFamily="18" charset="0"/>
-                          </a:rPr>
-                          <m:t> </m:t>
-                        </m:r>
-                        <m:r>
-                          <a:rPr lang="en-US" sz="1600" b="0" i="1" dirty="0" smtClean="0">
-                            <a:latin typeface="Cambria Math" panose="02040503050406030204" pitchFamily="18" charset="0"/>
-                            <a:ea typeface="Cambria Math" panose="02040503050406030204" pitchFamily="18" charset="0"/>
-                          </a:rPr>
-                          <m:t>𝐸𝑠𝑡𝑖𝑚𝑎𝑡𝑒</m:t>
-                        </m:r>
-                        <m:r>
-                          <a:rPr lang="en-US" sz="1600" b="0" i="1" dirty="0" smtClean="0">
-                            <a:latin typeface="Cambria Math" panose="02040503050406030204" pitchFamily="18" charset="0"/>
-                            <a:ea typeface="Cambria Math" panose="02040503050406030204" pitchFamily="18" charset="0"/>
-                          </a:rPr>
-                          <m:t> </m:t>
-                        </m:r>
-                        <m:r>
-                          <a:rPr lang="en-US" sz="1600" b="0" i="1" dirty="0" smtClean="0">
-                            <a:latin typeface="Cambria Math" panose="02040503050406030204" pitchFamily="18" charset="0"/>
-                            <a:ea typeface="Cambria Math" panose="02040503050406030204" pitchFamily="18" charset="0"/>
-                          </a:rPr>
-                          <m:t>𝜃</m:t>
-                        </m:r>
-                        <m:r>
-                          <a:rPr lang="en-US" sz="1600" b="0" i="1" dirty="0" smtClean="0">
-                            <a:latin typeface="Cambria Math" panose="02040503050406030204" pitchFamily="18" charset="0"/>
-                            <a:ea typeface="Cambria Math" panose="02040503050406030204" pitchFamily="18" charset="0"/>
-                          </a:rPr>
-                          <m:t> </m:t>
-                        </m:r>
-                      </m:oMath>
-                    </m:oMathPara>
-                  </a14:m>
-                  <a:endParaRPr lang="en-US" sz="1600" b="0" i="1" dirty="0" smtClean="0">
-                    <a:latin typeface="Cambria Math" panose="02040503050406030204" pitchFamily="18" charset="0"/>
-                    <a:ea typeface="Cambria Math" panose="02040503050406030204" pitchFamily="18" charset="0"/>
-                  </a:endParaRPr>
-                </a:p>
-                <a:p>
-                  <a:pPr algn="ctr"/>
-                  <a14:m>
-                    <m:oMathPara xmlns:m="http://schemas.openxmlformats.org/officeDocument/2006/math">
-                      <m:oMathParaPr>
-                        <m:jc m:val="centerGroup"/>
-                      </m:oMathParaPr>
-                      <m:oMath xmlns:m="http://schemas.openxmlformats.org/officeDocument/2006/math">
-                        <m:r>
-                          <a:rPr lang="en-US" sz="1600" b="0" i="1" dirty="0" smtClean="0">
-                            <a:latin typeface="Cambria Math" panose="02040503050406030204" pitchFamily="18" charset="0"/>
-                            <a:ea typeface="Cambria Math" panose="02040503050406030204" pitchFamily="18" charset="0"/>
-                          </a:rPr>
-                          <m:t>𝐸𝑟𝑟𝑜𝑟</m:t>
-                        </m:r>
-                        <m:r>
-                          <a:rPr lang="en-US" sz="1600" b="0" i="1" dirty="0" smtClean="0">
-                            <a:latin typeface="Cambria Math" panose="02040503050406030204" pitchFamily="18" charset="0"/>
-                            <a:ea typeface="Cambria Math" panose="02040503050406030204" pitchFamily="18" charset="0"/>
-                          </a:rPr>
-                          <m:t> (</m:t>
-                        </m:r>
-                        <m:r>
-                          <a:rPr lang="en-US" sz="1600" b="0" i="1" dirty="0" smtClean="0">
-                            <a:latin typeface="Cambria Math" panose="02040503050406030204" pitchFamily="18" charset="0"/>
-                            <a:ea typeface="Cambria Math" panose="02040503050406030204" pitchFamily="18" charset="0"/>
-                          </a:rPr>
-                          <m:t>𝑅𝑀𝑆𝐸</m:t>
-                        </m:r>
-                        <m:r>
-                          <a:rPr lang="en-US" sz="1600" b="0" i="1" dirty="0" smtClean="0">
-                            <a:latin typeface="Cambria Math" panose="02040503050406030204" pitchFamily="18" charset="0"/>
-                            <a:ea typeface="Cambria Math" panose="02040503050406030204" pitchFamily="18" charset="0"/>
-                          </a:rPr>
-                          <m:t>)</m:t>
-                        </m:r>
-                      </m:oMath>
-                    </m:oMathPara>
-                  </a14:m>
-                  <a:endParaRPr lang="en-US" sz="1600" dirty="0">
-                    <a:latin typeface="Cambria Math" panose="02040503050406030204" pitchFamily="18" charset="0"/>
-                    <a:ea typeface="Cambria Math" panose="02040503050406030204" pitchFamily="18" charset="0"/>
-                  </a:endParaRPr>
-                </a:p>
-              </p:txBody>
-            </p:sp>
-          </mc:Choice>
-          <mc:Fallback xmlns="">
-            <p:sp>
-              <p:nvSpPr>
-                <p:cNvPr id="5" name="Rectangle 4"/>
-                <p:cNvSpPr>
-                  <a:spLocks noRot="1" noChangeAspect="1" noMove="1" noResize="1" noEditPoints="1" noAdjustHandles="1" noChangeArrowheads="1" noChangeShapeType="1" noTextEdit="1"/>
-                </p:cNvSpPr>
-                <p:nvPr/>
-              </p:nvSpPr>
-              <p:spPr>
-                <a:xfrm>
-                  <a:off x="386080" y="3166398"/>
-                  <a:ext cx="2033970" cy="584775"/>
-                </a:xfrm>
-                <a:prstGeom prst="rect">
-                  <a:avLst/>
-                </a:prstGeom>
-                <a:blipFill rotWithShape="0">
-                  <a:blip r:embed="rId3"/>
-                  <a:stretch>
-                    <a:fillRect b="-5102"/>
-                  </a:stretch>
-                </a:blipFill>
-                <a:ln>
-                  <a:solidFill>
-                    <a:schemeClr val="bg1"/>
-                  </a:solidFill>
-                </a:ln>
-              </p:spPr>
-              <p:txBody>
-                <a:bodyPr/>
-                <a:lstStyle/>
-                <a:p>
-                  <a:r>
-                    <a:rPr lang="en-US">
-                      <a:noFill/>
-                    </a:rPr>
-                    <a:t> </a:t>
-                  </a:r>
-                </a:p>
-              </p:txBody>
-            </p:sp>
-          </mc:Fallback>
-        </mc:AlternateContent>
-        <p:sp>
-          <p:nvSpPr>
-            <p:cNvPr id="6" name="Rectangle 5"/>
-            <p:cNvSpPr/>
-            <p:nvPr/>
-          </p:nvSpPr>
-          <p:spPr>
-            <a:xfrm>
-              <a:off x="2674623" y="815340"/>
-              <a:ext cx="99058" cy="268834"/>
-            </a:xfrm>
-            <a:prstGeom prst="rect">
-              <a:avLst/>
-            </a:prstGeom>
-            <a:solidFill>
-              <a:schemeClr val="bg1"/>
-            </a:solidFill>
-            <a:ln>
-              <a:solidFill>
-                <a:schemeClr val="bg1"/>
-              </a:solidFill>
-            </a:ln>
-          </p:spPr>
-          <p:txBody>
-            <a:bodyPr wrap="square">
-              <a:spAutoFit/>
-            </a:bodyPr>
-            <a:lstStyle/>
-            <a:p>
-              <a:pPr algn="ctr"/>
-              <a:endParaRPr lang="en-US" sz="1600" dirty="0">
-                <a:latin typeface="Cambria Math" panose="02040503050406030204" pitchFamily="18" charset="0"/>
-                <a:ea typeface="Cambria Math" panose="02040503050406030204" pitchFamily="18" charset="0"/>
-              </a:endParaRPr>
-            </a:p>
-          </p:txBody>
-        </p:sp>
-        <p:sp>
-          <p:nvSpPr>
-            <p:cNvPr id="7" name="Rectangle 6"/>
-            <p:cNvSpPr/>
-            <p:nvPr/>
-          </p:nvSpPr>
-          <p:spPr>
-            <a:xfrm>
-              <a:off x="2674622" y="1501140"/>
-              <a:ext cx="99058" cy="268834"/>
-            </a:xfrm>
-            <a:prstGeom prst="rect">
-              <a:avLst/>
-            </a:prstGeom>
-            <a:solidFill>
-              <a:schemeClr val="bg1"/>
-            </a:solidFill>
-            <a:ln>
-              <a:solidFill>
-                <a:schemeClr val="bg1"/>
-              </a:solidFill>
-            </a:ln>
-          </p:spPr>
-          <p:txBody>
-            <a:bodyPr wrap="square">
-              <a:spAutoFit/>
-            </a:bodyPr>
-            <a:lstStyle/>
-            <a:p>
-              <a:pPr algn="ctr"/>
-              <a:endParaRPr lang="en-US" sz="1600" dirty="0">
-                <a:latin typeface="Cambria Math" panose="02040503050406030204" pitchFamily="18" charset="0"/>
-                <a:ea typeface="Cambria Math" panose="02040503050406030204" pitchFamily="18" charset="0"/>
-              </a:endParaRPr>
-            </a:p>
-          </p:txBody>
-        </p:sp>
-        <p:sp>
-          <p:nvSpPr>
-            <p:cNvPr id="8" name="Rectangle 7"/>
-            <p:cNvSpPr/>
-            <p:nvPr/>
-          </p:nvSpPr>
-          <p:spPr>
-            <a:xfrm>
-              <a:off x="2674621" y="2263140"/>
-              <a:ext cx="99058" cy="268834"/>
-            </a:xfrm>
-            <a:prstGeom prst="rect">
-              <a:avLst/>
-            </a:prstGeom>
-            <a:solidFill>
-              <a:schemeClr val="bg1"/>
-            </a:solidFill>
-            <a:ln>
-              <a:solidFill>
-                <a:schemeClr val="bg1"/>
-              </a:solidFill>
-            </a:ln>
-          </p:spPr>
-          <p:txBody>
-            <a:bodyPr wrap="square">
-              <a:spAutoFit/>
-            </a:bodyPr>
-            <a:lstStyle/>
-            <a:p>
-              <a:pPr algn="ctr"/>
-              <a:endParaRPr lang="en-US" sz="1600" dirty="0">
-                <a:latin typeface="Cambria Math" panose="02040503050406030204" pitchFamily="18" charset="0"/>
-                <a:ea typeface="Cambria Math" panose="02040503050406030204" pitchFamily="18" charset="0"/>
-              </a:endParaRPr>
-            </a:p>
-          </p:txBody>
-        </p:sp>
-        <p:sp>
-          <p:nvSpPr>
-            <p:cNvPr id="9" name="Rectangle 8"/>
-            <p:cNvSpPr/>
-            <p:nvPr/>
-          </p:nvSpPr>
-          <p:spPr>
-            <a:xfrm>
-              <a:off x="2674620" y="3025140"/>
-              <a:ext cx="99058" cy="268834"/>
-            </a:xfrm>
-            <a:prstGeom prst="rect">
-              <a:avLst/>
-            </a:prstGeom>
-            <a:solidFill>
-              <a:schemeClr val="bg1"/>
-            </a:solidFill>
-            <a:ln>
-              <a:solidFill>
-                <a:schemeClr val="bg1"/>
-              </a:solidFill>
-            </a:ln>
-          </p:spPr>
-          <p:txBody>
-            <a:bodyPr wrap="square">
-              <a:spAutoFit/>
-            </a:bodyPr>
-            <a:lstStyle/>
-            <a:p>
-              <a:pPr algn="ctr"/>
-              <a:endParaRPr lang="en-US" sz="1600" dirty="0">
-                <a:latin typeface="Cambria Math" panose="02040503050406030204" pitchFamily="18" charset="0"/>
-                <a:ea typeface="Cambria Math" panose="02040503050406030204" pitchFamily="18" charset="0"/>
-              </a:endParaRPr>
-            </a:p>
-          </p:txBody>
-        </p:sp>
-        <p:sp>
-          <p:nvSpPr>
-            <p:cNvPr id="10" name="Rectangle 9"/>
-            <p:cNvSpPr/>
-            <p:nvPr/>
-          </p:nvSpPr>
-          <p:spPr>
-            <a:xfrm>
-              <a:off x="2674620" y="3751173"/>
-              <a:ext cx="99058" cy="268834"/>
-            </a:xfrm>
-            <a:prstGeom prst="rect">
-              <a:avLst/>
-            </a:prstGeom>
-            <a:solidFill>
-              <a:schemeClr val="bg1"/>
-            </a:solidFill>
-            <a:ln>
-              <a:solidFill>
-                <a:schemeClr val="bg1"/>
-              </a:solidFill>
-            </a:ln>
-          </p:spPr>
-          <p:txBody>
-            <a:bodyPr wrap="square">
-              <a:spAutoFit/>
-            </a:bodyPr>
-            <a:lstStyle/>
-            <a:p>
-              <a:pPr algn="ctr"/>
-              <a:endParaRPr lang="en-US" sz="1600" dirty="0">
-                <a:latin typeface="Cambria Math" panose="02040503050406030204" pitchFamily="18" charset="0"/>
-                <a:ea typeface="Cambria Math" panose="02040503050406030204" pitchFamily="18" charset="0"/>
-              </a:endParaRPr>
-            </a:p>
-          </p:txBody>
-        </p:sp>
-        <p:sp>
-          <p:nvSpPr>
-            <p:cNvPr id="11" name="Rectangle 10"/>
-            <p:cNvSpPr/>
-            <p:nvPr/>
-          </p:nvSpPr>
-          <p:spPr>
-            <a:xfrm>
-              <a:off x="2674621" y="4455159"/>
-              <a:ext cx="99058" cy="268834"/>
-            </a:xfrm>
-            <a:prstGeom prst="rect">
-              <a:avLst/>
-            </a:prstGeom>
-            <a:solidFill>
-              <a:schemeClr val="bg1"/>
-            </a:solidFill>
-            <a:ln>
-              <a:solidFill>
-                <a:schemeClr val="bg1"/>
-              </a:solidFill>
-            </a:ln>
-          </p:spPr>
-          <p:txBody>
-            <a:bodyPr wrap="square">
-              <a:spAutoFit/>
-            </a:bodyPr>
-            <a:lstStyle/>
-            <a:p>
-              <a:pPr algn="ctr"/>
-              <a:endParaRPr lang="en-US" sz="1600" dirty="0">
-                <a:latin typeface="Cambria Math" panose="02040503050406030204" pitchFamily="18" charset="0"/>
-                <a:ea typeface="Cambria Math" panose="02040503050406030204" pitchFamily="18" charset="0"/>
-              </a:endParaRPr>
-            </a:p>
-          </p:txBody>
-        </p:sp>
-        <p:sp>
-          <p:nvSpPr>
-            <p:cNvPr id="12" name="Rectangle 11"/>
-            <p:cNvSpPr/>
-            <p:nvPr/>
-          </p:nvSpPr>
-          <p:spPr>
-            <a:xfrm>
-              <a:off x="2674620" y="5217159"/>
-              <a:ext cx="99058" cy="268834"/>
-            </a:xfrm>
-            <a:prstGeom prst="rect">
-              <a:avLst/>
-            </a:prstGeom>
-            <a:solidFill>
-              <a:schemeClr val="bg1"/>
-            </a:solidFill>
-            <a:ln>
-              <a:solidFill>
-                <a:schemeClr val="bg1"/>
-              </a:solidFill>
-            </a:ln>
-          </p:spPr>
-          <p:txBody>
-            <a:bodyPr wrap="square">
-              <a:spAutoFit/>
-            </a:bodyPr>
-            <a:lstStyle/>
-            <a:p>
-              <a:pPr algn="ctr"/>
-              <a:endParaRPr lang="en-US" sz="1600" dirty="0">
-                <a:latin typeface="Cambria Math" panose="02040503050406030204" pitchFamily="18" charset="0"/>
-                <a:ea typeface="Cambria Math" panose="02040503050406030204" pitchFamily="18" charset="0"/>
-              </a:endParaRPr>
-            </a:p>
-          </p:txBody>
-        </p:sp>
-        <p:sp>
-          <p:nvSpPr>
-            <p:cNvPr id="13" name="Rectangle 12"/>
-            <p:cNvSpPr/>
-            <p:nvPr/>
-          </p:nvSpPr>
-          <p:spPr>
-            <a:xfrm>
-              <a:off x="2674620" y="5943192"/>
-              <a:ext cx="99058" cy="268834"/>
-            </a:xfrm>
-            <a:prstGeom prst="rect">
-              <a:avLst/>
-            </a:prstGeom>
-            <a:solidFill>
-              <a:schemeClr val="bg1"/>
-            </a:solidFill>
-            <a:ln>
-              <a:solidFill>
-                <a:schemeClr val="bg1"/>
-              </a:solidFill>
-            </a:ln>
-          </p:spPr>
-          <p:txBody>
-            <a:bodyPr wrap="square">
-              <a:spAutoFit/>
-            </a:bodyPr>
-            <a:lstStyle/>
-            <a:p>
-              <a:pPr algn="ctr"/>
-              <a:endParaRPr lang="en-US" sz="1600" dirty="0">
-                <a:latin typeface="Cambria Math" panose="02040503050406030204" pitchFamily="18" charset="0"/>
-                <a:ea typeface="Cambria Math" panose="02040503050406030204" pitchFamily="18" charset="0"/>
-              </a:endParaRPr>
-            </a:p>
-          </p:txBody>
-        </p:sp>
-        <mc:AlternateContent xmlns:mc="http://schemas.openxmlformats.org/markup-compatibility/2006" xmlns:a14="http://schemas.microsoft.com/office/drawing/2010/main">
-          <mc:Choice Requires="a14">
-            <p:sp>
-              <p:nvSpPr>
-                <p:cNvPr id="14" name="Rectangle 13"/>
-                <p:cNvSpPr/>
-                <p:nvPr/>
-              </p:nvSpPr>
-              <p:spPr>
-                <a:xfrm>
-                  <a:off x="4935272" y="6351558"/>
-                  <a:ext cx="2033970" cy="338554"/>
-                </a:xfrm>
-                <a:prstGeom prst="rect">
-                  <a:avLst/>
-                </a:prstGeom>
-                <a:solidFill>
-                  <a:schemeClr val="bg1"/>
-                </a:solidFill>
-                <a:ln>
-                  <a:solidFill>
-                    <a:schemeClr val="bg1"/>
-                  </a:solidFill>
-                </a:ln>
-              </p:spPr>
-              <p:txBody>
-                <a:bodyPr wrap="square">
-                  <a:spAutoFit/>
-                </a:bodyPr>
-                <a:lstStyle/>
-                <a:p>
-                  <a:pPr algn="ctr"/>
-                  <a14:m>
-                    <m:oMathPara xmlns:m="http://schemas.openxmlformats.org/officeDocument/2006/math">
-                      <m:oMathParaPr>
-                        <m:jc m:val="centerGroup"/>
-                      </m:oMathParaPr>
-                      <m:oMath xmlns:m="http://schemas.openxmlformats.org/officeDocument/2006/math">
-                        <m:r>
-                          <a:rPr lang="en-US" sz="1600" i="1" dirty="0" smtClean="0">
-                            <a:latin typeface="Cambria Math" panose="02040503050406030204" pitchFamily="18" charset="0"/>
-                            <a:ea typeface="Cambria Math" panose="02040503050406030204" pitchFamily="18" charset="0"/>
-                          </a:rPr>
-                          <m:t>𝐿𝑜𝑔</m:t>
-                        </m:r>
-                        <m:r>
-                          <a:rPr lang="en-US" sz="1600" i="1" dirty="0" smtClean="0">
-                            <a:latin typeface="Cambria Math" panose="02040503050406030204" pitchFamily="18" charset="0"/>
-                            <a:ea typeface="Cambria Math" panose="02040503050406030204" pitchFamily="18" charset="0"/>
-                          </a:rPr>
-                          <m:t> </m:t>
-                        </m:r>
-                        <m:r>
-                          <a:rPr lang="en-US" sz="1600" i="1" dirty="0" smtClean="0">
-                            <a:latin typeface="Cambria Math" panose="02040503050406030204" pitchFamily="18" charset="0"/>
-                            <a:ea typeface="Cambria Math" panose="02040503050406030204" pitchFamily="18" charset="0"/>
-                          </a:rPr>
-                          <m:t>𝐿𝑖𝑘𝑒𝑙𝑖</m:t>
-                        </m:r>
-                        <m:r>
-                          <a:rPr lang="en-US" sz="1600" i="1" dirty="0" smtClean="0">
-                            <a:latin typeface="Cambria Math" panose="02040503050406030204" pitchFamily="18" charset="0"/>
-                            <a:ea typeface="Cambria Math" panose="02040503050406030204" pitchFamily="18" charset="0"/>
-                          </a:rPr>
-                          <m:t>h</m:t>
-                        </m:r>
-                        <m:r>
-                          <a:rPr lang="en-US" sz="1600" i="1" dirty="0" smtClean="0">
-                            <a:latin typeface="Cambria Math" panose="02040503050406030204" pitchFamily="18" charset="0"/>
-                            <a:ea typeface="Cambria Math" panose="02040503050406030204" pitchFamily="18" charset="0"/>
-                          </a:rPr>
-                          <m:t>𝑜𝑜𝑑</m:t>
-                        </m:r>
-                        <m:r>
-                          <a:rPr lang="en-US" sz="1600" i="1" dirty="0" smtClean="0">
-                            <a:latin typeface="Cambria Math" panose="02040503050406030204" pitchFamily="18" charset="0"/>
-                            <a:ea typeface="Cambria Math" panose="02040503050406030204" pitchFamily="18" charset="0"/>
-                          </a:rPr>
-                          <m:t> </m:t>
-                        </m:r>
-                        <m:r>
-                          <a:rPr lang="en-US" sz="1600" i="1" dirty="0" smtClean="0">
-                            <a:latin typeface="Cambria Math" panose="02040503050406030204" pitchFamily="18" charset="0"/>
-                            <a:ea typeface="Cambria Math" panose="02040503050406030204" pitchFamily="18" charset="0"/>
-                          </a:rPr>
-                          <m:t>𝑜𝑓</m:t>
-                        </m:r>
-                        <m:r>
-                          <a:rPr lang="en-US" sz="1600" b="0" i="1" dirty="0" smtClean="0">
-                            <a:latin typeface="Cambria Math" panose="02040503050406030204" pitchFamily="18" charset="0"/>
-                            <a:ea typeface="Cambria Math" panose="02040503050406030204" pitchFamily="18" charset="0"/>
-                          </a:rPr>
-                          <m:t> </m:t>
-                        </m:r>
-                        <m:r>
-                          <a:rPr lang="en-US" sz="1600" b="0" i="1" dirty="0" smtClean="0">
-                            <a:latin typeface="Cambria Math" panose="02040503050406030204" pitchFamily="18" charset="0"/>
-                            <a:ea typeface="Cambria Math" panose="02040503050406030204" pitchFamily="18" charset="0"/>
-                          </a:rPr>
-                          <m:t>𝐸𝑠𝑡𝑖𝑚𝑎𝑡𝑒</m:t>
-                        </m:r>
-                        <m:r>
-                          <a:rPr lang="en-US" sz="1600" b="0" i="1" dirty="0" smtClean="0">
-                            <a:latin typeface="Cambria Math" panose="02040503050406030204" pitchFamily="18" charset="0"/>
-                            <a:ea typeface="Cambria Math" panose="02040503050406030204" pitchFamily="18" charset="0"/>
-                          </a:rPr>
-                          <m:t> </m:t>
-                        </m:r>
-                        <m:r>
-                          <a:rPr lang="en-US" sz="1600" i="1" dirty="0" smtClean="0">
-                            <a:latin typeface="Cambria Math" panose="02040503050406030204" pitchFamily="18" charset="0"/>
-                            <a:ea typeface="Cambria Math" panose="02040503050406030204" pitchFamily="18" charset="0"/>
-                          </a:rPr>
-                          <m:t>𝜃</m:t>
-                        </m:r>
-                      </m:oMath>
-                    </m:oMathPara>
-                  </a14:m>
-                  <a:endParaRPr lang="en-US" sz="1600" dirty="0">
-                    <a:latin typeface="Cambria Math" panose="02040503050406030204" pitchFamily="18" charset="0"/>
-                    <a:ea typeface="Cambria Math" panose="02040503050406030204" pitchFamily="18" charset="0"/>
-                  </a:endParaRPr>
-                </a:p>
-              </p:txBody>
-            </p:sp>
-          </mc:Choice>
-          <mc:Fallback xmlns="">
-            <p:sp>
-              <p:nvSpPr>
-                <p:cNvPr id="14" name="Rectangle 13"/>
-                <p:cNvSpPr>
-                  <a:spLocks noRot="1" noChangeAspect="1" noMove="1" noResize="1" noEditPoints="1" noAdjustHandles="1" noChangeArrowheads="1" noChangeShapeType="1" noTextEdit="1"/>
-                </p:cNvSpPr>
-                <p:nvPr/>
-              </p:nvSpPr>
-              <p:spPr>
-                <a:xfrm>
-                  <a:off x="4935272" y="6351558"/>
-                  <a:ext cx="2033970" cy="338554"/>
-                </a:xfrm>
-                <a:prstGeom prst="rect">
-                  <a:avLst/>
-                </a:prstGeom>
-                <a:blipFill rotWithShape="0">
-                  <a:blip r:embed="rId4"/>
-                  <a:stretch>
-                    <a:fillRect l="-20896" r="-17612" b="-10526"/>
-                  </a:stretch>
-                </a:blipFill>
-                <a:ln>
-                  <a:solidFill>
-                    <a:schemeClr val="bg1"/>
-                  </a:solidFill>
-                </a:ln>
-              </p:spPr>
-              <p:txBody>
-                <a:bodyPr/>
-                <a:lstStyle/>
-                <a:p>
-                  <a:r>
-                    <a:rPr lang="en-US">
-                      <a:noFill/>
-                    </a:rPr>
-                    <a:t> </a:t>
-                  </a:r>
-                </a:p>
-              </p:txBody>
-            </p:sp>
-          </mc:Fallback>
-        </mc:AlternateContent>
-        <p:sp>
-          <p:nvSpPr>
-            <p:cNvPr id="15" name="Rectangle 14"/>
-            <p:cNvSpPr/>
-            <p:nvPr/>
-          </p:nvSpPr>
-          <p:spPr>
-            <a:xfrm>
-              <a:off x="4935272" y="611203"/>
-              <a:ext cx="2033970" cy="338554"/>
-            </a:xfrm>
-            <a:prstGeom prst="rect">
-              <a:avLst/>
-            </a:prstGeom>
-            <a:solidFill>
-              <a:schemeClr val="bg1"/>
-            </a:solidFill>
-            <a:ln>
-              <a:solidFill>
-                <a:schemeClr val="bg1"/>
-              </a:solidFill>
-            </a:ln>
-          </p:spPr>
-          <p:txBody>
-            <a:bodyPr wrap="square">
-              <a:spAutoFit/>
-            </a:bodyPr>
-            <a:lstStyle/>
-            <a:p>
-              <a:pPr algn="ctr"/>
-              <a:endParaRPr lang="en-US" sz="1600" dirty="0">
-                <a:latin typeface="Cambria Math" panose="02040503050406030204" pitchFamily="18" charset="0"/>
-                <a:ea typeface="Cambria Math" panose="02040503050406030204" pitchFamily="18" charset="0"/>
-              </a:endParaRPr>
-            </a:p>
-          </p:txBody>
-        </p:sp>
-      </p:grpSp>
-    </p:spTree>
-    <p:extLst>
-      <p:ext uri="{BB962C8B-B14F-4D97-AF65-F5344CB8AC3E}">
-        <p14:creationId xmlns:p14="http://schemas.microsoft.com/office/powerpoint/2010/main" val="1381118249"/>
-      </p:ext>
-    </p:extLst>
-  </p:cSld>
-  <p:clrMapOvr>
-    <a:masterClrMapping/>
-  </p:clrMapOvr>
-  <p:timing>
-    <p:tnLst>
-      <p:par>
-        <p:cTn id="1" dur="indefinite" restart="never" nodeType="tmRoot"/>
-      </p:par>
-    </p:tnLst>
-  </p:timing>
-</p:sld>
-</file>
-
-<file path=ppt/slides/slide8.xml><?xml version="1.0" encoding="utf-8"?>
 <p:sld xmlns:a="http://schemas.openxmlformats.org/drawingml/2006/main" xmlns:r="http://schemas.openxmlformats.org/officeDocument/2006/relationships" xmlns:p="http://schemas.openxmlformats.org/presentationml/2006/main">
   <p:cSld>
     <p:spTree>
@@ -11416,7 +9690,7 @@
             <p:cNvPr id="7" name="Rectangle 6">
               <a:extLst>
                 <a:ext uri="{FF2B5EF4-FFF2-40B4-BE49-F238E27FC236}">
-                  <a16:creationId xmlns:a16="http://schemas.microsoft.com/office/drawing/2014/main" xmlns:a14="http://schemas.microsoft.com/office/drawing/2010/main" xmlns:mc="http://schemas.openxmlformats.org/markup-compatibility/2006" xmlns="" id="{6D2C8BE0-B0D2-4978-A1B5-FFF5137A4C82}"/>
+                  <a16:creationId xmlns="" xmlns:mc="http://schemas.openxmlformats.org/markup-compatibility/2006" xmlns:a14="http://schemas.microsoft.com/office/drawing/2010/main" xmlns:a16="http://schemas.microsoft.com/office/drawing/2014/main" id="{6D2C8BE0-B0D2-4978-A1B5-FFF5137A4C82}"/>
                 </a:ext>
               </a:extLst>
             </p:cNvPr>
@@ -11484,7 +9758,7 @@
             <p:cNvPr id="8" name="Rectangle 7">
               <a:extLst>
                 <a:ext uri="{FF2B5EF4-FFF2-40B4-BE49-F238E27FC236}">
-                  <a16:creationId xmlns:a16="http://schemas.microsoft.com/office/drawing/2014/main" xmlns:a14="http://schemas.microsoft.com/office/drawing/2010/main" xmlns:mc="http://schemas.openxmlformats.org/markup-compatibility/2006" xmlns="" id="{6D2C8BE0-B0D2-4978-A1B5-FFF5137A4C82}"/>
+                  <a16:creationId xmlns="" xmlns:mc="http://schemas.openxmlformats.org/markup-compatibility/2006" xmlns:a14="http://schemas.microsoft.com/office/drawing/2010/main" xmlns:a16="http://schemas.microsoft.com/office/drawing/2014/main" id="{6D2C8BE0-B0D2-4978-A1B5-FFF5137A4C82}"/>
                 </a:ext>
               </a:extLst>
             </p:cNvPr>
@@ -11552,7 +9826,7 @@
             <p:cNvPr id="9" name="Rectangle 8">
               <a:extLst>
                 <a:ext uri="{FF2B5EF4-FFF2-40B4-BE49-F238E27FC236}">
-                  <a16:creationId xmlns:a16="http://schemas.microsoft.com/office/drawing/2014/main" xmlns:a14="http://schemas.microsoft.com/office/drawing/2010/main" xmlns:mc="http://schemas.openxmlformats.org/markup-compatibility/2006" xmlns="" id="{6D2C8BE0-B0D2-4978-A1B5-FFF5137A4C82}"/>
+                  <a16:creationId xmlns="" xmlns:mc="http://schemas.openxmlformats.org/markup-compatibility/2006" xmlns:a14="http://schemas.microsoft.com/office/drawing/2010/main" xmlns:a16="http://schemas.microsoft.com/office/drawing/2014/main" id="{6D2C8BE0-B0D2-4978-A1B5-FFF5137A4C82}"/>
                 </a:ext>
               </a:extLst>
             </p:cNvPr>
@@ -11620,7 +9894,7 @@
             <p:cNvPr id="10" name="Rectangle 9">
               <a:extLst>
                 <a:ext uri="{FF2B5EF4-FFF2-40B4-BE49-F238E27FC236}">
-                  <a16:creationId xmlns:a16="http://schemas.microsoft.com/office/drawing/2014/main" xmlns:a14="http://schemas.microsoft.com/office/drawing/2010/main" xmlns:mc="http://schemas.openxmlformats.org/markup-compatibility/2006" xmlns="" id="{6D2C8BE0-B0D2-4978-A1B5-FFF5137A4C82}"/>
+                  <a16:creationId xmlns="" xmlns:mc="http://schemas.openxmlformats.org/markup-compatibility/2006" xmlns:a14="http://schemas.microsoft.com/office/drawing/2010/main" xmlns:a16="http://schemas.microsoft.com/office/drawing/2014/main" id="{6D2C8BE0-B0D2-4978-A1B5-FFF5137A4C82}"/>
                 </a:ext>
               </a:extLst>
             </p:cNvPr>
@@ -11688,7 +9962,7 @@
             <p:cNvPr id="11" name="Rectangle 10">
               <a:extLst>
                 <a:ext uri="{FF2B5EF4-FFF2-40B4-BE49-F238E27FC236}">
-                  <a16:creationId xmlns:a16="http://schemas.microsoft.com/office/drawing/2014/main" xmlns:a14="http://schemas.microsoft.com/office/drawing/2010/main" xmlns:mc="http://schemas.openxmlformats.org/markup-compatibility/2006" xmlns="" id="{6D2C8BE0-B0D2-4978-A1B5-FFF5137A4C82}"/>
+                  <a16:creationId xmlns="" xmlns:mc="http://schemas.openxmlformats.org/markup-compatibility/2006" xmlns:a14="http://schemas.microsoft.com/office/drawing/2010/main" xmlns:a16="http://schemas.microsoft.com/office/drawing/2014/main" id="{6D2C8BE0-B0D2-4978-A1B5-FFF5137A4C82}"/>
                 </a:ext>
               </a:extLst>
             </p:cNvPr>
@@ -11755,7 +10029,7 @@
             <p:cNvPr id="12" name="Rectangle 11">
               <a:extLst>
                 <a:ext uri="{FF2B5EF4-FFF2-40B4-BE49-F238E27FC236}">
-                  <a16:creationId xmlns:a16="http://schemas.microsoft.com/office/drawing/2014/main" xmlns:a14="http://schemas.microsoft.com/office/drawing/2010/main" xmlns:mc="http://schemas.openxmlformats.org/markup-compatibility/2006" xmlns="" id="{6D2C8BE0-B0D2-4978-A1B5-FFF5137A4C82}"/>
+                  <a16:creationId xmlns="" xmlns:mc="http://schemas.openxmlformats.org/markup-compatibility/2006" xmlns:a14="http://schemas.microsoft.com/office/drawing/2010/main" xmlns:a16="http://schemas.microsoft.com/office/drawing/2014/main" id="{6D2C8BE0-B0D2-4978-A1B5-FFF5137A4C82}"/>
                 </a:ext>
               </a:extLst>
             </p:cNvPr>
@@ -11822,7 +10096,7 @@
             <p:cNvPr id="13" name="Rectangle 12">
               <a:extLst>
                 <a:ext uri="{FF2B5EF4-FFF2-40B4-BE49-F238E27FC236}">
-                  <a16:creationId xmlns:a16="http://schemas.microsoft.com/office/drawing/2014/main" xmlns:a14="http://schemas.microsoft.com/office/drawing/2010/main" xmlns:mc="http://schemas.openxmlformats.org/markup-compatibility/2006" xmlns="" id="{6D2C8BE0-B0D2-4978-A1B5-FFF5137A4C82}"/>
+                  <a16:creationId xmlns="" xmlns:mc="http://schemas.openxmlformats.org/markup-compatibility/2006" xmlns:a14="http://schemas.microsoft.com/office/drawing/2010/main" xmlns:a16="http://schemas.microsoft.com/office/drawing/2014/main" id="{6D2C8BE0-B0D2-4978-A1B5-FFF5137A4C82}"/>
                 </a:ext>
               </a:extLst>
             </p:cNvPr>
@@ -11889,7 +10163,7 @@
             <p:cNvPr id="14" name="Rectangle 13">
               <a:extLst>
                 <a:ext uri="{FF2B5EF4-FFF2-40B4-BE49-F238E27FC236}">
-                  <a16:creationId xmlns:a16="http://schemas.microsoft.com/office/drawing/2014/main" xmlns:a14="http://schemas.microsoft.com/office/drawing/2010/main" xmlns:mc="http://schemas.openxmlformats.org/markup-compatibility/2006" xmlns="" id="{6D2C8BE0-B0D2-4978-A1B5-FFF5137A4C82}"/>
+                  <a16:creationId xmlns="" xmlns:mc="http://schemas.openxmlformats.org/markup-compatibility/2006" xmlns:a14="http://schemas.microsoft.com/office/drawing/2010/main" xmlns:a16="http://schemas.microsoft.com/office/drawing/2014/main" id="{6D2C8BE0-B0D2-4978-A1B5-FFF5137A4C82}"/>
                 </a:ext>
               </a:extLst>
             </p:cNvPr>
@@ -11985,7 +10259,7 @@
             <p:cNvPr id="16" name="Rectangle 15">
               <a:extLst>
                 <a:ext uri="{FF2B5EF4-FFF2-40B4-BE49-F238E27FC236}">
-                  <a16:creationId xmlns:a16="http://schemas.microsoft.com/office/drawing/2014/main" xmlns:a14="http://schemas.microsoft.com/office/drawing/2010/main" xmlns:mc="http://schemas.openxmlformats.org/markup-compatibility/2006" xmlns="" id="{6D2C8BE0-B0D2-4978-A1B5-FFF5137A4C82}"/>
+                  <a16:creationId xmlns="" xmlns:mc="http://schemas.openxmlformats.org/markup-compatibility/2006" xmlns:a14="http://schemas.microsoft.com/office/drawing/2010/main" xmlns:a16="http://schemas.microsoft.com/office/drawing/2014/main" id="{6D2C8BE0-B0D2-4978-A1B5-FFF5137A4C82}"/>
                 </a:ext>
               </a:extLst>
             </p:cNvPr>
@@ -12071,7 +10345,7 @@
             <p:cNvPr id="17" name="Rectangle 16">
               <a:extLst>
                 <a:ext uri="{FF2B5EF4-FFF2-40B4-BE49-F238E27FC236}">
-                  <a16:creationId xmlns:a16="http://schemas.microsoft.com/office/drawing/2014/main" xmlns:a14="http://schemas.microsoft.com/office/drawing/2010/main" xmlns:mc="http://schemas.openxmlformats.org/markup-compatibility/2006" xmlns="" id="{6D2C8BE0-B0D2-4978-A1B5-FFF5137A4C82}"/>
+                  <a16:creationId xmlns="" xmlns:mc="http://schemas.openxmlformats.org/markup-compatibility/2006" xmlns:a14="http://schemas.microsoft.com/office/drawing/2010/main" xmlns:a16="http://schemas.microsoft.com/office/drawing/2014/main" id="{6D2C8BE0-B0D2-4978-A1B5-FFF5137A4C82}"/>
                 </a:ext>
               </a:extLst>
             </p:cNvPr>
@@ -12272,7 +10546,7 @@
             <p:cNvPr id="25" name="Rectangle 24">
               <a:extLst>
                 <a:ext uri="{FF2B5EF4-FFF2-40B4-BE49-F238E27FC236}">
-                  <a16:creationId xmlns:a16="http://schemas.microsoft.com/office/drawing/2014/main" xmlns:a14="http://schemas.microsoft.com/office/drawing/2010/main" xmlns:mc="http://schemas.openxmlformats.org/markup-compatibility/2006" xmlns="" id="{6D2C8BE0-B0D2-4978-A1B5-FFF5137A4C82}"/>
+                  <a16:creationId xmlns="" xmlns:mc="http://schemas.openxmlformats.org/markup-compatibility/2006" xmlns:a14="http://schemas.microsoft.com/office/drawing/2010/main" xmlns:a16="http://schemas.microsoft.com/office/drawing/2014/main" id="{6D2C8BE0-B0D2-4978-A1B5-FFF5137A4C82}"/>
                 </a:ext>
               </a:extLst>
             </p:cNvPr>
@@ -12346,6 +10620,13 @@
   <p:clrMapOvr>
     <a:masterClrMapping/>
   </p:clrMapOvr>
+  <p:timing>
+    <p:tnLst>
+      <p:par>
+        <p:cTn id="1" dur="indefinite" restart="never" nodeType="tmRoot"/>
+      </p:par>
+    </p:tnLst>
+  </p:timing>
 </p:sld>
 </file>
 

</xml_diff>

<commit_message>
fonts fix in figures workflow figure started
</commit_message>
<xml_diff>
--- a/Help/Figures3.pptx
+++ b/Help/Figures3.pptx
@@ -260,7 +260,7 @@
           <a:p>
             <a:fld id="{054E8CB3-1D98-4ECD-B6B7-C0FB8C78DDA1}" type="datetimeFigureOut">
               <a:rPr lang="en-US" smtClean="0"/>
-              <a:t>2019-11-15</a:t>
+              <a:t>2020-02-10</a:t>
             </a:fld>
             <a:endParaRPr lang="en-US"/>
           </a:p>
@@ -430,7 +430,7 @@
           <a:p>
             <a:fld id="{054E8CB3-1D98-4ECD-B6B7-C0FB8C78DDA1}" type="datetimeFigureOut">
               <a:rPr lang="en-US" smtClean="0"/>
-              <a:t>2019-11-15</a:t>
+              <a:t>2020-02-10</a:t>
             </a:fld>
             <a:endParaRPr lang="en-US"/>
           </a:p>
@@ -610,7 +610,7 @@
           <a:p>
             <a:fld id="{054E8CB3-1D98-4ECD-B6B7-C0FB8C78DDA1}" type="datetimeFigureOut">
               <a:rPr lang="en-US" smtClean="0"/>
-              <a:t>2019-11-15</a:t>
+              <a:t>2020-02-10</a:t>
             </a:fld>
             <a:endParaRPr lang="en-US"/>
           </a:p>
@@ -780,7 +780,7 @@
           <a:p>
             <a:fld id="{054E8CB3-1D98-4ECD-B6B7-C0FB8C78DDA1}" type="datetimeFigureOut">
               <a:rPr lang="en-US" smtClean="0"/>
-              <a:t>2019-11-15</a:t>
+              <a:t>2020-02-10</a:t>
             </a:fld>
             <a:endParaRPr lang="en-US"/>
           </a:p>
@@ -1026,7 +1026,7 @@
           <a:p>
             <a:fld id="{054E8CB3-1D98-4ECD-B6B7-C0FB8C78DDA1}" type="datetimeFigureOut">
               <a:rPr lang="en-US" smtClean="0"/>
-              <a:t>2019-11-15</a:t>
+              <a:t>2020-02-10</a:t>
             </a:fld>
             <a:endParaRPr lang="en-US"/>
           </a:p>
@@ -1258,7 +1258,7 @@
           <a:p>
             <a:fld id="{054E8CB3-1D98-4ECD-B6B7-C0FB8C78DDA1}" type="datetimeFigureOut">
               <a:rPr lang="en-US" smtClean="0"/>
-              <a:t>2019-11-15</a:t>
+              <a:t>2020-02-10</a:t>
             </a:fld>
             <a:endParaRPr lang="en-US"/>
           </a:p>
@@ -1625,7 +1625,7 @@
           <a:p>
             <a:fld id="{054E8CB3-1D98-4ECD-B6B7-C0FB8C78DDA1}" type="datetimeFigureOut">
               <a:rPr lang="en-US" smtClean="0"/>
-              <a:t>2019-11-15</a:t>
+              <a:t>2020-02-10</a:t>
             </a:fld>
             <a:endParaRPr lang="en-US"/>
           </a:p>
@@ -1743,7 +1743,7 @@
           <a:p>
             <a:fld id="{054E8CB3-1D98-4ECD-B6B7-C0FB8C78DDA1}" type="datetimeFigureOut">
               <a:rPr lang="en-US" smtClean="0"/>
-              <a:t>2019-11-15</a:t>
+              <a:t>2020-02-10</a:t>
             </a:fld>
             <a:endParaRPr lang="en-US"/>
           </a:p>
@@ -1838,7 +1838,7 @@
           <a:p>
             <a:fld id="{054E8CB3-1D98-4ECD-B6B7-C0FB8C78DDA1}" type="datetimeFigureOut">
               <a:rPr lang="en-US" smtClean="0"/>
-              <a:t>2019-11-15</a:t>
+              <a:t>2020-02-10</a:t>
             </a:fld>
             <a:endParaRPr lang="en-US"/>
           </a:p>
@@ -2115,7 +2115,7 @@
           <a:p>
             <a:fld id="{054E8CB3-1D98-4ECD-B6B7-C0FB8C78DDA1}" type="datetimeFigureOut">
               <a:rPr lang="en-US" smtClean="0"/>
-              <a:t>2019-11-15</a:t>
+              <a:t>2020-02-10</a:t>
             </a:fld>
             <a:endParaRPr lang="en-US"/>
           </a:p>
@@ -2368,7 +2368,7 @@
           <a:p>
             <a:fld id="{054E8CB3-1D98-4ECD-B6B7-C0FB8C78DDA1}" type="datetimeFigureOut">
               <a:rPr lang="en-US" smtClean="0"/>
-              <a:t>2019-11-15</a:t>
+              <a:t>2020-02-10</a:t>
             </a:fld>
             <a:endParaRPr lang="en-US"/>
           </a:p>
@@ -2581,7 +2581,7 @@
           <a:p>
             <a:fld id="{054E8CB3-1D98-4ECD-B6B7-C0FB8C78DDA1}" type="datetimeFigureOut">
               <a:rPr lang="en-US" smtClean="0"/>
-              <a:t>2019-11-15</a:t>
+              <a:t>2020-02-10</a:t>
             </a:fld>
             <a:endParaRPr lang="en-US"/>
           </a:p>
@@ -2994,10 +2994,10 @@
         </p:nvGrpSpPr>
         <p:grpSpPr>
           <a:xfrm>
-            <a:off x="60803" y="1149560"/>
-            <a:ext cx="12225670" cy="4543873"/>
-            <a:chOff x="60803" y="1149560"/>
-            <a:chExt cx="12225670" cy="4543873"/>
+            <a:off x="-422693" y="971913"/>
+            <a:ext cx="12709166" cy="4721520"/>
+            <a:chOff x="-422693" y="971913"/>
+            <a:chExt cx="12709166" cy="4721520"/>
           </a:xfrm>
           <a:solidFill>
             <a:schemeClr val="bg1"/>
@@ -3144,7 +3144,7 @@
             <p:cNvPr id="10" name="Rectangle 9">
               <a:extLst>
                 <a:ext uri="{FF2B5EF4-FFF2-40B4-BE49-F238E27FC236}">
-                  <a16:creationId xmlns="" xmlns:mc="http://schemas.openxmlformats.org/markup-compatibility/2006" xmlns:a14="http://schemas.microsoft.com/office/drawing/2010/main" xmlns:a16="http://schemas.microsoft.com/office/drawing/2014/main" id="{2E36643D-EEA2-42A8-BBCF-DC12D9FC8BA4}"/>
+                  <a16:creationId xmlns:a16="http://schemas.microsoft.com/office/drawing/2014/main" xmlns:a14="http://schemas.microsoft.com/office/drawing/2010/main" xmlns:mc="http://schemas.openxmlformats.org/markup-compatibility/2006" xmlns="" id="{2E36643D-EEA2-42A8-BBCF-DC12D9FC8BA4}"/>
                 </a:ext>
               </a:extLst>
             </p:cNvPr>
@@ -3186,7 +3186,7 @@
             <a:p>
               <a:pPr algn="ctr"/>
               <a:r>
-                <a:rPr lang="en-US" sz="1400" dirty="0" smtClean="0">
+                <a:rPr lang="en-US" sz="2000" dirty="0" smtClean="0">
                   <a:solidFill>
                     <a:schemeClr val="tx1"/>
                   </a:solidFill>
@@ -3195,7 +3195,7 @@
                 </a:rPr>
                 <a:t>EM Iterations</a:t>
               </a:r>
-              <a:endParaRPr lang="en-US" sz="1400" dirty="0">
+              <a:endParaRPr lang="en-US" sz="2000" dirty="0">
                 <a:solidFill>
                   <a:schemeClr val="tx1"/>
                 </a:solidFill>
@@ -3210,7 +3210,7 @@
             <p:cNvPr id="12" name="Rectangle 11">
               <a:extLst>
                 <a:ext uri="{FF2B5EF4-FFF2-40B4-BE49-F238E27FC236}">
-                  <a16:creationId xmlns="" xmlns:mc="http://schemas.openxmlformats.org/markup-compatibility/2006" xmlns:a14="http://schemas.microsoft.com/office/drawing/2010/main" xmlns:a16="http://schemas.microsoft.com/office/drawing/2014/main" id="{6D2C8BE0-B0D2-4978-A1B5-FFF5137A4C82}"/>
+                  <a16:creationId xmlns:a16="http://schemas.microsoft.com/office/drawing/2014/main" xmlns:a14="http://schemas.microsoft.com/office/drawing/2010/main" xmlns:mc="http://schemas.openxmlformats.org/markup-compatibility/2006" xmlns="" id="{6D2C8BE0-B0D2-4978-A1B5-FFF5137A4C82}"/>
                 </a:ext>
               </a:extLst>
             </p:cNvPr>
@@ -3219,8 +3219,8 @@
           </p:nvSpPr>
           <p:spPr>
             <a:xfrm>
-              <a:off x="60803" y="2320637"/>
-              <a:ext cx="1164565" cy="2216724"/>
+              <a:off x="-422693" y="2320637"/>
+              <a:ext cx="1648062" cy="2216724"/>
             </a:xfrm>
             <a:prstGeom prst="rect">
               <a:avLst/>
@@ -3252,7 +3252,7 @@
             <a:p>
               <a:pPr algn="ctr"/>
               <a:r>
-                <a:rPr lang="en-US" sz="1400" dirty="0" smtClean="0">
+                <a:rPr lang="en-US" sz="2000" dirty="0" smtClean="0">
                   <a:solidFill>
                     <a:schemeClr val="tx1"/>
                   </a:solidFill>
@@ -3264,8 +3264,8 @@
             </a:p>
           </p:txBody>
         </p:sp>
-        <mc:AlternateContent xmlns:mc="http://schemas.openxmlformats.org/markup-compatibility/2006" xmlns:a14="http://schemas.microsoft.com/office/drawing/2010/main">
-          <mc:Choice Requires="a14">
+        <mc:AlternateContent xmlns:mc="http://schemas.openxmlformats.org/markup-compatibility/2006">
+          <mc:Choice xmlns:a14="http://schemas.microsoft.com/office/drawing/2010/main" Requires="a14">
             <p:sp>
               <p:nvSpPr>
                 <p:cNvPr id="13" name="Rectangle 12"/>
@@ -3308,7 +3308,7 @@
                 <a:lstStyle/>
                 <a:p>
                   <a:r>
-                    <a:rPr lang="en-US" sz="1400" dirty="0" smtClean="0">
+                    <a:rPr lang="en-US" sz="1600" dirty="0" smtClean="0">
                       <a:solidFill>
                         <a:schemeClr val="tx1"/>
                       </a:solidFill>
@@ -3320,7 +3320,7 @@
                   <a14:m>
                     <m:oMath xmlns:m="http://schemas.openxmlformats.org/officeDocument/2006/math">
                       <m:r>
-                        <a:rPr lang="en-US" sz="1400" i="1">
+                        <a:rPr lang="en-US" sz="1600" i="1">
                           <a:solidFill>
                             <a:schemeClr val="tx1"/>
                           </a:solidFill>
@@ -3332,7 +3332,7 @@
                     </m:oMath>
                   </a14:m>
                   <a:r>
-                    <a:rPr lang="en-US" sz="1400" dirty="0">
+                    <a:rPr lang="en-US" sz="1600" dirty="0">
                       <a:solidFill>
                         <a:schemeClr val="tx1"/>
                       </a:solidFill>
@@ -3344,7 +3344,7 @@
                   <a14:m>
                     <m:oMath xmlns:m="http://schemas.openxmlformats.org/officeDocument/2006/math">
                       <m:r>
-                        <a:rPr lang="en-US" sz="1400" i="1">
+                        <a:rPr lang="en-US" sz="1600" i="1">
                           <a:solidFill>
                             <a:schemeClr val="tx1"/>
                           </a:solidFill>
@@ -3356,7 +3356,7 @@
                     </m:oMath>
                   </a14:m>
                   <a:r>
-                    <a:rPr lang="en-US" sz="1400" dirty="0" smtClean="0">
+                    <a:rPr lang="en-US" sz="1600" dirty="0" smtClean="0">
                       <a:solidFill>
                         <a:schemeClr val="tx1"/>
                       </a:solidFill>
@@ -3368,7 +3368,7 @@
                 </a:p>
                 <a:p>
                   <a:r>
-                    <a:rPr lang="en-US" sz="1400" dirty="0" smtClean="0">
+                    <a:rPr lang="en-US" sz="1600" dirty="0" smtClean="0">
                       <a:solidFill>
                         <a:schemeClr val="tx1"/>
                       </a:solidFill>
@@ -3380,7 +3380,7 @@
                   <a14:m>
                     <m:oMath xmlns:m="http://schemas.openxmlformats.org/officeDocument/2006/math">
                       <m:r>
-                        <a:rPr lang="en-US" sz="1400" i="1">
+                        <a:rPr lang="en-US" sz="1600" i="1">
                           <a:solidFill>
                             <a:schemeClr val="tx1"/>
                           </a:solidFill>
@@ -3392,7 +3392,7 @@
                     </m:oMath>
                   </a14:m>
                   <a:r>
-                    <a:rPr lang="en-US" sz="1400" dirty="0">
+                    <a:rPr lang="en-US" sz="1600" dirty="0">
                       <a:solidFill>
                         <a:schemeClr val="tx1"/>
                       </a:solidFill>
@@ -3404,7 +3404,7 @@
                   <a14:m>
                     <m:oMath xmlns:m="http://schemas.openxmlformats.org/officeDocument/2006/math">
                       <m:r>
-                        <a:rPr lang="en-US" sz="1400" i="1">
+                        <a:rPr lang="en-US" sz="1600" i="1">
                           <a:solidFill>
                             <a:schemeClr val="tx1"/>
                           </a:solidFill>
@@ -3416,7 +3416,7 @@
                     </m:oMath>
                   </a14:m>
                   <a:r>
-                    <a:rPr lang="en-US" sz="1400" dirty="0" smtClean="0">
+                    <a:rPr lang="en-US" sz="1600" dirty="0" smtClean="0">
                       <a:solidFill>
                         <a:schemeClr val="tx1"/>
                       </a:solidFill>
@@ -3425,7 +3425,7 @@
                     </a:rPr>
                     <a:t> (single run)</a:t>
                   </a:r>
-                  <a:endParaRPr lang="en-US" sz="1400" dirty="0">
+                  <a:endParaRPr lang="en-US" sz="1600" dirty="0">
                     <a:solidFill>
                       <a:schemeClr val="tx1"/>
                     </a:solidFill>
@@ -3434,7 +3434,7 @@
                   </a:endParaRPr>
                 </a:p>
                 <a:p>
-                  <a:endParaRPr lang="en-US" sz="1400" dirty="0" smtClean="0">
+                  <a:endParaRPr lang="en-US" sz="1600" dirty="0" smtClean="0">
                     <a:solidFill>
                       <a:schemeClr val="tx1"/>
                     </a:solidFill>
@@ -3443,7 +3443,7 @@
                   </a:endParaRPr>
                 </a:p>
                 <a:p>
-                  <a:endParaRPr lang="en-US" sz="1400" dirty="0">
+                  <a:endParaRPr lang="en-US" sz="1600" dirty="0">
                     <a:solidFill>
                       <a:schemeClr val="tx1"/>
                     </a:solidFill>
@@ -3454,7 +3454,7 @@
               </p:txBody>
             </p:sp>
           </mc:Choice>
-          <mc:Fallback xmlns="">
+          <mc:Fallback>
             <p:sp>
               <p:nvSpPr>
                 <p:cNvPr id="13" name="Rectangle 12"/>
@@ -3474,7 +3474,7 @@
                 <a:blipFill rotWithShape="0">
                   <a:blip r:embed="rId6"/>
                   <a:stretch>
-                    <a:fillRect l="-274"/>
+                    <a:fillRect l="-685" t="-2890"/>
                   </a:stretch>
                 </a:blipFill>
                 <a:ln>
@@ -3563,7 +3563,7 @@
             <p:cNvPr id="19" name="Rectangle 18">
               <a:extLst>
                 <a:ext uri="{FF2B5EF4-FFF2-40B4-BE49-F238E27FC236}">
-                  <a16:creationId xmlns="" xmlns:mc="http://schemas.openxmlformats.org/markup-compatibility/2006" xmlns:a14="http://schemas.microsoft.com/office/drawing/2010/main" xmlns:a16="http://schemas.microsoft.com/office/drawing/2014/main" id="{2E36643D-EEA2-42A8-BBCF-DC12D9FC8BA4}"/>
+                  <a16:creationId xmlns:a16="http://schemas.microsoft.com/office/drawing/2014/main" xmlns:a14="http://schemas.microsoft.com/office/drawing/2010/main" xmlns:mc="http://schemas.openxmlformats.org/markup-compatibility/2006" xmlns="" id="{2E36643D-EEA2-42A8-BBCF-DC12D9FC8BA4}"/>
                 </a:ext>
               </a:extLst>
             </p:cNvPr>
@@ -3605,7 +3605,7 @@
             <a:p>
               <a:pPr algn="ctr"/>
               <a:r>
-                <a:rPr lang="en-US" sz="1400" dirty="0" smtClean="0">
+                <a:rPr lang="en-US" sz="2000" dirty="0" smtClean="0">
                   <a:solidFill>
                     <a:schemeClr val="tx1"/>
                   </a:solidFill>
@@ -3614,7 +3614,7 @@
                 </a:rPr>
                 <a:t>EM Iterations</a:t>
               </a:r>
-              <a:endParaRPr lang="en-US" sz="1400" dirty="0">
+              <a:endParaRPr lang="en-US" sz="2000" dirty="0">
                 <a:solidFill>
                   <a:schemeClr val="tx1"/>
                 </a:solidFill>
@@ -3629,7 +3629,7 @@
             <p:cNvPr id="20" name="Rectangle 19">
               <a:extLst>
                 <a:ext uri="{FF2B5EF4-FFF2-40B4-BE49-F238E27FC236}">
-                  <a16:creationId xmlns="" xmlns:mc="http://schemas.openxmlformats.org/markup-compatibility/2006" xmlns:a14="http://schemas.microsoft.com/office/drawing/2010/main" xmlns:a16="http://schemas.microsoft.com/office/drawing/2014/main" id="{6D2C8BE0-B0D2-4978-A1B5-FFF5137A4C82}"/>
+                  <a16:creationId xmlns:a16="http://schemas.microsoft.com/office/drawing/2014/main" xmlns:a14="http://schemas.microsoft.com/office/drawing/2010/main" xmlns:mc="http://schemas.openxmlformats.org/markup-compatibility/2006" xmlns="" id="{6D2C8BE0-B0D2-4978-A1B5-FFF5137A4C82}"/>
                 </a:ext>
               </a:extLst>
             </p:cNvPr>
@@ -3685,7 +3685,7 @@
             <p:cNvPr id="21" name="Rectangle 20">
               <a:extLst>
                 <a:ext uri="{FF2B5EF4-FFF2-40B4-BE49-F238E27FC236}">
-                  <a16:creationId xmlns="" xmlns:mc="http://schemas.openxmlformats.org/markup-compatibility/2006" xmlns:a14="http://schemas.microsoft.com/office/drawing/2010/main" xmlns:a16="http://schemas.microsoft.com/office/drawing/2014/main" id="{6D2C8BE0-B0D2-4978-A1B5-FFF5137A4C82}"/>
+                  <a16:creationId xmlns:a16="http://schemas.microsoft.com/office/drawing/2014/main" xmlns:a14="http://schemas.microsoft.com/office/drawing/2010/main" xmlns:mc="http://schemas.openxmlformats.org/markup-compatibility/2006" xmlns="" id="{6D2C8BE0-B0D2-4978-A1B5-FFF5137A4C82}"/>
                 </a:ext>
               </a:extLst>
             </p:cNvPr>
@@ -3694,8 +3694,8 @@
           </p:nvSpPr>
           <p:spPr>
             <a:xfrm>
-              <a:off x="2367822" y="1149560"/>
-              <a:ext cx="2609638" cy="521426"/>
+              <a:off x="1716487" y="971913"/>
+              <a:ext cx="3835883" cy="521426"/>
             </a:xfrm>
             <a:prstGeom prst="rect">
               <a:avLst/>
@@ -3727,7 +3727,7 @@
             <a:p>
               <a:pPr algn="ctr"/>
               <a:r>
-                <a:rPr lang="en-US" sz="1400" dirty="0" smtClean="0">
+                <a:rPr lang="en-US" sz="2400" dirty="0" smtClean="0">
                   <a:solidFill>
                     <a:schemeClr val="tx1"/>
                   </a:solidFill>
@@ -3737,7 +3737,7 @@
                 <a:t>Without </a:t>
               </a:r>
               <a:r>
-                <a:rPr lang="en-US" sz="1400" dirty="0">
+                <a:rPr lang="en-US" sz="2400" dirty="0">
                   <a:solidFill>
                     <a:schemeClr val="tx1"/>
                   </a:solidFill>
@@ -3754,7 +3754,7 @@
             <p:cNvPr id="22" name="Rectangle 21">
               <a:extLst>
                 <a:ext uri="{FF2B5EF4-FFF2-40B4-BE49-F238E27FC236}">
-                  <a16:creationId xmlns="" xmlns:mc="http://schemas.openxmlformats.org/markup-compatibility/2006" xmlns:a14="http://schemas.microsoft.com/office/drawing/2010/main" xmlns:a16="http://schemas.microsoft.com/office/drawing/2014/main" id="{6D2C8BE0-B0D2-4978-A1B5-FFF5137A4C82}"/>
+                  <a16:creationId xmlns:a16="http://schemas.microsoft.com/office/drawing/2014/main" xmlns:a14="http://schemas.microsoft.com/office/drawing/2010/main" xmlns:mc="http://schemas.openxmlformats.org/markup-compatibility/2006" xmlns="" id="{6D2C8BE0-B0D2-4978-A1B5-FFF5137A4C82}"/>
                 </a:ext>
               </a:extLst>
             </p:cNvPr>
@@ -3763,8 +3763,8 @@
           </p:nvSpPr>
           <p:spPr>
             <a:xfrm>
-              <a:off x="7962274" y="1149560"/>
-              <a:ext cx="1923838" cy="521426"/>
+              <a:off x="7519685" y="971913"/>
+              <a:ext cx="2827832" cy="521426"/>
             </a:xfrm>
             <a:prstGeom prst="rect">
               <a:avLst/>
@@ -3796,7 +3796,7 @@
             <a:p>
               <a:pPr algn="ctr"/>
               <a:r>
-                <a:rPr lang="en-US" sz="1400" dirty="0">
+                <a:rPr lang="en-US" sz="2400" dirty="0">
                   <a:solidFill>
                     <a:schemeClr val="tx1"/>
                   </a:solidFill>
@@ -3994,7 +3994,7 @@
                   <p:cNvPr id="37" name="Rectangle 36">
                     <a:extLst>
                       <a:ext uri="{FF2B5EF4-FFF2-40B4-BE49-F238E27FC236}">
-                        <a16:creationId xmlns="" xmlns:a16="http://schemas.microsoft.com/office/drawing/2014/main" id="{2E36643D-EEA2-42A8-BBCF-DC12D9FC8BA4}"/>
+                        <a16:creationId xmlns:a16="http://schemas.microsoft.com/office/drawing/2014/main" xmlns="" id="{2E36643D-EEA2-42A8-BBCF-DC12D9FC8BA4}"/>
                       </a:ext>
                     </a:extLst>
                   </p:cNvPr>
@@ -4128,7 +4128,7 @@
                   <p:cNvPr id="42" name="Rectangle 41">
                     <a:extLst>
                       <a:ext uri="{FF2B5EF4-FFF2-40B4-BE49-F238E27FC236}">
-                        <a16:creationId xmlns="" xmlns:a16="http://schemas.microsoft.com/office/drawing/2014/main" id="{2E36643D-EEA2-42A8-BBCF-DC12D9FC8BA4}"/>
+                        <a16:creationId xmlns:a16="http://schemas.microsoft.com/office/drawing/2014/main" xmlns="" id="{2E36643D-EEA2-42A8-BBCF-DC12D9FC8BA4}"/>
                       </a:ext>
                     </a:extLst>
                   </p:cNvPr>
@@ -4260,7 +4260,7 @@
               <p:cNvPr id="43" name="Rectangle 42">
                 <a:extLst>
                   <a:ext uri="{FF2B5EF4-FFF2-40B4-BE49-F238E27FC236}">
-                    <a16:creationId xmlns="" xmlns:mc="http://schemas.openxmlformats.org/markup-compatibility/2006" xmlns:a14="http://schemas.microsoft.com/office/drawing/2010/main" xmlns:a16="http://schemas.microsoft.com/office/drawing/2014/main" id="{6D2C8BE0-B0D2-4978-A1B5-FFF5137A4C82}"/>
+                    <a16:creationId xmlns:a16="http://schemas.microsoft.com/office/drawing/2014/main" xmlns:a14="http://schemas.microsoft.com/office/drawing/2010/main" xmlns:mc="http://schemas.openxmlformats.org/markup-compatibility/2006" xmlns="" id="{6D2C8BE0-B0D2-4978-A1B5-FFF5137A4C82}"/>
                   </a:ext>
                 </a:extLst>
               </p:cNvPr>
@@ -4316,7 +4316,7 @@
               <p:cNvPr id="44" name="Rectangle 43">
                 <a:extLst>
                   <a:ext uri="{FF2B5EF4-FFF2-40B4-BE49-F238E27FC236}">
-                    <a16:creationId xmlns="" xmlns:mc="http://schemas.openxmlformats.org/markup-compatibility/2006" xmlns:a14="http://schemas.microsoft.com/office/drawing/2010/main" xmlns:a16="http://schemas.microsoft.com/office/drawing/2014/main" id="{6D2C8BE0-B0D2-4978-A1B5-FFF5137A4C82}"/>
+                    <a16:creationId xmlns:a16="http://schemas.microsoft.com/office/drawing/2014/main" xmlns:a14="http://schemas.microsoft.com/office/drawing/2010/main" xmlns:mc="http://schemas.openxmlformats.org/markup-compatibility/2006" xmlns="" id="{6D2C8BE0-B0D2-4978-A1B5-FFF5137A4C82}"/>
                   </a:ext>
                 </a:extLst>
               </p:cNvPr>
@@ -4385,7 +4385,7 @@
               <p:cNvPr id="45" name="Rectangle 44">
                 <a:extLst>
                   <a:ext uri="{FF2B5EF4-FFF2-40B4-BE49-F238E27FC236}">
-                    <a16:creationId xmlns="" xmlns:mc="http://schemas.openxmlformats.org/markup-compatibility/2006" xmlns:a14="http://schemas.microsoft.com/office/drawing/2010/main" xmlns:a16="http://schemas.microsoft.com/office/drawing/2014/main" id="{6D2C8BE0-B0D2-4978-A1B5-FFF5137A4C82}"/>
+                    <a16:creationId xmlns:a16="http://schemas.microsoft.com/office/drawing/2014/main" xmlns:a14="http://schemas.microsoft.com/office/drawing/2010/main" xmlns:mc="http://schemas.openxmlformats.org/markup-compatibility/2006" xmlns="" id="{6D2C8BE0-B0D2-4978-A1B5-FFF5137A4C82}"/>
                   </a:ext>
                 </a:extLst>
               </p:cNvPr>
@@ -4730,7 +4730,7 @@
                   <p:cNvPr id="13" name="Rectangle 12">
                     <a:extLst>
                       <a:ext uri="{FF2B5EF4-FFF2-40B4-BE49-F238E27FC236}">
-                        <a16:creationId xmlns="" xmlns:a16="http://schemas.microsoft.com/office/drawing/2014/main" id="{6D2C8BE0-B0D2-4978-A1B5-FFF5137A4C82}"/>
+                        <a16:creationId xmlns:a16="http://schemas.microsoft.com/office/drawing/2014/main" xmlns="" id="{6D2C8BE0-B0D2-4978-A1B5-FFF5137A4C82}"/>
                       </a:ext>
                     </a:extLst>
                   </p:cNvPr>
@@ -5007,10 +5007,10 @@
             </p:nvGrpSpPr>
             <p:grpSpPr>
               <a:xfrm>
-                <a:off x="-193576" y="597986"/>
-                <a:ext cx="12871732" cy="4540942"/>
-                <a:chOff x="-219455" y="597986"/>
-                <a:chExt cx="12871732" cy="4540942"/>
+                <a:off x="-193576" y="612648"/>
+                <a:ext cx="12871732" cy="4526280"/>
+                <a:chOff x="-219455" y="612648"/>
+                <a:chExt cx="12871732" cy="4526280"/>
               </a:xfrm>
               <a:solidFill>
                 <a:schemeClr val="bg1"/>
@@ -5083,7 +5083,7 @@
                 <p:cNvPr id="18" name="Rectangle 17">
                   <a:extLst>
                     <a:ext uri="{FF2B5EF4-FFF2-40B4-BE49-F238E27FC236}">
-                      <a16:creationId xmlns="" xmlns:mc="http://schemas.openxmlformats.org/markup-compatibility/2006" xmlns:a14="http://schemas.microsoft.com/office/drawing/2010/main" xmlns:a16="http://schemas.microsoft.com/office/drawing/2014/main" id="{2E36643D-EEA2-42A8-BBCF-DC12D9FC8BA4}"/>
+                      <a16:creationId xmlns:a16="http://schemas.microsoft.com/office/drawing/2014/main" xmlns:a14="http://schemas.microsoft.com/office/drawing/2010/main" xmlns:mc="http://schemas.openxmlformats.org/markup-compatibility/2006" xmlns="" id="{2E36643D-EEA2-42A8-BBCF-DC12D9FC8BA4}"/>
                     </a:ext>
                   </a:extLst>
                 </p:cNvPr>
@@ -5092,7 +5092,7 @@
               </p:nvSpPr>
               <p:spPr>
                 <a:xfrm>
-                  <a:off x="2666338" y="4764258"/>
+                  <a:off x="2666338" y="4779611"/>
                   <a:ext cx="2024961" cy="287389"/>
                 </a:xfrm>
                 <a:prstGeom prst="rect">
@@ -5125,7 +5125,7 @@
                 <a:p>
                   <a:pPr algn="ctr"/>
                   <a:r>
-                    <a:rPr lang="en-GB" sz="1400" dirty="0">
+                    <a:rPr lang="en-GB" sz="2000" dirty="0">
                       <a:solidFill>
                         <a:schemeClr val="tx1"/>
                       </a:solidFill>
@@ -5134,7 +5134,7 @@
                     </a:rPr>
                     <a:t>EM Iterations</a:t>
                   </a:r>
-                  <a:endParaRPr lang="en-US" sz="1400" dirty="0">
+                  <a:endParaRPr lang="en-US" sz="2000" dirty="0">
                     <a:solidFill>
                       <a:schemeClr val="tx1"/>
                     </a:solidFill>
@@ -5149,7 +5149,7 @@
                 <p:cNvPr id="19" name="Rectangle 18">
                   <a:extLst>
                     <a:ext uri="{FF2B5EF4-FFF2-40B4-BE49-F238E27FC236}">
-                      <a16:creationId xmlns="" xmlns:mc="http://schemas.openxmlformats.org/markup-compatibility/2006" xmlns:a14="http://schemas.microsoft.com/office/drawing/2010/main" xmlns:a16="http://schemas.microsoft.com/office/drawing/2014/main" id="{2E36643D-EEA2-42A8-BBCF-DC12D9FC8BA4}"/>
+                      <a16:creationId xmlns:a16="http://schemas.microsoft.com/office/drawing/2014/main" xmlns:a14="http://schemas.microsoft.com/office/drawing/2010/main" xmlns:mc="http://schemas.openxmlformats.org/markup-compatibility/2006" xmlns="" id="{2E36643D-EEA2-42A8-BBCF-DC12D9FC8BA4}"/>
                     </a:ext>
                   </a:extLst>
                 </p:cNvPr>
@@ -5158,7 +5158,7 @@
               </p:nvSpPr>
               <p:spPr>
                 <a:xfrm>
-                  <a:off x="7917890" y="4764258"/>
+                  <a:off x="7917890" y="4779611"/>
                   <a:ext cx="2024961" cy="287389"/>
                 </a:xfrm>
                 <a:prstGeom prst="rect">
@@ -5191,7 +5191,7 @@
                 <a:p>
                   <a:pPr algn="ctr"/>
                   <a:r>
-                    <a:rPr lang="en-GB" sz="1400" dirty="0" smtClean="0">
+                    <a:rPr lang="en-GB" sz="2000" dirty="0" smtClean="0">
                       <a:solidFill>
                         <a:schemeClr val="tx1"/>
                       </a:solidFill>
@@ -5200,7 +5200,7 @@
                     </a:rPr>
                     <a:t>EM Iterations</a:t>
                   </a:r>
-                  <a:endParaRPr lang="en-US" sz="1400" dirty="0">
+                  <a:endParaRPr lang="en-US" sz="2000" dirty="0">
                     <a:solidFill>
                       <a:schemeClr val="tx1"/>
                     </a:solidFill>
@@ -5215,7 +5215,7 @@
                 <p:cNvPr id="20" name="Rectangle 19">
                   <a:extLst>
                     <a:ext uri="{FF2B5EF4-FFF2-40B4-BE49-F238E27FC236}">
-                      <a16:creationId xmlns="" xmlns:mc="http://schemas.openxmlformats.org/markup-compatibility/2006" xmlns:a14="http://schemas.microsoft.com/office/drawing/2010/main" xmlns:a16="http://schemas.microsoft.com/office/drawing/2014/main" id="{6D2C8BE0-B0D2-4978-A1B5-FFF5137A4C82}"/>
+                      <a16:creationId xmlns:a16="http://schemas.microsoft.com/office/drawing/2014/main" xmlns:a14="http://schemas.microsoft.com/office/drawing/2010/main" xmlns:mc="http://schemas.openxmlformats.org/markup-compatibility/2006" xmlns="" id="{6D2C8BE0-B0D2-4978-A1B5-FFF5137A4C82}"/>
                     </a:ext>
                   </a:extLst>
                 </p:cNvPr>
@@ -5266,142 +5266,14 @@
                 </a:p>
               </p:txBody>
             </p:sp>
-            <p:sp>
-              <p:nvSpPr>
-                <p:cNvPr id="21" name="Rectangle 20">
-                  <a:extLst>
-                    <a:ext uri="{FF2B5EF4-FFF2-40B4-BE49-F238E27FC236}">
-                      <a16:creationId xmlns="" xmlns:mc="http://schemas.openxmlformats.org/markup-compatibility/2006" xmlns:a14="http://schemas.microsoft.com/office/drawing/2010/main" xmlns:a16="http://schemas.microsoft.com/office/drawing/2014/main" id="{6D2C8BE0-B0D2-4978-A1B5-FFF5137A4C82}"/>
-                    </a:ext>
-                  </a:extLst>
-                </p:cNvPr>
-                <p:cNvSpPr/>
-                <p:nvPr/>
-              </p:nvSpPr>
-              <p:spPr>
-                <a:xfrm>
-                  <a:off x="2373999" y="597986"/>
-                  <a:ext cx="2609638" cy="521426"/>
-                </a:xfrm>
-                <a:prstGeom prst="rect">
-                  <a:avLst/>
-                </a:prstGeom>
-                <a:grpFill/>
-                <a:ln>
-                  <a:noFill/>
-                </a:ln>
-              </p:spPr>
-              <p:style>
-                <a:lnRef idx="2">
-                  <a:schemeClr val="accent1">
-                    <a:shade val="50000"/>
-                  </a:schemeClr>
-                </a:lnRef>
-                <a:fillRef idx="1">
-                  <a:schemeClr val="accent1"/>
-                </a:fillRef>
-                <a:effectRef idx="0">
-                  <a:schemeClr val="accent1"/>
-                </a:effectRef>
-                <a:fontRef idx="minor">
-                  <a:schemeClr val="lt1"/>
-                </a:fontRef>
-              </p:style>
-              <p:txBody>
-                <a:bodyPr rtlCol="0" anchor="ctr"/>
-                <a:lstStyle/>
-                <a:p>
-                  <a:pPr algn="ctr"/>
-                  <a:r>
-                    <a:rPr lang="en-US" sz="1400" dirty="0" smtClean="0">
-                      <a:solidFill>
-                        <a:schemeClr val="tx1"/>
-                      </a:solidFill>
-                      <a:latin typeface="Cambria Math" panose="02040503050406030204" pitchFamily="18" charset="0"/>
-                      <a:ea typeface="Cambria Math" panose="02040503050406030204" pitchFamily="18" charset="0"/>
-                    </a:rPr>
-                    <a:t>Without </a:t>
-                  </a:r>
-                  <a:r>
-                    <a:rPr lang="en-US" sz="1400" dirty="0">
-                      <a:solidFill>
-                        <a:schemeClr val="tx1"/>
-                      </a:solidFill>
-                      <a:latin typeface="Cambria Math" panose="02040503050406030204" pitchFamily="18" charset="0"/>
-                      <a:ea typeface="Cambria Math" panose="02040503050406030204" pitchFamily="18" charset="0"/>
-                    </a:rPr>
-                    <a:t>Regularization </a:t>
-                  </a:r>
-                </a:p>
-              </p:txBody>
-            </p:sp>
-            <p:sp>
-              <p:nvSpPr>
-                <p:cNvPr id="22" name="Rectangle 21">
-                  <a:extLst>
-                    <a:ext uri="{FF2B5EF4-FFF2-40B4-BE49-F238E27FC236}">
-                      <a16:creationId xmlns="" xmlns:mc="http://schemas.openxmlformats.org/markup-compatibility/2006" xmlns:a14="http://schemas.microsoft.com/office/drawing/2010/main" xmlns:a16="http://schemas.microsoft.com/office/drawing/2014/main" id="{6D2C8BE0-B0D2-4978-A1B5-FFF5137A4C82}"/>
-                    </a:ext>
-                  </a:extLst>
-                </p:cNvPr>
-                <p:cNvSpPr/>
-                <p:nvPr/>
-              </p:nvSpPr>
-              <p:spPr>
-                <a:xfrm>
-                  <a:off x="7968451" y="597986"/>
-                  <a:ext cx="1923838" cy="521426"/>
-                </a:xfrm>
-                <a:prstGeom prst="rect">
-                  <a:avLst/>
-                </a:prstGeom>
-                <a:grpFill/>
-                <a:ln>
-                  <a:noFill/>
-                </a:ln>
-              </p:spPr>
-              <p:style>
-                <a:lnRef idx="2">
-                  <a:schemeClr val="accent1">
-                    <a:shade val="50000"/>
-                  </a:schemeClr>
-                </a:lnRef>
-                <a:fillRef idx="1">
-                  <a:schemeClr val="accent1"/>
-                </a:fillRef>
-                <a:effectRef idx="0">
-                  <a:schemeClr val="accent1"/>
-                </a:effectRef>
-                <a:fontRef idx="minor">
-                  <a:schemeClr val="lt1"/>
-                </a:fontRef>
-              </p:style>
-              <p:txBody>
-                <a:bodyPr rtlCol="0" anchor="ctr"/>
-                <a:lstStyle/>
-                <a:p>
-                  <a:pPr algn="ctr"/>
-                  <a:r>
-                    <a:rPr lang="en-US" sz="1400" dirty="0">
-                      <a:solidFill>
-                        <a:schemeClr val="tx1"/>
-                      </a:solidFill>
-                      <a:latin typeface="Cambria Math" panose="02040503050406030204" pitchFamily="18" charset="0"/>
-                      <a:ea typeface="Cambria Math" panose="02040503050406030204" pitchFamily="18" charset="0"/>
-                    </a:rPr>
-                    <a:t>With Regularization </a:t>
-                  </a:r>
-                </a:p>
-              </p:txBody>
-            </p:sp>
-            <mc:AlternateContent xmlns:mc="http://schemas.openxmlformats.org/markup-compatibility/2006" xmlns:a14="http://schemas.microsoft.com/office/drawing/2010/main">
-              <mc:Choice Requires="a14">
+            <mc:AlternateContent xmlns:mc="http://schemas.openxmlformats.org/markup-compatibility/2006">
+              <mc:Choice xmlns:a14="http://schemas.microsoft.com/office/drawing/2010/main" Requires="a14">
                 <p:sp>
                   <p:nvSpPr>
                     <p:cNvPr id="24" name="Rectangle 23">
                       <a:extLst>
                         <a:ext uri="{FF2B5EF4-FFF2-40B4-BE49-F238E27FC236}">
-                          <a16:creationId xmlns="" xmlns:a16="http://schemas.microsoft.com/office/drawing/2014/main" id="{6D2C8BE0-B0D2-4978-A1B5-FFF5137A4C82}"/>
+                          <a16:creationId xmlns:a16="http://schemas.microsoft.com/office/drawing/2014/main" xmlns="" id="{6D2C8BE0-B0D2-4978-A1B5-FFF5137A4C82}"/>
                         </a:ext>
                       </a:extLst>
                     </p:cNvPr>
@@ -5410,7 +5282,7 @@
                   </p:nvSpPr>
                   <p:spPr>
                     <a:xfrm>
-                      <a:off x="-219455" y="1944836"/>
+                      <a:off x="-219455" y="1962088"/>
                       <a:ext cx="1395983" cy="1852972"/>
                     </a:xfrm>
                     <a:prstGeom prst="rect">
@@ -5443,7 +5315,7 @@
                     <a:p>
                       <a:pPr algn="ctr"/>
                       <a:r>
-                        <a:rPr lang="en-US" sz="1400" dirty="0">
+                        <a:rPr lang="en-US" sz="2000" dirty="0">
                           <a:solidFill>
                             <a:schemeClr val="tx1"/>
                           </a:solidFill>
@@ -5452,7 +5324,7 @@
                         </a:rPr>
                         <a:t>Mean Log Likelihood</a:t>
                       </a:r>
-                      <a:endParaRPr lang="he-IL" sz="1400" dirty="0">
+                      <a:endParaRPr lang="he-IL" sz="2000" dirty="0">
                         <a:solidFill>
                           <a:schemeClr val="tx1"/>
                         </a:solidFill>
@@ -5471,7 +5343,7 @@
                             <m:sSub>
                               <m:sSubPr>
                                 <m:ctrlPr>
-                                  <a:rPr lang="en-US" sz="1400" i="1">
+                                  <a:rPr lang="en-US" sz="2000" i="1">
                                     <a:solidFill>
                                       <a:schemeClr val="tx1"/>
                                     </a:solidFill>
@@ -5482,7 +5354,7 @@
                               </m:sSubPr>
                               <m:e>
                                 <m:r>
-                                  <a:rPr lang="en-US" sz="1400" i="1">
+                                  <a:rPr lang="en-US" sz="2000" i="1">
                                     <a:solidFill>
                                       <a:schemeClr val="tx1"/>
                                     </a:solidFill>
@@ -5494,7 +5366,7 @@
                               </m:e>
                               <m:sub>
                                 <m:r>
-                                  <a:rPr lang="en-US" sz="1400" i="1">
+                                  <a:rPr lang="en-US" sz="2000" i="1">
                                     <a:solidFill>
                                       <a:schemeClr val="tx1"/>
                                     </a:solidFill>
@@ -5508,7 +5380,7 @@
                             <m:d>
                               <m:dPr>
                                 <m:ctrlPr>
-                                  <a:rPr lang="en-US" sz="1400" i="1">
+                                  <a:rPr lang="en-US" sz="2000" i="1">
                                     <a:solidFill>
                                       <a:schemeClr val="tx1"/>
                                     </a:solidFill>
@@ -5519,7 +5391,7 @@
                               </m:dPr>
                               <m:e>
                                 <m:r>
-                                  <a:rPr lang="en-US" sz="1400" i="1">
+                                  <a:rPr lang="en-US" sz="2000" i="1">
                                     <a:solidFill>
                                       <a:schemeClr val="tx1"/>
                                     </a:solidFill>
@@ -5533,7 +5405,7 @@
                           </m:oMath>
                         </m:oMathPara>
                       </a14:m>
-                      <a:endParaRPr lang="en-US" sz="1400" dirty="0">
+                      <a:endParaRPr lang="en-US" sz="2000" dirty="0">
                         <a:solidFill>
                           <a:schemeClr val="tx1"/>
                         </a:solidFill>
@@ -5544,7 +5416,7 @@
                   </p:txBody>
                 </p:sp>
               </mc:Choice>
-              <mc:Fallback xmlns="">
+              <mc:Fallback>
                 <p:sp>
                   <p:nvSpPr>
                     <p:cNvPr id="24" name="Rectangle 23">
@@ -5561,7 +5433,7 @@
                   </p:nvSpPr>
                   <p:spPr>
                     <a:xfrm>
-                      <a:off x="-219455" y="1944836"/>
+                      <a:off x="-219455" y="1962088"/>
                       <a:ext cx="1395983" cy="1852972"/>
                     </a:xfrm>
                     <a:prstGeom prst="rect">
@@ -5570,7 +5442,7 @@
                     <a:blipFill rotWithShape="0">
                       <a:blip r:embed="rId4"/>
                       <a:stretch>
-                        <a:fillRect/>
+                        <a:fillRect l="-2183" r="-2620"/>
                       </a:stretch>
                     </a:blipFill>
                     <a:ln>
@@ -6352,7 +6224,7 @@
                 <p:cNvPr id="45" name="Rectangle 44">
                   <a:extLst>
                     <a:ext uri="{FF2B5EF4-FFF2-40B4-BE49-F238E27FC236}">
-                      <a16:creationId xmlns="" xmlns:mc="http://schemas.openxmlformats.org/markup-compatibility/2006" xmlns:a14="http://schemas.microsoft.com/office/drawing/2010/main" xmlns:a16="http://schemas.microsoft.com/office/drawing/2014/main" id="{2E36643D-EEA2-42A8-BBCF-DC12D9FC8BA4}"/>
+                      <a16:creationId xmlns:a16="http://schemas.microsoft.com/office/drawing/2014/main" xmlns:a14="http://schemas.microsoft.com/office/drawing/2010/main" xmlns:mc="http://schemas.openxmlformats.org/markup-compatibility/2006" xmlns="" id="{2E36643D-EEA2-42A8-BBCF-DC12D9FC8BA4}"/>
                     </a:ext>
                   </a:extLst>
                 </p:cNvPr>
@@ -6408,7 +6280,7 @@
                 <p:cNvPr id="46" name="Rectangle 45">
                   <a:extLst>
                     <a:ext uri="{FF2B5EF4-FFF2-40B4-BE49-F238E27FC236}">
-                      <a16:creationId xmlns="" xmlns:mc="http://schemas.openxmlformats.org/markup-compatibility/2006" xmlns:a14="http://schemas.microsoft.com/office/drawing/2010/main" xmlns:a16="http://schemas.microsoft.com/office/drawing/2014/main" id="{2E36643D-EEA2-42A8-BBCF-DC12D9FC8BA4}"/>
+                      <a16:creationId xmlns:a16="http://schemas.microsoft.com/office/drawing/2014/main" xmlns:a14="http://schemas.microsoft.com/office/drawing/2010/main" xmlns:mc="http://schemas.openxmlformats.org/markup-compatibility/2006" xmlns="" id="{2E36643D-EEA2-42A8-BBCF-DC12D9FC8BA4}"/>
                     </a:ext>
                   </a:extLst>
                 </p:cNvPr>
@@ -6654,6 +6526,138 @@
           </p:txBody>
         </p:sp>
       </p:grpSp>
+      <p:sp>
+        <p:nvSpPr>
+          <p:cNvPr id="28" name="Rectangle 27">
+            <a:extLst>
+              <a:ext uri="{FF2B5EF4-FFF2-40B4-BE49-F238E27FC236}">
+                <a16:creationId xmlns:a16="http://schemas.microsoft.com/office/drawing/2014/main" xmlns:a14="http://schemas.microsoft.com/office/drawing/2010/main" xmlns:mc="http://schemas.openxmlformats.org/markup-compatibility/2006" xmlns="" id="{6D2C8BE0-B0D2-4978-A1B5-FFF5137A4C82}"/>
+              </a:ext>
+            </a:extLst>
+          </p:cNvPr>
+          <p:cNvSpPr/>
+          <p:nvPr/>
+        </p:nvSpPr>
+        <p:spPr>
+          <a:xfrm>
+            <a:off x="1716487" y="412334"/>
+            <a:ext cx="3835883" cy="521426"/>
+          </a:xfrm>
+          <a:prstGeom prst="rect">
+            <a:avLst/>
+          </a:prstGeom>
+          <a:solidFill>
+            <a:schemeClr val="bg1"/>
+          </a:solidFill>
+          <a:ln>
+            <a:noFill/>
+          </a:ln>
+        </p:spPr>
+        <p:style>
+          <a:lnRef idx="2">
+            <a:schemeClr val="accent1">
+              <a:shade val="50000"/>
+            </a:schemeClr>
+          </a:lnRef>
+          <a:fillRef idx="1">
+            <a:schemeClr val="accent1"/>
+          </a:fillRef>
+          <a:effectRef idx="0">
+            <a:schemeClr val="accent1"/>
+          </a:effectRef>
+          <a:fontRef idx="minor">
+            <a:schemeClr val="lt1"/>
+          </a:fontRef>
+        </p:style>
+        <p:txBody>
+          <a:bodyPr rtlCol="0" anchor="ctr"/>
+          <a:lstStyle/>
+          <a:p>
+            <a:pPr algn="ctr"/>
+            <a:r>
+              <a:rPr lang="en-US" sz="2400" dirty="0" smtClean="0">
+                <a:solidFill>
+                  <a:schemeClr val="tx1"/>
+                </a:solidFill>
+                <a:latin typeface="Cambria Math" panose="02040503050406030204" pitchFamily="18" charset="0"/>
+                <a:ea typeface="Cambria Math" panose="02040503050406030204" pitchFamily="18" charset="0"/>
+              </a:rPr>
+              <a:t>Without </a:t>
+            </a:r>
+            <a:r>
+              <a:rPr lang="en-US" sz="2400" dirty="0">
+                <a:solidFill>
+                  <a:schemeClr val="tx1"/>
+                </a:solidFill>
+                <a:latin typeface="Cambria Math" panose="02040503050406030204" pitchFamily="18" charset="0"/>
+                <a:ea typeface="Cambria Math" panose="02040503050406030204" pitchFamily="18" charset="0"/>
+              </a:rPr>
+              <a:t>Regularization </a:t>
+            </a:r>
+          </a:p>
+        </p:txBody>
+      </p:sp>
+      <p:sp>
+        <p:nvSpPr>
+          <p:cNvPr id="29" name="Rectangle 28">
+            <a:extLst>
+              <a:ext uri="{FF2B5EF4-FFF2-40B4-BE49-F238E27FC236}">
+                <a16:creationId xmlns:a16="http://schemas.microsoft.com/office/drawing/2014/main" xmlns:a14="http://schemas.microsoft.com/office/drawing/2010/main" xmlns:mc="http://schemas.openxmlformats.org/markup-compatibility/2006" xmlns="" id="{6D2C8BE0-B0D2-4978-A1B5-FFF5137A4C82}"/>
+              </a:ext>
+            </a:extLst>
+          </p:cNvPr>
+          <p:cNvSpPr/>
+          <p:nvPr/>
+        </p:nvSpPr>
+        <p:spPr>
+          <a:xfrm>
+            <a:off x="7519685" y="412334"/>
+            <a:ext cx="2827832" cy="521426"/>
+          </a:xfrm>
+          <a:prstGeom prst="rect">
+            <a:avLst/>
+          </a:prstGeom>
+          <a:solidFill>
+            <a:schemeClr val="bg1"/>
+          </a:solidFill>
+          <a:ln>
+            <a:noFill/>
+          </a:ln>
+        </p:spPr>
+        <p:style>
+          <a:lnRef idx="2">
+            <a:schemeClr val="accent1">
+              <a:shade val="50000"/>
+            </a:schemeClr>
+          </a:lnRef>
+          <a:fillRef idx="1">
+            <a:schemeClr val="accent1"/>
+          </a:fillRef>
+          <a:effectRef idx="0">
+            <a:schemeClr val="accent1"/>
+          </a:effectRef>
+          <a:fontRef idx="minor">
+            <a:schemeClr val="lt1"/>
+          </a:fontRef>
+        </p:style>
+        <p:txBody>
+          <a:bodyPr rtlCol="0" anchor="ctr"/>
+          <a:lstStyle/>
+          <a:p>
+            <a:pPr algn="ctr"/>
+            <a:r>
+              <a:rPr lang="en-US" sz="2400" dirty="0">
+                <a:solidFill>
+                  <a:schemeClr val="tx1"/>
+                </a:solidFill>
+                <a:latin typeface="Cambria Math" panose="02040503050406030204" pitchFamily="18" charset="0"/>
+                <a:ea typeface="Cambria Math" panose="02040503050406030204" pitchFamily="18" charset="0"/>
+              </a:rPr>
+              <a:t>With Regularization </a:t>
+            </a:r>
+          </a:p>
+        </p:txBody>
+      </p:sp>
     </p:spTree>
     <p:extLst>
       <p:ext uri="{BB962C8B-B14F-4D97-AF65-F5344CB8AC3E}">
@@ -6699,10 +6703,10 @@
         </p:nvGrpSpPr>
         <p:grpSpPr>
           <a:xfrm>
-            <a:off x="-1102743" y="1324586"/>
-            <a:ext cx="12284015" cy="4675517"/>
-            <a:chOff x="-1026543" y="1164566"/>
-            <a:chExt cx="12284015" cy="4675517"/>
+            <a:off x="-1628562" y="1298707"/>
+            <a:ext cx="12809834" cy="4675517"/>
+            <a:chOff x="-1552362" y="1164566"/>
+            <a:chExt cx="12809834" cy="4675517"/>
           </a:xfrm>
         </p:grpSpPr>
         <p:sp>
@@ -6761,10 +6765,10 @@
           </p:nvGrpSpPr>
           <p:grpSpPr>
             <a:xfrm>
-              <a:off x="-947839" y="1226450"/>
-              <a:ext cx="12122732" cy="4541311"/>
-              <a:chOff x="-50692" y="1278209"/>
-              <a:chExt cx="12122732" cy="4541311"/>
+              <a:off x="-1552362" y="1226450"/>
+              <a:ext cx="12735881" cy="4541311"/>
+              <a:chOff x="-655215" y="1278209"/>
+              <a:chExt cx="12735881" cy="4541311"/>
             </a:xfrm>
             <a:solidFill>
               <a:schemeClr val="bg1"/>
@@ -6833,7 +6837,7 @@
               <p:cNvPr id="46" name="Rectangle 45">
                 <a:extLst>
                   <a:ext uri="{FF2B5EF4-FFF2-40B4-BE49-F238E27FC236}">
-                    <a16:creationId xmlns="" xmlns:mc="http://schemas.openxmlformats.org/markup-compatibility/2006" xmlns:a14="http://schemas.microsoft.com/office/drawing/2010/main" xmlns:a16="http://schemas.microsoft.com/office/drawing/2014/main" id="{2E36643D-EEA2-42A8-BBCF-DC12D9FC8BA4}"/>
+                    <a16:creationId xmlns:a16="http://schemas.microsoft.com/office/drawing/2014/main" xmlns:a14="http://schemas.microsoft.com/office/drawing/2010/main" xmlns:mc="http://schemas.openxmlformats.org/markup-compatibility/2006" xmlns="" id="{2E36643D-EEA2-42A8-BBCF-DC12D9FC8BA4}"/>
                   </a:ext>
                 </a:extLst>
               </p:cNvPr>
@@ -6889,7 +6893,7 @@
               <p:cNvPr id="47" name="Rectangle 46">
                 <a:extLst>
                   <a:ext uri="{FF2B5EF4-FFF2-40B4-BE49-F238E27FC236}">
-                    <a16:creationId xmlns="" xmlns:mc="http://schemas.openxmlformats.org/markup-compatibility/2006" xmlns:a14="http://schemas.microsoft.com/office/drawing/2010/main" xmlns:a16="http://schemas.microsoft.com/office/drawing/2014/main" id="{2E36643D-EEA2-42A8-BBCF-DC12D9FC8BA4}"/>
+                    <a16:creationId xmlns:a16="http://schemas.microsoft.com/office/drawing/2014/main" xmlns:a14="http://schemas.microsoft.com/office/drawing/2010/main" xmlns:mc="http://schemas.openxmlformats.org/markup-compatibility/2006" xmlns="" id="{2E36643D-EEA2-42A8-BBCF-DC12D9FC8BA4}"/>
                   </a:ext>
                 </a:extLst>
               </p:cNvPr>
@@ -6955,7 +6959,7 @@
               <p:cNvPr id="48" name="Rectangle 47">
                 <a:extLst>
                   <a:ext uri="{FF2B5EF4-FFF2-40B4-BE49-F238E27FC236}">
-                    <a16:creationId xmlns="" xmlns:mc="http://schemas.openxmlformats.org/markup-compatibility/2006" xmlns:a14="http://schemas.microsoft.com/office/drawing/2010/main" xmlns:a16="http://schemas.microsoft.com/office/drawing/2014/main" id="{2E36643D-EEA2-42A8-BBCF-DC12D9FC8BA4}"/>
+                    <a16:creationId xmlns:a16="http://schemas.microsoft.com/office/drawing/2014/main" xmlns:a14="http://schemas.microsoft.com/office/drawing/2010/main" xmlns:mc="http://schemas.openxmlformats.org/markup-compatibility/2006" xmlns="" id="{2E36643D-EEA2-42A8-BBCF-DC12D9FC8BA4}"/>
                   </a:ext>
                 </a:extLst>
               </p:cNvPr>
@@ -7021,7 +7025,7 @@
               <p:cNvPr id="49" name="Rectangle 48">
                 <a:extLst>
                   <a:ext uri="{FF2B5EF4-FFF2-40B4-BE49-F238E27FC236}">
-                    <a16:creationId xmlns="" xmlns:mc="http://schemas.openxmlformats.org/markup-compatibility/2006" xmlns:a14="http://schemas.microsoft.com/office/drawing/2010/main" xmlns:a16="http://schemas.microsoft.com/office/drawing/2014/main" id="{2E36643D-EEA2-42A8-BBCF-DC12D9FC8BA4}"/>
+                    <a16:creationId xmlns:a16="http://schemas.microsoft.com/office/drawing/2014/main" xmlns:a14="http://schemas.microsoft.com/office/drawing/2010/main" xmlns:mc="http://schemas.openxmlformats.org/markup-compatibility/2006" xmlns="" id="{2E36643D-EEA2-42A8-BBCF-DC12D9FC8BA4}"/>
                   </a:ext>
                 </a:extLst>
               </p:cNvPr>
@@ -7087,7 +7091,7 @@
               <p:cNvPr id="50" name="Rectangle 49">
                 <a:extLst>
                   <a:ext uri="{FF2B5EF4-FFF2-40B4-BE49-F238E27FC236}">
-                    <a16:creationId xmlns="" xmlns:mc="http://schemas.openxmlformats.org/markup-compatibility/2006" xmlns:a14="http://schemas.microsoft.com/office/drawing/2010/main" xmlns:a16="http://schemas.microsoft.com/office/drawing/2014/main" id="{6D2C8BE0-B0D2-4978-A1B5-FFF5137A4C82}"/>
+                    <a16:creationId xmlns:a16="http://schemas.microsoft.com/office/drawing/2014/main" xmlns:a14="http://schemas.microsoft.com/office/drawing/2010/main" xmlns:mc="http://schemas.openxmlformats.org/markup-compatibility/2006" xmlns="" id="{6D2C8BE0-B0D2-4978-A1B5-FFF5137A4C82}"/>
                   </a:ext>
                 </a:extLst>
               </p:cNvPr>
@@ -7143,7 +7147,7 @@
               <p:cNvPr id="53" name="Rectangle 52">
                 <a:extLst>
                   <a:ext uri="{FF2B5EF4-FFF2-40B4-BE49-F238E27FC236}">
-                    <a16:creationId xmlns="" xmlns:mc="http://schemas.openxmlformats.org/markup-compatibility/2006" xmlns:a14="http://schemas.microsoft.com/office/drawing/2010/main" xmlns:a16="http://schemas.microsoft.com/office/drawing/2014/main" id="{2E36643D-EEA2-42A8-BBCF-DC12D9FC8BA4}"/>
+                    <a16:creationId xmlns:a16="http://schemas.microsoft.com/office/drawing/2014/main" xmlns:a14="http://schemas.microsoft.com/office/drawing/2010/main" xmlns:mc="http://schemas.openxmlformats.org/markup-compatibility/2006" xmlns="" id="{2E36643D-EEA2-42A8-BBCF-DC12D9FC8BA4}"/>
                   </a:ext>
                 </a:extLst>
               </p:cNvPr>
@@ -7199,7 +7203,7 @@
               <p:cNvPr id="54" name="Rectangle 53">
                 <a:extLst>
                   <a:ext uri="{FF2B5EF4-FFF2-40B4-BE49-F238E27FC236}">
-                    <a16:creationId xmlns="" xmlns:mc="http://schemas.openxmlformats.org/markup-compatibility/2006" xmlns:a14="http://schemas.microsoft.com/office/drawing/2010/main" xmlns:a16="http://schemas.microsoft.com/office/drawing/2014/main" id="{2E36643D-EEA2-42A8-BBCF-DC12D9FC8BA4}"/>
+                    <a16:creationId xmlns:a16="http://schemas.microsoft.com/office/drawing/2014/main" xmlns:a14="http://schemas.microsoft.com/office/drawing/2010/main" xmlns:mc="http://schemas.openxmlformats.org/markup-compatibility/2006" xmlns="" id="{2E36643D-EEA2-42A8-BBCF-DC12D9FC8BA4}"/>
                   </a:ext>
                 </a:extLst>
               </p:cNvPr>
@@ -7312,72 +7316,6 @@
               <a:grpFill/>
             </p:spPr>
           </p:pic>
-          <p:sp>
-            <p:nvSpPr>
-              <p:cNvPr id="57" name="Rectangle 56">
-                <a:extLst>
-                  <a:ext uri="{FF2B5EF4-FFF2-40B4-BE49-F238E27FC236}">
-                    <a16:creationId xmlns="" xmlns:a16="http://schemas.microsoft.com/office/drawing/2014/main" xmlns:a14="http://schemas.microsoft.com/office/drawing/2010/main" xmlns:mc="http://schemas.openxmlformats.org/markup-compatibility/2006" id="{6D2C8BE0-B0D2-4978-A1B5-FFF5137A4C82}"/>
-                  </a:ext>
-                </a:extLst>
-              </p:cNvPr>
-              <p:cNvSpPr/>
-              <p:nvPr/>
-            </p:nvSpPr>
-            <p:spPr>
-              <a:xfrm>
-                <a:off x="-50692" y="2625727"/>
-                <a:ext cx="1214068" cy="1852972"/>
-              </a:xfrm>
-              <a:prstGeom prst="rect">
-                <a:avLst/>
-              </a:prstGeom>
-              <a:grpFill/>
-              <a:ln>
-                <a:noFill/>
-              </a:ln>
-            </p:spPr>
-            <p:style>
-              <a:lnRef idx="2">
-                <a:schemeClr val="accent1">
-                  <a:shade val="50000"/>
-                </a:schemeClr>
-              </a:lnRef>
-              <a:fillRef idx="1">
-                <a:schemeClr val="accent1"/>
-              </a:fillRef>
-              <a:effectRef idx="0">
-                <a:schemeClr val="accent1"/>
-              </a:effectRef>
-              <a:fontRef idx="minor">
-                <a:schemeClr val="lt1"/>
-              </a:fontRef>
-            </p:style>
-            <p:txBody>
-              <a:bodyPr rtlCol="0" anchor="ctr"/>
-              <a:lstStyle/>
-              <a:p>
-                <a:pPr algn="ctr"/>
-                <a:r>
-                  <a:rPr lang="en-US" sz="1400" dirty="0" smtClean="0">
-                    <a:solidFill>
-                      <a:schemeClr val="tx1"/>
-                    </a:solidFill>
-                    <a:latin typeface="Cambria Math" panose="02040503050406030204" pitchFamily="18" charset="0"/>
-                    <a:ea typeface="Cambria Math" panose="02040503050406030204" pitchFamily="18" charset="0"/>
-                  </a:rPr>
-                  <a:t>Miss Classification Rate</a:t>
-                </a:r>
-                <a:endParaRPr lang="en-US" sz="1400" dirty="0">
-                  <a:solidFill>
-                    <a:schemeClr val="tx1"/>
-                  </a:solidFill>
-                  <a:latin typeface="Cambria Math" panose="02040503050406030204" pitchFamily="18" charset="0"/>
-                  <a:ea typeface="Cambria Math" panose="02040503050406030204" pitchFamily="18" charset="0"/>
-                </a:endParaRPr>
-              </a:p>
-            </p:txBody>
-          </p:sp>
           <p:grpSp>
             <p:nvGrpSpPr>
               <p:cNvPr id="58" name="Group 57"/>
@@ -7386,15 +7324,15 @@
             </p:nvGrpSpPr>
             <p:grpSpPr>
               <a:xfrm>
-                <a:off x="7361245" y="2589738"/>
-                <a:ext cx="4710795" cy="1636437"/>
-                <a:chOff x="8212725" y="-1727238"/>
-                <a:chExt cx="4710795" cy="1636437"/>
+                <a:off x="7361245" y="2572487"/>
+                <a:ext cx="4719421" cy="1268708"/>
+                <a:chOff x="8212725" y="-1744489"/>
+                <a:chExt cx="4719421" cy="1268708"/>
               </a:xfrm>
               <a:grpFill/>
             </p:grpSpPr>
-            <mc:AlternateContent xmlns:mc="http://schemas.openxmlformats.org/markup-compatibility/2006" xmlns:a14="http://schemas.microsoft.com/office/drawing/2010/main">
-              <mc:Choice Requires="a14">
+            <mc:AlternateContent xmlns:mc="http://schemas.openxmlformats.org/markup-compatibility/2006">
+              <mc:Choice xmlns:a14="http://schemas.microsoft.com/office/drawing/2010/main" Requires="a14">
                 <p:sp>
                   <p:nvSpPr>
                     <p:cNvPr id="59" name="Rectangle 58"/>
@@ -7403,8 +7341,8 @@
                   </p:nvSpPr>
                   <p:spPr>
                     <a:xfrm>
-                      <a:off x="8683098" y="-1727238"/>
-                      <a:ext cx="4240422" cy="1636437"/>
+                      <a:off x="8691724" y="-1744489"/>
+                      <a:ext cx="4240422" cy="1268708"/>
                     </a:xfrm>
                     <a:prstGeom prst="rect">
                       <a:avLst/>
@@ -7802,28 +7740,10 @@
                         <a:ea typeface="Cambria Math" panose="02040503050406030204" pitchFamily="18" charset="0"/>
                       </a:endParaRPr>
                     </a:p>
-                    <a:p>
-                      <a:endParaRPr lang="en-US" sz="1400" dirty="0" smtClean="0">
-                        <a:solidFill>
-                          <a:schemeClr val="tx1"/>
-                        </a:solidFill>
-                        <a:latin typeface="Cambria Math" panose="02040503050406030204" pitchFamily="18" charset="0"/>
-                        <a:ea typeface="Cambria Math" panose="02040503050406030204" pitchFamily="18" charset="0"/>
-                      </a:endParaRPr>
-                    </a:p>
-                    <a:p>
-                      <a:endParaRPr lang="en-US" sz="1400" dirty="0">
-                        <a:solidFill>
-                          <a:schemeClr val="tx1"/>
-                        </a:solidFill>
-                        <a:latin typeface="Cambria Math" panose="02040503050406030204" pitchFamily="18" charset="0"/>
-                        <a:ea typeface="Cambria Math" panose="02040503050406030204" pitchFamily="18" charset="0"/>
-                      </a:endParaRPr>
-                    </a:p>
                   </p:txBody>
                 </p:sp>
               </mc:Choice>
-              <mc:Fallback xmlns="">
+              <mc:Fallback>
                 <p:sp>
                   <p:nvSpPr>
                     <p:cNvPr id="59" name="Rectangle 58"/>
@@ -7834,8 +7754,8 @@
                   </p:nvSpPr>
                   <p:spPr>
                     <a:xfrm>
-                      <a:off x="8683098" y="-1727238"/>
-                      <a:ext cx="4240422" cy="1636437"/>
+                      <a:off x="8691724" y="-1744489"/>
+                      <a:ext cx="4240422" cy="1268708"/>
                     </a:xfrm>
                     <a:prstGeom prst="rect">
                       <a:avLst/>
@@ -7843,7 +7763,7 @@
                     <a:blipFill rotWithShape="0">
                       <a:blip r:embed="rId4"/>
                       <a:stretch>
-                        <a:fillRect l="-287" t="-5556"/>
+                        <a:fillRect l="-287" t="-5238" b="-8095"/>
                       </a:stretch>
                     </a:blipFill>
                     <a:ln>
@@ -8157,7 +8077,7 @@
               <p:cNvPr id="66" name="Rectangle 65">
                 <a:extLst>
                   <a:ext uri="{FF2B5EF4-FFF2-40B4-BE49-F238E27FC236}">
-                    <a16:creationId xmlns="" xmlns:a16="http://schemas.microsoft.com/office/drawing/2014/main" xmlns:a14="http://schemas.microsoft.com/office/drawing/2010/main" xmlns:mc="http://schemas.openxmlformats.org/markup-compatibility/2006" id="{6D2C8BE0-B0D2-4978-A1B5-FFF5137A4C82}"/>
+                    <a16:creationId xmlns:mc="http://schemas.openxmlformats.org/markup-compatibility/2006" xmlns:a14="http://schemas.microsoft.com/office/drawing/2010/main" xmlns:a16="http://schemas.microsoft.com/office/drawing/2014/main" xmlns="" id="{6D2C8BE0-B0D2-4978-A1B5-FFF5137A4C82}"/>
                   </a:ext>
                 </a:extLst>
               </p:cNvPr>
@@ -8213,7 +8133,7 @@
               <p:cNvPr id="67" name="Rectangle 66">
                 <a:extLst>
                   <a:ext uri="{FF2B5EF4-FFF2-40B4-BE49-F238E27FC236}">
-                    <a16:creationId xmlns="" xmlns:a16="http://schemas.microsoft.com/office/drawing/2014/main" xmlns:a14="http://schemas.microsoft.com/office/drawing/2010/main" xmlns:mc="http://schemas.openxmlformats.org/markup-compatibility/2006" id="{6D2C8BE0-B0D2-4978-A1B5-FFF5137A4C82}"/>
+                    <a16:creationId xmlns:mc="http://schemas.openxmlformats.org/markup-compatibility/2006" xmlns:a14="http://schemas.microsoft.com/office/drawing/2010/main" xmlns:a16="http://schemas.microsoft.com/office/drawing/2014/main" xmlns="" id="{6D2C8BE0-B0D2-4978-A1B5-FFF5137A4C82}"/>
                   </a:ext>
                 </a:extLst>
               </p:cNvPr>
@@ -8269,7 +8189,7 @@
               <p:cNvPr id="52" name="Rectangle 51">
                 <a:extLst>
                   <a:ext uri="{FF2B5EF4-FFF2-40B4-BE49-F238E27FC236}">
-                    <a16:creationId xmlns="" xmlns:mc="http://schemas.openxmlformats.org/markup-compatibility/2006" xmlns:a14="http://schemas.microsoft.com/office/drawing/2010/main" xmlns:a16="http://schemas.microsoft.com/office/drawing/2014/main" id="{6D2C8BE0-B0D2-4978-A1B5-FFF5137A4C82}"/>
+                    <a16:creationId xmlns:a16="http://schemas.microsoft.com/office/drawing/2014/main" xmlns:a14="http://schemas.microsoft.com/office/drawing/2010/main" xmlns:mc="http://schemas.openxmlformats.org/markup-compatibility/2006" xmlns="" id="{6D2C8BE0-B0D2-4978-A1B5-FFF5137A4C82}"/>
                   </a:ext>
                 </a:extLst>
               </p:cNvPr>
@@ -8328,7 +8248,7 @@
               <p:cNvPr id="51" name="Rectangle 50">
                 <a:extLst>
                   <a:ext uri="{FF2B5EF4-FFF2-40B4-BE49-F238E27FC236}">
-                    <a16:creationId xmlns="" xmlns:mc="http://schemas.openxmlformats.org/markup-compatibility/2006" xmlns:a14="http://schemas.microsoft.com/office/drawing/2010/main" xmlns:a16="http://schemas.microsoft.com/office/drawing/2014/main" id="{6D2C8BE0-B0D2-4978-A1B5-FFF5137A4C82}"/>
+                    <a16:creationId xmlns:a16="http://schemas.microsoft.com/office/drawing/2014/main" xmlns:a14="http://schemas.microsoft.com/office/drawing/2010/main" xmlns:mc="http://schemas.openxmlformats.org/markup-compatibility/2006" xmlns="" id="{6D2C8BE0-B0D2-4978-A1B5-FFF5137A4C82}"/>
                   </a:ext>
                 </a:extLst>
               </p:cNvPr>
@@ -8392,8 +8312,342 @@
               </a:p>
             </p:txBody>
           </p:sp>
+          <p:sp>
+            <p:nvSpPr>
+              <p:cNvPr id="57" name="Rectangle 56">
+                <a:extLst>
+                  <a:ext uri="{FF2B5EF4-FFF2-40B4-BE49-F238E27FC236}">
+                    <a16:creationId xmlns:mc="http://schemas.openxmlformats.org/markup-compatibility/2006" xmlns:a14="http://schemas.microsoft.com/office/drawing/2010/main" xmlns:a16="http://schemas.microsoft.com/office/drawing/2014/main" xmlns="" id="{6D2C8BE0-B0D2-4978-A1B5-FFF5137A4C82}"/>
+                  </a:ext>
+                </a:extLst>
+              </p:cNvPr>
+              <p:cNvSpPr/>
+              <p:nvPr/>
+            </p:nvSpPr>
+            <p:spPr>
+              <a:xfrm>
+                <a:off x="-655215" y="2531698"/>
+                <a:ext cx="1868500" cy="1906212"/>
+              </a:xfrm>
+              <a:prstGeom prst="rect">
+                <a:avLst/>
+              </a:prstGeom>
+              <a:grpFill/>
+              <a:ln>
+                <a:noFill/>
+              </a:ln>
+            </p:spPr>
+            <p:style>
+              <a:lnRef idx="2">
+                <a:schemeClr val="accent1">
+                  <a:shade val="50000"/>
+                </a:schemeClr>
+              </a:lnRef>
+              <a:fillRef idx="1">
+                <a:schemeClr val="accent1"/>
+              </a:fillRef>
+              <a:effectRef idx="0">
+                <a:schemeClr val="accent1"/>
+              </a:effectRef>
+              <a:fontRef idx="minor">
+                <a:schemeClr val="lt1"/>
+              </a:fontRef>
+            </p:style>
+            <p:txBody>
+              <a:bodyPr rtlCol="0" anchor="ctr"/>
+              <a:lstStyle/>
+              <a:p>
+                <a:pPr algn="ctr"/>
+                <a:r>
+                  <a:rPr lang="en-US" sz="2000" dirty="0" smtClean="0">
+                    <a:solidFill>
+                      <a:schemeClr val="tx1"/>
+                    </a:solidFill>
+                    <a:latin typeface="Cambria Math" panose="02040503050406030204" pitchFamily="18" charset="0"/>
+                    <a:ea typeface="Cambria Math" panose="02040503050406030204" pitchFamily="18" charset="0"/>
+                  </a:rPr>
+                  <a:t>Miss Classification Rate</a:t>
+                </a:r>
+                <a:endParaRPr lang="en-US" sz="2000" dirty="0">
+                  <a:solidFill>
+                    <a:schemeClr val="tx1"/>
+                  </a:solidFill>
+                  <a:latin typeface="Cambria Math" panose="02040503050406030204" pitchFamily="18" charset="0"/>
+                  <a:ea typeface="Cambria Math" panose="02040503050406030204" pitchFamily="18" charset="0"/>
+                </a:endParaRPr>
+              </a:p>
+            </p:txBody>
+          </p:sp>
         </p:grpSp>
       </p:grpSp>
+      <p:sp>
+        <p:nvSpPr>
+          <p:cNvPr id="28" name="Rectangle 27">
+            <a:extLst>
+              <a:ext uri="{FF2B5EF4-FFF2-40B4-BE49-F238E27FC236}">
+                <a16:creationId xmlns:a16="http://schemas.microsoft.com/office/drawing/2014/main" xmlns:a14="http://schemas.microsoft.com/office/drawing/2010/main" xmlns:mc="http://schemas.openxmlformats.org/markup-compatibility/2006" xmlns="" id="{6D2C8BE0-B0D2-4978-A1B5-FFF5137A4C82}"/>
+              </a:ext>
+            </a:extLst>
+          </p:cNvPr>
+          <p:cNvSpPr/>
+          <p:nvPr/>
+        </p:nvSpPr>
+        <p:spPr>
+          <a:xfrm>
+            <a:off x="961473" y="1230497"/>
+            <a:ext cx="3835883" cy="521426"/>
+          </a:xfrm>
+          <a:prstGeom prst="rect">
+            <a:avLst/>
+          </a:prstGeom>
+          <a:solidFill>
+            <a:schemeClr val="bg1"/>
+          </a:solidFill>
+          <a:ln>
+            <a:noFill/>
+          </a:ln>
+        </p:spPr>
+        <p:style>
+          <a:lnRef idx="2">
+            <a:schemeClr val="accent1">
+              <a:shade val="50000"/>
+            </a:schemeClr>
+          </a:lnRef>
+          <a:fillRef idx="1">
+            <a:schemeClr val="accent1"/>
+          </a:fillRef>
+          <a:effectRef idx="0">
+            <a:schemeClr val="accent1"/>
+          </a:effectRef>
+          <a:fontRef idx="minor">
+            <a:schemeClr val="lt1"/>
+          </a:fontRef>
+        </p:style>
+        <p:txBody>
+          <a:bodyPr rtlCol="0" anchor="ctr"/>
+          <a:lstStyle/>
+          <a:p>
+            <a:pPr algn="ctr"/>
+            <a:r>
+              <a:rPr lang="en-US" sz="2400" dirty="0" smtClean="0">
+                <a:solidFill>
+                  <a:schemeClr val="tx1"/>
+                </a:solidFill>
+                <a:latin typeface="Cambria Math" panose="02040503050406030204" pitchFamily="18" charset="0"/>
+                <a:ea typeface="Cambria Math" panose="02040503050406030204" pitchFamily="18" charset="0"/>
+              </a:rPr>
+              <a:t>Without </a:t>
+            </a:r>
+            <a:r>
+              <a:rPr lang="en-US" sz="2400" dirty="0">
+                <a:solidFill>
+                  <a:schemeClr val="tx1"/>
+                </a:solidFill>
+                <a:latin typeface="Cambria Math" panose="02040503050406030204" pitchFamily="18" charset="0"/>
+                <a:ea typeface="Cambria Math" panose="02040503050406030204" pitchFamily="18" charset="0"/>
+              </a:rPr>
+              <a:t>Regularization </a:t>
+            </a:r>
+          </a:p>
+        </p:txBody>
+      </p:sp>
+      <p:sp>
+        <p:nvSpPr>
+          <p:cNvPr id="29" name="Rectangle 28">
+            <a:extLst>
+              <a:ext uri="{FF2B5EF4-FFF2-40B4-BE49-F238E27FC236}">
+                <a16:creationId xmlns:a16="http://schemas.microsoft.com/office/drawing/2014/main" xmlns:a14="http://schemas.microsoft.com/office/drawing/2010/main" xmlns:mc="http://schemas.openxmlformats.org/markup-compatibility/2006" xmlns="" id="{6D2C8BE0-B0D2-4978-A1B5-FFF5137A4C82}"/>
+              </a:ext>
+            </a:extLst>
+          </p:cNvPr>
+          <p:cNvSpPr/>
+          <p:nvPr/>
+        </p:nvSpPr>
+        <p:spPr>
+          <a:xfrm>
+            <a:off x="6764671" y="1230497"/>
+            <a:ext cx="2827832" cy="521426"/>
+          </a:xfrm>
+          <a:prstGeom prst="rect">
+            <a:avLst/>
+          </a:prstGeom>
+          <a:solidFill>
+            <a:schemeClr val="bg1"/>
+          </a:solidFill>
+          <a:ln>
+            <a:noFill/>
+          </a:ln>
+        </p:spPr>
+        <p:style>
+          <a:lnRef idx="2">
+            <a:schemeClr val="accent1">
+              <a:shade val="50000"/>
+            </a:schemeClr>
+          </a:lnRef>
+          <a:fillRef idx="1">
+            <a:schemeClr val="accent1"/>
+          </a:fillRef>
+          <a:effectRef idx="0">
+            <a:schemeClr val="accent1"/>
+          </a:effectRef>
+          <a:fontRef idx="minor">
+            <a:schemeClr val="lt1"/>
+          </a:fontRef>
+        </p:style>
+        <p:txBody>
+          <a:bodyPr rtlCol="0" anchor="ctr"/>
+          <a:lstStyle/>
+          <a:p>
+            <a:pPr algn="ctr"/>
+            <a:r>
+              <a:rPr lang="en-US" sz="2400" dirty="0">
+                <a:solidFill>
+                  <a:schemeClr val="tx1"/>
+                </a:solidFill>
+                <a:latin typeface="Cambria Math" panose="02040503050406030204" pitchFamily="18" charset="0"/>
+                <a:ea typeface="Cambria Math" panose="02040503050406030204" pitchFamily="18" charset="0"/>
+              </a:rPr>
+              <a:t>With Regularization </a:t>
+            </a:r>
+          </a:p>
+        </p:txBody>
+      </p:sp>
+      <p:sp>
+        <p:nvSpPr>
+          <p:cNvPr id="30" name="Rectangle 29">
+            <a:extLst>
+              <a:ext uri="{FF2B5EF4-FFF2-40B4-BE49-F238E27FC236}">
+                <a16:creationId xmlns:a16="http://schemas.microsoft.com/office/drawing/2014/main" xmlns:a14="http://schemas.microsoft.com/office/drawing/2010/main" xmlns:mc="http://schemas.openxmlformats.org/markup-compatibility/2006" xmlns="" id="{2E36643D-EEA2-42A8-BBCF-DC12D9FC8BA4}"/>
+              </a:ext>
+            </a:extLst>
+          </p:cNvPr>
+          <p:cNvSpPr/>
+          <p:nvPr/>
+        </p:nvSpPr>
+        <p:spPr>
+          <a:xfrm>
+            <a:off x="1669440" y="5548316"/>
+            <a:ext cx="2024961" cy="287389"/>
+          </a:xfrm>
+          <a:prstGeom prst="rect">
+            <a:avLst/>
+          </a:prstGeom>
+          <a:solidFill>
+            <a:schemeClr val="bg1"/>
+          </a:solidFill>
+          <a:ln>
+            <a:noFill/>
+          </a:ln>
+        </p:spPr>
+        <p:style>
+          <a:lnRef idx="2">
+            <a:schemeClr val="accent1">
+              <a:shade val="50000"/>
+            </a:schemeClr>
+          </a:lnRef>
+          <a:fillRef idx="1">
+            <a:schemeClr val="accent1"/>
+          </a:fillRef>
+          <a:effectRef idx="0">
+            <a:schemeClr val="accent1"/>
+          </a:effectRef>
+          <a:fontRef idx="minor">
+            <a:schemeClr val="lt1"/>
+          </a:fontRef>
+        </p:style>
+        <p:txBody>
+          <a:bodyPr rtlCol="0" anchor="ctr"/>
+          <a:lstStyle/>
+          <a:p>
+            <a:pPr algn="ctr"/>
+            <a:r>
+              <a:rPr lang="en-GB" sz="2000" dirty="0">
+                <a:solidFill>
+                  <a:schemeClr val="tx1"/>
+                </a:solidFill>
+                <a:latin typeface="Cambria Math" panose="02040503050406030204" pitchFamily="18" charset="0"/>
+                <a:ea typeface="Cambria Math" panose="02040503050406030204" pitchFamily="18" charset="0"/>
+              </a:rPr>
+              <a:t>EM Iterations</a:t>
+            </a:r>
+            <a:endParaRPr lang="en-US" sz="2000" dirty="0">
+              <a:solidFill>
+                <a:schemeClr val="tx1"/>
+              </a:solidFill>
+              <a:latin typeface="Cambria Math" panose="02040503050406030204" pitchFamily="18" charset="0"/>
+              <a:ea typeface="Cambria Math" panose="02040503050406030204" pitchFamily="18" charset="0"/>
+            </a:endParaRPr>
+          </a:p>
+        </p:txBody>
+      </p:sp>
+      <p:sp>
+        <p:nvSpPr>
+          <p:cNvPr id="31" name="Rectangle 30">
+            <a:extLst>
+              <a:ext uri="{FF2B5EF4-FFF2-40B4-BE49-F238E27FC236}">
+                <a16:creationId xmlns:a16="http://schemas.microsoft.com/office/drawing/2014/main" xmlns:a14="http://schemas.microsoft.com/office/drawing/2010/main" xmlns:mc="http://schemas.openxmlformats.org/markup-compatibility/2006" xmlns="" id="{2E36643D-EEA2-42A8-BBCF-DC12D9FC8BA4}"/>
+              </a:ext>
+            </a:extLst>
+          </p:cNvPr>
+          <p:cNvSpPr/>
+          <p:nvPr/>
+        </p:nvSpPr>
+        <p:spPr>
+          <a:xfrm>
+            <a:off x="6920992" y="5548316"/>
+            <a:ext cx="2024961" cy="287389"/>
+          </a:xfrm>
+          <a:prstGeom prst="rect">
+            <a:avLst/>
+          </a:prstGeom>
+          <a:solidFill>
+            <a:schemeClr val="bg1"/>
+          </a:solidFill>
+          <a:ln>
+            <a:noFill/>
+          </a:ln>
+        </p:spPr>
+        <p:style>
+          <a:lnRef idx="2">
+            <a:schemeClr val="accent1">
+              <a:shade val="50000"/>
+            </a:schemeClr>
+          </a:lnRef>
+          <a:fillRef idx="1">
+            <a:schemeClr val="accent1"/>
+          </a:fillRef>
+          <a:effectRef idx="0">
+            <a:schemeClr val="accent1"/>
+          </a:effectRef>
+          <a:fontRef idx="minor">
+            <a:schemeClr val="lt1"/>
+          </a:fontRef>
+        </p:style>
+        <p:txBody>
+          <a:bodyPr rtlCol="0" anchor="ctr"/>
+          <a:lstStyle/>
+          <a:p>
+            <a:pPr algn="ctr"/>
+            <a:r>
+              <a:rPr lang="en-GB" sz="2000" dirty="0" smtClean="0">
+                <a:solidFill>
+                  <a:schemeClr val="tx1"/>
+                </a:solidFill>
+                <a:latin typeface="Cambria Math" panose="02040503050406030204" pitchFamily="18" charset="0"/>
+                <a:ea typeface="Cambria Math" panose="02040503050406030204" pitchFamily="18" charset="0"/>
+              </a:rPr>
+              <a:t>EM Iterations</a:t>
+            </a:r>
+            <a:endParaRPr lang="en-US" sz="2000" dirty="0">
+              <a:solidFill>
+                <a:schemeClr val="tx1"/>
+              </a:solidFill>
+              <a:latin typeface="Cambria Math" panose="02040503050406030204" pitchFamily="18" charset="0"/>
+              <a:ea typeface="Cambria Math" panose="02040503050406030204" pitchFamily="18" charset="0"/>
+            </a:endParaRPr>
+          </a:p>
+        </p:txBody>
+      </p:sp>
     </p:spTree>
     <p:extLst>
       <p:ext uri="{BB962C8B-B14F-4D97-AF65-F5344CB8AC3E}">
@@ -8658,21 +8912,21 @@
                           </m:dPr>
                           <m:e>
                             <m:r>
-                              <a:rPr lang="en-US" sz="1600" b="0" i="1" dirty="0" smtClean="0">
+                              <a:rPr lang="en-US" sz="1600" i="1" dirty="0">
                                 <a:latin typeface="Cambria Math" panose="02040503050406030204" pitchFamily="18" charset="0"/>
                                 <a:ea typeface="Cambria Math" panose="02040503050406030204" pitchFamily="18" charset="0"/>
                               </a:rPr>
                               <m:t>𝑝</m:t>
                             </m:r>
                             <m:r>
-                              <a:rPr lang="en-US" sz="1600" b="0" i="1" dirty="0" smtClean="0">
+                              <a:rPr lang="en-US" sz="1600" i="1" dirty="0">
                                 <a:latin typeface="Cambria Math" panose="02040503050406030204" pitchFamily="18" charset="0"/>
                                 <a:ea typeface="Cambria Math" panose="02040503050406030204" pitchFamily="18" charset="0"/>
                               </a:rPr>
-                              <m:t>−</m:t>
+                              <m:t>-</m:t>
                             </m:r>
                             <m:r>
-                              <a:rPr lang="en-US" sz="1600" b="0" i="1" dirty="0" smtClean="0">
+                              <a:rPr lang="en-US" sz="1600" i="1" dirty="0">
                                 <a:latin typeface="Cambria Math" panose="02040503050406030204" pitchFamily="18" charset="0"/>
                                 <a:ea typeface="Cambria Math" panose="02040503050406030204" pitchFamily="18" charset="0"/>
                               </a:rPr>
@@ -8851,7 +9105,7 @@
                                 <a:latin typeface="Cambria Math" panose="02040503050406030204" pitchFamily="18" charset="0"/>
                                 <a:ea typeface="Cambria Math" panose="02040503050406030204" pitchFamily="18" charset="0"/>
                               </a:rPr>
-                              <m:t>−</m:t>
+                              <m:t>-</m:t>
                             </m:r>
                             <m:r>
                               <a:rPr lang="en-US" sz="1600" i="1" dirty="0">
@@ -8927,8 +9181,8 @@
             </p:sp>
           </mc:Fallback>
         </mc:AlternateContent>
-        <mc:AlternateContent xmlns:mc="http://schemas.openxmlformats.org/markup-compatibility/2006">
-          <mc:Choice xmlns:a14="http://schemas.microsoft.com/office/drawing/2010/main" Requires="a14">
+        <mc:AlternateContent xmlns:mc="http://schemas.openxmlformats.org/markup-compatibility/2006" xmlns:a14="http://schemas.microsoft.com/office/drawing/2010/main">
+          <mc:Choice Requires="a14">
             <p:sp>
               <p:nvSpPr>
                 <p:cNvPr id="12" name="Rectangle 11"/>
@@ -9039,7 +9293,7 @@
               </p:txBody>
             </p:sp>
           </mc:Choice>
-          <mc:Fallback>
+          <mc:Fallback xmlns="">
             <p:sp>
               <p:nvSpPr>
                 <p:cNvPr id="12" name="Rectangle 11"/>
@@ -9321,7 +9575,14 @@
                   <a:latin typeface="Cambria Math" panose="02040503050406030204" pitchFamily="18" charset="0"/>
                   <a:ea typeface="Cambria Math" panose="02040503050406030204" pitchFamily="18" charset="0"/>
                 </a:rPr>
-                <a:t>Cells (E004) </a:t>
+                <a:t>Cells (</a:t>
+              </a:r>
+              <a:r>
+                <a:rPr lang="en-US" sz="1600" dirty="0" smtClean="0">
+                  <a:latin typeface="Cambria Math" panose="02040503050406030204" pitchFamily="18" charset="0"/>
+                  <a:ea typeface="Cambria Math" panose="02040503050406030204" pitchFamily="18" charset="0"/>
+                </a:rPr>
+                <a:t>E004) </a:t>
               </a:r>
               <a:endParaRPr lang="en-US" sz="1600" dirty="0">
                 <a:latin typeface="Cambria Math" panose="02040503050406030204" pitchFamily="18" charset="0"/>
@@ -9469,30 +9730,605 @@
           </a:p>
         </p:txBody>
       </p:sp>
-      <p:pic>
-        <p:nvPicPr>
-          <p:cNvPr id="94" name="Picture 93"/>
-          <p:cNvPicPr>
-            <a:picLocks noChangeAspect="1"/>
-          </p:cNvPicPr>
+      <p:grpSp>
+        <p:nvGrpSpPr>
+          <p:cNvPr id="2" name="Group 1"/>
+          <p:cNvGrpSpPr/>
           <p:nvPr/>
-        </p:nvPicPr>
-        <p:blipFill>
-          <a:blip r:embed="rId2"/>
-          <a:stretch>
-            <a:fillRect/>
-          </a:stretch>
-        </p:blipFill>
-        <p:spPr>
+        </p:nvGrpSpPr>
+        <p:grpSpPr>
           <a:xfrm>
             <a:off x="0" y="170234"/>
-            <a:ext cx="12192000" cy="6517532"/>
+            <a:ext cx="12381781" cy="6517532"/>
+            <a:chOff x="0" y="170234"/>
+            <a:chExt cx="12381781" cy="6517532"/>
           </a:xfrm>
-          <a:prstGeom prst="rect">
-            <a:avLst/>
-          </a:prstGeom>
-        </p:spPr>
-      </p:pic>
+        </p:grpSpPr>
+        <p:pic>
+          <p:nvPicPr>
+            <p:cNvPr id="94" name="Picture 93"/>
+            <p:cNvPicPr>
+              <a:picLocks noChangeAspect="1"/>
+            </p:cNvPicPr>
+            <p:nvPr/>
+          </p:nvPicPr>
+          <p:blipFill>
+            <a:blip r:embed="rId2"/>
+            <a:stretch>
+              <a:fillRect/>
+            </a:stretch>
+          </p:blipFill>
+          <p:spPr>
+            <a:xfrm>
+              <a:off x="189781" y="170234"/>
+              <a:ext cx="12192000" cy="6517532"/>
+            </a:xfrm>
+            <a:prstGeom prst="rect">
+              <a:avLst/>
+            </a:prstGeom>
+          </p:spPr>
+        </p:pic>
+        <mc:AlternateContent xmlns:mc="http://schemas.openxmlformats.org/markup-compatibility/2006">
+          <mc:Choice xmlns:a14="http://schemas.microsoft.com/office/drawing/2010/main" Requires="a14">
+            <p:sp>
+              <p:nvSpPr>
+                <p:cNvPr id="17" name="Rectangle 16"/>
+                <p:cNvSpPr/>
+                <p:nvPr/>
+              </p:nvSpPr>
+              <p:spPr>
+                <a:xfrm>
+                  <a:off x="0" y="3067786"/>
+                  <a:ext cx="1910080" cy="584775"/>
+                </a:xfrm>
+                <a:prstGeom prst="rect">
+                  <a:avLst/>
+                </a:prstGeom>
+                <a:solidFill>
+                  <a:schemeClr val="bg1"/>
+                </a:solidFill>
+                <a:ln>
+                  <a:solidFill>
+                    <a:schemeClr val="bg1"/>
+                  </a:solidFill>
+                </a:ln>
+              </p:spPr>
+              <p:txBody>
+                <a:bodyPr wrap="square">
+                  <a:spAutoFit/>
+                </a:bodyPr>
+                <a:lstStyle/>
+                <a:p>
+                  <a:pPr algn="ctr"/>
+                  <a14:m>
+                    <m:oMathPara xmlns:m="http://schemas.openxmlformats.org/officeDocument/2006/math">
+                      <m:oMathParaPr>
+                        <m:jc m:val="centerGroup"/>
+                      </m:oMathParaPr>
+                      <m:oMath xmlns:m="http://schemas.openxmlformats.org/officeDocument/2006/math">
+                        <m:r>
+                          <a:rPr lang="en-US" sz="1600" b="0" i="1" dirty="0" smtClean="0">
+                            <a:latin typeface="Cambria Math" panose="02040503050406030204" pitchFamily="18" charset="0"/>
+                            <a:ea typeface="Cambria Math" panose="02040503050406030204" pitchFamily="18" charset="0"/>
+                          </a:rPr>
+                          <m:t>−</m:t>
+                        </m:r>
+                        <m:r>
+                          <a:rPr lang="en-US" sz="1600" b="0" i="1" dirty="0" smtClean="0">
+                            <a:latin typeface="Cambria Math" panose="02040503050406030204" pitchFamily="18" charset="0"/>
+                            <a:ea typeface="Cambria Math" panose="02040503050406030204" pitchFamily="18" charset="0"/>
+                          </a:rPr>
+                          <m:t>𝑙𝑜</m:t>
+                        </m:r>
+                        <m:sSub>
+                          <m:sSubPr>
+                            <m:ctrlPr>
+                              <a:rPr lang="en-US" sz="1600" b="0" i="1" dirty="0" smtClean="0">
+                                <a:latin typeface="Cambria Math" panose="02040503050406030204" pitchFamily="18" charset="0"/>
+                                <a:ea typeface="Cambria Math" panose="02040503050406030204" pitchFamily="18" charset="0"/>
+                              </a:rPr>
+                            </m:ctrlPr>
+                          </m:sSubPr>
+                          <m:e>
+                            <m:r>
+                              <a:rPr lang="en-US" sz="1600" i="1" dirty="0" smtClean="0">
+                                <a:latin typeface="Cambria Math" panose="02040503050406030204" pitchFamily="18" charset="0"/>
+                                <a:ea typeface="Cambria Math" panose="02040503050406030204" pitchFamily="18" charset="0"/>
+                              </a:rPr>
+                              <m:t>𝑔</m:t>
+                            </m:r>
+                          </m:e>
+                          <m:sub>
+                            <m:r>
+                              <a:rPr lang="en-US" sz="1600" b="0" i="1" dirty="0" smtClean="0">
+                                <a:latin typeface="Cambria Math" panose="02040503050406030204" pitchFamily="18" charset="0"/>
+                                <a:ea typeface="Cambria Math" panose="02040503050406030204" pitchFamily="18" charset="0"/>
+                              </a:rPr>
+                              <m:t>10</m:t>
+                            </m:r>
+                          </m:sub>
+                        </m:sSub>
+                        <m:d>
+                          <m:dPr>
+                            <m:ctrlPr>
+                              <a:rPr lang="en-US" sz="1600" b="0" i="1" dirty="0" smtClean="0">
+                                <a:latin typeface="Cambria Math" panose="02040503050406030204" pitchFamily="18" charset="0"/>
+                                <a:ea typeface="Cambria Math" panose="02040503050406030204" pitchFamily="18" charset="0"/>
+                              </a:rPr>
+                            </m:ctrlPr>
+                          </m:dPr>
+                          <m:e>
+                            <m:r>
+                              <a:rPr lang="en-US" sz="1600" i="1" dirty="0">
+                                <a:latin typeface="Cambria Math" panose="02040503050406030204" pitchFamily="18" charset="0"/>
+                                <a:ea typeface="Cambria Math" panose="02040503050406030204" pitchFamily="18" charset="0"/>
+                              </a:rPr>
+                              <m:t>𝑝</m:t>
+                            </m:r>
+                            <m:r>
+                              <a:rPr lang="en-US" sz="1600" i="1" dirty="0">
+                                <a:latin typeface="Cambria Math" panose="02040503050406030204" pitchFamily="18" charset="0"/>
+                                <a:ea typeface="Cambria Math" panose="02040503050406030204" pitchFamily="18" charset="0"/>
+                              </a:rPr>
+                              <m:t>-</m:t>
+                            </m:r>
+                            <m:r>
+                              <a:rPr lang="en-US" sz="1600" i="1" dirty="0">
+                                <a:latin typeface="Cambria Math" panose="02040503050406030204" pitchFamily="18" charset="0"/>
+                                <a:ea typeface="Cambria Math" panose="02040503050406030204" pitchFamily="18" charset="0"/>
+                              </a:rPr>
+                              <m:t>𝑣𝑎𝑙𝑢𝑒</m:t>
+                            </m:r>
+                          </m:e>
+                        </m:d>
+                      </m:oMath>
+                    </m:oMathPara>
+                  </a14:m>
+                  <a:endParaRPr lang="en-US" sz="1600" b="0" dirty="0" smtClean="0">
+                    <a:latin typeface="Cambria Math" panose="02040503050406030204" pitchFamily="18" charset="0"/>
+                    <a:ea typeface="Cambria Math" panose="02040503050406030204" pitchFamily="18" charset="0"/>
+                  </a:endParaRPr>
+                </a:p>
+                <a:p>
+                  <a:pPr algn="ctr"/>
+                  <a:r>
+                    <a:rPr lang="en-US" sz="1600" dirty="0" smtClean="0">
+                      <a:latin typeface="Cambria Math" panose="02040503050406030204" pitchFamily="18" charset="0"/>
+                      <a:ea typeface="Cambria Math" panose="02040503050406030204" pitchFamily="18" charset="0"/>
+                    </a:rPr>
+                    <a:t>DNase</a:t>
+                  </a:r>
+                  <a:endParaRPr lang="en-US" sz="1600" dirty="0">
+                    <a:latin typeface="Cambria Math" panose="02040503050406030204" pitchFamily="18" charset="0"/>
+                    <a:ea typeface="Cambria Math" panose="02040503050406030204" pitchFamily="18" charset="0"/>
+                  </a:endParaRPr>
+                </a:p>
+              </p:txBody>
+            </p:sp>
+          </mc:Choice>
+          <mc:Fallback>
+            <p:sp>
+              <p:nvSpPr>
+                <p:cNvPr id="17" name="Rectangle 16"/>
+                <p:cNvSpPr>
+                  <a:spLocks noRot="1" noChangeAspect="1" noMove="1" noResize="1" noEditPoints="1" noAdjustHandles="1" noChangeArrowheads="1" noChangeShapeType="1" noTextEdit="1"/>
+                </p:cNvSpPr>
+                <p:nvPr/>
+              </p:nvSpPr>
+              <p:spPr>
+                <a:xfrm>
+                  <a:off x="0" y="3067786"/>
+                  <a:ext cx="1910080" cy="584775"/>
+                </a:xfrm>
+                <a:prstGeom prst="rect">
+                  <a:avLst/>
+                </a:prstGeom>
+                <a:blipFill rotWithShape="0">
+                  <a:blip r:embed="rId3"/>
+                  <a:stretch>
+                    <a:fillRect b="-10204"/>
+                  </a:stretch>
+                </a:blipFill>
+                <a:ln>
+                  <a:solidFill>
+                    <a:schemeClr val="bg1"/>
+                  </a:solidFill>
+                </a:ln>
+              </p:spPr>
+              <p:txBody>
+                <a:bodyPr/>
+                <a:lstStyle/>
+                <a:p>
+                  <a:r>
+                    <a:rPr lang="en-US">
+                      <a:noFill/>
+                    </a:rPr>
+                    <a:t> </a:t>
+                  </a:r>
+                </a:p>
+              </p:txBody>
+            </p:sp>
+          </mc:Fallback>
+        </mc:AlternateContent>
+        <mc:AlternateContent xmlns:mc="http://schemas.openxmlformats.org/markup-compatibility/2006">
+          <mc:Choice xmlns:a14="http://schemas.microsoft.com/office/drawing/2010/main" Requires="a14">
+            <p:sp>
+              <p:nvSpPr>
+                <p:cNvPr id="18" name="Rectangle 17"/>
+                <p:cNvSpPr/>
+                <p:nvPr/>
+              </p:nvSpPr>
+              <p:spPr>
+                <a:xfrm>
+                  <a:off x="0" y="1328163"/>
+                  <a:ext cx="1910080" cy="584775"/>
+                </a:xfrm>
+                <a:prstGeom prst="rect">
+                  <a:avLst/>
+                </a:prstGeom>
+                <a:solidFill>
+                  <a:schemeClr val="bg1"/>
+                </a:solidFill>
+                <a:ln>
+                  <a:solidFill>
+                    <a:schemeClr val="bg1"/>
+                  </a:solidFill>
+                </a:ln>
+              </p:spPr>
+              <p:txBody>
+                <a:bodyPr wrap="square">
+                  <a:spAutoFit/>
+                </a:bodyPr>
+                <a:lstStyle/>
+                <a:p>
+                  <a:pPr algn="ctr"/>
+                  <a14:m>
+                    <m:oMathPara xmlns:m="http://schemas.openxmlformats.org/officeDocument/2006/math">
+                      <m:oMathParaPr>
+                        <m:jc m:val="centerGroup"/>
+                      </m:oMathParaPr>
+                      <m:oMath xmlns:m="http://schemas.openxmlformats.org/officeDocument/2006/math">
+                        <m:r>
+                          <a:rPr lang="en-US" sz="1600" b="0" i="1" dirty="0" smtClean="0">
+                            <a:latin typeface="Cambria Math" panose="02040503050406030204" pitchFamily="18" charset="0"/>
+                            <a:ea typeface="Cambria Math" panose="02040503050406030204" pitchFamily="18" charset="0"/>
+                          </a:rPr>
+                          <m:t>−</m:t>
+                        </m:r>
+                        <m:r>
+                          <a:rPr lang="en-US" sz="1600" b="0" i="1" dirty="0" smtClean="0">
+                            <a:latin typeface="Cambria Math" panose="02040503050406030204" pitchFamily="18" charset="0"/>
+                            <a:ea typeface="Cambria Math" panose="02040503050406030204" pitchFamily="18" charset="0"/>
+                          </a:rPr>
+                          <m:t>𝑙𝑜</m:t>
+                        </m:r>
+                        <m:sSub>
+                          <m:sSubPr>
+                            <m:ctrlPr>
+                              <a:rPr lang="en-US" sz="1600" b="0" i="1" dirty="0" smtClean="0">
+                                <a:latin typeface="Cambria Math" panose="02040503050406030204" pitchFamily="18" charset="0"/>
+                                <a:ea typeface="Cambria Math" panose="02040503050406030204" pitchFamily="18" charset="0"/>
+                              </a:rPr>
+                            </m:ctrlPr>
+                          </m:sSubPr>
+                          <m:e>
+                            <m:r>
+                              <a:rPr lang="en-US" sz="1600" i="1" dirty="0" smtClean="0">
+                                <a:latin typeface="Cambria Math" panose="02040503050406030204" pitchFamily="18" charset="0"/>
+                                <a:ea typeface="Cambria Math" panose="02040503050406030204" pitchFamily="18" charset="0"/>
+                              </a:rPr>
+                              <m:t>𝑔</m:t>
+                            </m:r>
+                          </m:e>
+                          <m:sub>
+                            <m:r>
+                              <a:rPr lang="en-US" sz="1600" b="0" i="1" dirty="0" smtClean="0">
+                                <a:latin typeface="Cambria Math" panose="02040503050406030204" pitchFamily="18" charset="0"/>
+                                <a:ea typeface="Cambria Math" panose="02040503050406030204" pitchFamily="18" charset="0"/>
+                              </a:rPr>
+                              <m:t>10</m:t>
+                            </m:r>
+                          </m:sub>
+                        </m:sSub>
+                        <m:d>
+                          <m:dPr>
+                            <m:ctrlPr>
+                              <a:rPr lang="en-US" sz="1600" b="0" i="1" dirty="0" smtClean="0">
+                                <a:latin typeface="Cambria Math" panose="02040503050406030204" pitchFamily="18" charset="0"/>
+                                <a:ea typeface="Cambria Math" panose="02040503050406030204" pitchFamily="18" charset="0"/>
+                              </a:rPr>
+                            </m:ctrlPr>
+                          </m:dPr>
+                          <m:e>
+                            <m:r>
+                              <a:rPr lang="en-US" sz="1600" i="1" dirty="0">
+                                <a:latin typeface="Cambria Math" panose="02040503050406030204" pitchFamily="18" charset="0"/>
+                                <a:ea typeface="Cambria Math" panose="02040503050406030204" pitchFamily="18" charset="0"/>
+                              </a:rPr>
+                              <m:t>𝑝</m:t>
+                            </m:r>
+                            <m:r>
+                              <a:rPr lang="en-US" sz="1600" i="1" dirty="0">
+                                <a:latin typeface="Cambria Math" panose="02040503050406030204" pitchFamily="18" charset="0"/>
+                                <a:ea typeface="Cambria Math" panose="02040503050406030204" pitchFamily="18" charset="0"/>
+                              </a:rPr>
+                              <m:t>-</m:t>
+                            </m:r>
+                            <m:r>
+                              <a:rPr lang="en-US" sz="1600" i="1" dirty="0">
+                                <a:latin typeface="Cambria Math" panose="02040503050406030204" pitchFamily="18" charset="0"/>
+                                <a:ea typeface="Cambria Math" panose="02040503050406030204" pitchFamily="18" charset="0"/>
+                              </a:rPr>
+                              <m:t>𝑣𝑎𝑙𝑢𝑒</m:t>
+                            </m:r>
+                          </m:e>
+                        </m:d>
+                      </m:oMath>
+                    </m:oMathPara>
+                  </a14:m>
+                  <a:endParaRPr lang="en-US" sz="1600" b="0" dirty="0" smtClean="0">
+                    <a:latin typeface="Cambria Math" panose="02040503050406030204" pitchFamily="18" charset="0"/>
+                    <a:ea typeface="Cambria Math" panose="02040503050406030204" pitchFamily="18" charset="0"/>
+                  </a:endParaRPr>
+                </a:p>
+                <a:p>
+                  <a:pPr algn="ctr"/>
+                  <a:r>
+                    <a:rPr lang="en-US" sz="1600" dirty="0">
+                      <a:latin typeface="Cambria Math" panose="02040503050406030204" pitchFamily="18" charset="0"/>
+                      <a:ea typeface="Cambria Math" panose="02040503050406030204" pitchFamily="18" charset="0"/>
+                    </a:rPr>
+                    <a:t>H3K27ac</a:t>
+                  </a:r>
+                </a:p>
+              </p:txBody>
+            </p:sp>
+          </mc:Choice>
+          <mc:Fallback>
+            <p:sp>
+              <p:nvSpPr>
+                <p:cNvPr id="18" name="Rectangle 17"/>
+                <p:cNvSpPr>
+                  <a:spLocks noRot="1" noChangeAspect="1" noMove="1" noResize="1" noEditPoints="1" noAdjustHandles="1" noChangeArrowheads="1" noChangeShapeType="1" noTextEdit="1"/>
+                </p:cNvSpPr>
+                <p:nvPr/>
+              </p:nvSpPr>
+              <p:spPr>
+                <a:xfrm>
+                  <a:off x="0" y="1328163"/>
+                  <a:ext cx="1910080" cy="584775"/>
+                </a:xfrm>
+                <a:prstGeom prst="rect">
+                  <a:avLst/>
+                </a:prstGeom>
+                <a:blipFill rotWithShape="0">
+                  <a:blip r:embed="rId4"/>
+                  <a:stretch>
+                    <a:fillRect b="-10204"/>
+                  </a:stretch>
+                </a:blipFill>
+                <a:ln>
+                  <a:solidFill>
+                    <a:schemeClr val="bg1"/>
+                  </a:solidFill>
+                </a:ln>
+              </p:spPr>
+              <p:txBody>
+                <a:bodyPr/>
+                <a:lstStyle/>
+                <a:p>
+                  <a:r>
+                    <a:rPr lang="en-US">
+                      <a:noFill/>
+                    </a:rPr>
+                    <a:t> </a:t>
+                  </a:r>
+                </a:p>
+              </p:txBody>
+            </p:sp>
+          </mc:Fallback>
+        </mc:AlternateContent>
+        <mc:AlternateContent xmlns:mc="http://schemas.openxmlformats.org/markup-compatibility/2006">
+          <mc:Choice xmlns:a14="http://schemas.microsoft.com/office/drawing/2010/main" Requires="a14">
+            <p:sp>
+              <p:nvSpPr>
+                <p:cNvPr id="19" name="Rectangle 18"/>
+                <p:cNvSpPr/>
+                <p:nvPr/>
+              </p:nvSpPr>
+              <p:spPr>
+                <a:xfrm>
+                  <a:off x="951432" y="4984855"/>
+                  <a:ext cx="879774" cy="338554"/>
+                </a:xfrm>
+                <a:prstGeom prst="rect">
+                  <a:avLst/>
+                </a:prstGeom>
+                <a:solidFill>
+                  <a:schemeClr val="bg1"/>
+                </a:solidFill>
+                <a:ln>
+                  <a:solidFill>
+                    <a:schemeClr val="bg1"/>
+                  </a:solidFill>
+                </a:ln>
+              </p:spPr>
+              <p:txBody>
+                <a:bodyPr wrap="square">
+                  <a:spAutoFit/>
+                </a:bodyPr>
+                <a:lstStyle/>
+                <a:p>
+                  <a:pPr algn="ctr"/>
+                  <a14:m>
+                    <m:oMathPara xmlns:m="http://schemas.openxmlformats.org/officeDocument/2006/math">
+                      <m:oMathParaPr>
+                        <m:jc m:val="centerGroup"/>
+                      </m:oMathParaPr>
+                      <m:oMath xmlns:m="http://schemas.openxmlformats.org/officeDocument/2006/math">
+                        <m:r>
+                          <a:rPr lang="en-US" sz="1600" b="0" i="1" dirty="0" smtClean="0">
+                            <a:latin typeface="Cambria Math" panose="02040503050406030204" pitchFamily="18" charset="0"/>
+                            <a:ea typeface="Cambria Math" panose="02040503050406030204" pitchFamily="18" charset="0"/>
+                          </a:rPr>
+                          <m:t>𝑃</m:t>
+                        </m:r>
+                        <m:d>
+                          <m:dPr>
+                            <m:ctrlPr>
+                              <a:rPr lang="en-US" sz="1600" b="0" i="1" dirty="0" smtClean="0">
+                                <a:latin typeface="Cambria Math" panose="02040503050406030204" pitchFamily="18" charset="0"/>
+                                <a:ea typeface="Cambria Math" panose="02040503050406030204" pitchFamily="18" charset="0"/>
+                              </a:rPr>
+                            </m:ctrlPr>
+                          </m:dPr>
+                          <m:e>
+                            <m:sSub>
+                              <m:sSubPr>
+                                <m:ctrlPr>
+                                  <a:rPr lang="en-US" sz="1600" i="1" dirty="0">
+                                    <a:latin typeface="Cambria Math" panose="02040503050406030204" pitchFamily="18" charset="0"/>
+                                    <a:ea typeface="Cambria Math" panose="02040503050406030204" pitchFamily="18" charset="0"/>
+                                  </a:rPr>
+                                </m:ctrlPr>
+                              </m:sSubPr>
+                              <m:e>
+                                <m:r>
+                                  <a:rPr lang="en-US" sz="1600" i="1" dirty="0">
+                                    <a:latin typeface="Cambria Math" panose="02040503050406030204" pitchFamily="18" charset="0"/>
+                                    <a:ea typeface="Cambria Math" panose="02040503050406030204" pitchFamily="18" charset="0"/>
+                                  </a:rPr>
+                                  <m:t>𝑦</m:t>
+                                </m:r>
+                              </m:e>
+                              <m:sub>
+                                <m:r>
+                                  <a:rPr lang="en-US" sz="1600" i="1" dirty="0">
+                                    <a:latin typeface="Cambria Math" panose="02040503050406030204" pitchFamily="18" charset="0"/>
+                                    <a:ea typeface="Cambria Math" panose="02040503050406030204" pitchFamily="18" charset="0"/>
+                                  </a:rPr>
+                                  <m:t>𝑡</m:t>
+                                </m:r>
+                              </m:sub>
+                            </m:sSub>
+                          </m:e>
+                          <m:e>
+                            <m:r>
+                              <a:rPr lang="en-US" sz="1600" b="0" i="1" dirty="0" smtClean="0">
+                                <a:latin typeface="Cambria Math" panose="02040503050406030204" pitchFamily="18" charset="0"/>
+                                <a:ea typeface="Cambria Math" panose="02040503050406030204" pitchFamily="18" charset="0"/>
+                              </a:rPr>
+                              <m:t>𝑋</m:t>
+                            </m:r>
+                          </m:e>
+                        </m:d>
+                        <m:r>
+                          <a:rPr lang="en-US" sz="1600" b="0" i="1" dirty="0" smtClean="0">
+                            <a:latin typeface="Cambria Math" panose="02040503050406030204" pitchFamily="18" charset="0"/>
+                            <a:ea typeface="Cambria Math" panose="02040503050406030204" pitchFamily="18" charset="0"/>
+                          </a:rPr>
+                          <m:t> </m:t>
+                        </m:r>
+                      </m:oMath>
+                    </m:oMathPara>
+                  </a14:m>
+                  <a:endParaRPr lang="en-US" sz="1600" dirty="0">
+                    <a:latin typeface="Cambria Math" panose="02040503050406030204" pitchFamily="18" charset="0"/>
+                    <a:ea typeface="Cambria Math" panose="02040503050406030204" pitchFamily="18" charset="0"/>
+                  </a:endParaRPr>
+                </a:p>
+              </p:txBody>
+            </p:sp>
+          </mc:Choice>
+          <mc:Fallback>
+            <p:sp>
+              <p:nvSpPr>
+                <p:cNvPr id="19" name="Rectangle 18"/>
+                <p:cNvSpPr>
+                  <a:spLocks noRot="1" noChangeAspect="1" noMove="1" noResize="1" noEditPoints="1" noAdjustHandles="1" noChangeArrowheads="1" noChangeShapeType="1" noTextEdit="1"/>
+                </p:cNvSpPr>
+                <p:nvPr/>
+              </p:nvSpPr>
+              <p:spPr>
+                <a:xfrm>
+                  <a:off x="951432" y="4984855"/>
+                  <a:ext cx="879774" cy="338554"/>
+                </a:xfrm>
+                <a:prstGeom prst="rect">
+                  <a:avLst/>
+                </a:prstGeom>
+                <a:blipFill rotWithShape="0">
+                  <a:blip r:embed="rId5"/>
+                  <a:stretch>
+                    <a:fillRect l="-1370" b="-3509"/>
+                  </a:stretch>
+                </a:blipFill>
+                <a:ln>
+                  <a:solidFill>
+                    <a:schemeClr val="bg1"/>
+                  </a:solidFill>
+                </a:ln>
+              </p:spPr>
+              <p:txBody>
+                <a:bodyPr/>
+                <a:lstStyle/>
+                <a:p>
+                  <a:r>
+                    <a:rPr lang="en-US">
+                      <a:noFill/>
+                    </a:rPr>
+                    <a:t> </a:t>
+                  </a:r>
+                </a:p>
+              </p:txBody>
+            </p:sp>
+          </mc:Fallback>
+        </mc:AlternateContent>
+        <p:sp>
+          <p:nvSpPr>
+            <p:cNvPr id="20" name="Rectangle 19"/>
+            <p:cNvSpPr/>
+            <p:nvPr/>
+          </p:nvSpPr>
+          <p:spPr>
+            <a:xfrm>
+              <a:off x="674705" y="5582386"/>
+              <a:ext cx="1234103" cy="307777"/>
+            </a:xfrm>
+            <a:prstGeom prst="rect">
+              <a:avLst/>
+            </a:prstGeom>
+            <a:solidFill>
+              <a:schemeClr val="bg1"/>
+            </a:solidFill>
+            <a:ln>
+              <a:solidFill>
+                <a:schemeClr val="bg1"/>
+              </a:solidFill>
+            </a:ln>
+          </p:spPr>
+          <p:txBody>
+            <a:bodyPr wrap="square">
+              <a:spAutoFit/>
+            </a:bodyPr>
+            <a:lstStyle/>
+            <a:p>
+              <a:pPr algn="ctr"/>
+              <a:r>
+                <a:rPr lang="en-US" sz="1400" dirty="0" smtClean="0">
+                  <a:latin typeface="Cambria Math" panose="02040503050406030204" pitchFamily="18" charset="0"/>
+                  <a:ea typeface="Cambria Math" panose="02040503050406030204" pitchFamily="18" charset="0"/>
+                </a:rPr>
+                <a:t>Viterbi Path</a:t>
+              </a:r>
+              <a:endParaRPr lang="en-US" sz="1400" dirty="0">
+                <a:latin typeface="Cambria Math" panose="02040503050406030204" pitchFamily="18" charset="0"/>
+                <a:ea typeface="Cambria Math" panose="02040503050406030204" pitchFamily="18" charset="0"/>
+              </a:endParaRPr>
+            </a:p>
+          </p:txBody>
+        </p:sp>
+      </p:grpSp>
     </p:spTree>
     <p:extLst>
       <p:ext uri="{BB962C8B-B14F-4D97-AF65-F5344CB8AC3E}">
@@ -9690,7 +10526,7 @@
             <p:cNvPr id="7" name="Rectangle 6">
               <a:extLst>
                 <a:ext uri="{FF2B5EF4-FFF2-40B4-BE49-F238E27FC236}">
-                  <a16:creationId xmlns="" xmlns:mc="http://schemas.openxmlformats.org/markup-compatibility/2006" xmlns:a14="http://schemas.microsoft.com/office/drawing/2010/main" xmlns:a16="http://schemas.microsoft.com/office/drawing/2014/main" id="{6D2C8BE0-B0D2-4978-A1B5-FFF5137A4C82}"/>
+                  <a16:creationId xmlns:a16="http://schemas.microsoft.com/office/drawing/2014/main" xmlns:a14="http://schemas.microsoft.com/office/drawing/2010/main" xmlns:mc="http://schemas.openxmlformats.org/markup-compatibility/2006" xmlns="" id="{6D2C8BE0-B0D2-4978-A1B5-FFF5137A4C82}"/>
                 </a:ext>
               </a:extLst>
             </p:cNvPr>
@@ -9758,7 +10594,7 @@
             <p:cNvPr id="8" name="Rectangle 7">
               <a:extLst>
                 <a:ext uri="{FF2B5EF4-FFF2-40B4-BE49-F238E27FC236}">
-                  <a16:creationId xmlns="" xmlns:mc="http://schemas.openxmlformats.org/markup-compatibility/2006" xmlns:a14="http://schemas.microsoft.com/office/drawing/2010/main" xmlns:a16="http://schemas.microsoft.com/office/drawing/2014/main" id="{6D2C8BE0-B0D2-4978-A1B5-FFF5137A4C82}"/>
+                  <a16:creationId xmlns:a16="http://schemas.microsoft.com/office/drawing/2014/main" xmlns:a14="http://schemas.microsoft.com/office/drawing/2010/main" xmlns:mc="http://schemas.openxmlformats.org/markup-compatibility/2006" xmlns="" id="{6D2C8BE0-B0D2-4978-A1B5-FFF5137A4C82}"/>
                 </a:ext>
               </a:extLst>
             </p:cNvPr>
@@ -9826,7 +10662,7 @@
             <p:cNvPr id="9" name="Rectangle 8">
               <a:extLst>
                 <a:ext uri="{FF2B5EF4-FFF2-40B4-BE49-F238E27FC236}">
-                  <a16:creationId xmlns="" xmlns:mc="http://schemas.openxmlformats.org/markup-compatibility/2006" xmlns:a14="http://schemas.microsoft.com/office/drawing/2010/main" xmlns:a16="http://schemas.microsoft.com/office/drawing/2014/main" id="{6D2C8BE0-B0D2-4978-A1B5-FFF5137A4C82}"/>
+                  <a16:creationId xmlns:a16="http://schemas.microsoft.com/office/drawing/2014/main" xmlns:a14="http://schemas.microsoft.com/office/drawing/2010/main" xmlns:mc="http://schemas.openxmlformats.org/markup-compatibility/2006" xmlns="" id="{6D2C8BE0-B0D2-4978-A1B5-FFF5137A4C82}"/>
                 </a:ext>
               </a:extLst>
             </p:cNvPr>
@@ -9894,7 +10730,7 @@
             <p:cNvPr id="10" name="Rectangle 9">
               <a:extLst>
                 <a:ext uri="{FF2B5EF4-FFF2-40B4-BE49-F238E27FC236}">
-                  <a16:creationId xmlns="" xmlns:mc="http://schemas.openxmlformats.org/markup-compatibility/2006" xmlns:a14="http://schemas.microsoft.com/office/drawing/2010/main" xmlns:a16="http://schemas.microsoft.com/office/drawing/2014/main" id="{6D2C8BE0-B0D2-4978-A1B5-FFF5137A4C82}"/>
+                  <a16:creationId xmlns:a16="http://schemas.microsoft.com/office/drawing/2014/main" xmlns:a14="http://schemas.microsoft.com/office/drawing/2010/main" xmlns:mc="http://schemas.openxmlformats.org/markup-compatibility/2006" xmlns="" id="{6D2C8BE0-B0D2-4978-A1B5-FFF5137A4C82}"/>
                 </a:ext>
               </a:extLst>
             </p:cNvPr>
@@ -9962,7 +10798,7 @@
             <p:cNvPr id="11" name="Rectangle 10">
               <a:extLst>
                 <a:ext uri="{FF2B5EF4-FFF2-40B4-BE49-F238E27FC236}">
-                  <a16:creationId xmlns="" xmlns:mc="http://schemas.openxmlformats.org/markup-compatibility/2006" xmlns:a14="http://schemas.microsoft.com/office/drawing/2010/main" xmlns:a16="http://schemas.microsoft.com/office/drawing/2014/main" id="{6D2C8BE0-B0D2-4978-A1B5-FFF5137A4C82}"/>
+                  <a16:creationId xmlns:a16="http://schemas.microsoft.com/office/drawing/2014/main" xmlns:a14="http://schemas.microsoft.com/office/drawing/2010/main" xmlns:mc="http://schemas.openxmlformats.org/markup-compatibility/2006" xmlns="" id="{6D2C8BE0-B0D2-4978-A1B5-FFF5137A4C82}"/>
                 </a:ext>
               </a:extLst>
             </p:cNvPr>
@@ -10029,7 +10865,7 @@
             <p:cNvPr id="12" name="Rectangle 11">
               <a:extLst>
                 <a:ext uri="{FF2B5EF4-FFF2-40B4-BE49-F238E27FC236}">
-                  <a16:creationId xmlns="" xmlns:mc="http://schemas.openxmlformats.org/markup-compatibility/2006" xmlns:a14="http://schemas.microsoft.com/office/drawing/2010/main" xmlns:a16="http://schemas.microsoft.com/office/drawing/2014/main" id="{6D2C8BE0-B0D2-4978-A1B5-FFF5137A4C82}"/>
+                  <a16:creationId xmlns:a16="http://schemas.microsoft.com/office/drawing/2014/main" xmlns:a14="http://schemas.microsoft.com/office/drawing/2010/main" xmlns:mc="http://schemas.openxmlformats.org/markup-compatibility/2006" xmlns="" id="{6D2C8BE0-B0D2-4978-A1B5-FFF5137A4C82}"/>
                 </a:ext>
               </a:extLst>
             </p:cNvPr>
@@ -10096,7 +10932,7 @@
             <p:cNvPr id="13" name="Rectangle 12">
               <a:extLst>
                 <a:ext uri="{FF2B5EF4-FFF2-40B4-BE49-F238E27FC236}">
-                  <a16:creationId xmlns="" xmlns:mc="http://schemas.openxmlformats.org/markup-compatibility/2006" xmlns:a14="http://schemas.microsoft.com/office/drawing/2010/main" xmlns:a16="http://schemas.microsoft.com/office/drawing/2014/main" id="{6D2C8BE0-B0D2-4978-A1B5-FFF5137A4C82}"/>
+                  <a16:creationId xmlns:a16="http://schemas.microsoft.com/office/drawing/2014/main" xmlns:a14="http://schemas.microsoft.com/office/drawing/2010/main" xmlns:mc="http://schemas.openxmlformats.org/markup-compatibility/2006" xmlns="" id="{6D2C8BE0-B0D2-4978-A1B5-FFF5137A4C82}"/>
                 </a:ext>
               </a:extLst>
             </p:cNvPr>
@@ -10163,7 +10999,7 @@
             <p:cNvPr id="14" name="Rectangle 13">
               <a:extLst>
                 <a:ext uri="{FF2B5EF4-FFF2-40B4-BE49-F238E27FC236}">
-                  <a16:creationId xmlns="" xmlns:mc="http://schemas.openxmlformats.org/markup-compatibility/2006" xmlns:a14="http://schemas.microsoft.com/office/drawing/2010/main" xmlns:a16="http://schemas.microsoft.com/office/drawing/2014/main" id="{6D2C8BE0-B0D2-4978-A1B5-FFF5137A4C82}"/>
+                  <a16:creationId xmlns:a16="http://schemas.microsoft.com/office/drawing/2014/main" xmlns:a14="http://schemas.microsoft.com/office/drawing/2010/main" xmlns:mc="http://schemas.openxmlformats.org/markup-compatibility/2006" xmlns="" id="{6D2C8BE0-B0D2-4978-A1B5-FFF5137A4C82}"/>
                 </a:ext>
               </a:extLst>
             </p:cNvPr>
@@ -10259,7 +11095,7 @@
             <p:cNvPr id="16" name="Rectangle 15">
               <a:extLst>
                 <a:ext uri="{FF2B5EF4-FFF2-40B4-BE49-F238E27FC236}">
-                  <a16:creationId xmlns="" xmlns:mc="http://schemas.openxmlformats.org/markup-compatibility/2006" xmlns:a14="http://schemas.microsoft.com/office/drawing/2010/main" xmlns:a16="http://schemas.microsoft.com/office/drawing/2014/main" id="{6D2C8BE0-B0D2-4978-A1B5-FFF5137A4C82}"/>
+                  <a16:creationId xmlns:a16="http://schemas.microsoft.com/office/drawing/2014/main" xmlns:a14="http://schemas.microsoft.com/office/drawing/2010/main" xmlns:mc="http://schemas.openxmlformats.org/markup-compatibility/2006" xmlns="" id="{6D2C8BE0-B0D2-4978-A1B5-FFF5137A4C82}"/>
                 </a:ext>
               </a:extLst>
             </p:cNvPr>
@@ -10345,7 +11181,7 @@
             <p:cNvPr id="17" name="Rectangle 16">
               <a:extLst>
                 <a:ext uri="{FF2B5EF4-FFF2-40B4-BE49-F238E27FC236}">
-                  <a16:creationId xmlns="" xmlns:mc="http://schemas.openxmlformats.org/markup-compatibility/2006" xmlns:a14="http://schemas.microsoft.com/office/drawing/2010/main" xmlns:a16="http://schemas.microsoft.com/office/drawing/2014/main" id="{6D2C8BE0-B0D2-4978-A1B5-FFF5137A4C82}"/>
+                  <a16:creationId xmlns:a16="http://schemas.microsoft.com/office/drawing/2014/main" xmlns:a14="http://schemas.microsoft.com/office/drawing/2010/main" xmlns:mc="http://schemas.openxmlformats.org/markup-compatibility/2006" xmlns="" id="{6D2C8BE0-B0D2-4978-A1B5-FFF5137A4C82}"/>
                 </a:ext>
               </a:extLst>
             </p:cNvPr>
@@ -10546,7 +11382,7 @@
             <p:cNvPr id="25" name="Rectangle 24">
               <a:extLst>
                 <a:ext uri="{FF2B5EF4-FFF2-40B4-BE49-F238E27FC236}">
-                  <a16:creationId xmlns="" xmlns:mc="http://schemas.openxmlformats.org/markup-compatibility/2006" xmlns:a14="http://schemas.microsoft.com/office/drawing/2010/main" xmlns:a16="http://schemas.microsoft.com/office/drawing/2014/main" id="{6D2C8BE0-B0D2-4978-A1B5-FFF5137A4C82}"/>
+                  <a16:creationId xmlns:a16="http://schemas.microsoft.com/office/drawing/2014/main" xmlns:a14="http://schemas.microsoft.com/office/drawing/2010/main" xmlns:mc="http://schemas.openxmlformats.org/markup-compatibility/2006" xmlns="" id="{6D2C8BE0-B0D2-4978-A1B5-FFF5137A4C82}"/>
                 </a:ext>
               </a:extLst>
             </p:cNvPr>

</xml_diff>

<commit_message>
many fixes from Tommy and general proofreading of the PDF v10
</commit_message>
<xml_diff>
--- a/Help/Figures3.pptx
+++ b/Help/Figures3.pptx
@@ -262,7 +262,7 @@
           <a:p>
             <a:fld id="{054E8CB3-1D98-4ECD-B6B7-C0FB8C78DDA1}" type="datetimeFigureOut">
               <a:rPr lang="en-US" smtClean="0"/>
-              <a:t>4/25/2020</a:t>
+              <a:t>5/1/2020</a:t>
             </a:fld>
             <a:endParaRPr lang="en-US"/>
           </a:p>
@@ -432,7 +432,7 @@
           <a:p>
             <a:fld id="{054E8CB3-1D98-4ECD-B6B7-C0FB8C78DDA1}" type="datetimeFigureOut">
               <a:rPr lang="en-US" smtClean="0"/>
-              <a:t>4/25/2020</a:t>
+              <a:t>5/1/2020</a:t>
             </a:fld>
             <a:endParaRPr lang="en-US"/>
           </a:p>
@@ -612,7 +612,7 @@
           <a:p>
             <a:fld id="{054E8CB3-1D98-4ECD-B6B7-C0FB8C78DDA1}" type="datetimeFigureOut">
               <a:rPr lang="en-US" smtClean="0"/>
-              <a:t>4/25/2020</a:t>
+              <a:t>5/1/2020</a:t>
             </a:fld>
             <a:endParaRPr lang="en-US"/>
           </a:p>
@@ -782,7 +782,7 @@
           <a:p>
             <a:fld id="{054E8CB3-1D98-4ECD-B6B7-C0FB8C78DDA1}" type="datetimeFigureOut">
               <a:rPr lang="en-US" smtClean="0"/>
-              <a:t>4/25/2020</a:t>
+              <a:t>5/1/2020</a:t>
             </a:fld>
             <a:endParaRPr lang="en-US"/>
           </a:p>
@@ -1028,7 +1028,7 @@
           <a:p>
             <a:fld id="{054E8CB3-1D98-4ECD-B6B7-C0FB8C78DDA1}" type="datetimeFigureOut">
               <a:rPr lang="en-US" smtClean="0"/>
-              <a:t>4/25/2020</a:t>
+              <a:t>5/1/2020</a:t>
             </a:fld>
             <a:endParaRPr lang="en-US"/>
           </a:p>
@@ -1260,7 +1260,7 @@
           <a:p>
             <a:fld id="{054E8CB3-1D98-4ECD-B6B7-C0FB8C78DDA1}" type="datetimeFigureOut">
               <a:rPr lang="en-US" smtClean="0"/>
-              <a:t>4/25/2020</a:t>
+              <a:t>5/1/2020</a:t>
             </a:fld>
             <a:endParaRPr lang="en-US"/>
           </a:p>
@@ -1627,7 +1627,7 @@
           <a:p>
             <a:fld id="{054E8CB3-1D98-4ECD-B6B7-C0FB8C78DDA1}" type="datetimeFigureOut">
               <a:rPr lang="en-US" smtClean="0"/>
-              <a:t>4/25/2020</a:t>
+              <a:t>5/1/2020</a:t>
             </a:fld>
             <a:endParaRPr lang="en-US"/>
           </a:p>
@@ -1745,7 +1745,7 @@
           <a:p>
             <a:fld id="{054E8CB3-1D98-4ECD-B6B7-C0FB8C78DDA1}" type="datetimeFigureOut">
               <a:rPr lang="en-US" smtClean="0"/>
-              <a:t>4/25/2020</a:t>
+              <a:t>5/1/2020</a:t>
             </a:fld>
             <a:endParaRPr lang="en-US"/>
           </a:p>
@@ -1840,7 +1840,7 @@
           <a:p>
             <a:fld id="{054E8CB3-1D98-4ECD-B6B7-C0FB8C78DDA1}" type="datetimeFigureOut">
               <a:rPr lang="en-US" smtClean="0"/>
-              <a:t>4/25/2020</a:t>
+              <a:t>5/1/2020</a:t>
             </a:fld>
             <a:endParaRPr lang="en-US"/>
           </a:p>
@@ -2117,7 +2117,7 @@
           <a:p>
             <a:fld id="{054E8CB3-1D98-4ECD-B6B7-C0FB8C78DDA1}" type="datetimeFigureOut">
               <a:rPr lang="en-US" smtClean="0"/>
-              <a:t>4/25/2020</a:t>
+              <a:t>5/1/2020</a:t>
             </a:fld>
             <a:endParaRPr lang="en-US"/>
           </a:p>
@@ -2370,7 +2370,7 @@
           <a:p>
             <a:fld id="{054E8CB3-1D98-4ECD-B6B7-C0FB8C78DDA1}" type="datetimeFigureOut">
               <a:rPr lang="en-US" smtClean="0"/>
-              <a:t>4/25/2020</a:t>
+              <a:t>5/1/2020</a:t>
             </a:fld>
             <a:endParaRPr lang="en-US"/>
           </a:p>
@@ -2583,7 +2583,7 @@
           <a:p>
             <a:fld id="{054E8CB3-1D98-4ECD-B6B7-C0FB8C78DDA1}" type="datetimeFigureOut">
               <a:rPr lang="en-US" smtClean="0"/>
-              <a:t>4/25/2020</a:t>
+              <a:t>5/1/2020</a:t>
             </a:fld>
             <a:endParaRPr lang="en-US"/>
           </a:p>
@@ -3021,7 +3021,7 @@
               <p:cNvPr id="30" name="Rectangle 29">
                 <a:extLst>
                   <a:ext uri="{FF2B5EF4-FFF2-40B4-BE49-F238E27FC236}">
-                    <a16:creationId xmlns="" xmlns:mc="http://schemas.openxmlformats.org/markup-compatibility/2006" xmlns:a14="http://schemas.microsoft.com/office/drawing/2010/main" xmlns:a16="http://schemas.microsoft.com/office/drawing/2014/main" id="{6D2C8BE0-B0D2-4978-A1B5-FFF5137A4C82}"/>
+                    <a16:creationId xmlns:a16="http://schemas.microsoft.com/office/drawing/2014/main" xmlns:a14="http://schemas.microsoft.com/office/drawing/2010/main" xmlns:mc="http://schemas.openxmlformats.org/markup-compatibility/2006" xmlns="" id="{6D2C8BE0-B0D2-4978-A1B5-FFF5137A4C82}"/>
                   </a:ext>
                 </a:extLst>
               </p:cNvPr>
@@ -3082,10 +3082,10 @@
             </p:nvGrpSpPr>
             <p:grpSpPr>
               <a:xfrm>
-                <a:off x="-304363" y="1024960"/>
-                <a:ext cx="13034513" cy="4675518"/>
-                <a:chOff x="-267419" y="526211"/>
-                <a:chExt cx="13034513" cy="4675517"/>
+                <a:off x="-531988" y="1024960"/>
+                <a:ext cx="13262138" cy="4675518"/>
+                <a:chOff x="-495044" y="526211"/>
+                <a:chExt cx="13262138" cy="4675517"/>
               </a:xfrm>
             </p:grpSpPr>
             <p:grpSp>
@@ -3096,10 +3096,10 @@
               </p:nvGrpSpPr>
               <p:grpSpPr>
                 <a:xfrm>
-                  <a:off x="-267419" y="526211"/>
-                  <a:ext cx="13034513" cy="4675517"/>
-                  <a:chOff x="-267419" y="526211"/>
-                  <a:chExt cx="13034513" cy="4675517"/>
+                  <a:off x="-495044" y="526211"/>
+                  <a:ext cx="13262138" cy="4675517"/>
+                  <a:chOff x="-495044" y="526211"/>
+                  <a:chExt cx="13262138" cy="4675517"/>
                 </a:xfrm>
               </p:grpSpPr>
               <p:sp>
@@ -3158,10 +3158,10 @@
                 </p:nvGrpSpPr>
                 <p:grpSpPr>
                   <a:xfrm>
-                    <a:off x="-193576" y="612648"/>
-                    <a:ext cx="12871732" cy="4526280"/>
-                    <a:chOff x="-219455" y="612648"/>
-                    <a:chExt cx="12871732" cy="4526280"/>
+                    <a:off x="-495044" y="612648"/>
+                    <a:ext cx="13173200" cy="4526280"/>
+                    <a:chOff x="-520923" y="612648"/>
+                    <a:chExt cx="13173200" cy="4526280"/>
                   </a:xfrm>
                   <a:solidFill>
                     <a:schemeClr val="bg1"/>
@@ -3234,7 +3234,7 @@
                     <p:cNvPr id="18" name="Rectangle 17">
                       <a:extLst>
                         <a:ext uri="{FF2B5EF4-FFF2-40B4-BE49-F238E27FC236}">
-                          <a16:creationId xmlns="" xmlns:mc="http://schemas.openxmlformats.org/markup-compatibility/2006" xmlns:a14="http://schemas.microsoft.com/office/drawing/2010/main" xmlns:a16="http://schemas.microsoft.com/office/drawing/2014/main" id="{2E36643D-EEA2-42A8-BBCF-DC12D9FC8BA4}"/>
+                          <a16:creationId xmlns:a16="http://schemas.microsoft.com/office/drawing/2014/main" xmlns:a14="http://schemas.microsoft.com/office/drawing/2010/main" xmlns:mc="http://schemas.openxmlformats.org/markup-compatibility/2006" xmlns="" id="{2E36643D-EEA2-42A8-BBCF-DC12D9FC8BA4}"/>
                         </a:ext>
                       </a:extLst>
                     </p:cNvPr>
@@ -3300,7 +3300,7 @@
                     <p:cNvPr id="19" name="Rectangle 18">
                       <a:extLst>
                         <a:ext uri="{FF2B5EF4-FFF2-40B4-BE49-F238E27FC236}">
-                          <a16:creationId xmlns="" xmlns:mc="http://schemas.openxmlformats.org/markup-compatibility/2006" xmlns:a14="http://schemas.microsoft.com/office/drawing/2010/main" xmlns:a16="http://schemas.microsoft.com/office/drawing/2014/main" id="{2E36643D-EEA2-42A8-BBCF-DC12D9FC8BA4}"/>
+                          <a16:creationId xmlns:a16="http://schemas.microsoft.com/office/drawing/2014/main" xmlns:a14="http://schemas.microsoft.com/office/drawing/2010/main" xmlns:mc="http://schemas.openxmlformats.org/markup-compatibility/2006" xmlns="" id="{2E36643D-EEA2-42A8-BBCF-DC12D9FC8BA4}"/>
                         </a:ext>
                       </a:extLst>
                     </p:cNvPr>
@@ -3366,7 +3366,7 @@
                     <p:cNvPr id="20" name="Rectangle 19">
                       <a:extLst>
                         <a:ext uri="{FF2B5EF4-FFF2-40B4-BE49-F238E27FC236}">
-                          <a16:creationId xmlns="" xmlns:mc="http://schemas.openxmlformats.org/markup-compatibility/2006" xmlns:a14="http://schemas.microsoft.com/office/drawing/2010/main" xmlns:a16="http://schemas.microsoft.com/office/drawing/2014/main" id="{6D2C8BE0-B0D2-4978-A1B5-FFF5137A4C82}"/>
+                          <a16:creationId xmlns:a16="http://schemas.microsoft.com/office/drawing/2014/main" xmlns:a14="http://schemas.microsoft.com/office/drawing/2010/main" xmlns:mc="http://schemas.openxmlformats.org/markup-compatibility/2006" xmlns="" id="{6D2C8BE0-B0D2-4978-A1B5-FFF5137A4C82}"/>
                         </a:ext>
                       </a:extLst>
                     </p:cNvPr>
@@ -3417,14 +3417,14 @@
                     </a:p>
                   </p:txBody>
                 </p:sp>
-                <mc:AlternateContent xmlns:mc="http://schemas.openxmlformats.org/markup-compatibility/2006" xmlns:a14="http://schemas.microsoft.com/office/drawing/2010/main">
-                  <mc:Choice Requires="a14">
+                <mc:AlternateContent xmlns:mc="http://schemas.openxmlformats.org/markup-compatibility/2006">
+                  <mc:Choice xmlns:a14="http://schemas.microsoft.com/office/drawing/2010/main" Requires="a14">
                     <p:sp>
                       <p:nvSpPr>
                         <p:cNvPr id="24" name="Rectangle 23">
                           <a:extLst>
                             <a:ext uri="{FF2B5EF4-FFF2-40B4-BE49-F238E27FC236}">
-                              <a16:creationId xmlns="" xmlns:a16="http://schemas.microsoft.com/office/drawing/2014/main" id="{6D2C8BE0-B0D2-4978-A1B5-FFF5137A4C82}"/>
+                              <a16:creationId xmlns:a16="http://schemas.microsoft.com/office/drawing/2014/main" xmlns="" id="{6D2C8BE0-B0D2-4978-A1B5-FFF5137A4C82}"/>
                             </a:ext>
                           </a:extLst>
                         </p:cNvPr>
@@ -3433,8 +3433,8 @@
                       </p:nvSpPr>
                       <p:spPr>
                         <a:xfrm>
-                          <a:off x="-219455" y="1962088"/>
-                          <a:ext cx="1395983" cy="1852972"/>
+                          <a:off x="-520923" y="1943251"/>
+                          <a:ext cx="1703366" cy="1909119"/>
                         </a:xfrm>
                         <a:prstGeom prst="rect">
                           <a:avLst/>
@@ -3567,7 +3567,7 @@
                       </p:txBody>
                     </p:sp>
                   </mc:Choice>
-                  <mc:Fallback xmlns="">
+                  <mc:Fallback>
                     <p:sp>
                       <p:nvSpPr>
                         <p:cNvPr id="24" name="Rectangle 23">
@@ -3584,8 +3584,8 @@
                       </p:nvSpPr>
                       <p:spPr>
                         <a:xfrm>
-                          <a:off x="-219455" y="1962088"/>
-                          <a:ext cx="1395983" cy="1852972"/>
+                          <a:off x="-520923" y="1943251"/>
+                          <a:ext cx="1703366" cy="1909119"/>
                         </a:xfrm>
                         <a:prstGeom prst="rect">
                           <a:avLst/>
@@ -3593,7 +3593,7 @@
                         <a:blipFill rotWithShape="0">
                           <a:blip r:embed="rId4"/>
                           <a:stretch>
-                            <a:fillRect l="-2183" r="-2620"/>
+                            <a:fillRect/>
                           </a:stretch>
                         </a:blipFill>
                         <a:ln>
@@ -4375,7 +4375,7 @@
                     <p:cNvPr id="45" name="Rectangle 44">
                       <a:extLst>
                         <a:ext uri="{FF2B5EF4-FFF2-40B4-BE49-F238E27FC236}">
-                          <a16:creationId xmlns="" xmlns:mc="http://schemas.openxmlformats.org/markup-compatibility/2006" xmlns:a14="http://schemas.microsoft.com/office/drawing/2010/main" xmlns:a16="http://schemas.microsoft.com/office/drawing/2014/main" id="{2E36643D-EEA2-42A8-BBCF-DC12D9FC8BA4}"/>
+                          <a16:creationId xmlns:a16="http://schemas.microsoft.com/office/drawing/2014/main" xmlns:a14="http://schemas.microsoft.com/office/drawing/2010/main" xmlns:mc="http://schemas.openxmlformats.org/markup-compatibility/2006" xmlns="" id="{2E36643D-EEA2-42A8-BBCF-DC12D9FC8BA4}"/>
                         </a:ext>
                       </a:extLst>
                     </p:cNvPr>
@@ -4431,7 +4431,7 @@
                     <p:cNvPr id="46" name="Rectangle 45">
                       <a:extLst>
                         <a:ext uri="{FF2B5EF4-FFF2-40B4-BE49-F238E27FC236}">
-                          <a16:creationId xmlns="" xmlns:mc="http://schemas.openxmlformats.org/markup-compatibility/2006" xmlns:a14="http://schemas.microsoft.com/office/drawing/2010/main" xmlns:a16="http://schemas.microsoft.com/office/drawing/2014/main" id="{2E36643D-EEA2-42A8-BBCF-DC12D9FC8BA4}"/>
+                          <a16:creationId xmlns:a16="http://schemas.microsoft.com/office/drawing/2014/main" xmlns:a14="http://schemas.microsoft.com/office/drawing/2010/main" xmlns:mc="http://schemas.openxmlformats.org/markup-compatibility/2006" xmlns="" id="{2E36643D-EEA2-42A8-BBCF-DC12D9FC8BA4}"/>
                         </a:ext>
                       </a:extLst>
                     </p:cNvPr>
@@ -4682,7 +4682,7 @@
               <p:cNvPr id="33" name="Rectangle 32">
                 <a:extLst>
                   <a:ext uri="{FF2B5EF4-FFF2-40B4-BE49-F238E27FC236}">
-                    <a16:creationId xmlns="" xmlns:mc="http://schemas.openxmlformats.org/markup-compatibility/2006" xmlns:a14="http://schemas.microsoft.com/office/drawing/2010/main" xmlns:a16="http://schemas.microsoft.com/office/drawing/2014/main" id="{6D2C8BE0-B0D2-4978-A1B5-FFF5137A4C82}"/>
+                    <a16:creationId xmlns:a16="http://schemas.microsoft.com/office/drawing/2014/main" xmlns:a14="http://schemas.microsoft.com/office/drawing/2010/main" xmlns:mc="http://schemas.openxmlformats.org/markup-compatibility/2006" xmlns="" id="{6D2C8BE0-B0D2-4978-A1B5-FFF5137A4C82}"/>
                   </a:ext>
                 </a:extLst>
               </p:cNvPr>
@@ -4753,7 +4753,7 @@
               <p:cNvPr id="34" name="Rectangle 33">
                 <a:extLst>
                   <a:ext uri="{FF2B5EF4-FFF2-40B4-BE49-F238E27FC236}">
-                    <a16:creationId xmlns="" xmlns:mc="http://schemas.openxmlformats.org/markup-compatibility/2006" xmlns:a14="http://schemas.microsoft.com/office/drawing/2010/main" xmlns:a16="http://schemas.microsoft.com/office/drawing/2014/main" id="{6D2C8BE0-B0D2-4978-A1B5-FFF5137A4C82}"/>
+                    <a16:creationId xmlns:a16="http://schemas.microsoft.com/office/drawing/2014/main" xmlns:a14="http://schemas.microsoft.com/office/drawing/2010/main" xmlns:mc="http://schemas.openxmlformats.org/markup-compatibility/2006" xmlns="" id="{6D2C8BE0-B0D2-4978-A1B5-FFF5137A4C82}"/>
                   </a:ext>
                 </a:extLst>
               </p:cNvPr>
@@ -4934,7 +4934,7 @@
               <p:cNvPr id="18" name="Rectangle 17">
                 <a:extLst>
                   <a:ext uri="{FF2B5EF4-FFF2-40B4-BE49-F238E27FC236}">
-                    <a16:creationId xmlns="" xmlns:mc="http://schemas.openxmlformats.org/markup-compatibility/2006" xmlns:a14="http://schemas.microsoft.com/office/drawing/2010/main" xmlns:a16="http://schemas.microsoft.com/office/drawing/2014/main" id="{6D2C8BE0-B0D2-4978-A1B5-FFF5137A4C82}"/>
+                    <a16:creationId xmlns:a16="http://schemas.microsoft.com/office/drawing/2014/main" xmlns:a14="http://schemas.microsoft.com/office/drawing/2010/main" xmlns:mc="http://schemas.openxmlformats.org/markup-compatibility/2006" xmlns="" id="{6D2C8BE0-B0D2-4978-A1B5-FFF5137A4C82}"/>
                   </a:ext>
                 </a:extLst>
               </p:cNvPr>
@@ -4995,10 +4995,10 @@
             </p:nvGrpSpPr>
             <p:grpSpPr>
               <a:xfrm>
-                <a:off x="-431320" y="1125563"/>
-                <a:ext cx="12709166" cy="4532145"/>
-                <a:chOff x="-422693" y="1161288"/>
-                <a:chExt cx="12709166" cy="4532145"/>
+                <a:off x="-459028" y="1125563"/>
+                <a:ext cx="12736874" cy="4532145"/>
+                <a:chOff x="-450401" y="1161288"/>
+                <a:chExt cx="12736874" cy="4532145"/>
               </a:xfrm>
               <a:solidFill>
                 <a:schemeClr val="bg1"/>
@@ -5145,7 +5145,7 @@
                 <p:cNvPr id="10" name="Rectangle 9">
                   <a:extLst>
                     <a:ext uri="{FF2B5EF4-FFF2-40B4-BE49-F238E27FC236}">
-                      <a16:creationId xmlns="" xmlns:mc="http://schemas.openxmlformats.org/markup-compatibility/2006" xmlns:a14="http://schemas.microsoft.com/office/drawing/2010/main" xmlns:a16="http://schemas.microsoft.com/office/drawing/2014/main" id="{2E36643D-EEA2-42A8-BBCF-DC12D9FC8BA4}"/>
+                      <a16:creationId xmlns:a16="http://schemas.microsoft.com/office/drawing/2014/main" xmlns:a14="http://schemas.microsoft.com/office/drawing/2010/main" xmlns:mc="http://schemas.openxmlformats.org/markup-compatibility/2006" xmlns="" id="{2E36643D-EEA2-42A8-BBCF-DC12D9FC8BA4}"/>
                     </a:ext>
                   </a:extLst>
                 </p:cNvPr>
@@ -5211,7 +5211,7 @@
                 <p:cNvPr id="12" name="Rectangle 11">
                   <a:extLst>
                     <a:ext uri="{FF2B5EF4-FFF2-40B4-BE49-F238E27FC236}">
-                      <a16:creationId xmlns="" xmlns:mc="http://schemas.openxmlformats.org/markup-compatibility/2006" xmlns:a14="http://schemas.microsoft.com/office/drawing/2010/main" xmlns:a16="http://schemas.microsoft.com/office/drawing/2014/main" id="{6D2C8BE0-B0D2-4978-A1B5-FFF5137A4C82}"/>
+                      <a16:creationId xmlns:a16="http://schemas.microsoft.com/office/drawing/2014/main" xmlns:a14="http://schemas.microsoft.com/office/drawing/2010/main" xmlns:mc="http://schemas.openxmlformats.org/markup-compatibility/2006" xmlns="" id="{6D2C8BE0-B0D2-4978-A1B5-FFF5137A4C82}"/>
                     </a:ext>
                   </a:extLst>
                 </p:cNvPr>
@@ -5220,7 +5220,7 @@
               </p:nvSpPr>
               <p:spPr>
                 <a:xfrm>
-                  <a:off x="-422693" y="2320637"/>
+                  <a:off x="-450401" y="2320637"/>
                   <a:ext cx="1648062" cy="2216724"/>
                 </a:xfrm>
                 <a:prstGeom prst="rect">
@@ -5564,7 +5564,7 @@
                 <p:cNvPr id="19" name="Rectangle 18">
                   <a:extLst>
                     <a:ext uri="{FF2B5EF4-FFF2-40B4-BE49-F238E27FC236}">
-                      <a16:creationId xmlns="" xmlns:mc="http://schemas.openxmlformats.org/markup-compatibility/2006" xmlns:a14="http://schemas.microsoft.com/office/drawing/2010/main" xmlns:a16="http://schemas.microsoft.com/office/drawing/2014/main" id="{2E36643D-EEA2-42A8-BBCF-DC12D9FC8BA4}"/>
+                      <a16:creationId xmlns:a16="http://schemas.microsoft.com/office/drawing/2014/main" xmlns:a14="http://schemas.microsoft.com/office/drawing/2010/main" xmlns:mc="http://schemas.openxmlformats.org/markup-compatibility/2006" xmlns="" id="{2E36643D-EEA2-42A8-BBCF-DC12D9FC8BA4}"/>
                     </a:ext>
                   </a:extLst>
                 </p:cNvPr>
@@ -5630,7 +5630,7 @@
                 <p:cNvPr id="20" name="Rectangle 19">
                   <a:extLst>
                     <a:ext uri="{FF2B5EF4-FFF2-40B4-BE49-F238E27FC236}">
-                      <a16:creationId xmlns="" xmlns:mc="http://schemas.openxmlformats.org/markup-compatibility/2006" xmlns:a14="http://schemas.microsoft.com/office/drawing/2010/main" xmlns:a16="http://schemas.microsoft.com/office/drawing/2014/main" id="{6D2C8BE0-B0D2-4978-A1B5-FFF5137A4C82}"/>
+                      <a16:creationId xmlns:a16="http://schemas.microsoft.com/office/drawing/2014/main" xmlns:a14="http://schemas.microsoft.com/office/drawing/2010/main" xmlns:mc="http://schemas.openxmlformats.org/markup-compatibility/2006" xmlns="" id="{6D2C8BE0-B0D2-4978-A1B5-FFF5137A4C82}"/>
                     </a:ext>
                   </a:extLst>
                 </p:cNvPr>
@@ -5687,7 +5687,7 @@
               <p:cNvPr id="27" name="Rectangle 26">
                 <a:extLst>
                   <a:ext uri="{FF2B5EF4-FFF2-40B4-BE49-F238E27FC236}">
-                    <a16:creationId xmlns="" xmlns:mc="http://schemas.openxmlformats.org/markup-compatibility/2006" xmlns:a14="http://schemas.microsoft.com/office/drawing/2010/main" xmlns:a16="http://schemas.microsoft.com/office/drawing/2014/main" id="{6D2C8BE0-B0D2-4978-A1B5-FFF5137A4C82}"/>
+                    <a16:creationId xmlns:a16="http://schemas.microsoft.com/office/drawing/2014/main" xmlns:a14="http://schemas.microsoft.com/office/drawing/2010/main" xmlns:mc="http://schemas.openxmlformats.org/markup-compatibility/2006" xmlns="" id="{6D2C8BE0-B0D2-4978-A1B5-FFF5137A4C82}"/>
                   </a:ext>
                 </a:extLst>
               </p:cNvPr>
@@ -5758,7 +5758,7 @@
               <p:cNvPr id="28" name="Rectangle 27">
                 <a:extLst>
                   <a:ext uri="{FF2B5EF4-FFF2-40B4-BE49-F238E27FC236}">
-                    <a16:creationId xmlns="" xmlns:mc="http://schemas.openxmlformats.org/markup-compatibility/2006" xmlns:a14="http://schemas.microsoft.com/office/drawing/2010/main" xmlns:a16="http://schemas.microsoft.com/office/drawing/2014/main" id="{6D2C8BE0-B0D2-4978-A1B5-FFF5137A4C82}"/>
+                    <a16:creationId xmlns:a16="http://schemas.microsoft.com/office/drawing/2014/main" xmlns:a14="http://schemas.microsoft.com/office/drawing/2010/main" xmlns:mc="http://schemas.openxmlformats.org/markup-compatibility/2006" xmlns="" id="{6D2C8BE0-B0D2-4978-A1B5-FFF5137A4C82}"/>
                   </a:ext>
                 </a:extLst>
               </p:cNvPr>
@@ -5925,7 +5925,7 @@
             <p:cNvPr id="61" name="Rectangle 60">
               <a:extLst>
                 <a:ext uri="{FF2B5EF4-FFF2-40B4-BE49-F238E27FC236}">
-                  <a16:creationId xmlns="" xmlns:mc="http://schemas.openxmlformats.org/markup-compatibility/2006" xmlns:a14="http://schemas.microsoft.com/office/drawing/2010/main" xmlns:a16="http://schemas.microsoft.com/office/drawing/2014/main" id="{6D2C8BE0-B0D2-4978-A1B5-FFF5137A4C82}"/>
+                  <a16:creationId xmlns:a16="http://schemas.microsoft.com/office/drawing/2014/main" xmlns:a14="http://schemas.microsoft.com/office/drawing/2010/main" xmlns:mc="http://schemas.openxmlformats.org/markup-compatibility/2006" xmlns="" id="{6D2C8BE0-B0D2-4978-A1B5-FFF5137A4C82}"/>
                 </a:ext>
               </a:extLst>
             </p:cNvPr>
@@ -6092,14 +6092,14 @@
             </a:solidFill>
           </p:spPr>
         </p:pic>
-        <mc:AlternateContent xmlns:mc="http://schemas.openxmlformats.org/markup-compatibility/2006">
-          <mc:Choice xmlns:a14="http://schemas.microsoft.com/office/drawing/2010/main" Requires="a14">
+        <mc:AlternateContent xmlns:mc="http://schemas.openxmlformats.org/markup-compatibility/2006" xmlns:a14="http://schemas.microsoft.com/office/drawing/2010/main">
+          <mc:Choice Requires="a14">
             <p:sp>
               <p:nvSpPr>
                 <p:cNvPr id="37" name="Rectangle 36">
                   <a:extLst>
                     <a:ext uri="{FF2B5EF4-FFF2-40B4-BE49-F238E27FC236}">
-                      <a16:creationId xmlns="" xmlns:a16="http://schemas.microsoft.com/office/drawing/2014/main" id="{2E36643D-EEA2-42A8-BBCF-DC12D9FC8BA4}"/>
+                      <a16:creationId xmlns:a16="http://schemas.microsoft.com/office/drawing/2014/main" xmlns="" id="{2E36643D-EEA2-42A8-BBCF-DC12D9FC8BA4}"/>
                     </a:ext>
                   </a:extLst>
                 </p:cNvPr>
@@ -6180,7 +6180,7 @@
               </p:txBody>
             </p:sp>
           </mc:Choice>
-          <mc:Fallback>
+          <mc:Fallback xmlns="">
             <p:sp>
               <p:nvSpPr>
                 <p:cNvPr id="37" name="Rectangle 36">
@@ -6228,14 +6228,14 @@
             </p:sp>
           </mc:Fallback>
         </mc:AlternateContent>
-        <mc:AlternateContent xmlns:mc="http://schemas.openxmlformats.org/markup-compatibility/2006">
-          <mc:Choice xmlns:a14="http://schemas.microsoft.com/office/drawing/2010/main" Requires="a14">
+        <mc:AlternateContent xmlns:mc="http://schemas.openxmlformats.org/markup-compatibility/2006" xmlns:a14="http://schemas.microsoft.com/office/drawing/2010/main">
+          <mc:Choice Requires="a14">
             <p:sp>
               <p:nvSpPr>
                 <p:cNvPr id="42" name="Rectangle 41">
                   <a:extLst>
                     <a:ext uri="{FF2B5EF4-FFF2-40B4-BE49-F238E27FC236}">
-                      <a16:creationId xmlns="" xmlns:a16="http://schemas.microsoft.com/office/drawing/2014/main" id="{2E36643D-EEA2-42A8-BBCF-DC12D9FC8BA4}"/>
+                      <a16:creationId xmlns:a16="http://schemas.microsoft.com/office/drawing/2014/main" xmlns="" id="{2E36643D-EEA2-42A8-BBCF-DC12D9FC8BA4}"/>
                     </a:ext>
                   </a:extLst>
                 </p:cNvPr>
@@ -6316,7 +6316,7 @@
               </p:txBody>
             </p:sp>
           </mc:Choice>
-          <mc:Fallback>
+          <mc:Fallback xmlns="">
             <p:sp>
               <p:nvSpPr>
                 <p:cNvPr id="42" name="Rectangle 41">
@@ -6369,7 +6369,7 @@
             <p:cNvPr id="43" name="Rectangle 42">
               <a:extLst>
                 <a:ext uri="{FF2B5EF4-FFF2-40B4-BE49-F238E27FC236}">
-                  <a16:creationId xmlns="" xmlns:mc="http://schemas.openxmlformats.org/markup-compatibility/2006" xmlns:a14="http://schemas.microsoft.com/office/drawing/2010/main" xmlns:a16="http://schemas.microsoft.com/office/drawing/2014/main" id="{6D2C8BE0-B0D2-4978-A1B5-FFF5137A4C82}"/>
+                  <a16:creationId xmlns:a16="http://schemas.microsoft.com/office/drawing/2014/main" xmlns:a14="http://schemas.microsoft.com/office/drawing/2010/main" xmlns:mc="http://schemas.openxmlformats.org/markup-compatibility/2006" xmlns="" id="{6D2C8BE0-B0D2-4978-A1B5-FFF5137A4C82}"/>
                 </a:ext>
               </a:extLst>
             </p:cNvPr>
@@ -6422,8 +6422,8 @@
             </a:p>
           </p:txBody>
         </p:sp>
-        <mc:AlternateContent xmlns:mc="http://schemas.openxmlformats.org/markup-compatibility/2006">
-          <mc:Choice xmlns:a14="http://schemas.microsoft.com/office/drawing/2010/main" Requires="a14">
+        <mc:AlternateContent xmlns:mc="http://schemas.openxmlformats.org/markup-compatibility/2006" xmlns:a14="http://schemas.microsoft.com/office/drawing/2010/main">
+          <mc:Choice Requires="a14">
             <p:sp>
               <p:nvSpPr>
                 <p:cNvPr id="23" name="Rectangle 22"/>
@@ -6555,17 +6555,7 @@
                       <a:latin typeface="Cambria Math" panose="02040503050406030204" pitchFamily="18" charset="0"/>
                       <a:ea typeface="Cambria Math" panose="02040503050406030204" pitchFamily="18" charset="0"/>
                     </a:rPr>
-                    <a:t>in the non-final EM </a:t>
-                  </a:r>
-                  <a:r>
-                    <a:rPr lang="en-US" sz="1400" dirty="0" smtClean="0">
-                      <a:solidFill>
-                        <a:schemeClr val="tx1"/>
-                      </a:solidFill>
-                      <a:latin typeface="Cambria Math" panose="02040503050406030204" pitchFamily="18" charset="0"/>
-                      <a:ea typeface="Cambria Math" panose="02040503050406030204" pitchFamily="18" charset="0"/>
-                    </a:rPr>
-                    <a:t>iterations</a:t>
+                    <a:t>in the non-final EM iterations</a:t>
                   </a:r>
                   <a:endParaRPr lang="en-US" sz="1400" dirty="0">
                     <a:solidFill>
@@ -6578,7 +6568,7 @@
               </p:txBody>
             </p:sp>
           </mc:Choice>
-          <mc:Fallback>
+          <mc:Fallback xmlns="">
             <p:sp>
               <p:nvSpPr>
                 <p:cNvPr id="23" name="Rectangle 22"/>
@@ -6733,7 +6723,7 @@
                 <p:cNvPr id="13" name="Rectangle 12">
                   <a:extLst>
                     <a:ext uri="{FF2B5EF4-FFF2-40B4-BE49-F238E27FC236}">
-                      <a16:creationId xmlns="" xmlns:a16="http://schemas.microsoft.com/office/drawing/2014/main" id="{6D2C8BE0-B0D2-4978-A1B5-FFF5137A4C82}"/>
+                      <a16:creationId xmlns:a16="http://schemas.microsoft.com/office/drawing/2014/main" xmlns="" id="{6D2C8BE0-B0D2-4978-A1B5-FFF5137A4C82}"/>
                     </a:ext>
                   </a:extLst>
                 </p:cNvPr>
@@ -6742,8 +6732,8 @@
               </p:nvSpPr>
               <p:spPr>
                 <a:xfrm>
-                  <a:off x="-532457" y="2674070"/>
-                  <a:ext cx="1790085" cy="1405857"/>
+                  <a:off x="-578156" y="2646362"/>
+                  <a:ext cx="1826066" cy="1405857"/>
                 </a:xfrm>
                 <a:prstGeom prst="rect">
                   <a:avLst/>
@@ -6784,44 +6774,40 @@
                       <a:latin typeface="Cambria Math" panose="02040503050406030204" pitchFamily="18" charset="0"/>
                       <a:ea typeface="Cambria Math" panose="02040503050406030204" pitchFamily="18" charset="0"/>
                     </a:rPr>
-                    <a:t>Estimated</a:t>
+                    <a:t>Estimated  </a:t>
                   </a:r>
-                  <a:endParaRPr lang="en-US" sz="2000" b="0" dirty="0" smtClean="0">
-                    <a:solidFill>
-                      <a:schemeClr val="tx1"/>
-                    </a:solidFill>
-                    <a:latin typeface="Cambria Math" panose="02040503050406030204" pitchFamily="18" charset="0"/>
-                    <a:ea typeface="Cambria Math" panose="02040503050406030204" pitchFamily="18" charset="0"/>
-                  </a:endParaRPr>
-                </a:p>
-                <a:p>
-                  <a:pPr algn="ctr"/>
                   <a14:m>
                     <m:oMath xmlns:m="http://schemas.openxmlformats.org/officeDocument/2006/math">
-                      <m:r>
-                        <a:rPr lang="en-US" sz="2000" b="0" i="1" smtClean="0">
-                          <a:solidFill>
-                            <a:schemeClr val="tx1"/>
-                          </a:solidFill>
-                          <a:latin typeface="Cambria Math" panose="02040503050406030204" pitchFamily="18" charset="0"/>
-                          <a:ea typeface="Cambria Math" panose="02040503050406030204" pitchFamily="18" charset="0"/>
-                        </a:rPr>
-                        <m:t> </m:t>
-                      </m:r>
-                      <m:r>
-                        <a:rPr lang="en-US" sz="2000" b="0" i="1" smtClean="0">
-                          <a:solidFill>
-                            <a:schemeClr val="tx1"/>
-                          </a:solidFill>
-                          <a:latin typeface="Cambria Math" panose="02040503050406030204" pitchFamily="18" charset="0"/>
-                          <a:ea typeface="Cambria Math" panose="02040503050406030204" pitchFamily="18" charset="0"/>
-                        </a:rPr>
-                        <m:t>𝜃</m:t>
-                      </m:r>
+                      <m:acc>
+                        <m:accPr>
+                          <m:chr m:val="̂"/>
+                          <m:ctrlPr>
+                            <a:rPr lang="en-US" sz="2000" i="1">
+                              <a:solidFill>
+                                <a:schemeClr val="tx1"/>
+                              </a:solidFill>
+                              <a:latin typeface="Cambria Math" panose="02040503050406030204" pitchFamily="18" charset="0"/>
+                              <a:ea typeface="Cambria Math" panose="02040503050406030204" pitchFamily="18" charset="0"/>
+                            </a:rPr>
+                          </m:ctrlPr>
+                        </m:accPr>
+                        <m:e>
+                          <m:r>
+                            <a:rPr lang="en-US" sz="2000" i="1">
+                              <a:solidFill>
+                                <a:schemeClr val="tx1"/>
+                              </a:solidFill>
+                              <a:latin typeface="Cambria Math" panose="02040503050406030204" pitchFamily="18" charset="0"/>
+                              <a:ea typeface="Cambria Math" panose="02040503050406030204" pitchFamily="18" charset="0"/>
+                            </a:rPr>
+                            <m:t>𝜃</m:t>
+                          </m:r>
+                        </m:e>
+                      </m:acc>
                     </m:oMath>
                   </a14:m>
                   <a:r>
-                    <a:rPr lang="en-US" sz="2000" dirty="0" smtClean="0">
+                    <a:rPr lang="en-US" sz="2000" dirty="0">
                       <a:solidFill>
                         <a:schemeClr val="tx1"/>
                       </a:solidFill>
@@ -6847,7 +6833,7 @@
                 <p:cNvPr id="13" name="Rectangle 12">
                   <a:extLst>
                     <a:ext uri="{FF2B5EF4-FFF2-40B4-BE49-F238E27FC236}">
-                      <a16:creationId xmlns="" xmlns:a16="http://schemas.microsoft.com/office/drawing/2014/main" xmlns:a14="http://schemas.microsoft.com/office/drawing/2010/main" id="{6D2C8BE0-B0D2-4978-A1B5-FFF5137A4C82}"/>
+                      <a16:creationId xmlns:a16="http://schemas.microsoft.com/office/drawing/2014/main" xmlns="" xmlns:a14="http://schemas.microsoft.com/office/drawing/2010/main" id="{6D2C8BE0-B0D2-4978-A1B5-FFF5137A4C82}"/>
                     </a:ext>
                   </a:extLst>
                 </p:cNvPr>
@@ -6858,8 +6844,8 @@
               </p:nvSpPr>
               <p:spPr>
                 <a:xfrm>
-                  <a:off x="-532457" y="2674070"/>
-                  <a:ext cx="1790085" cy="1405857"/>
+                  <a:off x="-578156" y="2646362"/>
+                  <a:ext cx="1826066" cy="1405857"/>
                 </a:xfrm>
                 <a:prstGeom prst="rect">
                   <a:avLst/>
@@ -6867,7 +6853,7 @@
                 <a:blipFill rotWithShape="0">
                   <a:blip r:embed="rId7"/>
                   <a:stretch>
-                    <a:fillRect r="-4778"/>
+                    <a:fillRect r="-3333"/>
                   </a:stretch>
                 </a:blipFill>
                 <a:ln>
@@ -6894,7 +6880,7 @@
             <p:cNvPr id="39" name="Rectangle 38">
               <a:extLst>
                 <a:ext uri="{FF2B5EF4-FFF2-40B4-BE49-F238E27FC236}">
-                  <a16:creationId xmlns="" xmlns:mc="http://schemas.openxmlformats.org/markup-compatibility/2006" xmlns:a14="http://schemas.microsoft.com/office/drawing/2010/main" xmlns:a16="http://schemas.microsoft.com/office/drawing/2014/main" id="{6D2C8BE0-B0D2-4978-A1B5-FFF5137A4C82}"/>
+                  <a16:creationId xmlns:a16="http://schemas.microsoft.com/office/drawing/2014/main" xmlns:a14="http://schemas.microsoft.com/office/drawing/2010/main" xmlns:mc="http://schemas.openxmlformats.org/markup-compatibility/2006" xmlns="" id="{6D2C8BE0-B0D2-4978-A1B5-FFF5137A4C82}"/>
                 </a:ext>
               </a:extLst>
             </p:cNvPr>
@@ -6965,7 +6951,7 @@
             <p:cNvPr id="40" name="Rectangle 39">
               <a:extLst>
                 <a:ext uri="{FF2B5EF4-FFF2-40B4-BE49-F238E27FC236}">
-                  <a16:creationId xmlns="" xmlns:mc="http://schemas.openxmlformats.org/markup-compatibility/2006" xmlns:a14="http://schemas.microsoft.com/office/drawing/2010/main" xmlns:a16="http://schemas.microsoft.com/office/drawing/2014/main" id="{6D2C8BE0-B0D2-4978-A1B5-FFF5137A4C82}"/>
+                  <a16:creationId xmlns:a16="http://schemas.microsoft.com/office/drawing/2014/main" xmlns:a14="http://schemas.microsoft.com/office/drawing/2010/main" xmlns:mc="http://schemas.openxmlformats.org/markup-compatibility/2006" xmlns="" id="{6D2C8BE0-B0D2-4978-A1B5-FFF5137A4C82}"/>
                 </a:ext>
               </a:extLst>
             </p:cNvPr>
@@ -7117,2062 +7103,2087 @@
           <a:chExt cx="0" cy="0"/>
         </a:xfrm>
       </p:grpSpPr>
-      <p:sp>
-        <p:nvSpPr>
-          <p:cNvPr id="33" name="Rectangle 32">
-            <a:extLst>
-              <a:ext uri="{FF2B5EF4-FFF2-40B4-BE49-F238E27FC236}">
-                <a16:creationId xmlns="" xmlns:mc="http://schemas.openxmlformats.org/markup-compatibility/2006" xmlns:a14="http://schemas.microsoft.com/office/drawing/2010/main" xmlns:a16="http://schemas.microsoft.com/office/drawing/2014/main" id="{6D2C8BE0-B0D2-4978-A1B5-FFF5137A4C82}"/>
-              </a:ext>
-            </a:extLst>
-          </p:cNvPr>
-          <p:cNvSpPr/>
+      <p:grpSp>
+        <p:nvGrpSpPr>
+          <p:cNvPr id="3" name="Group 2"/>
+          <p:cNvGrpSpPr/>
           <p:nvPr/>
-        </p:nvSpPr>
-        <p:spPr>
+        </p:nvGrpSpPr>
+        <p:grpSpPr>
           <a:xfrm>
             <a:off x="-695669" y="624583"/>
             <a:ext cx="13866724" cy="5351343"/>
+            <a:chOff x="-695669" y="624583"/>
+            <a:chExt cx="13866724" cy="5351343"/>
           </a:xfrm>
-          <a:prstGeom prst="rect">
-            <a:avLst/>
-          </a:prstGeom>
-          <a:solidFill>
-            <a:schemeClr val="bg1"/>
-          </a:solidFill>
-          <a:ln>
-            <a:noFill/>
-          </a:ln>
-        </p:spPr>
-        <p:style>
-          <a:lnRef idx="2">
-            <a:schemeClr val="accent1">
-              <a:shade val="50000"/>
-            </a:schemeClr>
-          </a:lnRef>
-          <a:fillRef idx="1">
-            <a:schemeClr val="accent1"/>
-          </a:fillRef>
-          <a:effectRef idx="0">
-            <a:schemeClr val="accent1"/>
-          </a:effectRef>
-          <a:fontRef idx="minor">
-            <a:schemeClr val="lt1"/>
-          </a:fontRef>
-        </p:style>
-        <p:txBody>
-          <a:bodyPr rtlCol="0" anchor="ctr"/>
-          <a:lstStyle/>
-          <a:p>
-            <a:pPr algn="ctr"/>
-            <a:endParaRPr lang="en-US" sz="2000" dirty="0" smtClean="0">
-              <a:solidFill>
-                <a:schemeClr val="tx1"/>
-              </a:solidFill>
-              <a:latin typeface="Cambria Math" panose="02040503050406030204" pitchFamily="18" charset="0"/>
-              <a:ea typeface="Cambria Math" panose="02040503050406030204" pitchFamily="18" charset="0"/>
-            </a:endParaRPr>
-          </a:p>
-        </p:txBody>
-      </p:sp>
-      <p:sp>
-        <p:nvSpPr>
-          <p:cNvPr id="2" name="Rectangle 1"/>
-          <p:cNvSpPr/>
-          <p:nvPr/>
-        </p:nvSpPr>
-        <p:spPr>
-          <a:xfrm>
-            <a:off x="-92015" y="1049325"/>
-            <a:ext cx="12284015" cy="4675517"/>
-          </a:xfrm>
-          <a:prstGeom prst="rect">
-            <a:avLst/>
-          </a:prstGeom>
-          <a:solidFill>
-            <a:schemeClr val="bg1"/>
-          </a:solidFill>
-          <a:ln>
+        </p:grpSpPr>
+        <p:sp>
+          <p:nvSpPr>
+            <p:cNvPr id="33" name="Rectangle 32">
+              <a:extLst>
+                <a:ext uri="{FF2B5EF4-FFF2-40B4-BE49-F238E27FC236}">
+                  <a16:creationId xmlns:a16="http://schemas.microsoft.com/office/drawing/2014/main" xmlns:a14="http://schemas.microsoft.com/office/drawing/2010/main" xmlns:mc="http://schemas.openxmlformats.org/markup-compatibility/2006" xmlns="" id="{6D2C8BE0-B0D2-4978-A1B5-FFF5137A4C82}"/>
+                </a:ext>
+              </a:extLst>
+            </p:cNvPr>
+            <p:cNvSpPr/>
+            <p:nvPr/>
+          </p:nvSpPr>
+          <p:spPr>
+            <a:xfrm>
+              <a:off x="-695669" y="624583"/>
+              <a:ext cx="13866724" cy="5351343"/>
+            </a:xfrm>
+            <a:prstGeom prst="rect">
+              <a:avLst/>
+            </a:prstGeom>
             <a:solidFill>
               <a:schemeClr val="bg1"/>
             </a:solidFill>
-          </a:ln>
-        </p:spPr>
-        <p:style>
-          <a:lnRef idx="2">
-            <a:schemeClr val="accent1">
-              <a:shade val="50000"/>
-            </a:schemeClr>
-          </a:lnRef>
-          <a:fillRef idx="1">
-            <a:schemeClr val="accent1"/>
-          </a:fillRef>
-          <a:effectRef idx="0">
-            <a:schemeClr val="accent1"/>
-          </a:effectRef>
-          <a:fontRef idx="minor">
-            <a:schemeClr val="lt1"/>
-          </a:fontRef>
-        </p:style>
-        <p:txBody>
-          <a:bodyPr rtlCol="0" anchor="ctr"/>
-          <a:lstStyle/>
-          <a:p>
-            <a:pPr algn="ctr"/>
-            <a:endParaRPr lang="en-US"/>
-          </a:p>
-        </p:txBody>
-      </p:sp>
-      <p:sp>
-        <p:nvSpPr>
-          <p:cNvPr id="45" name="Oval 44"/>
-          <p:cNvSpPr/>
-          <p:nvPr/>
-        </p:nvSpPr>
-        <p:spPr>
-          <a:xfrm>
-            <a:off x="2131075" y="4632487"/>
-            <a:ext cx="328566" cy="291486"/>
-          </a:xfrm>
-          <a:prstGeom prst="ellipse">
-            <a:avLst/>
-          </a:prstGeom>
-          <a:solidFill>
-            <a:schemeClr val="bg1"/>
-          </a:solidFill>
-          <a:ln w="38100">
-            <a:solidFill>
-              <a:schemeClr val="tx1"/>
-            </a:solidFill>
-          </a:ln>
-        </p:spPr>
-        <p:style>
-          <a:lnRef idx="2">
-            <a:schemeClr val="accent1">
-              <a:shade val="50000"/>
-            </a:schemeClr>
-          </a:lnRef>
-          <a:fillRef idx="1">
-            <a:schemeClr val="accent1"/>
-          </a:fillRef>
-          <a:effectRef idx="0">
-            <a:schemeClr val="accent1"/>
-          </a:effectRef>
-          <a:fontRef idx="minor">
-            <a:schemeClr val="lt1"/>
-          </a:fontRef>
-        </p:style>
-        <p:txBody>
-          <a:bodyPr rtlCol="0" anchor="ctr"/>
-          <a:lstStyle/>
-          <a:p>
-            <a:pPr algn="ctr"/>
-            <a:r>
-              <a:rPr lang="en-US" b="1" dirty="0" smtClean="0">
-                <a:solidFill>
-                  <a:schemeClr val="tx1"/>
-                </a:solidFill>
-              </a:rPr>
-              <a:t>C</a:t>
-            </a:r>
-            <a:endParaRPr lang="en-US" b="1" dirty="0">
-              <a:solidFill>
-                <a:schemeClr val="tx1"/>
-              </a:solidFill>
-            </a:endParaRPr>
-          </a:p>
-        </p:txBody>
-      </p:sp>
-      <p:sp>
-        <p:nvSpPr>
-          <p:cNvPr id="46" name="Rectangle 45">
-            <a:extLst>
-              <a:ext uri="{FF2B5EF4-FFF2-40B4-BE49-F238E27FC236}">
-                <a16:creationId xmlns="" xmlns:mc="http://schemas.openxmlformats.org/markup-compatibility/2006" xmlns:a14="http://schemas.microsoft.com/office/drawing/2010/main" xmlns:a16="http://schemas.microsoft.com/office/drawing/2014/main" id="{2E36643D-EEA2-42A8-BBCF-DC12D9FC8BA4}"/>
-              </a:ext>
-            </a:extLst>
-          </p:cNvPr>
-          <p:cNvSpPr/>
-          <p:nvPr/>
-        </p:nvSpPr>
-        <p:spPr>
-          <a:xfrm>
-            <a:off x="4786384" y="4222836"/>
-            <a:ext cx="2744576" cy="253156"/>
-          </a:xfrm>
-          <a:prstGeom prst="rect">
-            <a:avLst/>
-          </a:prstGeom>
-          <a:solidFill>
-            <a:schemeClr val="bg1"/>
-          </a:solidFill>
-          <a:ln>
-            <a:noFill/>
-          </a:ln>
-        </p:spPr>
-        <p:style>
-          <a:lnRef idx="2">
-            <a:schemeClr val="accent1">
-              <a:shade val="50000"/>
-            </a:schemeClr>
-          </a:lnRef>
-          <a:fillRef idx="1">
-            <a:schemeClr val="accent1"/>
-          </a:fillRef>
-          <a:effectRef idx="0">
-            <a:schemeClr val="accent1"/>
-          </a:effectRef>
-          <a:fontRef idx="minor">
-            <a:schemeClr val="lt1"/>
-          </a:fontRef>
-        </p:style>
-        <p:txBody>
-          <a:bodyPr rtlCol="0" anchor="ctr"/>
-          <a:lstStyle/>
-          <a:p>
-            <a:pPr algn="ctr"/>
-            <a:endParaRPr lang="en-US" sz="1200" dirty="0">
-              <a:solidFill>
-                <a:schemeClr val="tx1"/>
-              </a:solidFill>
-              <a:latin typeface="Cambria Math" panose="02040503050406030204" pitchFamily="18" charset="0"/>
-              <a:ea typeface="Cambria Math" panose="02040503050406030204" pitchFamily="18" charset="0"/>
-            </a:endParaRPr>
-          </a:p>
-        </p:txBody>
-      </p:sp>
-      <p:sp>
-        <p:nvSpPr>
-          <p:cNvPr id="47" name="Rectangle 46">
-            <a:extLst>
-              <a:ext uri="{FF2B5EF4-FFF2-40B4-BE49-F238E27FC236}">
-                <a16:creationId xmlns="" xmlns:mc="http://schemas.openxmlformats.org/markup-compatibility/2006" xmlns:a14="http://schemas.microsoft.com/office/drawing/2010/main" xmlns:a16="http://schemas.microsoft.com/office/drawing/2014/main" id="{2E36643D-EEA2-42A8-BBCF-DC12D9FC8BA4}"/>
-              </a:ext>
-            </a:extLst>
-          </p:cNvPr>
-          <p:cNvSpPr/>
-          <p:nvPr/>
-        </p:nvSpPr>
-        <p:spPr>
-          <a:xfrm>
-            <a:off x="7120967" y="4297608"/>
-            <a:ext cx="2687737" cy="928954"/>
-          </a:xfrm>
-          <a:prstGeom prst="rect">
-            <a:avLst/>
-          </a:prstGeom>
-          <a:solidFill>
-            <a:schemeClr val="bg1"/>
-          </a:solidFill>
-          <a:ln>
-            <a:noFill/>
-          </a:ln>
-        </p:spPr>
-        <p:style>
-          <a:lnRef idx="2">
-            <a:schemeClr val="accent1">
-              <a:shade val="50000"/>
-            </a:schemeClr>
-          </a:lnRef>
-          <a:fillRef idx="1">
-            <a:schemeClr val="accent1"/>
-          </a:fillRef>
-          <a:effectRef idx="0">
-            <a:schemeClr val="accent1"/>
-          </a:effectRef>
-          <a:fontRef idx="minor">
-            <a:schemeClr val="lt1"/>
-          </a:fontRef>
-        </p:style>
-        <p:txBody>
-          <a:bodyPr rtlCol="0" anchor="ctr"/>
-          <a:lstStyle/>
-          <a:p>
-            <a:pPr algn="ctr"/>
-            <a:r>
-              <a:rPr lang="en-US" sz="1200" dirty="0" smtClean="0">
+            <a:ln>
+              <a:noFill/>
+            </a:ln>
+          </p:spPr>
+          <p:style>
+            <a:lnRef idx="2">
+              <a:schemeClr val="accent1">
+                <a:shade val="50000"/>
+              </a:schemeClr>
+            </a:lnRef>
+            <a:fillRef idx="1">
+              <a:schemeClr val="accent1"/>
+            </a:fillRef>
+            <a:effectRef idx="0">
+              <a:schemeClr val="accent1"/>
+            </a:effectRef>
+            <a:fontRef idx="minor">
+              <a:schemeClr val="lt1"/>
+            </a:fontRef>
+          </p:style>
+          <p:txBody>
+            <a:bodyPr rtlCol="0" anchor="ctr"/>
+            <a:lstStyle/>
+            <a:p>
+              <a:pPr algn="ctr"/>
+              <a:endParaRPr lang="en-US" sz="2000" dirty="0" smtClean="0">
                 <a:solidFill>
                   <a:schemeClr val="tx1"/>
                 </a:solidFill>
                 <a:latin typeface="Cambria Math" panose="02040503050406030204" pitchFamily="18" charset="0"/>
                 <a:ea typeface="Cambria Math" panose="02040503050406030204" pitchFamily="18" charset="0"/>
-              </a:rPr>
-              <a:t>EM Iterations</a:t>
-            </a:r>
-            <a:endParaRPr lang="en-US" sz="1200" dirty="0">
+              </a:endParaRPr>
+            </a:p>
+          </p:txBody>
+        </p:sp>
+        <p:sp>
+          <p:nvSpPr>
+            <p:cNvPr id="2" name="Rectangle 1"/>
+            <p:cNvSpPr/>
+            <p:nvPr/>
+          </p:nvSpPr>
+          <p:spPr>
+            <a:xfrm>
+              <a:off x="-92015" y="1049325"/>
+              <a:ext cx="12284015" cy="4675517"/>
+            </a:xfrm>
+            <a:prstGeom prst="rect">
+              <a:avLst/>
+            </a:prstGeom>
+            <a:solidFill>
+              <a:schemeClr val="bg1"/>
+            </a:solidFill>
+            <a:ln>
+              <a:solidFill>
+                <a:schemeClr val="bg1"/>
+              </a:solidFill>
+            </a:ln>
+          </p:spPr>
+          <p:style>
+            <a:lnRef idx="2">
+              <a:schemeClr val="accent1">
+                <a:shade val="50000"/>
+              </a:schemeClr>
+            </a:lnRef>
+            <a:fillRef idx="1">
+              <a:schemeClr val="accent1"/>
+            </a:fillRef>
+            <a:effectRef idx="0">
+              <a:schemeClr val="accent1"/>
+            </a:effectRef>
+            <a:fontRef idx="minor">
+              <a:schemeClr val="lt1"/>
+            </a:fontRef>
+          </p:style>
+          <p:txBody>
+            <a:bodyPr rtlCol="0" anchor="ctr"/>
+            <a:lstStyle/>
+            <a:p>
+              <a:pPr algn="ctr"/>
+              <a:endParaRPr lang="en-US"/>
+            </a:p>
+          </p:txBody>
+        </p:sp>
+        <p:sp>
+          <p:nvSpPr>
+            <p:cNvPr id="45" name="Oval 44"/>
+            <p:cNvSpPr/>
+            <p:nvPr/>
+          </p:nvSpPr>
+          <p:spPr>
+            <a:xfrm>
+              <a:off x="2131075" y="4632487"/>
+              <a:ext cx="328566" cy="291486"/>
+            </a:xfrm>
+            <a:prstGeom prst="ellipse">
+              <a:avLst/>
+            </a:prstGeom>
+            <a:solidFill>
+              <a:schemeClr val="bg1"/>
+            </a:solidFill>
+            <a:ln w="38100">
               <a:solidFill>
                 <a:schemeClr val="tx1"/>
               </a:solidFill>
-              <a:latin typeface="Cambria Math" panose="02040503050406030204" pitchFamily="18" charset="0"/>
-              <a:ea typeface="Cambria Math" panose="02040503050406030204" pitchFamily="18" charset="0"/>
-            </a:endParaRPr>
-          </a:p>
-        </p:txBody>
-      </p:sp>
-      <p:sp>
-        <p:nvSpPr>
-          <p:cNvPr id="48" name="Rectangle 47">
-            <a:extLst>
-              <a:ext uri="{FF2B5EF4-FFF2-40B4-BE49-F238E27FC236}">
-                <a16:creationId xmlns="" xmlns:mc="http://schemas.openxmlformats.org/markup-compatibility/2006" xmlns:a14="http://schemas.microsoft.com/office/drawing/2010/main" xmlns:a16="http://schemas.microsoft.com/office/drawing/2014/main" id="{2E36643D-EEA2-42A8-BBCF-DC12D9FC8BA4}"/>
-              </a:ext>
-            </a:extLst>
-          </p:cNvPr>
-          <p:cNvSpPr/>
-          <p:nvPr/>
-        </p:nvSpPr>
-        <p:spPr>
-          <a:xfrm>
-            <a:off x="2629607" y="5277481"/>
-            <a:ext cx="2024961" cy="287389"/>
-          </a:xfrm>
-          <a:prstGeom prst="rect">
-            <a:avLst/>
-          </a:prstGeom>
-          <a:solidFill>
-            <a:schemeClr val="bg1"/>
-          </a:solidFill>
-          <a:ln>
-            <a:noFill/>
-          </a:ln>
-        </p:spPr>
-        <p:style>
-          <a:lnRef idx="2">
-            <a:schemeClr val="accent1">
-              <a:shade val="50000"/>
-            </a:schemeClr>
-          </a:lnRef>
-          <a:fillRef idx="1">
-            <a:schemeClr val="accent1"/>
-          </a:fillRef>
-          <a:effectRef idx="0">
-            <a:schemeClr val="accent1"/>
-          </a:effectRef>
-          <a:fontRef idx="minor">
-            <a:schemeClr val="lt1"/>
-          </a:fontRef>
-        </p:style>
-        <p:txBody>
-          <a:bodyPr rtlCol="0" anchor="ctr"/>
-          <a:lstStyle/>
-          <a:p>
-            <a:pPr algn="ctr"/>
-            <a:r>
-              <a:rPr lang="en-GB" sz="1400" dirty="0">
+            </a:ln>
+          </p:spPr>
+          <p:style>
+            <a:lnRef idx="2">
+              <a:schemeClr val="accent1">
+                <a:shade val="50000"/>
+              </a:schemeClr>
+            </a:lnRef>
+            <a:fillRef idx="1">
+              <a:schemeClr val="accent1"/>
+            </a:fillRef>
+            <a:effectRef idx="0">
+              <a:schemeClr val="accent1"/>
+            </a:effectRef>
+            <a:fontRef idx="minor">
+              <a:schemeClr val="lt1"/>
+            </a:fontRef>
+          </p:style>
+          <p:txBody>
+            <a:bodyPr rtlCol="0" anchor="ctr"/>
+            <a:lstStyle/>
+            <a:p>
+              <a:pPr algn="ctr"/>
+              <a:r>
+                <a:rPr lang="en-US" b="1" dirty="0" smtClean="0">
+                  <a:solidFill>
+                    <a:schemeClr val="tx1"/>
+                  </a:solidFill>
+                </a:rPr>
+                <a:t>C</a:t>
+              </a:r>
+              <a:endParaRPr lang="en-US" b="1" dirty="0">
+                <a:solidFill>
+                  <a:schemeClr val="tx1"/>
+                </a:solidFill>
+              </a:endParaRPr>
+            </a:p>
+          </p:txBody>
+        </p:sp>
+        <p:sp>
+          <p:nvSpPr>
+            <p:cNvPr id="46" name="Rectangle 45">
+              <a:extLst>
+                <a:ext uri="{FF2B5EF4-FFF2-40B4-BE49-F238E27FC236}">
+                  <a16:creationId xmlns:a16="http://schemas.microsoft.com/office/drawing/2014/main" xmlns:a14="http://schemas.microsoft.com/office/drawing/2010/main" xmlns:mc="http://schemas.openxmlformats.org/markup-compatibility/2006" xmlns="" id="{2E36643D-EEA2-42A8-BBCF-DC12D9FC8BA4}"/>
+                </a:ext>
+              </a:extLst>
+            </p:cNvPr>
+            <p:cNvSpPr/>
+            <p:nvPr/>
+          </p:nvSpPr>
+          <p:spPr>
+            <a:xfrm>
+              <a:off x="4786384" y="4222836"/>
+              <a:ext cx="2744576" cy="253156"/>
+            </a:xfrm>
+            <a:prstGeom prst="rect">
+              <a:avLst/>
+            </a:prstGeom>
+            <a:solidFill>
+              <a:schemeClr val="bg1"/>
+            </a:solidFill>
+            <a:ln>
+              <a:noFill/>
+            </a:ln>
+          </p:spPr>
+          <p:style>
+            <a:lnRef idx="2">
+              <a:schemeClr val="accent1">
+                <a:shade val="50000"/>
+              </a:schemeClr>
+            </a:lnRef>
+            <a:fillRef idx="1">
+              <a:schemeClr val="accent1"/>
+            </a:fillRef>
+            <a:effectRef idx="0">
+              <a:schemeClr val="accent1"/>
+            </a:effectRef>
+            <a:fontRef idx="minor">
+              <a:schemeClr val="lt1"/>
+            </a:fontRef>
+          </p:style>
+          <p:txBody>
+            <a:bodyPr rtlCol="0" anchor="ctr"/>
+            <a:lstStyle/>
+            <a:p>
+              <a:pPr algn="ctr"/>
+              <a:endParaRPr lang="en-US" sz="1200" dirty="0">
                 <a:solidFill>
                   <a:schemeClr val="tx1"/>
                 </a:solidFill>
                 <a:latin typeface="Cambria Math" panose="02040503050406030204" pitchFamily="18" charset="0"/>
                 <a:ea typeface="Cambria Math" panose="02040503050406030204" pitchFamily="18" charset="0"/>
-              </a:rPr>
-              <a:t>EM Iterations</a:t>
-            </a:r>
-            <a:endParaRPr lang="en-US" sz="1400" dirty="0">
-              <a:solidFill>
-                <a:schemeClr val="tx1"/>
-              </a:solidFill>
-              <a:latin typeface="Cambria Math" panose="02040503050406030204" pitchFamily="18" charset="0"/>
-              <a:ea typeface="Cambria Math" panose="02040503050406030204" pitchFamily="18" charset="0"/>
-            </a:endParaRPr>
-          </a:p>
-        </p:txBody>
-      </p:sp>
-      <p:sp>
-        <p:nvSpPr>
-          <p:cNvPr id="49" name="Rectangle 48">
-            <a:extLst>
-              <a:ext uri="{FF2B5EF4-FFF2-40B4-BE49-F238E27FC236}">
-                <a16:creationId xmlns="" xmlns:mc="http://schemas.openxmlformats.org/markup-compatibility/2006" xmlns:a14="http://schemas.microsoft.com/office/drawing/2010/main" xmlns:a16="http://schemas.microsoft.com/office/drawing/2014/main" id="{2E36643D-EEA2-42A8-BBCF-DC12D9FC8BA4}"/>
-              </a:ext>
-            </a:extLst>
-          </p:cNvPr>
-          <p:cNvSpPr/>
-          <p:nvPr/>
-        </p:nvSpPr>
-        <p:spPr>
-          <a:xfrm>
-            <a:off x="7881159" y="5277481"/>
-            <a:ext cx="2024961" cy="287389"/>
-          </a:xfrm>
-          <a:prstGeom prst="rect">
-            <a:avLst/>
-          </a:prstGeom>
-          <a:solidFill>
-            <a:schemeClr val="bg1"/>
-          </a:solidFill>
-          <a:ln>
-            <a:noFill/>
-          </a:ln>
-        </p:spPr>
-        <p:style>
-          <a:lnRef idx="2">
-            <a:schemeClr val="accent1">
-              <a:shade val="50000"/>
-            </a:schemeClr>
-          </a:lnRef>
-          <a:fillRef idx="1">
-            <a:schemeClr val="accent1"/>
-          </a:fillRef>
-          <a:effectRef idx="0">
-            <a:schemeClr val="accent1"/>
-          </a:effectRef>
-          <a:fontRef idx="minor">
-            <a:schemeClr val="lt1"/>
-          </a:fontRef>
-        </p:style>
-        <p:txBody>
-          <a:bodyPr rtlCol="0" anchor="ctr"/>
-          <a:lstStyle/>
-          <a:p>
-            <a:pPr algn="ctr"/>
-            <a:r>
-              <a:rPr lang="en-GB" sz="1400" dirty="0" smtClean="0">
+              </a:endParaRPr>
+            </a:p>
+          </p:txBody>
+        </p:sp>
+        <p:sp>
+          <p:nvSpPr>
+            <p:cNvPr id="47" name="Rectangle 46">
+              <a:extLst>
+                <a:ext uri="{FF2B5EF4-FFF2-40B4-BE49-F238E27FC236}">
+                  <a16:creationId xmlns:a16="http://schemas.microsoft.com/office/drawing/2014/main" xmlns:a14="http://schemas.microsoft.com/office/drawing/2010/main" xmlns:mc="http://schemas.openxmlformats.org/markup-compatibility/2006" xmlns="" id="{2E36643D-EEA2-42A8-BBCF-DC12D9FC8BA4}"/>
+                </a:ext>
+              </a:extLst>
+            </p:cNvPr>
+            <p:cNvSpPr/>
+            <p:nvPr/>
+          </p:nvSpPr>
+          <p:spPr>
+            <a:xfrm>
+              <a:off x="7120967" y="4297608"/>
+              <a:ext cx="2687737" cy="928954"/>
+            </a:xfrm>
+            <a:prstGeom prst="rect">
+              <a:avLst/>
+            </a:prstGeom>
+            <a:solidFill>
+              <a:schemeClr val="bg1"/>
+            </a:solidFill>
+            <a:ln>
+              <a:noFill/>
+            </a:ln>
+          </p:spPr>
+          <p:style>
+            <a:lnRef idx="2">
+              <a:schemeClr val="accent1">
+                <a:shade val="50000"/>
+              </a:schemeClr>
+            </a:lnRef>
+            <a:fillRef idx="1">
+              <a:schemeClr val="accent1"/>
+            </a:fillRef>
+            <a:effectRef idx="0">
+              <a:schemeClr val="accent1"/>
+            </a:effectRef>
+            <a:fontRef idx="minor">
+              <a:schemeClr val="lt1"/>
+            </a:fontRef>
+          </p:style>
+          <p:txBody>
+            <a:bodyPr rtlCol="0" anchor="ctr"/>
+            <a:lstStyle/>
+            <a:p>
+              <a:pPr algn="ctr"/>
+              <a:r>
+                <a:rPr lang="en-US" sz="1200" dirty="0" smtClean="0">
+                  <a:solidFill>
+                    <a:schemeClr val="tx1"/>
+                  </a:solidFill>
+                  <a:latin typeface="Cambria Math" panose="02040503050406030204" pitchFamily="18" charset="0"/>
+                  <a:ea typeface="Cambria Math" panose="02040503050406030204" pitchFamily="18" charset="0"/>
+                </a:rPr>
+                <a:t>EM Iterations</a:t>
+              </a:r>
+              <a:endParaRPr lang="en-US" sz="1200" dirty="0">
                 <a:solidFill>
                   <a:schemeClr val="tx1"/>
                 </a:solidFill>
                 <a:latin typeface="Cambria Math" panose="02040503050406030204" pitchFamily="18" charset="0"/>
                 <a:ea typeface="Cambria Math" panose="02040503050406030204" pitchFamily="18" charset="0"/>
-              </a:rPr>
-              <a:t>EM Iterations</a:t>
-            </a:r>
-            <a:endParaRPr lang="en-US" sz="1400" dirty="0">
-              <a:solidFill>
-                <a:schemeClr val="tx1"/>
-              </a:solidFill>
-              <a:latin typeface="Cambria Math" panose="02040503050406030204" pitchFamily="18" charset="0"/>
-              <a:ea typeface="Cambria Math" panose="02040503050406030204" pitchFamily="18" charset="0"/>
-            </a:endParaRPr>
-          </a:p>
-        </p:txBody>
-      </p:sp>
-      <p:sp>
-        <p:nvSpPr>
-          <p:cNvPr id="50" name="Rectangle 49">
-            <a:extLst>
-              <a:ext uri="{FF2B5EF4-FFF2-40B4-BE49-F238E27FC236}">
-                <a16:creationId xmlns="" xmlns:mc="http://schemas.openxmlformats.org/markup-compatibility/2006" xmlns:a14="http://schemas.microsoft.com/office/drawing/2010/main" xmlns:a16="http://schemas.microsoft.com/office/drawing/2014/main" id="{6D2C8BE0-B0D2-4978-A1B5-FFF5137A4C82}"/>
-              </a:ext>
-            </a:extLst>
-          </p:cNvPr>
-          <p:cNvSpPr/>
-          <p:nvPr/>
-        </p:nvSpPr>
-        <p:spPr>
-          <a:xfrm>
-            <a:off x="6073066" y="2282286"/>
-            <a:ext cx="380163" cy="2198021"/>
-          </a:xfrm>
-          <a:prstGeom prst="rect">
-            <a:avLst/>
-          </a:prstGeom>
-          <a:solidFill>
-            <a:schemeClr val="bg1"/>
-          </a:solidFill>
-          <a:ln>
-            <a:noFill/>
-          </a:ln>
-        </p:spPr>
-        <p:style>
-          <a:lnRef idx="2">
-            <a:schemeClr val="accent1">
-              <a:shade val="50000"/>
-            </a:schemeClr>
-          </a:lnRef>
-          <a:fillRef idx="1">
-            <a:schemeClr val="accent1"/>
-          </a:fillRef>
-          <a:effectRef idx="0">
-            <a:schemeClr val="accent1"/>
-          </a:effectRef>
-          <a:fontRef idx="minor">
-            <a:schemeClr val="lt1"/>
-          </a:fontRef>
-        </p:style>
-        <p:txBody>
-          <a:bodyPr rtlCol="0" anchor="ctr"/>
-          <a:lstStyle/>
-          <a:p>
-            <a:pPr algn="ctr"/>
-            <a:endParaRPr lang="en-US" sz="1400" dirty="0" smtClean="0">
-              <a:solidFill>
-                <a:schemeClr val="tx1"/>
-              </a:solidFill>
-              <a:latin typeface="Cambria Math" panose="02040503050406030204" pitchFamily="18" charset="0"/>
-              <a:ea typeface="Cambria Math" panose="02040503050406030204" pitchFamily="18" charset="0"/>
-            </a:endParaRPr>
-          </a:p>
-        </p:txBody>
-      </p:sp>
-      <p:sp>
-        <p:nvSpPr>
-          <p:cNvPr id="53" name="Rectangle 52">
-            <a:extLst>
-              <a:ext uri="{FF2B5EF4-FFF2-40B4-BE49-F238E27FC236}">
-                <a16:creationId xmlns="" xmlns:mc="http://schemas.openxmlformats.org/markup-compatibility/2006" xmlns:a14="http://schemas.microsoft.com/office/drawing/2010/main" xmlns:a16="http://schemas.microsoft.com/office/drawing/2014/main" id="{2E36643D-EEA2-42A8-BBCF-DC12D9FC8BA4}"/>
-              </a:ext>
-            </a:extLst>
-          </p:cNvPr>
-          <p:cNvSpPr/>
-          <p:nvPr/>
-        </p:nvSpPr>
-        <p:spPr>
-          <a:xfrm>
-            <a:off x="4471253" y="4451932"/>
-            <a:ext cx="1336831" cy="666750"/>
-          </a:xfrm>
-          <a:prstGeom prst="rect">
-            <a:avLst/>
-          </a:prstGeom>
-          <a:solidFill>
-            <a:schemeClr val="bg1"/>
-          </a:solidFill>
-          <a:ln>
-            <a:noFill/>
-          </a:ln>
-        </p:spPr>
-        <p:style>
-          <a:lnRef idx="2">
-            <a:schemeClr val="accent1">
-              <a:shade val="50000"/>
-            </a:schemeClr>
-          </a:lnRef>
-          <a:fillRef idx="1">
-            <a:schemeClr val="accent1"/>
-          </a:fillRef>
-          <a:effectRef idx="0">
-            <a:schemeClr val="accent1"/>
-          </a:effectRef>
-          <a:fontRef idx="minor">
-            <a:schemeClr val="lt1"/>
-          </a:fontRef>
-        </p:style>
-        <p:txBody>
-          <a:bodyPr rtlCol="0" anchor="ctr"/>
-          <a:lstStyle/>
-          <a:p>
-            <a:pPr algn="ctr"/>
-            <a:endParaRPr lang="en-US" sz="1400" dirty="0">
-              <a:solidFill>
-                <a:schemeClr val="tx1"/>
-              </a:solidFill>
-              <a:latin typeface="Cambria Math" panose="02040503050406030204" pitchFamily="18" charset="0"/>
-              <a:ea typeface="Cambria Math" panose="02040503050406030204" pitchFamily="18" charset="0"/>
-            </a:endParaRPr>
-          </a:p>
-        </p:txBody>
-      </p:sp>
-      <p:sp>
-        <p:nvSpPr>
-          <p:cNvPr id="54" name="Rectangle 53">
-            <a:extLst>
-              <a:ext uri="{FF2B5EF4-FFF2-40B4-BE49-F238E27FC236}">
-                <a16:creationId xmlns="" xmlns:mc="http://schemas.openxmlformats.org/markup-compatibility/2006" xmlns:a14="http://schemas.microsoft.com/office/drawing/2010/main" xmlns:a16="http://schemas.microsoft.com/office/drawing/2014/main" id="{2E36643D-EEA2-42A8-BBCF-DC12D9FC8BA4}"/>
-              </a:ext>
-            </a:extLst>
-          </p:cNvPr>
-          <p:cNvSpPr/>
-          <p:nvPr/>
-        </p:nvSpPr>
-        <p:spPr>
-          <a:xfrm>
-            <a:off x="9784686" y="4451932"/>
-            <a:ext cx="1336831" cy="666750"/>
-          </a:xfrm>
-          <a:prstGeom prst="rect">
-            <a:avLst/>
-          </a:prstGeom>
-          <a:solidFill>
-            <a:schemeClr val="bg1"/>
-          </a:solidFill>
-          <a:ln>
-            <a:noFill/>
-          </a:ln>
-        </p:spPr>
-        <p:style>
-          <a:lnRef idx="2">
-            <a:schemeClr val="accent1">
-              <a:shade val="50000"/>
-            </a:schemeClr>
-          </a:lnRef>
-          <a:fillRef idx="1">
-            <a:schemeClr val="accent1"/>
-          </a:fillRef>
-          <a:effectRef idx="0">
-            <a:schemeClr val="accent1"/>
-          </a:effectRef>
-          <a:fontRef idx="minor">
-            <a:schemeClr val="lt1"/>
-          </a:fontRef>
-        </p:style>
-        <p:txBody>
-          <a:bodyPr rtlCol="0" anchor="ctr"/>
-          <a:lstStyle/>
-          <a:p>
-            <a:pPr algn="ctr"/>
-            <a:endParaRPr lang="en-US" sz="1400" dirty="0">
-              <a:solidFill>
-                <a:schemeClr val="tx1"/>
-              </a:solidFill>
-              <a:latin typeface="Cambria Math" panose="02040503050406030204" pitchFamily="18" charset="0"/>
-              <a:ea typeface="Cambria Math" panose="02040503050406030204" pitchFamily="18" charset="0"/>
-            </a:endParaRPr>
-          </a:p>
-        </p:txBody>
-      </p:sp>
-      <p:pic>
-        <p:nvPicPr>
-          <p:cNvPr id="55" name="Picture 54"/>
-          <p:cNvPicPr>
-            <a:picLocks noChangeAspect="1"/>
-          </p:cNvPicPr>
-          <p:nvPr/>
-        </p:nvPicPr>
-        <p:blipFill>
-          <a:blip r:embed="rId2" cstate="print">
-            <a:extLst>
-              <a:ext uri="{28A0092B-C50C-407E-A947-70E740481C1C}">
-                <a14:useLocalDpi xmlns:a14="http://schemas.microsoft.com/office/drawing/2010/main" val="0"/>
-              </a:ext>
-            </a:extLst>
-          </a:blip>
-          <a:stretch>
-            <a:fillRect/>
-          </a:stretch>
-        </p:blipFill>
-        <p:spPr>
-          <a:xfrm>
-            <a:off x="5899264" y="1126240"/>
-            <a:ext cx="5714520" cy="4526280"/>
-          </a:xfrm>
-          <a:prstGeom prst="rect">
-            <a:avLst/>
-          </a:prstGeom>
-          <a:solidFill>
-            <a:schemeClr val="bg1"/>
-          </a:solidFill>
-        </p:spPr>
-      </p:pic>
-      <p:pic>
-        <p:nvPicPr>
-          <p:cNvPr id="56" name="Picture 55"/>
-          <p:cNvPicPr>
-            <a:picLocks noChangeAspect="1"/>
-          </p:cNvPicPr>
-          <p:nvPr/>
-        </p:nvPicPr>
-        <p:blipFill>
-          <a:blip r:embed="rId3">
-            <a:extLst>
-              <a:ext uri="{28A0092B-C50C-407E-A947-70E740481C1C}">
-                <a14:useLocalDpi xmlns:a14="http://schemas.microsoft.com/office/drawing/2010/main" val="0"/>
-              </a:ext>
-            </a:extLst>
-          </a:blip>
-          <a:stretch>
-            <a:fillRect/>
-          </a:stretch>
-        </p:blipFill>
-        <p:spPr>
-          <a:xfrm>
-            <a:off x="696328" y="1126240"/>
-            <a:ext cx="5715000" cy="4526280"/>
-          </a:xfrm>
-          <a:prstGeom prst="rect">
-            <a:avLst/>
-          </a:prstGeom>
-          <a:solidFill>
-            <a:schemeClr val="bg1"/>
-          </a:solidFill>
-        </p:spPr>
-      </p:pic>
-      <mc:AlternateContent xmlns:mc="http://schemas.openxmlformats.org/markup-compatibility/2006">
-        <mc:Choice xmlns:a14="http://schemas.microsoft.com/office/drawing/2010/main" Requires="a14">
-          <p:sp>
-            <p:nvSpPr>
-              <p:cNvPr id="59" name="Rectangle 58"/>
-              <p:cNvSpPr/>
-              <p:nvPr/>
-            </p:nvSpPr>
-            <p:spPr>
-              <a:xfrm>
-                <a:off x="7877625" y="2405487"/>
-                <a:ext cx="4240422" cy="1268708"/>
-              </a:xfrm>
-              <a:prstGeom prst="rect">
-                <a:avLst/>
-              </a:prstGeom>
-              <a:solidFill>
-                <a:schemeClr val="bg1"/>
-              </a:solidFill>
-              <a:ln>
+              </a:endParaRPr>
+            </a:p>
+          </p:txBody>
+        </p:sp>
+        <p:sp>
+          <p:nvSpPr>
+            <p:cNvPr id="48" name="Rectangle 47">
+              <a:extLst>
+                <a:ext uri="{FF2B5EF4-FFF2-40B4-BE49-F238E27FC236}">
+                  <a16:creationId xmlns:a16="http://schemas.microsoft.com/office/drawing/2014/main" xmlns:a14="http://schemas.microsoft.com/office/drawing/2010/main" xmlns:mc="http://schemas.openxmlformats.org/markup-compatibility/2006" xmlns="" id="{2E36643D-EEA2-42A8-BBCF-DC12D9FC8BA4}"/>
+                </a:ext>
+              </a:extLst>
+            </p:cNvPr>
+            <p:cNvSpPr/>
+            <p:nvPr/>
+          </p:nvSpPr>
+          <p:spPr>
+            <a:xfrm>
+              <a:off x="2629607" y="5277481"/>
+              <a:ext cx="2024961" cy="287389"/>
+            </a:xfrm>
+            <a:prstGeom prst="rect">
+              <a:avLst/>
+            </a:prstGeom>
+            <a:solidFill>
+              <a:schemeClr val="bg1"/>
+            </a:solidFill>
+            <a:ln>
+              <a:noFill/>
+            </a:ln>
+          </p:spPr>
+          <p:style>
+            <a:lnRef idx="2">
+              <a:schemeClr val="accent1">
+                <a:shade val="50000"/>
+              </a:schemeClr>
+            </a:lnRef>
+            <a:fillRef idx="1">
+              <a:schemeClr val="accent1"/>
+            </a:fillRef>
+            <a:effectRef idx="0">
+              <a:schemeClr val="accent1"/>
+            </a:effectRef>
+            <a:fontRef idx="minor">
+              <a:schemeClr val="lt1"/>
+            </a:fontRef>
+          </p:style>
+          <p:txBody>
+            <a:bodyPr rtlCol="0" anchor="ctr"/>
+            <a:lstStyle/>
+            <a:p>
+              <a:pPr algn="ctr"/>
+              <a:r>
+                <a:rPr lang="en-GB" sz="1400" dirty="0">
+                  <a:solidFill>
+                    <a:schemeClr val="tx1"/>
+                  </a:solidFill>
+                  <a:latin typeface="Cambria Math" panose="02040503050406030204" pitchFamily="18" charset="0"/>
+                  <a:ea typeface="Cambria Math" panose="02040503050406030204" pitchFamily="18" charset="0"/>
+                </a:rPr>
+                <a:t>EM Iterations</a:t>
+              </a:r>
+              <a:endParaRPr lang="en-US" sz="1400" dirty="0">
+                <a:solidFill>
+                  <a:schemeClr val="tx1"/>
+                </a:solidFill>
+                <a:latin typeface="Cambria Math" panose="02040503050406030204" pitchFamily="18" charset="0"/>
+                <a:ea typeface="Cambria Math" panose="02040503050406030204" pitchFamily="18" charset="0"/>
+              </a:endParaRPr>
+            </a:p>
+          </p:txBody>
+        </p:sp>
+        <p:sp>
+          <p:nvSpPr>
+            <p:cNvPr id="49" name="Rectangle 48">
+              <a:extLst>
+                <a:ext uri="{FF2B5EF4-FFF2-40B4-BE49-F238E27FC236}">
+                  <a16:creationId xmlns:a16="http://schemas.microsoft.com/office/drawing/2014/main" xmlns:a14="http://schemas.microsoft.com/office/drawing/2010/main" xmlns:mc="http://schemas.openxmlformats.org/markup-compatibility/2006" xmlns="" id="{2E36643D-EEA2-42A8-BBCF-DC12D9FC8BA4}"/>
+                </a:ext>
+              </a:extLst>
+            </p:cNvPr>
+            <p:cNvSpPr/>
+            <p:nvPr/>
+          </p:nvSpPr>
+          <p:spPr>
+            <a:xfrm>
+              <a:off x="7881159" y="5277481"/>
+              <a:ext cx="2024961" cy="287389"/>
+            </a:xfrm>
+            <a:prstGeom prst="rect">
+              <a:avLst/>
+            </a:prstGeom>
+            <a:solidFill>
+              <a:schemeClr val="bg1"/>
+            </a:solidFill>
+            <a:ln>
+              <a:noFill/>
+            </a:ln>
+          </p:spPr>
+          <p:style>
+            <a:lnRef idx="2">
+              <a:schemeClr val="accent1">
+                <a:shade val="50000"/>
+              </a:schemeClr>
+            </a:lnRef>
+            <a:fillRef idx="1">
+              <a:schemeClr val="accent1"/>
+            </a:fillRef>
+            <a:effectRef idx="0">
+              <a:schemeClr val="accent1"/>
+            </a:effectRef>
+            <a:fontRef idx="minor">
+              <a:schemeClr val="lt1"/>
+            </a:fontRef>
+          </p:style>
+          <p:txBody>
+            <a:bodyPr rtlCol="0" anchor="ctr"/>
+            <a:lstStyle/>
+            <a:p>
+              <a:pPr algn="ctr"/>
+              <a:r>
+                <a:rPr lang="en-GB" sz="1400" dirty="0" smtClean="0">
+                  <a:solidFill>
+                    <a:schemeClr val="tx1"/>
+                  </a:solidFill>
+                  <a:latin typeface="Cambria Math" panose="02040503050406030204" pitchFamily="18" charset="0"/>
+                  <a:ea typeface="Cambria Math" panose="02040503050406030204" pitchFamily="18" charset="0"/>
+                </a:rPr>
+                <a:t>EM Iterations</a:t>
+              </a:r>
+              <a:endParaRPr lang="en-US" sz="1400" dirty="0">
+                <a:solidFill>
+                  <a:schemeClr val="tx1"/>
+                </a:solidFill>
+                <a:latin typeface="Cambria Math" panose="02040503050406030204" pitchFamily="18" charset="0"/>
+                <a:ea typeface="Cambria Math" panose="02040503050406030204" pitchFamily="18" charset="0"/>
+              </a:endParaRPr>
+            </a:p>
+          </p:txBody>
+        </p:sp>
+        <p:sp>
+          <p:nvSpPr>
+            <p:cNvPr id="50" name="Rectangle 49">
+              <a:extLst>
+                <a:ext uri="{FF2B5EF4-FFF2-40B4-BE49-F238E27FC236}">
+                  <a16:creationId xmlns:a16="http://schemas.microsoft.com/office/drawing/2014/main" xmlns:a14="http://schemas.microsoft.com/office/drawing/2010/main" xmlns:mc="http://schemas.openxmlformats.org/markup-compatibility/2006" xmlns="" id="{6D2C8BE0-B0D2-4978-A1B5-FFF5137A4C82}"/>
+                </a:ext>
+              </a:extLst>
+            </p:cNvPr>
+            <p:cNvSpPr/>
+            <p:nvPr/>
+          </p:nvSpPr>
+          <p:spPr>
+            <a:xfrm>
+              <a:off x="6073066" y="2282286"/>
+              <a:ext cx="380163" cy="2198021"/>
+            </a:xfrm>
+            <a:prstGeom prst="rect">
+              <a:avLst/>
+            </a:prstGeom>
+            <a:solidFill>
+              <a:schemeClr val="bg1"/>
+            </a:solidFill>
+            <a:ln>
+              <a:noFill/>
+            </a:ln>
+          </p:spPr>
+          <p:style>
+            <a:lnRef idx="2">
+              <a:schemeClr val="accent1">
+                <a:shade val="50000"/>
+              </a:schemeClr>
+            </a:lnRef>
+            <a:fillRef idx="1">
+              <a:schemeClr val="accent1"/>
+            </a:fillRef>
+            <a:effectRef idx="0">
+              <a:schemeClr val="accent1"/>
+            </a:effectRef>
+            <a:fontRef idx="minor">
+              <a:schemeClr val="lt1"/>
+            </a:fontRef>
+          </p:style>
+          <p:txBody>
+            <a:bodyPr rtlCol="0" anchor="ctr"/>
+            <a:lstStyle/>
+            <a:p>
+              <a:pPr algn="ctr"/>
+              <a:endParaRPr lang="en-US" sz="1400" dirty="0" smtClean="0">
+                <a:solidFill>
+                  <a:schemeClr val="tx1"/>
+                </a:solidFill>
+                <a:latin typeface="Cambria Math" panose="02040503050406030204" pitchFamily="18" charset="0"/>
+                <a:ea typeface="Cambria Math" panose="02040503050406030204" pitchFamily="18" charset="0"/>
+              </a:endParaRPr>
+            </a:p>
+          </p:txBody>
+        </p:sp>
+        <p:sp>
+          <p:nvSpPr>
+            <p:cNvPr id="53" name="Rectangle 52">
+              <a:extLst>
+                <a:ext uri="{FF2B5EF4-FFF2-40B4-BE49-F238E27FC236}">
+                  <a16:creationId xmlns:a16="http://schemas.microsoft.com/office/drawing/2014/main" xmlns:a14="http://schemas.microsoft.com/office/drawing/2010/main" xmlns:mc="http://schemas.openxmlformats.org/markup-compatibility/2006" xmlns="" id="{2E36643D-EEA2-42A8-BBCF-DC12D9FC8BA4}"/>
+                </a:ext>
+              </a:extLst>
+            </p:cNvPr>
+            <p:cNvSpPr/>
+            <p:nvPr/>
+          </p:nvSpPr>
+          <p:spPr>
+            <a:xfrm>
+              <a:off x="4471253" y="4451932"/>
+              <a:ext cx="1336831" cy="666750"/>
+            </a:xfrm>
+            <a:prstGeom prst="rect">
+              <a:avLst/>
+            </a:prstGeom>
+            <a:solidFill>
+              <a:schemeClr val="bg1"/>
+            </a:solidFill>
+            <a:ln>
+              <a:noFill/>
+            </a:ln>
+          </p:spPr>
+          <p:style>
+            <a:lnRef idx="2">
+              <a:schemeClr val="accent1">
+                <a:shade val="50000"/>
+              </a:schemeClr>
+            </a:lnRef>
+            <a:fillRef idx="1">
+              <a:schemeClr val="accent1"/>
+            </a:fillRef>
+            <a:effectRef idx="0">
+              <a:schemeClr val="accent1"/>
+            </a:effectRef>
+            <a:fontRef idx="minor">
+              <a:schemeClr val="lt1"/>
+            </a:fontRef>
+          </p:style>
+          <p:txBody>
+            <a:bodyPr rtlCol="0" anchor="ctr"/>
+            <a:lstStyle/>
+            <a:p>
+              <a:pPr algn="ctr"/>
+              <a:endParaRPr lang="en-US" sz="1400" dirty="0">
+                <a:solidFill>
+                  <a:schemeClr val="tx1"/>
+                </a:solidFill>
+                <a:latin typeface="Cambria Math" panose="02040503050406030204" pitchFamily="18" charset="0"/>
+                <a:ea typeface="Cambria Math" panose="02040503050406030204" pitchFamily="18" charset="0"/>
+              </a:endParaRPr>
+            </a:p>
+          </p:txBody>
+        </p:sp>
+        <p:sp>
+          <p:nvSpPr>
+            <p:cNvPr id="54" name="Rectangle 53">
+              <a:extLst>
+                <a:ext uri="{FF2B5EF4-FFF2-40B4-BE49-F238E27FC236}">
+                  <a16:creationId xmlns:a16="http://schemas.microsoft.com/office/drawing/2014/main" xmlns:a14="http://schemas.microsoft.com/office/drawing/2010/main" xmlns:mc="http://schemas.openxmlformats.org/markup-compatibility/2006" xmlns="" id="{2E36643D-EEA2-42A8-BBCF-DC12D9FC8BA4}"/>
+                </a:ext>
+              </a:extLst>
+            </p:cNvPr>
+            <p:cNvSpPr/>
+            <p:nvPr/>
+          </p:nvSpPr>
+          <p:spPr>
+            <a:xfrm>
+              <a:off x="9784686" y="4451932"/>
+              <a:ext cx="1336831" cy="666750"/>
+            </a:xfrm>
+            <a:prstGeom prst="rect">
+              <a:avLst/>
+            </a:prstGeom>
+            <a:solidFill>
+              <a:schemeClr val="bg1"/>
+            </a:solidFill>
+            <a:ln>
+              <a:noFill/>
+            </a:ln>
+          </p:spPr>
+          <p:style>
+            <a:lnRef idx="2">
+              <a:schemeClr val="accent1">
+                <a:shade val="50000"/>
+              </a:schemeClr>
+            </a:lnRef>
+            <a:fillRef idx="1">
+              <a:schemeClr val="accent1"/>
+            </a:fillRef>
+            <a:effectRef idx="0">
+              <a:schemeClr val="accent1"/>
+            </a:effectRef>
+            <a:fontRef idx="minor">
+              <a:schemeClr val="lt1"/>
+            </a:fontRef>
+          </p:style>
+          <p:txBody>
+            <a:bodyPr rtlCol="0" anchor="ctr"/>
+            <a:lstStyle/>
+            <a:p>
+              <a:pPr algn="ctr"/>
+              <a:endParaRPr lang="en-US" sz="1400" dirty="0">
+                <a:solidFill>
+                  <a:schemeClr val="tx1"/>
+                </a:solidFill>
+                <a:latin typeface="Cambria Math" panose="02040503050406030204" pitchFamily="18" charset="0"/>
+                <a:ea typeface="Cambria Math" panose="02040503050406030204" pitchFamily="18" charset="0"/>
+              </a:endParaRPr>
+            </a:p>
+          </p:txBody>
+        </p:sp>
+        <p:pic>
+          <p:nvPicPr>
+            <p:cNvPr id="55" name="Picture 54"/>
+            <p:cNvPicPr>
+              <a:picLocks noChangeAspect="1"/>
+            </p:cNvPicPr>
+            <p:nvPr/>
+          </p:nvPicPr>
+          <p:blipFill>
+            <a:blip r:embed="rId2" cstate="print">
+              <a:extLst>
+                <a:ext uri="{28A0092B-C50C-407E-A947-70E740481C1C}">
+                  <a14:useLocalDpi xmlns:a14="http://schemas.microsoft.com/office/drawing/2010/main" val="0"/>
+                </a:ext>
+              </a:extLst>
+            </a:blip>
+            <a:stretch>
+              <a:fillRect/>
+            </a:stretch>
+          </p:blipFill>
+          <p:spPr>
+            <a:xfrm>
+              <a:off x="5899264" y="1126240"/>
+              <a:ext cx="5714520" cy="4526280"/>
+            </a:xfrm>
+            <a:prstGeom prst="rect">
+              <a:avLst/>
+            </a:prstGeom>
+            <a:solidFill>
+              <a:schemeClr val="bg1"/>
+            </a:solidFill>
+          </p:spPr>
+        </p:pic>
+        <p:pic>
+          <p:nvPicPr>
+            <p:cNvPr id="56" name="Picture 55"/>
+            <p:cNvPicPr>
+              <a:picLocks noChangeAspect="1"/>
+            </p:cNvPicPr>
+            <p:nvPr/>
+          </p:nvPicPr>
+          <p:blipFill>
+            <a:blip r:embed="rId3">
+              <a:extLst>
+                <a:ext uri="{28A0092B-C50C-407E-A947-70E740481C1C}">
+                  <a14:useLocalDpi xmlns:a14="http://schemas.microsoft.com/office/drawing/2010/main" val="0"/>
+                </a:ext>
+              </a:extLst>
+            </a:blip>
+            <a:stretch>
+              <a:fillRect/>
+            </a:stretch>
+          </p:blipFill>
+          <p:spPr>
+            <a:xfrm>
+              <a:off x="696328" y="1126240"/>
+              <a:ext cx="5715000" cy="4526280"/>
+            </a:xfrm>
+            <a:prstGeom prst="rect">
+              <a:avLst/>
+            </a:prstGeom>
+            <a:solidFill>
+              <a:schemeClr val="bg1"/>
+            </a:solidFill>
+          </p:spPr>
+        </p:pic>
+        <mc:AlternateContent xmlns:mc="http://schemas.openxmlformats.org/markup-compatibility/2006" xmlns:a14="http://schemas.microsoft.com/office/drawing/2010/main">
+          <mc:Choice Requires="a14">
+            <p:sp>
+              <p:nvSpPr>
+                <p:cNvPr id="59" name="Rectangle 58"/>
+                <p:cNvSpPr/>
+                <p:nvPr/>
+              </p:nvSpPr>
+              <p:spPr>
+                <a:xfrm>
+                  <a:off x="7877625" y="2405487"/>
+                  <a:ext cx="4240422" cy="1268708"/>
+                </a:xfrm>
+                <a:prstGeom prst="rect">
+                  <a:avLst/>
+                </a:prstGeom>
                 <a:solidFill>
                   <a:schemeClr val="bg1"/>
                 </a:solidFill>
-              </a:ln>
-            </p:spPr>
-            <p:style>
-              <a:lnRef idx="2">
-                <a:schemeClr val="accent1">
-                  <a:shade val="50000"/>
-                </a:schemeClr>
-              </a:lnRef>
-              <a:fillRef idx="1">
-                <a:schemeClr val="accent1"/>
-              </a:fillRef>
-              <a:effectRef idx="0">
-                <a:schemeClr val="accent1"/>
-              </a:effectRef>
-              <a:fontRef idx="minor">
-                <a:schemeClr val="lt1"/>
-              </a:fontRef>
-            </p:style>
-            <p:txBody>
-              <a:bodyPr rtlCol="0" anchor="ctr"/>
-              <a:lstStyle/>
-              <a:p>
-                <a:r>
-                  <a:rPr lang="en-US" sz="1400" dirty="0" smtClean="0">
+                <a:ln>
+                  <a:solidFill>
+                    <a:schemeClr val="bg1"/>
+                  </a:solidFill>
+                </a:ln>
+              </p:spPr>
+              <p:style>
+                <a:lnRef idx="2">
+                  <a:schemeClr val="accent1">
+                    <a:shade val="50000"/>
+                  </a:schemeClr>
+                </a:lnRef>
+                <a:fillRef idx="1">
+                  <a:schemeClr val="accent1"/>
+                </a:fillRef>
+                <a:effectRef idx="0">
+                  <a:schemeClr val="accent1"/>
+                </a:effectRef>
+                <a:fontRef idx="minor">
+                  <a:schemeClr val="lt1"/>
+                </a:fontRef>
+              </p:style>
+              <p:txBody>
+                <a:bodyPr rtlCol="0" anchor="ctr"/>
+                <a:lstStyle/>
+                <a:p>
+                  <a:r>
+                    <a:rPr lang="en-US" sz="1400" dirty="0" smtClean="0">
+                      <a:solidFill>
+                        <a:schemeClr val="tx1"/>
+                      </a:solidFill>
+                      <a:latin typeface="Cambria Math" panose="02040503050406030204" pitchFamily="18" charset="0"/>
+                      <a:ea typeface="Cambria Math" panose="02040503050406030204" pitchFamily="18" charset="0"/>
+                    </a:rPr>
+                    <a:t>Viterbi train </a:t>
+                  </a:r>
+                  <a:r>
+                    <a:rPr lang="en-US" sz="1400" dirty="0">
+                      <a:solidFill>
+                        <a:schemeClr val="tx1"/>
+                      </a:solidFill>
+                      <a:latin typeface="Cambria Math" panose="02040503050406030204" pitchFamily="18" charset="0"/>
+                      <a:ea typeface="Cambria Math" panose="02040503050406030204" pitchFamily="18" charset="0"/>
+                    </a:rPr>
+                    <a:t>e</a:t>
+                  </a:r>
+                  <a:r>
+                    <a:rPr lang="en-US" sz="1400" dirty="0" smtClean="0">
+                      <a:solidFill>
+                        <a:schemeClr val="tx1"/>
+                      </a:solidFill>
+                      <a:latin typeface="Cambria Math" panose="02040503050406030204" pitchFamily="18" charset="0"/>
+                      <a:ea typeface="Cambria Math" panose="02040503050406030204" pitchFamily="18" charset="0"/>
+                    </a:rPr>
+                    <a:t>rror </a:t>
+                  </a:r>
+                  <a:r>
+                    <a:rPr lang="en-US" sz="1400" dirty="0">
+                      <a:solidFill>
+                        <a:schemeClr val="tx1"/>
+                      </a:solidFill>
+                      <a:latin typeface="Cambria Math" panose="02040503050406030204" pitchFamily="18" charset="0"/>
+                      <a:ea typeface="Cambria Math" panose="02040503050406030204" pitchFamily="18" charset="0"/>
+                    </a:rPr>
+                    <a:t>with </a:t>
+                  </a:r>
+                  <a:r>
+                    <a:rPr lang="en-US" sz="1400" dirty="0" smtClean="0">
+                      <a:solidFill>
+                        <a:schemeClr val="tx1"/>
+                      </a:solidFill>
+                      <a:latin typeface="Cambria Math" panose="02040503050406030204" pitchFamily="18" charset="0"/>
+                      <a:ea typeface="Cambria Math" panose="02040503050406030204" pitchFamily="18" charset="0"/>
+                    </a:rPr>
+                    <a:t>learned </a:t>
+                  </a:r>
+                  <a14:m>
+                    <m:oMath xmlns:m="http://schemas.openxmlformats.org/officeDocument/2006/math">
+                      <m:r>
+                        <a:rPr lang="en-US" sz="1400" i="1">
+                          <a:solidFill>
+                            <a:schemeClr val="tx1"/>
+                          </a:solidFill>
+                          <a:latin typeface="Cambria Math" panose="02040503050406030204" pitchFamily="18" charset="0"/>
+                          <a:ea typeface="Cambria Math" panose="02040503050406030204" pitchFamily="18" charset="0"/>
+                        </a:rPr>
+                        <m:t>𝜃</m:t>
+                      </m:r>
+                    </m:oMath>
+                  </a14:m>
+                  <a:r>
+                    <a:rPr lang="en-US" sz="1400" dirty="0" smtClean="0">
+                      <a:solidFill>
+                        <a:schemeClr val="tx1"/>
+                      </a:solidFill>
+                      <a:latin typeface="Cambria Math" panose="02040503050406030204" pitchFamily="18" charset="0"/>
+                      <a:ea typeface="Cambria Math" panose="02040503050406030204" pitchFamily="18" charset="0"/>
+                    </a:rPr>
+                    <a:t> (single run)</a:t>
+                  </a:r>
+                </a:p>
+                <a:p>
+                  <a:r>
+                    <a:rPr lang="en-US" sz="1400" dirty="0" smtClean="0">
+                      <a:solidFill>
+                        <a:schemeClr val="tx1"/>
+                      </a:solidFill>
+                      <a:latin typeface="Cambria Math" panose="02040503050406030204" pitchFamily="18" charset="0"/>
+                      <a:ea typeface="Cambria Math" panose="02040503050406030204" pitchFamily="18" charset="0"/>
+                    </a:rPr>
+                    <a:t>Viterbi test error </a:t>
+                  </a:r>
+                  <a:r>
+                    <a:rPr lang="en-US" sz="1400" dirty="0">
+                      <a:solidFill>
+                        <a:schemeClr val="tx1"/>
+                      </a:solidFill>
+                      <a:latin typeface="Cambria Math" panose="02040503050406030204" pitchFamily="18" charset="0"/>
+                      <a:ea typeface="Cambria Math" panose="02040503050406030204" pitchFamily="18" charset="0"/>
+                    </a:rPr>
+                    <a:t>with </a:t>
+                  </a:r>
+                  <a:r>
+                    <a:rPr lang="en-US" sz="1400" dirty="0" smtClean="0">
+                      <a:solidFill>
+                        <a:schemeClr val="tx1"/>
+                      </a:solidFill>
+                      <a:latin typeface="Cambria Math" panose="02040503050406030204" pitchFamily="18" charset="0"/>
+                      <a:ea typeface="Cambria Math" panose="02040503050406030204" pitchFamily="18" charset="0"/>
+                    </a:rPr>
+                    <a:t>learned </a:t>
+                  </a:r>
+                  <a14:m>
+                    <m:oMath xmlns:m="http://schemas.openxmlformats.org/officeDocument/2006/math">
+                      <m:r>
+                        <a:rPr lang="en-US" sz="1400" i="1">
+                          <a:solidFill>
+                            <a:schemeClr val="tx1"/>
+                          </a:solidFill>
+                          <a:latin typeface="Cambria Math" panose="02040503050406030204" pitchFamily="18" charset="0"/>
+                          <a:ea typeface="Cambria Math" panose="02040503050406030204" pitchFamily="18" charset="0"/>
+                        </a:rPr>
+                        <m:t>𝜃</m:t>
+                      </m:r>
+                    </m:oMath>
+                  </a14:m>
+                  <a:r>
+                    <a:rPr lang="en-US" sz="1400" dirty="0" smtClean="0">
+                      <a:solidFill>
+                        <a:schemeClr val="tx1"/>
+                      </a:solidFill>
+                      <a:latin typeface="Cambria Math" panose="02040503050406030204" pitchFamily="18" charset="0"/>
+                      <a:ea typeface="Cambria Math" panose="02040503050406030204" pitchFamily="18" charset="0"/>
+                    </a:rPr>
+                    <a:t> (single run)</a:t>
+                  </a:r>
+                </a:p>
+                <a:p>
+                  <a:r>
+                    <a:rPr lang="en-US" sz="1400" dirty="0" smtClean="0">
+                      <a:solidFill>
+                        <a:schemeClr val="tx1"/>
+                      </a:solidFill>
+                      <a:latin typeface="Cambria Math" panose="02040503050406030204" pitchFamily="18" charset="0"/>
+                      <a:ea typeface="Cambria Math" panose="02040503050406030204" pitchFamily="18" charset="0"/>
+                    </a:rPr>
+                    <a:t>Viterbi train error </a:t>
+                  </a:r>
+                  <a:r>
+                    <a:rPr lang="en-US" sz="1400" dirty="0">
+                      <a:solidFill>
+                        <a:schemeClr val="tx1"/>
+                      </a:solidFill>
+                      <a:latin typeface="Cambria Math" panose="02040503050406030204" pitchFamily="18" charset="0"/>
+                      <a:ea typeface="Cambria Math" panose="02040503050406030204" pitchFamily="18" charset="0"/>
+                    </a:rPr>
+                    <a:t>with </a:t>
+                  </a:r>
+                  <a:r>
+                    <a:rPr lang="en-US" sz="1400" dirty="0" smtClean="0">
+                      <a:solidFill>
+                        <a:schemeClr val="tx1"/>
+                      </a:solidFill>
+                      <a:latin typeface="Cambria Math" panose="02040503050406030204" pitchFamily="18" charset="0"/>
+                      <a:ea typeface="Cambria Math" panose="02040503050406030204" pitchFamily="18" charset="0"/>
+                    </a:rPr>
+                    <a:t>learned </a:t>
+                  </a:r>
+                  <a14:m>
+                    <m:oMath xmlns:m="http://schemas.openxmlformats.org/officeDocument/2006/math">
+                      <m:r>
+                        <a:rPr lang="en-US" sz="1400" i="1">
+                          <a:solidFill>
+                            <a:schemeClr val="tx1"/>
+                          </a:solidFill>
+                          <a:latin typeface="Cambria Math" panose="02040503050406030204" pitchFamily="18" charset="0"/>
+                          <a:ea typeface="Cambria Math" panose="02040503050406030204" pitchFamily="18" charset="0"/>
+                        </a:rPr>
+                        <m:t>𝜃</m:t>
+                      </m:r>
+                    </m:oMath>
+                  </a14:m>
+                  <a:r>
+                    <a:rPr lang="en-US" sz="1400" dirty="0" smtClean="0">
+                      <a:solidFill>
+                        <a:schemeClr val="tx1"/>
+                      </a:solidFill>
+                      <a:latin typeface="Cambria Math" panose="02040503050406030204" pitchFamily="18" charset="0"/>
+                      <a:ea typeface="Cambria Math" panose="02040503050406030204" pitchFamily="18" charset="0"/>
+                    </a:rPr>
+                    <a:t> (average of runs)</a:t>
+                  </a:r>
+                  <a:endParaRPr lang="en-US" sz="1400" dirty="0">
                     <a:solidFill>
                       <a:schemeClr val="tx1"/>
                     </a:solidFill>
                     <a:latin typeface="Cambria Math" panose="02040503050406030204" pitchFamily="18" charset="0"/>
                     <a:ea typeface="Cambria Math" panose="02040503050406030204" pitchFamily="18" charset="0"/>
-                  </a:rPr>
-                  <a:t>Viterbi train </a:t>
-                </a:r>
-                <a:r>
-                  <a:rPr lang="en-US" sz="1400" dirty="0">
+                  </a:endParaRPr>
+                </a:p>
+                <a:p>
+                  <a:r>
+                    <a:rPr lang="en-US" sz="1400" dirty="0" smtClean="0">
+                      <a:solidFill>
+                        <a:schemeClr val="tx1"/>
+                      </a:solidFill>
+                      <a:latin typeface="Cambria Math" panose="02040503050406030204" pitchFamily="18" charset="0"/>
+                      <a:ea typeface="Cambria Math" panose="02040503050406030204" pitchFamily="18" charset="0"/>
+                    </a:rPr>
+                    <a:t>Viterbi test error </a:t>
+                  </a:r>
+                  <a:r>
+                    <a:rPr lang="en-US" sz="1400" dirty="0">
+                      <a:solidFill>
+                        <a:schemeClr val="tx1"/>
+                      </a:solidFill>
+                      <a:latin typeface="Cambria Math" panose="02040503050406030204" pitchFamily="18" charset="0"/>
+                      <a:ea typeface="Cambria Math" panose="02040503050406030204" pitchFamily="18" charset="0"/>
+                    </a:rPr>
+                    <a:t>with </a:t>
+                  </a:r>
+                  <a:r>
+                    <a:rPr lang="en-US" sz="1400" dirty="0" smtClean="0">
+                      <a:solidFill>
+                        <a:schemeClr val="tx1"/>
+                      </a:solidFill>
+                      <a:latin typeface="Cambria Math" panose="02040503050406030204" pitchFamily="18" charset="0"/>
+                      <a:ea typeface="Cambria Math" panose="02040503050406030204" pitchFamily="18" charset="0"/>
+                    </a:rPr>
+                    <a:t>learned </a:t>
+                  </a:r>
+                  <a14:m>
+                    <m:oMath xmlns:m="http://schemas.openxmlformats.org/officeDocument/2006/math">
+                      <m:r>
+                        <a:rPr lang="en-US" sz="1400" i="1">
+                          <a:solidFill>
+                            <a:schemeClr val="tx1"/>
+                          </a:solidFill>
+                          <a:latin typeface="Cambria Math" panose="02040503050406030204" pitchFamily="18" charset="0"/>
+                          <a:ea typeface="Cambria Math" panose="02040503050406030204" pitchFamily="18" charset="0"/>
+                        </a:rPr>
+                        <m:t>𝜃</m:t>
+                      </m:r>
+                    </m:oMath>
+                  </a14:m>
+                  <a:r>
+                    <a:rPr lang="en-US" sz="1400" dirty="0" smtClean="0">
+                      <a:solidFill>
+                        <a:schemeClr val="tx1"/>
+                      </a:solidFill>
+                      <a:latin typeface="Cambria Math" panose="02040503050406030204" pitchFamily="18" charset="0"/>
+                      <a:ea typeface="Cambria Math" panose="02040503050406030204" pitchFamily="18" charset="0"/>
+                    </a:rPr>
+                    <a:t> (average of runs)</a:t>
+                  </a:r>
+                </a:p>
+                <a:p>
+                  <a:r>
+                    <a:rPr lang="en-US" sz="1400" dirty="0" smtClean="0">
+                      <a:solidFill>
+                        <a:schemeClr val="tx1"/>
+                      </a:solidFill>
+                      <a:latin typeface="Cambria Math" panose="02040503050406030204" pitchFamily="18" charset="0"/>
+                      <a:ea typeface="Cambria Math" panose="02040503050406030204" pitchFamily="18" charset="0"/>
+                    </a:rPr>
+                    <a:t>Viterbi train error </a:t>
+                  </a:r>
+                  <a:r>
+                    <a:rPr lang="en-US" sz="1400" dirty="0">
+                      <a:solidFill>
+                        <a:schemeClr val="tx1"/>
+                      </a:solidFill>
+                      <a:latin typeface="Cambria Math" panose="02040503050406030204" pitchFamily="18" charset="0"/>
+                      <a:ea typeface="Cambria Math" panose="02040503050406030204" pitchFamily="18" charset="0"/>
+                    </a:rPr>
+                    <a:t>with </a:t>
+                  </a:r>
+                  <a:r>
+                    <a:rPr lang="en-US" sz="1400" dirty="0" smtClean="0">
+                      <a:solidFill>
+                        <a:schemeClr val="tx1"/>
+                      </a:solidFill>
+                      <a:latin typeface="Cambria Math" panose="02040503050406030204" pitchFamily="18" charset="0"/>
+                      <a:ea typeface="Cambria Math" panose="02040503050406030204" pitchFamily="18" charset="0"/>
+                    </a:rPr>
+                    <a:t>true </a:t>
+                  </a:r>
+                  <a14:m>
+                    <m:oMath xmlns:m="http://schemas.openxmlformats.org/officeDocument/2006/math">
+                      <m:r>
+                        <a:rPr lang="en-US" sz="1400" i="1">
+                          <a:solidFill>
+                            <a:schemeClr val="tx1"/>
+                          </a:solidFill>
+                          <a:latin typeface="Cambria Math" panose="02040503050406030204" pitchFamily="18" charset="0"/>
+                          <a:ea typeface="Cambria Math" panose="02040503050406030204" pitchFamily="18" charset="0"/>
+                        </a:rPr>
+                        <m:t>𝜃</m:t>
+                      </m:r>
+                    </m:oMath>
+                  </a14:m>
+                  <a:endParaRPr lang="en-US" sz="1400" dirty="0" smtClean="0">
                     <a:solidFill>
                       <a:schemeClr val="tx1"/>
                     </a:solidFill>
                     <a:latin typeface="Cambria Math" panose="02040503050406030204" pitchFamily="18" charset="0"/>
                     <a:ea typeface="Cambria Math" panose="02040503050406030204" pitchFamily="18" charset="0"/>
-                  </a:rPr>
-                  <a:t>e</a:t>
-                </a:r>
-                <a:r>
-                  <a:rPr lang="en-US" sz="1400" dirty="0" smtClean="0">
+                  </a:endParaRPr>
+                </a:p>
+                <a:p>
+                  <a:r>
+                    <a:rPr lang="en-US" sz="1400" dirty="0">
+                      <a:solidFill>
+                        <a:schemeClr val="tx1"/>
+                      </a:solidFill>
+                      <a:latin typeface="Cambria Math" panose="02040503050406030204" pitchFamily="18" charset="0"/>
+                      <a:ea typeface="Cambria Math" panose="02040503050406030204" pitchFamily="18" charset="0"/>
+                    </a:rPr>
+                    <a:t>Viterbi </a:t>
+                  </a:r>
+                  <a:r>
+                    <a:rPr lang="en-US" sz="1400" dirty="0" smtClean="0">
+                      <a:solidFill>
+                        <a:schemeClr val="tx1"/>
+                      </a:solidFill>
+                      <a:latin typeface="Cambria Math" panose="02040503050406030204" pitchFamily="18" charset="0"/>
+                      <a:ea typeface="Cambria Math" panose="02040503050406030204" pitchFamily="18" charset="0"/>
+                    </a:rPr>
+                    <a:t>test error </a:t>
+                  </a:r>
+                  <a:r>
+                    <a:rPr lang="en-US" sz="1400" dirty="0">
+                      <a:solidFill>
+                        <a:schemeClr val="tx1"/>
+                      </a:solidFill>
+                      <a:latin typeface="Cambria Math" panose="02040503050406030204" pitchFamily="18" charset="0"/>
+                      <a:ea typeface="Cambria Math" panose="02040503050406030204" pitchFamily="18" charset="0"/>
+                    </a:rPr>
+                    <a:t>with true </a:t>
+                  </a:r>
+                  <a14:m>
+                    <m:oMath xmlns:m="http://schemas.openxmlformats.org/officeDocument/2006/math">
+                      <m:r>
+                        <a:rPr lang="en-US" sz="1400" b="0" i="0" smtClean="0">
+                          <a:solidFill>
+                            <a:schemeClr val="tx1"/>
+                          </a:solidFill>
+                          <a:latin typeface="Cambria Math" panose="02040503050406030204" pitchFamily="18" charset="0"/>
+                          <a:ea typeface="Cambria Math" panose="02040503050406030204" pitchFamily="18" charset="0"/>
+                        </a:rPr>
+                        <m:t> </m:t>
+                      </m:r>
+                      <m:r>
+                        <a:rPr lang="en-US" sz="1400" i="1">
+                          <a:solidFill>
+                            <a:schemeClr val="tx1"/>
+                          </a:solidFill>
+                          <a:latin typeface="Cambria Math" panose="02040503050406030204" pitchFamily="18" charset="0"/>
+                          <a:ea typeface="Cambria Math" panose="02040503050406030204" pitchFamily="18" charset="0"/>
+                        </a:rPr>
+                        <m:t>𝜃</m:t>
+                      </m:r>
+                    </m:oMath>
+                  </a14:m>
+                  <a:endParaRPr lang="en-US" sz="1400" dirty="0">
                     <a:solidFill>
                       <a:schemeClr val="tx1"/>
                     </a:solidFill>
                     <a:latin typeface="Cambria Math" panose="02040503050406030204" pitchFamily="18" charset="0"/>
                     <a:ea typeface="Cambria Math" panose="02040503050406030204" pitchFamily="18" charset="0"/>
-                  </a:rPr>
-                  <a:t>rror </a:t>
-                </a:r>
-                <a:r>
-                  <a:rPr lang="en-US" sz="1400" dirty="0">
-                    <a:solidFill>
-                      <a:schemeClr val="tx1"/>
-                    </a:solidFill>
-                    <a:latin typeface="Cambria Math" panose="02040503050406030204" pitchFamily="18" charset="0"/>
-                    <a:ea typeface="Cambria Math" panose="02040503050406030204" pitchFamily="18" charset="0"/>
-                  </a:rPr>
-                  <a:t>with </a:t>
-                </a:r>
-                <a:r>
-                  <a:rPr lang="en-US" sz="1400" dirty="0" smtClean="0">
-                    <a:solidFill>
-                      <a:schemeClr val="tx1"/>
-                    </a:solidFill>
-                    <a:latin typeface="Cambria Math" panose="02040503050406030204" pitchFamily="18" charset="0"/>
-                    <a:ea typeface="Cambria Math" panose="02040503050406030204" pitchFamily="18" charset="0"/>
-                  </a:rPr>
-                  <a:t>learned </a:t>
-                </a:r>
-                <a14:m>
-                  <m:oMath xmlns:m="http://schemas.openxmlformats.org/officeDocument/2006/math">
-                    <m:r>
-                      <a:rPr lang="en-US" sz="1400" i="1">
-                        <a:solidFill>
-                          <a:schemeClr val="tx1"/>
-                        </a:solidFill>
-                        <a:latin typeface="Cambria Math" panose="02040503050406030204" pitchFamily="18" charset="0"/>
-                        <a:ea typeface="Cambria Math" panose="02040503050406030204" pitchFamily="18" charset="0"/>
-                      </a:rPr>
-                      <m:t>𝜃</m:t>
-                    </m:r>
-                  </m:oMath>
-                </a14:m>
-                <a:r>
-                  <a:rPr lang="en-US" sz="1400" dirty="0" smtClean="0">
-                    <a:solidFill>
-                      <a:schemeClr val="tx1"/>
-                    </a:solidFill>
-                    <a:latin typeface="Cambria Math" panose="02040503050406030204" pitchFamily="18" charset="0"/>
-                    <a:ea typeface="Cambria Math" panose="02040503050406030204" pitchFamily="18" charset="0"/>
-                  </a:rPr>
-                  <a:t> (single run)</a:t>
-                </a:r>
-              </a:p>
-              <a:p>
-                <a:r>
-                  <a:rPr lang="en-US" sz="1400" dirty="0" smtClean="0">
-                    <a:solidFill>
-                      <a:schemeClr val="tx1"/>
-                    </a:solidFill>
-                    <a:latin typeface="Cambria Math" panose="02040503050406030204" pitchFamily="18" charset="0"/>
-                    <a:ea typeface="Cambria Math" panose="02040503050406030204" pitchFamily="18" charset="0"/>
-                  </a:rPr>
-                  <a:t>Viterbi test error </a:t>
-                </a:r>
-                <a:r>
-                  <a:rPr lang="en-US" sz="1400" dirty="0">
-                    <a:solidFill>
-                      <a:schemeClr val="tx1"/>
-                    </a:solidFill>
-                    <a:latin typeface="Cambria Math" panose="02040503050406030204" pitchFamily="18" charset="0"/>
-                    <a:ea typeface="Cambria Math" panose="02040503050406030204" pitchFamily="18" charset="0"/>
-                  </a:rPr>
-                  <a:t>with </a:t>
-                </a:r>
-                <a:r>
-                  <a:rPr lang="en-US" sz="1400" dirty="0" smtClean="0">
-                    <a:solidFill>
-                      <a:schemeClr val="tx1"/>
-                    </a:solidFill>
-                    <a:latin typeface="Cambria Math" panose="02040503050406030204" pitchFamily="18" charset="0"/>
-                    <a:ea typeface="Cambria Math" panose="02040503050406030204" pitchFamily="18" charset="0"/>
-                  </a:rPr>
-                  <a:t>learned </a:t>
-                </a:r>
-                <a14:m>
-                  <m:oMath xmlns:m="http://schemas.openxmlformats.org/officeDocument/2006/math">
-                    <m:r>
-                      <a:rPr lang="en-US" sz="1400" i="1">
-                        <a:solidFill>
-                          <a:schemeClr val="tx1"/>
-                        </a:solidFill>
-                        <a:latin typeface="Cambria Math" panose="02040503050406030204" pitchFamily="18" charset="0"/>
-                        <a:ea typeface="Cambria Math" panose="02040503050406030204" pitchFamily="18" charset="0"/>
-                      </a:rPr>
-                      <m:t>𝜃</m:t>
-                    </m:r>
-                  </m:oMath>
-                </a14:m>
-                <a:r>
-                  <a:rPr lang="en-US" sz="1400" dirty="0" smtClean="0">
-                    <a:solidFill>
-                      <a:schemeClr val="tx1"/>
-                    </a:solidFill>
-                    <a:latin typeface="Cambria Math" panose="02040503050406030204" pitchFamily="18" charset="0"/>
-                    <a:ea typeface="Cambria Math" panose="02040503050406030204" pitchFamily="18" charset="0"/>
-                  </a:rPr>
-                  <a:t> (single run)</a:t>
-                </a:r>
-              </a:p>
-              <a:p>
-                <a:r>
-                  <a:rPr lang="en-US" sz="1400" dirty="0" smtClean="0">
-                    <a:solidFill>
-                      <a:schemeClr val="tx1"/>
-                    </a:solidFill>
-                    <a:latin typeface="Cambria Math" panose="02040503050406030204" pitchFamily="18" charset="0"/>
-                    <a:ea typeface="Cambria Math" panose="02040503050406030204" pitchFamily="18" charset="0"/>
-                  </a:rPr>
-                  <a:t>Viterbi train error </a:t>
-                </a:r>
-                <a:r>
-                  <a:rPr lang="en-US" sz="1400" dirty="0">
-                    <a:solidFill>
-                      <a:schemeClr val="tx1"/>
-                    </a:solidFill>
-                    <a:latin typeface="Cambria Math" panose="02040503050406030204" pitchFamily="18" charset="0"/>
-                    <a:ea typeface="Cambria Math" panose="02040503050406030204" pitchFamily="18" charset="0"/>
-                  </a:rPr>
-                  <a:t>with </a:t>
-                </a:r>
-                <a:r>
-                  <a:rPr lang="en-US" sz="1400" dirty="0" smtClean="0">
-                    <a:solidFill>
-                      <a:schemeClr val="tx1"/>
-                    </a:solidFill>
-                    <a:latin typeface="Cambria Math" panose="02040503050406030204" pitchFamily="18" charset="0"/>
-                    <a:ea typeface="Cambria Math" panose="02040503050406030204" pitchFamily="18" charset="0"/>
-                  </a:rPr>
-                  <a:t>learned </a:t>
-                </a:r>
-                <a14:m>
-                  <m:oMath xmlns:m="http://schemas.openxmlformats.org/officeDocument/2006/math">
-                    <m:r>
-                      <a:rPr lang="en-US" sz="1400" i="1">
-                        <a:solidFill>
-                          <a:schemeClr val="tx1"/>
-                        </a:solidFill>
-                        <a:latin typeface="Cambria Math" panose="02040503050406030204" pitchFamily="18" charset="0"/>
-                        <a:ea typeface="Cambria Math" panose="02040503050406030204" pitchFamily="18" charset="0"/>
-                      </a:rPr>
-                      <m:t>𝜃</m:t>
-                    </m:r>
-                  </m:oMath>
-                </a14:m>
-                <a:r>
-                  <a:rPr lang="en-US" sz="1400" dirty="0" smtClean="0">
-                    <a:solidFill>
-                      <a:schemeClr val="tx1"/>
-                    </a:solidFill>
-                    <a:latin typeface="Cambria Math" panose="02040503050406030204" pitchFamily="18" charset="0"/>
-                    <a:ea typeface="Cambria Math" panose="02040503050406030204" pitchFamily="18" charset="0"/>
-                  </a:rPr>
-                  <a:t> (average of runs)</a:t>
-                </a:r>
-                <a:endParaRPr lang="en-US" sz="1400" dirty="0">
+                  </a:endParaRPr>
+                </a:p>
+              </p:txBody>
+            </p:sp>
+          </mc:Choice>
+          <mc:Fallback xmlns="">
+            <p:sp>
+              <p:nvSpPr>
+                <p:cNvPr id="59" name="Rectangle 58"/>
+                <p:cNvSpPr>
+                  <a:spLocks noRot="1" noChangeAspect="1" noMove="1" noResize="1" noEditPoints="1" noAdjustHandles="1" noChangeArrowheads="1" noChangeShapeType="1" noTextEdit="1"/>
+                </p:cNvSpPr>
+                <p:nvPr/>
+              </p:nvSpPr>
+              <p:spPr>
+                <a:xfrm>
+                  <a:off x="7877625" y="2405487"/>
+                  <a:ext cx="4240422" cy="1268708"/>
+                </a:xfrm>
+                <a:prstGeom prst="rect">
+                  <a:avLst/>
+                </a:prstGeom>
+                <a:blipFill rotWithShape="0">
+                  <a:blip r:embed="rId4"/>
+                  <a:stretch>
+                    <a:fillRect l="-287" t="-5238" b="-8095"/>
+                  </a:stretch>
+                </a:blipFill>
+                <a:ln>
+                  <a:solidFill>
+                    <a:schemeClr val="bg1"/>
+                  </a:solidFill>
+                </a:ln>
+              </p:spPr>
+              <p:txBody>
+                <a:bodyPr/>
+                <a:lstStyle/>
+                <a:p>
+                  <a:r>
+                    <a:rPr lang="en-US">
+                      <a:noFill/>
+                    </a:rPr>
+                    <a:t> </a:t>
+                  </a:r>
+                </a:p>
+              </p:txBody>
+            </p:sp>
+          </mc:Fallback>
+        </mc:AlternateContent>
+        <p:sp>
+          <p:nvSpPr>
+            <p:cNvPr id="60" name="Rectangle 59"/>
+            <p:cNvSpPr/>
+            <p:nvPr/>
+          </p:nvSpPr>
+          <p:spPr>
+            <a:xfrm>
+              <a:off x="7398628" y="3548895"/>
+              <a:ext cx="470371" cy="27432"/>
+            </a:xfrm>
+            <a:prstGeom prst="rect">
+              <a:avLst/>
+            </a:prstGeom>
+            <a:solidFill>
+              <a:srgbClr val="C0B577"/>
+            </a:solidFill>
+            <a:ln>
+              <a:noFill/>
+            </a:ln>
+          </p:spPr>
+          <p:style>
+            <a:lnRef idx="2">
+              <a:schemeClr val="accent1">
+                <a:shade val="50000"/>
+              </a:schemeClr>
+            </a:lnRef>
+            <a:fillRef idx="1">
+              <a:schemeClr val="accent1"/>
+            </a:fillRef>
+            <a:effectRef idx="0">
+              <a:schemeClr val="accent1"/>
+            </a:effectRef>
+            <a:fontRef idx="minor">
+              <a:schemeClr val="lt1"/>
+            </a:fontRef>
+          </p:style>
+          <p:txBody>
+            <a:bodyPr rtlCol="0" anchor="ctr"/>
+            <a:lstStyle/>
+            <a:p>
+              <a:pPr algn="ctr"/>
+              <a:endParaRPr lang="en-US"/>
+            </a:p>
+          </p:txBody>
+        </p:sp>
+        <p:sp>
+          <p:nvSpPr>
+            <p:cNvPr id="61" name="Rectangle 60"/>
+            <p:cNvSpPr/>
+            <p:nvPr/>
+          </p:nvSpPr>
+          <p:spPr>
+            <a:xfrm>
+              <a:off x="7398628" y="3332729"/>
+              <a:ext cx="470371" cy="27432"/>
+            </a:xfrm>
+            <a:prstGeom prst="rect">
+              <a:avLst/>
+            </a:prstGeom>
+            <a:solidFill>
+              <a:srgbClr val="6E277F"/>
+            </a:solidFill>
+            <a:ln>
+              <a:noFill/>
+            </a:ln>
+          </p:spPr>
+          <p:style>
+            <a:lnRef idx="2">
+              <a:schemeClr val="accent1">
+                <a:shade val="50000"/>
+              </a:schemeClr>
+            </a:lnRef>
+            <a:fillRef idx="1">
+              <a:schemeClr val="accent1"/>
+            </a:fillRef>
+            <a:effectRef idx="0">
+              <a:schemeClr val="accent1"/>
+            </a:effectRef>
+            <a:fontRef idx="minor">
+              <a:schemeClr val="lt1"/>
+            </a:fontRef>
+          </p:style>
+          <p:txBody>
+            <a:bodyPr rtlCol="0" anchor="ctr"/>
+            <a:lstStyle/>
+            <a:p>
+              <a:pPr algn="ctr"/>
+              <a:endParaRPr lang="en-US">
+                <a:solidFill>
+                  <a:srgbClr val="7030A0"/>
+                </a:solidFill>
+              </a:endParaRPr>
+            </a:p>
+          </p:txBody>
+        </p:sp>
+        <p:sp>
+          <p:nvSpPr>
+            <p:cNvPr id="62" name="Rectangle 61"/>
+            <p:cNvSpPr/>
+            <p:nvPr/>
+          </p:nvSpPr>
+          <p:spPr>
+            <a:xfrm>
+              <a:off x="7398627" y="3130279"/>
+              <a:ext cx="470371" cy="27432"/>
+            </a:xfrm>
+            <a:prstGeom prst="rect">
+              <a:avLst/>
+            </a:prstGeom>
+            <a:solidFill>
+              <a:schemeClr val="accent2">
+                <a:lumMod val="75000"/>
+              </a:schemeClr>
+            </a:solidFill>
+            <a:ln>
+              <a:noFill/>
+            </a:ln>
+          </p:spPr>
+          <p:style>
+            <a:lnRef idx="2">
+              <a:schemeClr val="accent1">
+                <a:shade val="50000"/>
+              </a:schemeClr>
+            </a:lnRef>
+            <a:fillRef idx="1">
+              <a:schemeClr val="accent1"/>
+            </a:fillRef>
+            <a:effectRef idx="0">
+              <a:schemeClr val="accent1"/>
+            </a:effectRef>
+            <a:fontRef idx="minor">
+              <a:schemeClr val="lt1"/>
+            </a:fontRef>
+          </p:style>
+          <p:txBody>
+            <a:bodyPr rtlCol="0" anchor="ctr"/>
+            <a:lstStyle/>
+            <a:p>
+              <a:pPr algn="ctr"/>
+              <a:endParaRPr lang="en-US"/>
+            </a:p>
+          </p:txBody>
+        </p:sp>
+        <p:sp>
+          <p:nvSpPr>
+            <p:cNvPr id="63" name="Rectangle 62"/>
+            <p:cNvSpPr/>
+            <p:nvPr/>
+          </p:nvSpPr>
+          <p:spPr>
+            <a:xfrm>
+              <a:off x="7398628" y="2920015"/>
+              <a:ext cx="470371" cy="27432"/>
+            </a:xfrm>
+            <a:prstGeom prst="rect">
+              <a:avLst/>
+            </a:prstGeom>
+            <a:solidFill>
+              <a:schemeClr val="accent1">
+                <a:lumMod val="75000"/>
+              </a:schemeClr>
+            </a:solidFill>
+            <a:ln>
+              <a:noFill/>
+            </a:ln>
+          </p:spPr>
+          <p:style>
+            <a:lnRef idx="2">
+              <a:schemeClr val="accent1">
+                <a:shade val="50000"/>
+              </a:schemeClr>
+            </a:lnRef>
+            <a:fillRef idx="1">
+              <a:schemeClr val="accent1"/>
+            </a:fillRef>
+            <a:effectRef idx="0">
+              <a:schemeClr val="accent1"/>
+            </a:effectRef>
+            <a:fontRef idx="minor">
+              <a:schemeClr val="lt1"/>
+            </a:fontRef>
+          </p:style>
+          <p:txBody>
+            <a:bodyPr rtlCol="0" anchor="ctr"/>
+            <a:lstStyle/>
+            <a:p>
+              <a:pPr algn="ctr"/>
+              <a:endParaRPr lang="en-US"/>
+            </a:p>
+          </p:txBody>
+        </p:sp>
+        <p:sp>
+          <p:nvSpPr>
+            <p:cNvPr id="64" name="Rectangle 63"/>
+            <p:cNvSpPr/>
+            <p:nvPr/>
+          </p:nvSpPr>
+          <p:spPr>
+            <a:xfrm>
+              <a:off x="7398626" y="2713719"/>
+              <a:ext cx="470371" cy="0"/>
+            </a:xfrm>
+            <a:prstGeom prst="rect">
+              <a:avLst/>
+            </a:prstGeom>
+            <a:solidFill>
+              <a:schemeClr val="bg1"/>
+            </a:solidFill>
+            <a:ln w="6350">
+              <a:solidFill>
+                <a:srgbClr val="D6541B"/>
+              </a:solidFill>
+            </a:ln>
+          </p:spPr>
+          <p:style>
+            <a:lnRef idx="2">
+              <a:schemeClr val="accent1">
+                <a:shade val="50000"/>
+              </a:schemeClr>
+            </a:lnRef>
+            <a:fillRef idx="1">
+              <a:schemeClr val="accent1"/>
+            </a:fillRef>
+            <a:effectRef idx="0">
+              <a:schemeClr val="accent1"/>
+            </a:effectRef>
+            <a:fontRef idx="minor">
+              <a:schemeClr val="lt1"/>
+            </a:fontRef>
+          </p:style>
+          <p:txBody>
+            <a:bodyPr rtlCol="0" anchor="ctr"/>
+            <a:lstStyle/>
+            <a:p>
+              <a:pPr algn="ctr"/>
+              <a:endParaRPr lang="en-US"/>
+            </a:p>
+          </p:txBody>
+        </p:sp>
+        <p:sp>
+          <p:nvSpPr>
+            <p:cNvPr id="65" name="Rectangle 64"/>
+            <p:cNvSpPr/>
+            <p:nvPr/>
+          </p:nvSpPr>
+          <p:spPr>
+            <a:xfrm>
+              <a:off x="7398627" y="2503455"/>
+              <a:ext cx="470371" cy="0"/>
+            </a:xfrm>
+            <a:prstGeom prst="rect">
+              <a:avLst/>
+            </a:prstGeom>
+            <a:solidFill>
+              <a:schemeClr val="bg1"/>
+            </a:solidFill>
+            <a:ln w="6350">
+              <a:solidFill>
+                <a:srgbClr val="0376C2"/>
+              </a:solidFill>
+            </a:ln>
+          </p:spPr>
+          <p:style>
+            <a:lnRef idx="2">
+              <a:schemeClr val="accent1">
+                <a:shade val="50000"/>
+              </a:schemeClr>
+            </a:lnRef>
+            <a:fillRef idx="1">
+              <a:schemeClr val="accent1"/>
+            </a:fillRef>
+            <a:effectRef idx="0">
+              <a:schemeClr val="accent1"/>
+            </a:effectRef>
+            <a:fontRef idx="minor">
+              <a:schemeClr val="lt1"/>
+            </a:fontRef>
+          </p:style>
+          <p:txBody>
+            <a:bodyPr rtlCol="0" anchor="ctr"/>
+            <a:lstStyle/>
+            <a:p>
+              <a:pPr algn="ctr"/>
+              <a:endParaRPr lang="en-US"/>
+            </a:p>
+          </p:txBody>
+        </p:sp>
+        <p:sp>
+          <p:nvSpPr>
+            <p:cNvPr id="66" name="Rectangle 65">
+              <a:extLst>
+                <a:ext uri="{FF2B5EF4-FFF2-40B4-BE49-F238E27FC236}">
+                  <a16:creationId xmlns:mc="http://schemas.openxmlformats.org/markup-compatibility/2006" xmlns:a14="http://schemas.microsoft.com/office/drawing/2010/main" xmlns:a16="http://schemas.microsoft.com/office/drawing/2014/main" xmlns="" id="{6D2C8BE0-B0D2-4978-A1B5-FFF5137A4C82}"/>
+                </a:ext>
+              </a:extLst>
+            </p:cNvPr>
+            <p:cNvSpPr/>
+            <p:nvPr/>
+          </p:nvSpPr>
+          <p:spPr>
+            <a:xfrm>
+              <a:off x="4297343" y="3317804"/>
+              <a:ext cx="1395983" cy="783729"/>
+            </a:xfrm>
+            <a:prstGeom prst="rect">
+              <a:avLst/>
+            </a:prstGeom>
+            <a:solidFill>
+              <a:schemeClr val="bg1"/>
+            </a:solidFill>
+            <a:ln>
+              <a:noFill/>
+            </a:ln>
+          </p:spPr>
+          <p:style>
+            <a:lnRef idx="2">
+              <a:schemeClr val="accent1">
+                <a:shade val="50000"/>
+              </a:schemeClr>
+            </a:lnRef>
+            <a:fillRef idx="1">
+              <a:schemeClr val="accent1"/>
+            </a:fillRef>
+            <a:effectRef idx="0">
+              <a:schemeClr val="accent1"/>
+            </a:effectRef>
+            <a:fontRef idx="minor">
+              <a:schemeClr val="lt1"/>
+            </a:fontRef>
+          </p:style>
+          <p:txBody>
+            <a:bodyPr rtlCol="0" anchor="ctr"/>
+            <a:lstStyle/>
+            <a:p>
+              <a:pPr algn="ctr"/>
+              <a:endParaRPr lang="en-US" sz="1400" dirty="0">
+                <a:solidFill>
+                  <a:schemeClr val="tx1"/>
+                </a:solidFill>
+                <a:latin typeface="Cambria Math" panose="02040503050406030204" pitchFamily="18" charset="0"/>
+                <a:ea typeface="Cambria Math" panose="02040503050406030204" pitchFamily="18" charset="0"/>
+              </a:endParaRPr>
+            </a:p>
+          </p:txBody>
+        </p:sp>
+        <p:sp>
+          <p:nvSpPr>
+            <p:cNvPr id="67" name="Rectangle 66">
+              <a:extLst>
+                <a:ext uri="{FF2B5EF4-FFF2-40B4-BE49-F238E27FC236}">
+                  <a16:creationId xmlns:mc="http://schemas.openxmlformats.org/markup-compatibility/2006" xmlns:a14="http://schemas.microsoft.com/office/drawing/2010/main" xmlns:a16="http://schemas.microsoft.com/office/drawing/2014/main" xmlns="" id="{6D2C8BE0-B0D2-4978-A1B5-FFF5137A4C82}"/>
+                </a:ext>
+              </a:extLst>
+            </p:cNvPr>
+            <p:cNvSpPr/>
+            <p:nvPr/>
+          </p:nvSpPr>
+          <p:spPr>
+            <a:xfrm>
+              <a:off x="8052268" y="1323829"/>
+              <a:ext cx="3111343" cy="783729"/>
+            </a:xfrm>
+            <a:prstGeom prst="rect">
+              <a:avLst/>
+            </a:prstGeom>
+            <a:solidFill>
+              <a:schemeClr val="bg1"/>
+            </a:solidFill>
+            <a:ln>
+              <a:noFill/>
+            </a:ln>
+          </p:spPr>
+          <p:style>
+            <a:lnRef idx="2">
+              <a:schemeClr val="accent1">
+                <a:shade val="50000"/>
+              </a:schemeClr>
+            </a:lnRef>
+            <a:fillRef idx="1">
+              <a:schemeClr val="accent1"/>
+            </a:fillRef>
+            <a:effectRef idx="0">
+              <a:schemeClr val="accent1"/>
+            </a:effectRef>
+            <a:fontRef idx="minor">
+              <a:schemeClr val="lt1"/>
+            </a:fontRef>
+          </p:style>
+          <p:txBody>
+            <a:bodyPr rtlCol="0" anchor="ctr"/>
+            <a:lstStyle/>
+            <a:p>
+              <a:pPr algn="ctr"/>
+              <a:endParaRPr lang="en-US" sz="1400" dirty="0">
+                <a:solidFill>
+                  <a:schemeClr val="tx1"/>
+                </a:solidFill>
+                <a:latin typeface="Cambria Math" panose="02040503050406030204" pitchFamily="18" charset="0"/>
+                <a:ea typeface="Cambria Math" panose="02040503050406030204" pitchFamily="18" charset="0"/>
+              </a:endParaRPr>
+            </a:p>
+          </p:txBody>
+        </p:sp>
+        <p:sp>
+          <p:nvSpPr>
+            <p:cNvPr id="52" name="Rectangle 51">
+              <a:extLst>
+                <a:ext uri="{FF2B5EF4-FFF2-40B4-BE49-F238E27FC236}">
+                  <a16:creationId xmlns:a16="http://schemas.microsoft.com/office/drawing/2014/main" xmlns:a14="http://schemas.microsoft.com/office/drawing/2010/main" xmlns:mc="http://schemas.openxmlformats.org/markup-compatibility/2006" xmlns="" id="{6D2C8BE0-B0D2-4978-A1B5-FFF5137A4C82}"/>
+                </a:ext>
+              </a:extLst>
+            </p:cNvPr>
+            <p:cNvSpPr/>
+            <p:nvPr/>
+          </p:nvSpPr>
+          <p:spPr>
+            <a:xfrm>
+              <a:off x="7931720" y="1111209"/>
+              <a:ext cx="1923838" cy="521426"/>
+            </a:xfrm>
+            <a:prstGeom prst="rect">
+              <a:avLst/>
+            </a:prstGeom>
+            <a:solidFill>
+              <a:schemeClr val="bg1"/>
+            </a:solidFill>
+            <a:ln>
+              <a:noFill/>
+            </a:ln>
+          </p:spPr>
+          <p:style>
+            <a:lnRef idx="2">
+              <a:schemeClr val="accent1">
+                <a:shade val="50000"/>
+              </a:schemeClr>
+            </a:lnRef>
+            <a:fillRef idx="1">
+              <a:schemeClr val="accent1"/>
+            </a:fillRef>
+            <a:effectRef idx="0">
+              <a:schemeClr val="accent1"/>
+            </a:effectRef>
+            <a:fontRef idx="minor">
+              <a:schemeClr val="lt1"/>
+            </a:fontRef>
+          </p:style>
+          <p:txBody>
+            <a:bodyPr rtlCol="0" anchor="ctr"/>
+            <a:lstStyle/>
+            <a:p>
+              <a:pPr algn="ctr"/>
+              <a:r>
+                <a:rPr lang="en-US" sz="1400" dirty="0">
                   <a:solidFill>
                     <a:schemeClr val="tx1"/>
                   </a:solidFill>
                   <a:latin typeface="Cambria Math" panose="02040503050406030204" pitchFamily="18" charset="0"/>
                   <a:ea typeface="Cambria Math" panose="02040503050406030204" pitchFamily="18" charset="0"/>
-                </a:endParaRPr>
-              </a:p>
-              <a:p>
-                <a:r>
-                  <a:rPr lang="en-US" sz="1400" dirty="0" smtClean="0">
-                    <a:solidFill>
-                      <a:schemeClr val="tx1"/>
-                    </a:solidFill>
-                    <a:latin typeface="Cambria Math" panose="02040503050406030204" pitchFamily="18" charset="0"/>
-                    <a:ea typeface="Cambria Math" panose="02040503050406030204" pitchFamily="18" charset="0"/>
-                  </a:rPr>
-                  <a:t>Viterbi test error </a:t>
-                </a:r>
-                <a:r>
-                  <a:rPr lang="en-US" sz="1400" dirty="0">
-                    <a:solidFill>
-                      <a:schemeClr val="tx1"/>
-                    </a:solidFill>
-                    <a:latin typeface="Cambria Math" panose="02040503050406030204" pitchFamily="18" charset="0"/>
-                    <a:ea typeface="Cambria Math" panose="02040503050406030204" pitchFamily="18" charset="0"/>
-                  </a:rPr>
-                  <a:t>with </a:t>
-                </a:r>
-                <a:r>
-                  <a:rPr lang="en-US" sz="1400" dirty="0" smtClean="0">
-                    <a:solidFill>
-                      <a:schemeClr val="tx1"/>
-                    </a:solidFill>
-                    <a:latin typeface="Cambria Math" panose="02040503050406030204" pitchFamily="18" charset="0"/>
-                    <a:ea typeface="Cambria Math" panose="02040503050406030204" pitchFamily="18" charset="0"/>
-                  </a:rPr>
-                  <a:t>learned </a:t>
-                </a:r>
-                <a14:m>
-                  <m:oMath xmlns:m="http://schemas.openxmlformats.org/officeDocument/2006/math">
-                    <m:r>
-                      <a:rPr lang="en-US" sz="1400" i="1">
-                        <a:solidFill>
-                          <a:schemeClr val="tx1"/>
-                        </a:solidFill>
-                        <a:latin typeface="Cambria Math" panose="02040503050406030204" pitchFamily="18" charset="0"/>
-                        <a:ea typeface="Cambria Math" panose="02040503050406030204" pitchFamily="18" charset="0"/>
-                      </a:rPr>
-                      <m:t>𝜃</m:t>
-                    </m:r>
-                  </m:oMath>
-                </a14:m>
-                <a:r>
-                  <a:rPr lang="en-US" sz="1400" dirty="0" smtClean="0">
-                    <a:solidFill>
-                      <a:schemeClr val="tx1"/>
-                    </a:solidFill>
-                    <a:latin typeface="Cambria Math" panose="02040503050406030204" pitchFamily="18" charset="0"/>
-                    <a:ea typeface="Cambria Math" panose="02040503050406030204" pitchFamily="18" charset="0"/>
-                  </a:rPr>
-                  <a:t> (average of runs)</a:t>
-                </a:r>
-              </a:p>
-              <a:p>
-                <a:r>
-                  <a:rPr lang="en-US" sz="1400" dirty="0" smtClean="0">
-                    <a:solidFill>
-                      <a:schemeClr val="tx1"/>
-                    </a:solidFill>
-                    <a:latin typeface="Cambria Math" panose="02040503050406030204" pitchFamily="18" charset="0"/>
-                    <a:ea typeface="Cambria Math" panose="02040503050406030204" pitchFamily="18" charset="0"/>
-                  </a:rPr>
-                  <a:t>Viterbi train error </a:t>
-                </a:r>
-                <a:r>
-                  <a:rPr lang="en-US" sz="1400" dirty="0">
-                    <a:solidFill>
-                      <a:schemeClr val="tx1"/>
-                    </a:solidFill>
-                    <a:latin typeface="Cambria Math" panose="02040503050406030204" pitchFamily="18" charset="0"/>
-                    <a:ea typeface="Cambria Math" panose="02040503050406030204" pitchFamily="18" charset="0"/>
-                  </a:rPr>
-                  <a:t>with </a:t>
-                </a:r>
-                <a:r>
-                  <a:rPr lang="en-US" sz="1400" dirty="0" smtClean="0">
-                    <a:solidFill>
-                      <a:schemeClr val="tx1"/>
-                    </a:solidFill>
-                    <a:latin typeface="Cambria Math" panose="02040503050406030204" pitchFamily="18" charset="0"/>
-                    <a:ea typeface="Cambria Math" panose="02040503050406030204" pitchFamily="18" charset="0"/>
-                  </a:rPr>
-                  <a:t>true </a:t>
-                </a:r>
-                <a14:m>
-                  <m:oMath xmlns:m="http://schemas.openxmlformats.org/officeDocument/2006/math">
-                    <m:r>
-                      <a:rPr lang="en-US" sz="1400" i="1">
-                        <a:solidFill>
-                          <a:schemeClr val="tx1"/>
-                        </a:solidFill>
-                        <a:latin typeface="Cambria Math" panose="02040503050406030204" pitchFamily="18" charset="0"/>
-                        <a:ea typeface="Cambria Math" panose="02040503050406030204" pitchFamily="18" charset="0"/>
-                      </a:rPr>
-                      <m:t>𝜃</m:t>
-                    </m:r>
-                  </m:oMath>
-                </a14:m>
-                <a:endParaRPr lang="en-US" sz="1400" dirty="0" smtClean="0">
+                </a:rPr>
+                <a:t>With Regularization </a:t>
+              </a:r>
+            </a:p>
+          </p:txBody>
+        </p:sp>
+        <p:sp>
+          <p:nvSpPr>
+            <p:cNvPr id="51" name="Rectangle 50">
+              <a:extLst>
+                <a:ext uri="{FF2B5EF4-FFF2-40B4-BE49-F238E27FC236}">
+                  <a16:creationId xmlns:a16="http://schemas.microsoft.com/office/drawing/2014/main" xmlns:a14="http://schemas.microsoft.com/office/drawing/2010/main" xmlns:mc="http://schemas.openxmlformats.org/markup-compatibility/2006" xmlns="" id="{6D2C8BE0-B0D2-4978-A1B5-FFF5137A4C82}"/>
+                </a:ext>
+              </a:extLst>
+            </p:cNvPr>
+            <p:cNvSpPr/>
+            <p:nvPr/>
+          </p:nvSpPr>
+          <p:spPr>
+            <a:xfrm>
+              <a:off x="2337268" y="1111209"/>
+              <a:ext cx="2609638" cy="521426"/>
+            </a:xfrm>
+            <a:prstGeom prst="rect">
+              <a:avLst/>
+            </a:prstGeom>
+            <a:solidFill>
+              <a:schemeClr val="bg1"/>
+            </a:solidFill>
+            <a:ln>
+              <a:noFill/>
+            </a:ln>
+          </p:spPr>
+          <p:style>
+            <a:lnRef idx="2">
+              <a:schemeClr val="accent1">
+                <a:shade val="50000"/>
+              </a:schemeClr>
+            </a:lnRef>
+            <a:fillRef idx="1">
+              <a:schemeClr val="accent1"/>
+            </a:fillRef>
+            <a:effectRef idx="0">
+              <a:schemeClr val="accent1"/>
+            </a:effectRef>
+            <a:fontRef idx="minor">
+              <a:schemeClr val="lt1"/>
+            </a:fontRef>
+          </p:style>
+          <p:txBody>
+            <a:bodyPr rtlCol="0" anchor="ctr"/>
+            <a:lstStyle/>
+            <a:p>
+              <a:pPr algn="ctr"/>
+              <a:r>
+                <a:rPr lang="en-US" sz="1400" dirty="0" smtClean="0">
                   <a:solidFill>
                     <a:schemeClr val="tx1"/>
                   </a:solidFill>
                   <a:latin typeface="Cambria Math" panose="02040503050406030204" pitchFamily="18" charset="0"/>
                   <a:ea typeface="Cambria Math" panose="02040503050406030204" pitchFamily="18" charset="0"/>
-                </a:endParaRPr>
-              </a:p>
-              <a:p>
-                <a:r>
-                  <a:rPr lang="en-US" sz="1400" dirty="0">
-                    <a:solidFill>
-                      <a:schemeClr val="tx1"/>
-                    </a:solidFill>
-                    <a:latin typeface="Cambria Math" panose="02040503050406030204" pitchFamily="18" charset="0"/>
-                    <a:ea typeface="Cambria Math" panose="02040503050406030204" pitchFamily="18" charset="0"/>
-                  </a:rPr>
-                  <a:t>Viterbi </a:t>
-                </a:r>
-                <a:r>
-                  <a:rPr lang="en-US" sz="1400" dirty="0" smtClean="0">
-                    <a:solidFill>
-                      <a:schemeClr val="tx1"/>
-                    </a:solidFill>
-                    <a:latin typeface="Cambria Math" panose="02040503050406030204" pitchFamily="18" charset="0"/>
-                    <a:ea typeface="Cambria Math" panose="02040503050406030204" pitchFamily="18" charset="0"/>
-                  </a:rPr>
-                  <a:t>test error </a:t>
-                </a:r>
-                <a:r>
-                  <a:rPr lang="en-US" sz="1400" dirty="0">
-                    <a:solidFill>
-                      <a:schemeClr val="tx1"/>
-                    </a:solidFill>
-                    <a:latin typeface="Cambria Math" panose="02040503050406030204" pitchFamily="18" charset="0"/>
-                    <a:ea typeface="Cambria Math" panose="02040503050406030204" pitchFamily="18" charset="0"/>
-                  </a:rPr>
-                  <a:t>with true </a:t>
-                </a:r>
-                <a14:m>
-                  <m:oMath xmlns:m="http://schemas.openxmlformats.org/officeDocument/2006/math">
-                    <m:r>
-                      <a:rPr lang="en-US" sz="1400" b="0" i="0" smtClean="0">
-                        <a:solidFill>
-                          <a:schemeClr val="tx1"/>
-                        </a:solidFill>
-                        <a:latin typeface="Cambria Math" panose="02040503050406030204" pitchFamily="18" charset="0"/>
-                        <a:ea typeface="Cambria Math" panose="02040503050406030204" pitchFamily="18" charset="0"/>
-                      </a:rPr>
-                      <m:t> </m:t>
-                    </m:r>
-                    <m:r>
-                      <a:rPr lang="en-US" sz="1400" i="1">
-                        <a:solidFill>
-                          <a:schemeClr val="tx1"/>
-                        </a:solidFill>
-                        <a:latin typeface="Cambria Math" panose="02040503050406030204" pitchFamily="18" charset="0"/>
-                        <a:ea typeface="Cambria Math" panose="02040503050406030204" pitchFamily="18" charset="0"/>
-                      </a:rPr>
-                      <m:t>𝜃</m:t>
-                    </m:r>
-                  </m:oMath>
-                </a14:m>
-                <a:endParaRPr lang="en-US" sz="1400" dirty="0">
+                </a:rPr>
+                <a:t>Without </a:t>
+              </a:r>
+              <a:r>
+                <a:rPr lang="en-US" sz="1400" dirty="0">
                   <a:solidFill>
                     <a:schemeClr val="tx1"/>
                   </a:solidFill>
                   <a:latin typeface="Cambria Math" panose="02040503050406030204" pitchFamily="18" charset="0"/>
                   <a:ea typeface="Cambria Math" panose="02040503050406030204" pitchFamily="18" charset="0"/>
-                </a:endParaRPr>
-              </a:p>
-            </p:txBody>
-          </p:sp>
-        </mc:Choice>
-        <mc:Fallback>
-          <p:sp>
-            <p:nvSpPr>
-              <p:cNvPr id="59" name="Rectangle 58"/>
-              <p:cNvSpPr>
-                <a:spLocks noRot="1" noChangeAspect="1" noMove="1" noResize="1" noEditPoints="1" noAdjustHandles="1" noChangeArrowheads="1" noChangeShapeType="1" noTextEdit="1"/>
-              </p:cNvSpPr>
-              <p:nvPr/>
-            </p:nvSpPr>
-            <p:spPr>
-              <a:xfrm>
-                <a:off x="7877625" y="2405487"/>
-                <a:ext cx="4240422" cy="1268708"/>
-              </a:xfrm>
-              <a:prstGeom prst="rect">
-                <a:avLst/>
-              </a:prstGeom>
-              <a:blipFill rotWithShape="0">
-                <a:blip r:embed="rId4"/>
-                <a:stretch>
-                  <a:fillRect l="-287" t="-5238" b="-8095"/>
-                </a:stretch>
-              </a:blipFill>
-              <a:ln>
-                <a:solidFill>
-                  <a:schemeClr val="bg1"/>
-                </a:solidFill>
-              </a:ln>
-            </p:spPr>
-            <p:txBody>
-              <a:bodyPr/>
-              <a:lstStyle/>
-              <a:p>
-                <a:r>
-                  <a:rPr lang="en-US">
-                    <a:noFill/>
-                  </a:rPr>
-                  <a:t> </a:t>
-                </a:r>
-              </a:p>
-            </p:txBody>
-          </p:sp>
-        </mc:Fallback>
-      </mc:AlternateContent>
-      <p:sp>
-        <p:nvSpPr>
-          <p:cNvPr id="60" name="Rectangle 59"/>
-          <p:cNvSpPr/>
-          <p:nvPr/>
-        </p:nvSpPr>
-        <p:spPr>
-          <a:xfrm>
-            <a:off x="7398628" y="3548895"/>
-            <a:ext cx="470371" cy="27432"/>
-          </a:xfrm>
-          <a:prstGeom prst="rect">
-            <a:avLst/>
-          </a:prstGeom>
-          <a:solidFill>
-            <a:srgbClr val="C0B577"/>
-          </a:solidFill>
-          <a:ln>
-            <a:noFill/>
-          </a:ln>
-        </p:spPr>
-        <p:style>
-          <a:lnRef idx="2">
-            <a:schemeClr val="accent1">
-              <a:shade val="50000"/>
-            </a:schemeClr>
-          </a:lnRef>
-          <a:fillRef idx="1">
-            <a:schemeClr val="accent1"/>
-          </a:fillRef>
-          <a:effectRef idx="0">
-            <a:schemeClr val="accent1"/>
-          </a:effectRef>
-          <a:fontRef idx="minor">
-            <a:schemeClr val="lt1"/>
-          </a:fontRef>
-        </p:style>
-        <p:txBody>
-          <a:bodyPr rtlCol="0" anchor="ctr"/>
-          <a:lstStyle/>
-          <a:p>
-            <a:pPr algn="ctr"/>
-            <a:endParaRPr lang="en-US"/>
-          </a:p>
-        </p:txBody>
-      </p:sp>
-      <p:sp>
-        <p:nvSpPr>
-          <p:cNvPr id="61" name="Rectangle 60"/>
-          <p:cNvSpPr/>
-          <p:nvPr/>
-        </p:nvSpPr>
-        <p:spPr>
-          <a:xfrm>
-            <a:off x="7398628" y="3332729"/>
-            <a:ext cx="470371" cy="27432"/>
-          </a:xfrm>
-          <a:prstGeom prst="rect">
-            <a:avLst/>
-          </a:prstGeom>
-          <a:solidFill>
-            <a:srgbClr val="6E277F"/>
-          </a:solidFill>
-          <a:ln>
-            <a:noFill/>
-          </a:ln>
-        </p:spPr>
-        <p:style>
-          <a:lnRef idx="2">
-            <a:schemeClr val="accent1">
-              <a:shade val="50000"/>
-            </a:schemeClr>
-          </a:lnRef>
-          <a:fillRef idx="1">
-            <a:schemeClr val="accent1"/>
-          </a:fillRef>
-          <a:effectRef idx="0">
-            <a:schemeClr val="accent1"/>
-          </a:effectRef>
-          <a:fontRef idx="minor">
-            <a:schemeClr val="lt1"/>
-          </a:fontRef>
-        </p:style>
-        <p:txBody>
-          <a:bodyPr rtlCol="0" anchor="ctr"/>
-          <a:lstStyle/>
-          <a:p>
-            <a:pPr algn="ctr"/>
-            <a:endParaRPr lang="en-US">
-              <a:solidFill>
-                <a:srgbClr val="7030A0"/>
-              </a:solidFill>
-            </a:endParaRPr>
-          </a:p>
-        </p:txBody>
-      </p:sp>
-      <p:sp>
-        <p:nvSpPr>
-          <p:cNvPr id="62" name="Rectangle 61"/>
-          <p:cNvSpPr/>
-          <p:nvPr/>
-        </p:nvSpPr>
-        <p:spPr>
-          <a:xfrm>
-            <a:off x="7398627" y="3130279"/>
-            <a:ext cx="470371" cy="27432"/>
-          </a:xfrm>
-          <a:prstGeom prst="rect">
-            <a:avLst/>
-          </a:prstGeom>
-          <a:solidFill>
-            <a:schemeClr val="accent2">
-              <a:lumMod val="75000"/>
-            </a:schemeClr>
-          </a:solidFill>
-          <a:ln>
-            <a:noFill/>
-          </a:ln>
-        </p:spPr>
-        <p:style>
-          <a:lnRef idx="2">
-            <a:schemeClr val="accent1">
-              <a:shade val="50000"/>
-            </a:schemeClr>
-          </a:lnRef>
-          <a:fillRef idx="1">
-            <a:schemeClr val="accent1"/>
-          </a:fillRef>
-          <a:effectRef idx="0">
-            <a:schemeClr val="accent1"/>
-          </a:effectRef>
-          <a:fontRef idx="minor">
-            <a:schemeClr val="lt1"/>
-          </a:fontRef>
-        </p:style>
-        <p:txBody>
-          <a:bodyPr rtlCol="0" anchor="ctr"/>
-          <a:lstStyle/>
-          <a:p>
-            <a:pPr algn="ctr"/>
-            <a:endParaRPr lang="en-US"/>
-          </a:p>
-        </p:txBody>
-      </p:sp>
-      <p:sp>
-        <p:nvSpPr>
-          <p:cNvPr id="63" name="Rectangle 62"/>
-          <p:cNvSpPr/>
-          <p:nvPr/>
-        </p:nvSpPr>
-        <p:spPr>
-          <a:xfrm>
-            <a:off x="7398628" y="2920015"/>
-            <a:ext cx="470371" cy="27432"/>
-          </a:xfrm>
-          <a:prstGeom prst="rect">
-            <a:avLst/>
-          </a:prstGeom>
-          <a:solidFill>
-            <a:schemeClr val="accent1">
-              <a:lumMod val="75000"/>
-            </a:schemeClr>
-          </a:solidFill>
-          <a:ln>
-            <a:noFill/>
-          </a:ln>
-        </p:spPr>
-        <p:style>
-          <a:lnRef idx="2">
-            <a:schemeClr val="accent1">
-              <a:shade val="50000"/>
-            </a:schemeClr>
-          </a:lnRef>
-          <a:fillRef idx="1">
-            <a:schemeClr val="accent1"/>
-          </a:fillRef>
-          <a:effectRef idx="0">
-            <a:schemeClr val="accent1"/>
-          </a:effectRef>
-          <a:fontRef idx="minor">
-            <a:schemeClr val="lt1"/>
-          </a:fontRef>
-        </p:style>
-        <p:txBody>
-          <a:bodyPr rtlCol="0" anchor="ctr"/>
-          <a:lstStyle/>
-          <a:p>
-            <a:pPr algn="ctr"/>
-            <a:endParaRPr lang="en-US"/>
-          </a:p>
-        </p:txBody>
-      </p:sp>
-      <p:sp>
-        <p:nvSpPr>
-          <p:cNvPr id="64" name="Rectangle 63"/>
-          <p:cNvSpPr/>
-          <p:nvPr/>
-        </p:nvSpPr>
-        <p:spPr>
-          <a:xfrm>
-            <a:off x="7398626" y="2713719"/>
-            <a:ext cx="470371" cy="0"/>
-          </a:xfrm>
-          <a:prstGeom prst="rect">
-            <a:avLst/>
-          </a:prstGeom>
-          <a:solidFill>
-            <a:schemeClr val="bg1"/>
-          </a:solidFill>
-          <a:ln w="6350">
+                </a:rPr>
+                <a:t>Regularization </a:t>
+              </a:r>
+            </a:p>
+          </p:txBody>
+        </p:sp>
+        <p:sp>
+          <p:nvSpPr>
+            <p:cNvPr id="57" name="Rectangle 56">
+              <a:extLst>
+                <a:ext uri="{FF2B5EF4-FFF2-40B4-BE49-F238E27FC236}">
+                  <a16:creationId xmlns:mc="http://schemas.openxmlformats.org/markup-compatibility/2006" xmlns:a14="http://schemas.microsoft.com/office/drawing/2010/main" xmlns:a16="http://schemas.microsoft.com/office/drawing/2014/main" xmlns="" id="{6D2C8BE0-B0D2-4978-A1B5-FFF5137A4C82}"/>
+                </a:ext>
+              </a:extLst>
+            </p:cNvPr>
+            <p:cNvSpPr/>
+            <p:nvPr/>
+          </p:nvSpPr>
+          <p:spPr>
+            <a:xfrm>
+              <a:off x="-695669" y="2407055"/>
+              <a:ext cx="1887185" cy="1906212"/>
+            </a:xfrm>
+            <a:prstGeom prst="rect">
+              <a:avLst/>
+            </a:prstGeom>
             <a:solidFill>
-              <a:srgbClr val="D6541B"/>
+              <a:schemeClr val="bg1"/>
             </a:solidFill>
-          </a:ln>
-        </p:spPr>
-        <p:style>
-          <a:lnRef idx="2">
-            <a:schemeClr val="accent1">
-              <a:shade val="50000"/>
-            </a:schemeClr>
-          </a:lnRef>
-          <a:fillRef idx="1">
-            <a:schemeClr val="accent1"/>
-          </a:fillRef>
-          <a:effectRef idx="0">
-            <a:schemeClr val="accent1"/>
-          </a:effectRef>
-          <a:fontRef idx="minor">
-            <a:schemeClr val="lt1"/>
-          </a:fontRef>
-        </p:style>
-        <p:txBody>
-          <a:bodyPr rtlCol="0" anchor="ctr"/>
-          <a:lstStyle/>
-          <a:p>
-            <a:pPr algn="ctr"/>
-            <a:endParaRPr lang="en-US"/>
-          </a:p>
-        </p:txBody>
-      </p:sp>
-      <p:sp>
-        <p:nvSpPr>
-          <p:cNvPr id="65" name="Rectangle 64"/>
-          <p:cNvSpPr/>
-          <p:nvPr/>
-        </p:nvSpPr>
-        <p:spPr>
-          <a:xfrm>
-            <a:off x="7398627" y="2503455"/>
-            <a:ext cx="470371" cy="0"/>
-          </a:xfrm>
-          <a:prstGeom prst="rect">
-            <a:avLst/>
-          </a:prstGeom>
-          <a:solidFill>
-            <a:schemeClr val="bg1"/>
-          </a:solidFill>
-          <a:ln w="6350">
-            <a:solidFill>
-              <a:srgbClr val="0376C2"/>
-            </a:solidFill>
-          </a:ln>
-        </p:spPr>
-        <p:style>
-          <a:lnRef idx="2">
-            <a:schemeClr val="accent1">
-              <a:shade val="50000"/>
-            </a:schemeClr>
-          </a:lnRef>
-          <a:fillRef idx="1">
-            <a:schemeClr val="accent1"/>
-          </a:fillRef>
-          <a:effectRef idx="0">
-            <a:schemeClr val="accent1"/>
-          </a:effectRef>
-          <a:fontRef idx="minor">
-            <a:schemeClr val="lt1"/>
-          </a:fontRef>
-        </p:style>
-        <p:txBody>
-          <a:bodyPr rtlCol="0" anchor="ctr"/>
-          <a:lstStyle/>
-          <a:p>
-            <a:pPr algn="ctr"/>
-            <a:endParaRPr lang="en-US"/>
-          </a:p>
-        </p:txBody>
-      </p:sp>
-      <p:sp>
-        <p:nvSpPr>
-          <p:cNvPr id="66" name="Rectangle 65">
-            <a:extLst>
-              <a:ext uri="{FF2B5EF4-FFF2-40B4-BE49-F238E27FC236}">
-                <a16:creationId xmlns="" xmlns:a16="http://schemas.microsoft.com/office/drawing/2014/main" xmlns:a14="http://schemas.microsoft.com/office/drawing/2010/main" xmlns:mc="http://schemas.openxmlformats.org/markup-compatibility/2006" id="{6D2C8BE0-B0D2-4978-A1B5-FFF5137A4C82}"/>
-              </a:ext>
-            </a:extLst>
-          </p:cNvPr>
-          <p:cNvSpPr/>
-          <p:nvPr/>
-        </p:nvSpPr>
-        <p:spPr>
-          <a:xfrm>
-            <a:off x="4297343" y="3317804"/>
-            <a:ext cx="1395983" cy="783729"/>
-          </a:xfrm>
-          <a:prstGeom prst="rect">
-            <a:avLst/>
-          </a:prstGeom>
-          <a:solidFill>
-            <a:schemeClr val="bg1"/>
-          </a:solidFill>
-          <a:ln>
-            <a:noFill/>
-          </a:ln>
-        </p:spPr>
-        <p:style>
-          <a:lnRef idx="2">
-            <a:schemeClr val="accent1">
-              <a:shade val="50000"/>
-            </a:schemeClr>
-          </a:lnRef>
-          <a:fillRef idx="1">
-            <a:schemeClr val="accent1"/>
-          </a:fillRef>
-          <a:effectRef idx="0">
-            <a:schemeClr val="accent1"/>
-          </a:effectRef>
-          <a:fontRef idx="minor">
-            <a:schemeClr val="lt1"/>
-          </a:fontRef>
-        </p:style>
-        <p:txBody>
-          <a:bodyPr rtlCol="0" anchor="ctr"/>
-          <a:lstStyle/>
-          <a:p>
-            <a:pPr algn="ctr"/>
-            <a:endParaRPr lang="en-US" sz="1400" dirty="0">
-              <a:solidFill>
-                <a:schemeClr val="tx1"/>
-              </a:solidFill>
-              <a:latin typeface="Cambria Math" panose="02040503050406030204" pitchFamily="18" charset="0"/>
-              <a:ea typeface="Cambria Math" panose="02040503050406030204" pitchFamily="18" charset="0"/>
-            </a:endParaRPr>
-          </a:p>
-        </p:txBody>
-      </p:sp>
-      <p:sp>
-        <p:nvSpPr>
-          <p:cNvPr id="67" name="Rectangle 66">
-            <a:extLst>
-              <a:ext uri="{FF2B5EF4-FFF2-40B4-BE49-F238E27FC236}">
-                <a16:creationId xmlns="" xmlns:a16="http://schemas.microsoft.com/office/drawing/2014/main" xmlns:a14="http://schemas.microsoft.com/office/drawing/2010/main" xmlns:mc="http://schemas.openxmlformats.org/markup-compatibility/2006" id="{6D2C8BE0-B0D2-4978-A1B5-FFF5137A4C82}"/>
-              </a:ext>
-            </a:extLst>
-          </p:cNvPr>
-          <p:cNvSpPr/>
-          <p:nvPr/>
-        </p:nvSpPr>
-        <p:spPr>
-          <a:xfrm>
-            <a:off x="8052268" y="1323829"/>
-            <a:ext cx="3111343" cy="783729"/>
-          </a:xfrm>
-          <a:prstGeom prst="rect">
-            <a:avLst/>
-          </a:prstGeom>
-          <a:solidFill>
-            <a:schemeClr val="bg1"/>
-          </a:solidFill>
-          <a:ln>
-            <a:noFill/>
-          </a:ln>
-        </p:spPr>
-        <p:style>
-          <a:lnRef idx="2">
-            <a:schemeClr val="accent1">
-              <a:shade val="50000"/>
-            </a:schemeClr>
-          </a:lnRef>
-          <a:fillRef idx="1">
-            <a:schemeClr val="accent1"/>
-          </a:fillRef>
-          <a:effectRef idx="0">
-            <a:schemeClr val="accent1"/>
-          </a:effectRef>
-          <a:fontRef idx="minor">
-            <a:schemeClr val="lt1"/>
-          </a:fontRef>
-        </p:style>
-        <p:txBody>
-          <a:bodyPr rtlCol="0" anchor="ctr"/>
-          <a:lstStyle/>
-          <a:p>
-            <a:pPr algn="ctr"/>
-            <a:endParaRPr lang="en-US" sz="1400" dirty="0">
-              <a:solidFill>
-                <a:schemeClr val="tx1"/>
-              </a:solidFill>
-              <a:latin typeface="Cambria Math" panose="02040503050406030204" pitchFamily="18" charset="0"/>
-              <a:ea typeface="Cambria Math" panose="02040503050406030204" pitchFamily="18" charset="0"/>
-            </a:endParaRPr>
-          </a:p>
-        </p:txBody>
-      </p:sp>
-      <p:sp>
-        <p:nvSpPr>
-          <p:cNvPr id="52" name="Rectangle 51">
-            <a:extLst>
-              <a:ext uri="{FF2B5EF4-FFF2-40B4-BE49-F238E27FC236}">
-                <a16:creationId xmlns="" xmlns:mc="http://schemas.openxmlformats.org/markup-compatibility/2006" xmlns:a14="http://schemas.microsoft.com/office/drawing/2010/main" xmlns:a16="http://schemas.microsoft.com/office/drawing/2014/main" id="{6D2C8BE0-B0D2-4978-A1B5-FFF5137A4C82}"/>
-              </a:ext>
-            </a:extLst>
-          </p:cNvPr>
-          <p:cNvSpPr/>
-          <p:nvPr/>
-        </p:nvSpPr>
-        <p:spPr>
-          <a:xfrm>
-            <a:off x="7931720" y="1111209"/>
-            <a:ext cx="1923838" cy="521426"/>
-          </a:xfrm>
-          <a:prstGeom prst="rect">
-            <a:avLst/>
-          </a:prstGeom>
-          <a:solidFill>
-            <a:schemeClr val="bg1"/>
-          </a:solidFill>
-          <a:ln>
-            <a:noFill/>
-          </a:ln>
-        </p:spPr>
-        <p:style>
-          <a:lnRef idx="2">
-            <a:schemeClr val="accent1">
-              <a:shade val="50000"/>
-            </a:schemeClr>
-          </a:lnRef>
-          <a:fillRef idx="1">
-            <a:schemeClr val="accent1"/>
-          </a:fillRef>
-          <a:effectRef idx="0">
-            <a:schemeClr val="accent1"/>
-          </a:effectRef>
-          <a:fontRef idx="minor">
-            <a:schemeClr val="lt1"/>
-          </a:fontRef>
-        </p:style>
-        <p:txBody>
-          <a:bodyPr rtlCol="0" anchor="ctr"/>
-          <a:lstStyle/>
-          <a:p>
-            <a:pPr algn="ctr"/>
-            <a:r>
-              <a:rPr lang="en-US" sz="1400" dirty="0">
+            <a:ln>
+              <a:noFill/>
+            </a:ln>
+          </p:spPr>
+          <p:style>
+            <a:lnRef idx="2">
+              <a:schemeClr val="accent1">
+                <a:shade val="50000"/>
+              </a:schemeClr>
+            </a:lnRef>
+            <a:fillRef idx="1">
+              <a:schemeClr val="accent1"/>
+            </a:fillRef>
+            <a:effectRef idx="0">
+              <a:schemeClr val="accent1"/>
+            </a:effectRef>
+            <a:fontRef idx="minor">
+              <a:schemeClr val="lt1"/>
+            </a:fontRef>
+          </p:style>
+          <p:txBody>
+            <a:bodyPr lIns="0" tIns="0" rIns="0" bIns="0" rtlCol="0" anchor="ctr"/>
+            <a:lstStyle/>
+            <a:p>
+              <a:pPr algn="ctr"/>
+              <a:r>
+                <a:rPr lang="en-US" sz="2000" dirty="0" smtClean="0">
+                  <a:solidFill>
+                    <a:schemeClr val="tx1"/>
+                  </a:solidFill>
+                  <a:latin typeface="Cambria Math" panose="02040503050406030204" pitchFamily="18" charset="0"/>
+                  <a:ea typeface="Cambria Math" panose="02040503050406030204" pitchFamily="18" charset="0"/>
+                </a:rPr>
+                <a:t>Misclassification </a:t>
+              </a:r>
+              <a:r>
+                <a:rPr lang="en-US" sz="2000" dirty="0" smtClean="0">
+                  <a:solidFill>
+                    <a:schemeClr val="tx1"/>
+                  </a:solidFill>
+                  <a:latin typeface="Cambria Math" panose="02040503050406030204" pitchFamily="18" charset="0"/>
+                  <a:ea typeface="Cambria Math" panose="02040503050406030204" pitchFamily="18" charset="0"/>
+                </a:rPr>
+                <a:t>Rate</a:t>
+              </a:r>
+              <a:endParaRPr lang="en-US" sz="2000" dirty="0">
                 <a:solidFill>
                   <a:schemeClr val="tx1"/>
                 </a:solidFill>
                 <a:latin typeface="Cambria Math" panose="02040503050406030204" pitchFamily="18" charset="0"/>
                 <a:ea typeface="Cambria Math" panose="02040503050406030204" pitchFamily="18" charset="0"/>
-              </a:rPr>
-              <a:t>With Regularization </a:t>
-            </a:r>
-          </a:p>
-        </p:txBody>
-      </p:sp>
-      <p:sp>
-        <p:nvSpPr>
-          <p:cNvPr id="51" name="Rectangle 50">
-            <a:extLst>
-              <a:ext uri="{FF2B5EF4-FFF2-40B4-BE49-F238E27FC236}">
-                <a16:creationId xmlns="" xmlns:mc="http://schemas.openxmlformats.org/markup-compatibility/2006" xmlns:a14="http://schemas.microsoft.com/office/drawing/2010/main" xmlns:a16="http://schemas.microsoft.com/office/drawing/2014/main" id="{6D2C8BE0-B0D2-4978-A1B5-FFF5137A4C82}"/>
-              </a:ext>
-            </a:extLst>
-          </p:cNvPr>
-          <p:cNvSpPr/>
-          <p:nvPr/>
-        </p:nvSpPr>
-        <p:spPr>
-          <a:xfrm>
-            <a:off x="2337268" y="1111209"/>
-            <a:ext cx="2609638" cy="521426"/>
-          </a:xfrm>
-          <a:prstGeom prst="rect">
-            <a:avLst/>
-          </a:prstGeom>
-          <a:solidFill>
-            <a:schemeClr val="bg1"/>
-          </a:solidFill>
-          <a:ln>
-            <a:noFill/>
-          </a:ln>
-        </p:spPr>
-        <p:style>
-          <a:lnRef idx="2">
-            <a:schemeClr val="accent1">
-              <a:shade val="50000"/>
-            </a:schemeClr>
-          </a:lnRef>
-          <a:fillRef idx="1">
-            <a:schemeClr val="accent1"/>
-          </a:fillRef>
-          <a:effectRef idx="0">
-            <a:schemeClr val="accent1"/>
-          </a:effectRef>
-          <a:fontRef idx="minor">
-            <a:schemeClr val="lt1"/>
-          </a:fontRef>
-        </p:style>
-        <p:txBody>
-          <a:bodyPr rtlCol="0" anchor="ctr"/>
-          <a:lstStyle/>
-          <a:p>
-            <a:pPr algn="ctr"/>
-            <a:r>
-              <a:rPr lang="en-US" sz="1400" dirty="0" smtClean="0">
+              </a:endParaRPr>
+            </a:p>
+          </p:txBody>
+        </p:sp>
+        <p:sp>
+          <p:nvSpPr>
+            <p:cNvPr id="30" name="Rectangle 29">
+              <a:extLst>
+                <a:ext uri="{FF2B5EF4-FFF2-40B4-BE49-F238E27FC236}">
+                  <a16:creationId xmlns:a16="http://schemas.microsoft.com/office/drawing/2014/main" xmlns:a14="http://schemas.microsoft.com/office/drawing/2010/main" xmlns:mc="http://schemas.openxmlformats.org/markup-compatibility/2006" xmlns="" id="{2E36643D-EEA2-42A8-BBCF-DC12D9FC8BA4}"/>
+                </a:ext>
+              </a:extLst>
+            </p:cNvPr>
+            <p:cNvSpPr/>
+            <p:nvPr/>
+          </p:nvSpPr>
+          <p:spPr>
+            <a:xfrm>
+              <a:off x="2680168" y="5298934"/>
+              <a:ext cx="2024961" cy="287389"/>
+            </a:xfrm>
+            <a:prstGeom prst="rect">
+              <a:avLst/>
+            </a:prstGeom>
+            <a:solidFill>
+              <a:schemeClr val="bg1"/>
+            </a:solidFill>
+            <a:ln>
+              <a:noFill/>
+            </a:ln>
+          </p:spPr>
+          <p:style>
+            <a:lnRef idx="2">
+              <a:schemeClr val="accent1">
+                <a:shade val="50000"/>
+              </a:schemeClr>
+            </a:lnRef>
+            <a:fillRef idx="1">
+              <a:schemeClr val="accent1"/>
+            </a:fillRef>
+            <a:effectRef idx="0">
+              <a:schemeClr val="accent1"/>
+            </a:effectRef>
+            <a:fontRef idx="minor">
+              <a:schemeClr val="lt1"/>
+            </a:fontRef>
+          </p:style>
+          <p:txBody>
+            <a:bodyPr rtlCol="0" anchor="ctr"/>
+            <a:lstStyle/>
+            <a:p>
+              <a:pPr algn="ctr"/>
+              <a:r>
+                <a:rPr lang="en-GB" sz="2000" dirty="0">
+                  <a:solidFill>
+                    <a:schemeClr val="tx1"/>
+                  </a:solidFill>
+                  <a:latin typeface="Cambria Math" panose="02040503050406030204" pitchFamily="18" charset="0"/>
+                  <a:ea typeface="Cambria Math" panose="02040503050406030204" pitchFamily="18" charset="0"/>
+                </a:rPr>
+                <a:t>EM Iterations</a:t>
+              </a:r>
+              <a:endParaRPr lang="en-US" sz="2000" dirty="0">
                 <a:solidFill>
                   <a:schemeClr val="tx1"/>
                 </a:solidFill>
                 <a:latin typeface="Cambria Math" panose="02040503050406030204" pitchFamily="18" charset="0"/>
                 <a:ea typeface="Cambria Math" panose="02040503050406030204" pitchFamily="18" charset="0"/>
-              </a:rPr>
-              <a:t>Without </a:t>
-            </a:r>
-            <a:r>
-              <a:rPr lang="en-US" sz="1400" dirty="0">
+              </a:endParaRPr>
+            </a:p>
+          </p:txBody>
+        </p:sp>
+        <p:sp>
+          <p:nvSpPr>
+            <p:cNvPr id="31" name="Rectangle 30">
+              <a:extLst>
+                <a:ext uri="{FF2B5EF4-FFF2-40B4-BE49-F238E27FC236}">
+                  <a16:creationId xmlns:a16="http://schemas.microsoft.com/office/drawing/2014/main" xmlns:a14="http://schemas.microsoft.com/office/drawing/2010/main" xmlns:mc="http://schemas.openxmlformats.org/markup-compatibility/2006" xmlns="" id="{2E36643D-EEA2-42A8-BBCF-DC12D9FC8BA4}"/>
+                </a:ext>
+              </a:extLst>
+            </p:cNvPr>
+            <p:cNvSpPr/>
+            <p:nvPr/>
+          </p:nvSpPr>
+          <p:spPr>
+            <a:xfrm>
+              <a:off x="7931720" y="5298934"/>
+              <a:ext cx="2024961" cy="287389"/>
+            </a:xfrm>
+            <a:prstGeom prst="rect">
+              <a:avLst/>
+            </a:prstGeom>
+            <a:solidFill>
+              <a:schemeClr val="bg1"/>
+            </a:solidFill>
+            <a:ln>
+              <a:noFill/>
+            </a:ln>
+          </p:spPr>
+          <p:style>
+            <a:lnRef idx="2">
+              <a:schemeClr val="accent1">
+                <a:shade val="50000"/>
+              </a:schemeClr>
+            </a:lnRef>
+            <a:fillRef idx="1">
+              <a:schemeClr val="accent1"/>
+            </a:fillRef>
+            <a:effectRef idx="0">
+              <a:schemeClr val="accent1"/>
+            </a:effectRef>
+            <a:fontRef idx="minor">
+              <a:schemeClr val="lt1"/>
+            </a:fontRef>
+          </p:style>
+          <p:txBody>
+            <a:bodyPr rtlCol="0" anchor="ctr"/>
+            <a:lstStyle/>
+            <a:p>
+              <a:pPr algn="ctr"/>
+              <a:r>
+                <a:rPr lang="en-GB" sz="2000" dirty="0" smtClean="0">
+                  <a:solidFill>
+                    <a:schemeClr val="tx1"/>
+                  </a:solidFill>
+                  <a:latin typeface="Cambria Math" panose="02040503050406030204" pitchFamily="18" charset="0"/>
+                  <a:ea typeface="Cambria Math" panose="02040503050406030204" pitchFamily="18" charset="0"/>
+                </a:rPr>
+                <a:t>EM Iterations</a:t>
+              </a:r>
+              <a:endParaRPr lang="en-US" sz="2000" dirty="0">
                 <a:solidFill>
                   <a:schemeClr val="tx1"/>
                 </a:solidFill>
                 <a:latin typeface="Cambria Math" panose="02040503050406030204" pitchFamily="18" charset="0"/>
                 <a:ea typeface="Cambria Math" panose="02040503050406030204" pitchFamily="18" charset="0"/>
-              </a:rPr>
-              <a:t>Regularization </a:t>
-            </a:r>
-          </a:p>
-        </p:txBody>
-      </p:sp>
-      <p:sp>
-        <p:nvSpPr>
-          <p:cNvPr id="57" name="Rectangle 56">
-            <a:extLst>
-              <a:ext uri="{FF2B5EF4-FFF2-40B4-BE49-F238E27FC236}">
-                <a16:creationId xmlns="" xmlns:a16="http://schemas.microsoft.com/office/drawing/2014/main" xmlns:a14="http://schemas.microsoft.com/office/drawing/2010/main" xmlns:mc="http://schemas.openxmlformats.org/markup-compatibility/2006" id="{6D2C8BE0-B0D2-4978-A1B5-FFF5137A4C82}"/>
-              </a:ext>
-            </a:extLst>
-          </p:cNvPr>
-          <p:cNvSpPr/>
-          <p:nvPr/>
-        </p:nvSpPr>
-        <p:spPr>
-          <a:xfrm>
-            <a:off x="-617834" y="2364698"/>
-            <a:ext cx="1868500" cy="1906212"/>
-          </a:xfrm>
-          <a:prstGeom prst="rect">
-            <a:avLst/>
-          </a:prstGeom>
-          <a:solidFill>
-            <a:schemeClr val="bg1"/>
-          </a:solidFill>
-          <a:ln>
+              </a:endParaRPr>
+            </a:p>
+          </p:txBody>
+        </p:sp>
+        <p:sp>
+          <p:nvSpPr>
+            <p:cNvPr id="34" name="Rectangle 33">
+              <a:extLst>
+                <a:ext uri="{FF2B5EF4-FFF2-40B4-BE49-F238E27FC236}">
+                  <a16:creationId xmlns:a16="http://schemas.microsoft.com/office/drawing/2014/main" xmlns:a14="http://schemas.microsoft.com/office/drawing/2010/main" xmlns:mc="http://schemas.openxmlformats.org/markup-compatibility/2006" xmlns="" id="{6D2C8BE0-B0D2-4978-A1B5-FFF5137A4C82}"/>
+                </a:ext>
+              </a:extLst>
+            </p:cNvPr>
+            <p:cNvSpPr/>
+            <p:nvPr/>
+          </p:nvSpPr>
+          <p:spPr>
+            <a:xfrm>
+              <a:off x="1698015" y="929555"/>
+              <a:ext cx="3835883" cy="521426"/>
+            </a:xfrm>
+            <a:prstGeom prst="rect">
+              <a:avLst/>
+            </a:prstGeom>
+            <a:solidFill>
+              <a:schemeClr val="bg1"/>
+            </a:solidFill>
+            <a:ln>
+              <a:noFill/>
+            </a:ln>
+          </p:spPr>
+          <p:style>
+            <a:lnRef idx="2">
+              <a:schemeClr val="accent1">
+                <a:shade val="50000"/>
+              </a:schemeClr>
+            </a:lnRef>
+            <a:fillRef idx="1">
+              <a:schemeClr val="accent1"/>
+            </a:fillRef>
+            <a:effectRef idx="0">
+              <a:schemeClr val="accent1"/>
+            </a:effectRef>
+            <a:fontRef idx="minor">
+              <a:schemeClr val="lt1"/>
+            </a:fontRef>
+          </p:style>
+          <p:txBody>
+            <a:bodyPr rtlCol="0" anchor="ctr"/>
+            <a:lstStyle/>
+            <a:p>
+              <a:pPr algn="ctr"/>
+              <a:r>
+                <a:rPr lang="en-US" sz="2400" dirty="0" smtClean="0">
+                  <a:solidFill>
+                    <a:schemeClr val="tx1"/>
+                  </a:solidFill>
+                  <a:latin typeface="Cambria Math" panose="02040503050406030204" pitchFamily="18" charset="0"/>
+                  <a:ea typeface="Cambria Math" panose="02040503050406030204" pitchFamily="18" charset="0"/>
+                </a:rPr>
+                <a:t>Without </a:t>
+              </a:r>
+              <a:r>
+                <a:rPr lang="en-US" sz="2400" dirty="0">
+                  <a:solidFill>
+                    <a:schemeClr val="tx1"/>
+                  </a:solidFill>
+                  <a:latin typeface="Cambria Math" panose="02040503050406030204" pitchFamily="18" charset="0"/>
+                  <a:ea typeface="Cambria Math" panose="02040503050406030204" pitchFamily="18" charset="0"/>
+                </a:rPr>
+                <a:t>Regularization </a:t>
+              </a:r>
+            </a:p>
+          </p:txBody>
+        </p:sp>
+        <p:sp>
+          <p:nvSpPr>
+            <p:cNvPr id="35" name="Rectangle 34">
+              <a:extLst>
+                <a:ext uri="{FF2B5EF4-FFF2-40B4-BE49-F238E27FC236}">
+                  <a16:creationId xmlns:a16="http://schemas.microsoft.com/office/drawing/2014/main" xmlns:a14="http://schemas.microsoft.com/office/drawing/2010/main" xmlns:mc="http://schemas.openxmlformats.org/markup-compatibility/2006" xmlns="" id="{6D2C8BE0-B0D2-4978-A1B5-FFF5137A4C82}"/>
+                </a:ext>
+              </a:extLst>
+            </p:cNvPr>
+            <p:cNvSpPr/>
+            <p:nvPr/>
+          </p:nvSpPr>
+          <p:spPr>
+            <a:xfrm>
+              <a:off x="7501213" y="929555"/>
+              <a:ext cx="2827832" cy="521426"/>
+            </a:xfrm>
+            <a:prstGeom prst="rect">
+              <a:avLst/>
+            </a:prstGeom>
+            <a:solidFill>
+              <a:schemeClr val="bg1"/>
+            </a:solidFill>
+            <a:ln>
+              <a:noFill/>
+            </a:ln>
+          </p:spPr>
+          <p:style>
+            <a:lnRef idx="2">
+              <a:schemeClr val="accent1">
+                <a:shade val="50000"/>
+              </a:schemeClr>
+            </a:lnRef>
+            <a:fillRef idx="1">
+              <a:schemeClr val="accent1"/>
+            </a:fillRef>
+            <a:effectRef idx="0">
+              <a:schemeClr val="accent1"/>
+            </a:effectRef>
+            <a:fontRef idx="minor">
+              <a:schemeClr val="lt1"/>
+            </a:fontRef>
+          </p:style>
+          <p:txBody>
+            <a:bodyPr rtlCol="0" anchor="ctr"/>
+            <a:lstStyle/>
+            <a:p>
+              <a:pPr algn="ctr"/>
+              <a:r>
+                <a:rPr lang="en-US" sz="2400" dirty="0">
+                  <a:solidFill>
+                    <a:schemeClr val="tx1"/>
+                  </a:solidFill>
+                  <a:latin typeface="Cambria Math" panose="02040503050406030204" pitchFamily="18" charset="0"/>
+                  <a:ea typeface="Cambria Math" panose="02040503050406030204" pitchFamily="18" charset="0"/>
+                </a:rPr>
+                <a:t>With Regularization </a:t>
+              </a:r>
+            </a:p>
+          </p:txBody>
+        </p:sp>
+        <p:sp>
+          <p:nvSpPr>
+            <p:cNvPr id="37" name="Oval 36"/>
+            <p:cNvSpPr/>
+            <p:nvPr/>
+          </p:nvSpPr>
+          <p:spPr>
+            <a:xfrm>
+              <a:off x="-111126" y="845482"/>
+              <a:ext cx="328566" cy="291486"/>
+            </a:xfrm>
+            <a:prstGeom prst="ellipse">
+              <a:avLst/>
+            </a:prstGeom>
             <a:noFill/>
-          </a:ln>
-        </p:spPr>
-        <p:style>
-          <a:lnRef idx="2">
-            <a:schemeClr val="accent1">
-              <a:shade val="50000"/>
-            </a:schemeClr>
-          </a:lnRef>
-          <a:fillRef idx="1">
-            <a:schemeClr val="accent1"/>
-          </a:fillRef>
-          <a:effectRef idx="0">
-            <a:schemeClr val="accent1"/>
-          </a:effectRef>
-          <a:fontRef idx="minor">
-            <a:schemeClr val="lt1"/>
-          </a:fontRef>
-        </p:style>
-        <p:txBody>
-          <a:bodyPr rtlCol="0" anchor="ctr"/>
-          <a:lstStyle/>
-          <a:p>
-            <a:pPr algn="ctr"/>
-            <a:r>
-              <a:rPr lang="en-US" sz="2000" dirty="0" smtClean="0">
+            <a:ln w="38100">
+              <a:solidFill>
+                <a:schemeClr val="bg1"/>
+              </a:solidFill>
+            </a:ln>
+          </p:spPr>
+          <p:style>
+            <a:lnRef idx="2">
+              <a:schemeClr val="accent1">
+                <a:shade val="50000"/>
+              </a:schemeClr>
+            </a:lnRef>
+            <a:fillRef idx="1">
+              <a:schemeClr val="accent1"/>
+            </a:fillRef>
+            <a:effectRef idx="0">
+              <a:schemeClr val="accent1"/>
+            </a:effectRef>
+            <a:fontRef idx="minor">
+              <a:schemeClr val="lt1"/>
+            </a:fontRef>
+          </p:style>
+          <p:txBody>
+            <a:bodyPr rtlCol="0" anchor="ctr"/>
+            <a:lstStyle/>
+            <a:p>
+              <a:pPr algn="ctr"/>
+              <a:r>
+                <a:rPr lang="en-US" sz="2400" b="1" dirty="0" smtClean="0">
+                  <a:solidFill>
+                    <a:schemeClr val="tx1"/>
+                  </a:solidFill>
+                </a:rPr>
+                <a:t>B</a:t>
+              </a:r>
+              <a:endParaRPr lang="en-US" sz="2400" b="1" dirty="0">
                 <a:solidFill>
                   <a:schemeClr val="tx1"/>
                 </a:solidFill>
-                <a:latin typeface="Cambria Math" panose="02040503050406030204" pitchFamily="18" charset="0"/>
-                <a:ea typeface="Cambria Math" panose="02040503050406030204" pitchFamily="18" charset="0"/>
-              </a:rPr>
-              <a:t>Miss Classification Rate</a:t>
-            </a:r>
-            <a:endParaRPr lang="en-US" sz="2000" dirty="0">
-              <a:solidFill>
-                <a:schemeClr val="tx1"/>
-              </a:solidFill>
-              <a:latin typeface="Cambria Math" panose="02040503050406030204" pitchFamily="18" charset="0"/>
-              <a:ea typeface="Cambria Math" panose="02040503050406030204" pitchFamily="18" charset="0"/>
-            </a:endParaRPr>
-          </a:p>
-        </p:txBody>
-      </p:sp>
-      <p:sp>
-        <p:nvSpPr>
-          <p:cNvPr id="30" name="Rectangle 29">
-            <a:extLst>
-              <a:ext uri="{FF2B5EF4-FFF2-40B4-BE49-F238E27FC236}">
-                <a16:creationId xmlns="" xmlns:mc="http://schemas.openxmlformats.org/markup-compatibility/2006" xmlns:a14="http://schemas.microsoft.com/office/drawing/2010/main" xmlns:a16="http://schemas.microsoft.com/office/drawing/2014/main" id="{2E36643D-EEA2-42A8-BBCF-DC12D9FC8BA4}"/>
-              </a:ext>
-            </a:extLst>
-          </p:cNvPr>
-          <p:cNvSpPr/>
-          <p:nvPr/>
-        </p:nvSpPr>
-        <p:spPr>
-          <a:xfrm>
-            <a:off x="2680168" y="5298934"/>
-            <a:ext cx="2024961" cy="287389"/>
-          </a:xfrm>
-          <a:prstGeom prst="rect">
-            <a:avLst/>
-          </a:prstGeom>
-          <a:solidFill>
-            <a:schemeClr val="bg1"/>
-          </a:solidFill>
-          <a:ln>
-            <a:noFill/>
-          </a:ln>
-        </p:spPr>
-        <p:style>
-          <a:lnRef idx="2">
-            <a:schemeClr val="accent1">
-              <a:shade val="50000"/>
-            </a:schemeClr>
-          </a:lnRef>
-          <a:fillRef idx="1">
-            <a:schemeClr val="accent1"/>
-          </a:fillRef>
-          <a:effectRef idx="0">
-            <a:schemeClr val="accent1"/>
-          </a:effectRef>
-          <a:fontRef idx="minor">
-            <a:schemeClr val="lt1"/>
-          </a:fontRef>
-        </p:style>
-        <p:txBody>
-          <a:bodyPr rtlCol="0" anchor="ctr"/>
-          <a:lstStyle/>
-          <a:p>
-            <a:pPr algn="ctr"/>
-            <a:r>
-              <a:rPr lang="en-GB" sz="2000" dirty="0">
-                <a:solidFill>
-                  <a:schemeClr val="tx1"/>
-                </a:solidFill>
-                <a:latin typeface="Cambria Math" panose="02040503050406030204" pitchFamily="18" charset="0"/>
-                <a:ea typeface="Cambria Math" panose="02040503050406030204" pitchFamily="18" charset="0"/>
-              </a:rPr>
-              <a:t>EM Iterations</a:t>
-            </a:r>
-            <a:endParaRPr lang="en-US" sz="2000" dirty="0">
-              <a:solidFill>
-                <a:schemeClr val="tx1"/>
-              </a:solidFill>
-              <a:latin typeface="Cambria Math" panose="02040503050406030204" pitchFamily="18" charset="0"/>
-              <a:ea typeface="Cambria Math" panose="02040503050406030204" pitchFamily="18" charset="0"/>
-            </a:endParaRPr>
-          </a:p>
-        </p:txBody>
-      </p:sp>
-      <p:sp>
-        <p:nvSpPr>
-          <p:cNvPr id="31" name="Rectangle 30">
-            <a:extLst>
-              <a:ext uri="{FF2B5EF4-FFF2-40B4-BE49-F238E27FC236}">
-                <a16:creationId xmlns="" xmlns:mc="http://schemas.openxmlformats.org/markup-compatibility/2006" xmlns:a14="http://schemas.microsoft.com/office/drawing/2010/main" xmlns:a16="http://schemas.microsoft.com/office/drawing/2014/main" id="{2E36643D-EEA2-42A8-BBCF-DC12D9FC8BA4}"/>
-              </a:ext>
-            </a:extLst>
-          </p:cNvPr>
-          <p:cNvSpPr/>
-          <p:nvPr/>
-        </p:nvSpPr>
-        <p:spPr>
-          <a:xfrm>
-            <a:off x="7931720" y="5298934"/>
-            <a:ext cx="2024961" cy="287389"/>
-          </a:xfrm>
-          <a:prstGeom prst="rect">
-            <a:avLst/>
-          </a:prstGeom>
-          <a:solidFill>
-            <a:schemeClr val="bg1"/>
-          </a:solidFill>
-          <a:ln>
-            <a:noFill/>
-          </a:ln>
-        </p:spPr>
-        <p:style>
-          <a:lnRef idx="2">
-            <a:schemeClr val="accent1">
-              <a:shade val="50000"/>
-            </a:schemeClr>
-          </a:lnRef>
-          <a:fillRef idx="1">
-            <a:schemeClr val="accent1"/>
-          </a:fillRef>
-          <a:effectRef idx="0">
-            <a:schemeClr val="accent1"/>
-          </a:effectRef>
-          <a:fontRef idx="minor">
-            <a:schemeClr val="lt1"/>
-          </a:fontRef>
-        </p:style>
-        <p:txBody>
-          <a:bodyPr rtlCol="0" anchor="ctr"/>
-          <a:lstStyle/>
-          <a:p>
-            <a:pPr algn="ctr"/>
-            <a:r>
-              <a:rPr lang="en-GB" sz="2000" dirty="0" smtClean="0">
-                <a:solidFill>
-                  <a:schemeClr val="tx1"/>
-                </a:solidFill>
-                <a:latin typeface="Cambria Math" panose="02040503050406030204" pitchFamily="18" charset="0"/>
-                <a:ea typeface="Cambria Math" panose="02040503050406030204" pitchFamily="18" charset="0"/>
-              </a:rPr>
-              <a:t>EM Iterations</a:t>
-            </a:r>
-            <a:endParaRPr lang="en-US" sz="2000" dirty="0">
-              <a:solidFill>
-                <a:schemeClr val="tx1"/>
-              </a:solidFill>
-              <a:latin typeface="Cambria Math" panose="02040503050406030204" pitchFamily="18" charset="0"/>
-              <a:ea typeface="Cambria Math" panose="02040503050406030204" pitchFamily="18" charset="0"/>
-            </a:endParaRPr>
-          </a:p>
-        </p:txBody>
-      </p:sp>
-      <p:sp>
-        <p:nvSpPr>
-          <p:cNvPr id="34" name="Rectangle 33">
-            <a:extLst>
-              <a:ext uri="{FF2B5EF4-FFF2-40B4-BE49-F238E27FC236}">
-                <a16:creationId xmlns="" xmlns:mc="http://schemas.openxmlformats.org/markup-compatibility/2006" xmlns:a14="http://schemas.microsoft.com/office/drawing/2010/main" xmlns:a16="http://schemas.microsoft.com/office/drawing/2014/main" id="{6D2C8BE0-B0D2-4978-A1B5-FFF5137A4C82}"/>
-              </a:ext>
-            </a:extLst>
-          </p:cNvPr>
-          <p:cNvSpPr/>
-          <p:nvPr/>
-        </p:nvSpPr>
-        <p:spPr>
-          <a:xfrm>
-            <a:off x="1698015" y="929555"/>
-            <a:ext cx="3835883" cy="521426"/>
-          </a:xfrm>
-          <a:prstGeom prst="rect">
-            <a:avLst/>
-          </a:prstGeom>
-          <a:solidFill>
-            <a:schemeClr val="bg1"/>
-          </a:solidFill>
-          <a:ln>
-            <a:noFill/>
-          </a:ln>
-        </p:spPr>
-        <p:style>
-          <a:lnRef idx="2">
-            <a:schemeClr val="accent1">
-              <a:shade val="50000"/>
-            </a:schemeClr>
-          </a:lnRef>
-          <a:fillRef idx="1">
-            <a:schemeClr val="accent1"/>
-          </a:fillRef>
-          <a:effectRef idx="0">
-            <a:schemeClr val="accent1"/>
-          </a:effectRef>
-          <a:fontRef idx="minor">
-            <a:schemeClr val="lt1"/>
-          </a:fontRef>
-        </p:style>
-        <p:txBody>
-          <a:bodyPr rtlCol="0" anchor="ctr"/>
-          <a:lstStyle/>
-          <a:p>
-            <a:pPr algn="ctr"/>
-            <a:r>
-              <a:rPr lang="en-US" sz="2400" dirty="0" smtClean="0">
-                <a:solidFill>
-                  <a:schemeClr val="tx1"/>
-                </a:solidFill>
-                <a:latin typeface="Cambria Math" panose="02040503050406030204" pitchFamily="18" charset="0"/>
-                <a:ea typeface="Cambria Math" panose="02040503050406030204" pitchFamily="18" charset="0"/>
-              </a:rPr>
-              <a:t>Without </a:t>
-            </a:r>
-            <a:r>
-              <a:rPr lang="en-US" sz="2400" dirty="0">
-                <a:solidFill>
-                  <a:schemeClr val="tx1"/>
-                </a:solidFill>
-                <a:latin typeface="Cambria Math" panose="02040503050406030204" pitchFamily="18" charset="0"/>
-                <a:ea typeface="Cambria Math" panose="02040503050406030204" pitchFamily="18" charset="0"/>
-              </a:rPr>
-              <a:t>Regularization </a:t>
-            </a:r>
-          </a:p>
-        </p:txBody>
-      </p:sp>
-      <p:sp>
-        <p:nvSpPr>
-          <p:cNvPr id="35" name="Rectangle 34">
-            <a:extLst>
-              <a:ext uri="{FF2B5EF4-FFF2-40B4-BE49-F238E27FC236}">
-                <a16:creationId xmlns="" xmlns:mc="http://schemas.openxmlformats.org/markup-compatibility/2006" xmlns:a14="http://schemas.microsoft.com/office/drawing/2010/main" xmlns:a16="http://schemas.microsoft.com/office/drawing/2014/main" id="{6D2C8BE0-B0D2-4978-A1B5-FFF5137A4C82}"/>
-              </a:ext>
-            </a:extLst>
-          </p:cNvPr>
-          <p:cNvSpPr/>
-          <p:nvPr/>
-        </p:nvSpPr>
-        <p:spPr>
-          <a:xfrm>
-            <a:off x="7501213" y="929555"/>
-            <a:ext cx="2827832" cy="521426"/>
-          </a:xfrm>
-          <a:prstGeom prst="rect">
-            <a:avLst/>
-          </a:prstGeom>
-          <a:solidFill>
-            <a:schemeClr val="bg1"/>
-          </a:solidFill>
-          <a:ln>
-            <a:noFill/>
-          </a:ln>
-        </p:spPr>
-        <p:style>
-          <a:lnRef idx="2">
-            <a:schemeClr val="accent1">
-              <a:shade val="50000"/>
-            </a:schemeClr>
-          </a:lnRef>
-          <a:fillRef idx="1">
-            <a:schemeClr val="accent1"/>
-          </a:fillRef>
-          <a:effectRef idx="0">
-            <a:schemeClr val="accent1"/>
-          </a:effectRef>
-          <a:fontRef idx="minor">
-            <a:schemeClr val="lt1"/>
-          </a:fontRef>
-        </p:style>
-        <p:txBody>
-          <a:bodyPr rtlCol="0" anchor="ctr"/>
-          <a:lstStyle/>
-          <a:p>
-            <a:pPr algn="ctr"/>
-            <a:r>
-              <a:rPr lang="en-US" sz="2400" dirty="0">
-                <a:solidFill>
-                  <a:schemeClr val="tx1"/>
-                </a:solidFill>
-                <a:latin typeface="Cambria Math" panose="02040503050406030204" pitchFamily="18" charset="0"/>
-                <a:ea typeface="Cambria Math" panose="02040503050406030204" pitchFamily="18" charset="0"/>
-              </a:rPr>
-              <a:t>With Regularization </a:t>
-            </a:r>
-          </a:p>
-        </p:txBody>
-      </p:sp>
-      <p:sp>
-        <p:nvSpPr>
-          <p:cNvPr id="37" name="Oval 36"/>
-          <p:cNvSpPr/>
-          <p:nvPr/>
-        </p:nvSpPr>
-        <p:spPr>
-          <a:xfrm>
-            <a:off x="-111126" y="845482"/>
-            <a:ext cx="328566" cy="291486"/>
-          </a:xfrm>
-          <a:prstGeom prst="ellipse">
-            <a:avLst/>
-          </a:prstGeom>
-          <a:noFill/>
-          <a:ln w="38100">
-            <a:solidFill>
-              <a:schemeClr val="bg1"/>
-            </a:solidFill>
-          </a:ln>
-        </p:spPr>
-        <p:style>
-          <a:lnRef idx="2">
-            <a:schemeClr val="accent1">
-              <a:shade val="50000"/>
-            </a:schemeClr>
-          </a:lnRef>
-          <a:fillRef idx="1">
-            <a:schemeClr val="accent1"/>
-          </a:fillRef>
-          <a:effectRef idx="0">
-            <a:schemeClr val="accent1"/>
-          </a:effectRef>
-          <a:fontRef idx="minor">
-            <a:schemeClr val="lt1"/>
-          </a:fontRef>
-        </p:style>
-        <p:txBody>
-          <a:bodyPr rtlCol="0" anchor="ctr"/>
-          <a:lstStyle/>
-          <a:p>
-            <a:pPr algn="ctr"/>
-            <a:r>
-              <a:rPr lang="en-US" sz="2400" b="1" dirty="0" smtClean="0">
-                <a:solidFill>
-                  <a:schemeClr val="tx1"/>
-                </a:solidFill>
-              </a:rPr>
-              <a:t>B</a:t>
-            </a:r>
-            <a:endParaRPr lang="en-US" sz="2400" b="1" dirty="0">
-              <a:solidFill>
-                <a:schemeClr val="tx1"/>
-              </a:solidFill>
-            </a:endParaRPr>
-          </a:p>
-        </p:txBody>
-      </p:sp>
+              </a:endParaRPr>
+            </a:p>
+          </p:txBody>
+        </p:sp>
+      </p:grpSp>
     </p:spTree>
     <p:extLst>
       <p:ext uri="{BB962C8B-B14F-4D97-AF65-F5344CB8AC3E}">
@@ -9272,7 +9283,7 @@
               <p:cNvPr id="6" name="Rectangle 5">
                 <a:extLst>
                   <a:ext uri="{FF2B5EF4-FFF2-40B4-BE49-F238E27FC236}">
-                    <a16:creationId xmlns="" xmlns:mc="http://schemas.openxmlformats.org/markup-compatibility/2006" xmlns:a14="http://schemas.microsoft.com/office/drawing/2010/main" xmlns:a16="http://schemas.microsoft.com/office/drawing/2014/main" id="{6D2C8BE0-B0D2-4978-A1B5-FFF5137A4C82}"/>
+                    <a16:creationId xmlns:a16="http://schemas.microsoft.com/office/drawing/2014/main" xmlns:a14="http://schemas.microsoft.com/office/drawing/2010/main" xmlns:mc="http://schemas.openxmlformats.org/markup-compatibility/2006" xmlns="" id="{6D2C8BE0-B0D2-4978-A1B5-FFF5137A4C82}"/>
                   </a:ext>
                 </a:extLst>
               </p:cNvPr>
@@ -9331,7 +9342,7 @@
               <p:cNvPr id="7" name="Rectangle 6">
                 <a:extLst>
                   <a:ext uri="{FF2B5EF4-FFF2-40B4-BE49-F238E27FC236}">
-                    <a16:creationId xmlns="" xmlns:mc="http://schemas.openxmlformats.org/markup-compatibility/2006" xmlns:a14="http://schemas.microsoft.com/office/drawing/2010/main" xmlns:a16="http://schemas.microsoft.com/office/drawing/2014/main" id="{6D2C8BE0-B0D2-4978-A1B5-FFF5137A4C82}"/>
+                    <a16:creationId xmlns:a16="http://schemas.microsoft.com/office/drawing/2014/main" xmlns:a14="http://schemas.microsoft.com/office/drawing/2010/main" xmlns:mc="http://schemas.openxmlformats.org/markup-compatibility/2006" xmlns="" id="{6D2C8BE0-B0D2-4978-A1B5-FFF5137A4C82}"/>
                   </a:ext>
                 </a:extLst>
               </p:cNvPr>
@@ -9389,7 +9400,7 @@
               <p:cNvPr id="8" name="Rectangle 7">
                 <a:extLst>
                   <a:ext uri="{FF2B5EF4-FFF2-40B4-BE49-F238E27FC236}">
-                    <a16:creationId xmlns="" xmlns:mc="http://schemas.openxmlformats.org/markup-compatibility/2006" xmlns:a14="http://schemas.microsoft.com/office/drawing/2010/main" xmlns:a16="http://schemas.microsoft.com/office/drawing/2014/main" id="{6D2C8BE0-B0D2-4978-A1B5-FFF5137A4C82}"/>
+                    <a16:creationId xmlns:a16="http://schemas.microsoft.com/office/drawing/2014/main" xmlns:a14="http://schemas.microsoft.com/office/drawing/2010/main" xmlns:mc="http://schemas.openxmlformats.org/markup-compatibility/2006" xmlns="" id="{6D2C8BE0-B0D2-4978-A1B5-FFF5137A4C82}"/>
                   </a:ext>
                 </a:extLst>
               </p:cNvPr>
@@ -9451,7 +9462,7 @@
             <p:cNvPr id="10" name="Rectangle 9">
               <a:extLst>
                 <a:ext uri="{FF2B5EF4-FFF2-40B4-BE49-F238E27FC236}">
-                  <a16:creationId xmlns="" xmlns:mc="http://schemas.openxmlformats.org/markup-compatibility/2006" xmlns:a14="http://schemas.microsoft.com/office/drawing/2010/main" xmlns:a16="http://schemas.microsoft.com/office/drawing/2014/main" id="{6D2C8BE0-B0D2-4978-A1B5-FFF5137A4C82}"/>
+                  <a16:creationId xmlns:a16="http://schemas.microsoft.com/office/drawing/2014/main" xmlns:a14="http://schemas.microsoft.com/office/drawing/2010/main" xmlns:mc="http://schemas.openxmlformats.org/markup-compatibility/2006" xmlns="" id="{6D2C8BE0-B0D2-4978-A1B5-FFF5137A4C82}"/>
                 </a:ext>
               </a:extLst>
             </p:cNvPr>
@@ -11420,7 +11431,7 @@
             <p:cNvPr id="7" name="Rectangle 6">
               <a:extLst>
                 <a:ext uri="{FF2B5EF4-FFF2-40B4-BE49-F238E27FC236}">
-                  <a16:creationId xmlns="" xmlns:mc="http://schemas.openxmlformats.org/markup-compatibility/2006" xmlns:a14="http://schemas.microsoft.com/office/drawing/2010/main" xmlns:a16="http://schemas.microsoft.com/office/drawing/2014/main" id="{6D2C8BE0-B0D2-4978-A1B5-FFF5137A4C82}"/>
+                  <a16:creationId xmlns:a16="http://schemas.microsoft.com/office/drawing/2014/main" xmlns:a14="http://schemas.microsoft.com/office/drawing/2010/main" xmlns:mc="http://schemas.openxmlformats.org/markup-compatibility/2006" xmlns="" id="{6D2C8BE0-B0D2-4978-A1B5-FFF5137A4C82}"/>
                 </a:ext>
               </a:extLst>
             </p:cNvPr>
@@ -11488,7 +11499,7 @@
             <p:cNvPr id="8" name="Rectangle 7">
               <a:extLst>
                 <a:ext uri="{FF2B5EF4-FFF2-40B4-BE49-F238E27FC236}">
-                  <a16:creationId xmlns="" xmlns:mc="http://schemas.openxmlformats.org/markup-compatibility/2006" xmlns:a14="http://schemas.microsoft.com/office/drawing/2010/main" xmlns:a16="http://schemas.microsoft.com/office/drawing/2014/main" id="{6D2C8BE0-B0D2-4978-A1B5-FFF5137A4C82}"/>
+                  <a16:creationId xmlns:a16="http://schemas.microsoft.com/office/drawing/2014/main" xmlns:a14="http://schemas.microsoft.com/office/drawing/2010/main" xmlns:mc="http://schemas.openxmlformats.org/markup-compatibility/2006" xmlns="" id="{6D2C8BE0-B0D2-4978-A1B5-FFF5137A4C82}"/>
                 </a:ext>
               </a:extLst>
             </p:cNvPr>
@@ -11556,7 +11567,7 @@
             <p:cNvPr id="9" name="Rectangle 8">
               <a:extLst>
                 <a:ext uri="{FF2B5EF4-FFF2-40B4-BE49-F238E27FC236}">
-                  <a16:creationId xmlns="" xmlns:mc="http://schemas.openxmlformats.org/markup-compatibility/2006" xmlns:a14="http://schemas.microsoft.com/office/drawing/2010/main" xmlns:a16="http://schemas.microsoft.com/office/drawing/2014/main" id="{6D2C8BE0-B0D2-4978-A1B5-FFF5137A4C82}"/>
+                  <a16:creationId xmlns:a16="http://schemas.microsoft.com/office/drawing/2014/main" xmlns:a14="http://schemas.microsoft.com/office/drawing/2010/main" xmlns:mc="http://schemas.openxmlformats.org/markup-compatibility/2006" xmlns="" id="{6D2C8BE0-B0D2-4978-A1B5-FFF5137A4C82}"/>
                 </a:ext>
               </a:extLst>
             </p:cNvPr>
@@ -11624,7 +11635,7 @@
             <p:cNvPr id="10" name="Rectangle 9">
               <a:extLst>
                 <a:ext uri="{FF2B5EF4-FFF2-40B4-BE49-F238E27FC236}">
-                  <a16:creationId xmlns="" xmlns:mc="http://schemas.openxmlformats.org/markup-compatibility/2006" xmlns:a14="http://schemas.microsoft.com/office/drawing/2010/main" xmlns:a16="http://schemas.microsoft.com/office/drawing/2014/main" id="{6D2C8BE0-B0D2-4978-A1B5-FFF5137A4C82}"/>
+                  <a16:creationId xmlns:a16="http://schemas.microsoft.com/office/drawing/2014/main" xmlns:a14="http://schemas.microsoft.com/office/drawing/2010/main" xmlns:mc="http://schemas.openxmlformats.org/markup-compatibility/2006" xmlns="" id="{6D2C8BE0-B0D2-4978-A1B5-FFF5137A4C82}"/>
                 </a:ext>
               </a:extLst>
             </p:cNvPr>
@@ -11692,7 +11703,7 @@
             <p:cNvPr id="11" name="Rectangle 10">
               <a:extLst>
                 <a:ext uri="{FF2B5EF4-FFF2-40B4-BE49-F238E27FC236}">
-                  <a16:creationId xmlns="" xmlns:mc="http://schemas.openxmlformats.org/markup-compatibility/2006" xmlns:a14="http://schemas.microsoft.com/office/drawing/2010/main" xmlns:a16="http://schemas.microsoft.com/office/drawing/2014/main" id="{6D2C8BE0-B0D2-4978-A1B5-FFF5137A4C82}"/>
+                  <a16:creationId xmlns:a16="http://schemas.microsoft.com/office/drawing/2014/main" xmlns:a14="http://schemas.microsoft.com/office/drawing/2010/main" xmlns:mc="http://schemas.openxmlformats.org/markup-compatibility/2006" xmlns="" id="{6D2C8BE0-B0D2-4978-A1B5-FFF5137A4C82}"/>
                 </a:ext>
               </a:extLst>
             </p:cNvPr>
@@ -11759,7 +11770,7 @@
             <p:cNvPr id="12" name="Rectangle 11">
               <a:extLst>
                 <a:ext uri="{FF2B5EF4-FFF2-40B4-BE49-F238E27FC236}">
-                  <a16:creationId xmlns="" xmlns:mc="http://schemas.openxmlformats.org/markup-compatibility/2006" xmlns:a14="http://schemas.microsoft.com/office/drawing/2010/main" xmlns:a16="http://schemas.microsoft.com/office/drawing/2014/main" id="{6D2C8BE0-B0D2-4978-A1B5-FFF5137A4C82}"/>
+                  <a16:creationId xmlns:a16="http://schemas.microsoft.com/office/drawing/2014/main" xmlns:a14="http://schemas.microsoft.com/office/drawing/2010/main" xmlns:mc="http://schemas.openxmlformats.org/markup-compatibility/2006" xmlns="" id="{6D2C8BE0-B0D2-4978-A1B5-FFF5137A4C82}"/>
                 </a:ext>
               </a:extLst>
             </p:cNvPr>
@@ -11826,7 +11837,7 @@
             <p:cNvPr id="13" name="Rectangle 12">
               <a:extLst>
                 <a:ext uri="{FF2B5EF4-FFF2-40B4-BE49-F238E27FC236}">
-                  <a16:creationId xmlns="" xmlns:mc="http://schemas.openxmlformats.org/markup-compatibility/2006" xmlns:a14="http://schemas.microsoft.com/office/drawing/2010/main" xmlns:a16="http://schemas.microsoft.com/office/drawing/2014/main" id="{6D2C8BE0-B0D2-4978-A1B5-FFF5137A4C82}"/>
+                  <a16:creationId xmlns:a16="http://schemas.microsoft.com/office/drawing/2014/main" xmlns:a14="http://schemas.microsoft.com/office/drawing/2010/main" xmlns:mc="http://schemas.openxmlformats.org/markup-compatibility/2006" xmlns="" id="{6D2C8BE0-B0D2-4978-A1B5-FFF5137A4C82}"/>
                 </a:ext>
               </a:extLst>
             </p:cNvPr>
@@ -11893,7 +11904,7 @@
             <p:cNvPr id="14" name="Rectangle 13">
               <a:extLst>
                 <a:ext uri="{FF2B5EF4-FFF2-40B4-BE49-F238E27FC236}">
-                  <a16:creationId xmlns="" xmlns:mc="http://schemas.openxmlformats.org/markup-compatibility/2006" xmlns:a14="http://schemas.microsoft.com/office/drawing/2010/main" xmlns:a16="http://schemas.microsoft.com/office/drawing/2014/main" id="{6D2C8BE0-B0D2-4978-A1B5-FFF5137A4C82}"/>
+                  <a16:creationId xmlns:a16="http://schemas.microsoft.com/office/drawing/2014/main" xmlns:a14="http://schemas.microsoft.com/office/drawing/2010/main" xmlns:mc="http://schemas.openxmlformats.org/markup-compatibility/2006" xmlns="" id="{6D2C8BE0-B0D2-4978-A1B5-FFF5137A4C82}"/>
                 </a:ext>
               </a:extLst>
             </p:cNvPr>
@@ -11989,7 +12000,7 @@
             <p:cNvPr id="16" name="Rectangle 15">
               <a:extLst>
                 <a:ext uri="{FF2B5EF4-FFF2-40B4-BE49-F238E27FC236}">
-                  <a16:creationId xmlns="" xmlns:mc="http://schemas.openxmlformats.org/markup-compatibility/2006" xmlns:a14="http://schemas.microsoft.com/office/drawing/2010/main" xmlns:a16="http://schemas.microsoft.com/office/drawing/2014/main" id="{6D2C8BE0-B0D2-4978-A1B5-FFF5137A4C82}"/>
+                  <a16:creationId xmlns:a16="http://schemas.microsoft.com/office/drawing/2014/main" xmlns:a14="http://schemas.microsoft.com/office/drawing/2010/main" xmlns:mc="http://schemas.openxmlformats.org/markup-compatibility/2006" xmlns="" id="{6D2C8BE0-B0D2-4978-A1B5-FFF5137A4C82}"/>
                 </a:ext>
               </a:extLst>
             </p:cNvPr>
@@ -12075,7 +12086,7 @@
             <p:cNvPr id="17" name="Rectangle 16">
               <a:extLst>
                 <a:ext uri="{FF2B5EF4-FFF2-40B4-BE49-F238E27FC236}">
-                  <a16:creationId xmlns="" xmlns:mc="http://schemas.openxmlformats.org/markup-compatibility/2006" xmlns:a14="http://schemas.microsoft.com/office/drawing/2010/main" xmlns:a16="http://schemas.microsoft.com/office/drawing/2014/main" id="{6D2C8BE0-B0D2-4978-A1B5-FFF5137A4C82}"/>
+                  <a16:creationId xmlns:a16="http://schemas.microsoft.com/office/drawing/2014/main" xmlns:a14="http://schemas.microsoft.com/office/drawing/2010/main" xmlns:mc="http://schemas.openxmlformats.org/markup-compatibility/2006" xmlns="" id="{6D2C8BE0-B0D2-4978-A1B5-FFF5137A4C82}"/>
                 </a:ext>
               </a:extLst>
             </p:cNvPr>
@@ -12276,7 +12287,7 @@
             <p:cNvPr id="25" name="Rectangle 24">
               <a:extLst>
                 <a:ext uri="{FF2B5EF4-FFF2-40B4-BE49-F238E27FC236}">
-                  <a16:creationId xmlns="" xmlns:mc="http://schemas.openxmlformats.org/markup-compatibility/2006" xmlns:a14="http://schemas.microsoft.com/office/drawing/2010/main" xmlns:a16="http://schemas.microsoft.com/office/drawing/2014/main" id="{6D2C8BE0-B0D2-4978-A1B5-FFF5137A4C82}"/>
+                  <a16:creationId xmlns:a16="http://schemas.microsoft.com/office/drawing/2014/main" xmlns:a14="http://schemas.microsoft.com/office/drawing/2010/main" xmlns:mc="http://schemas.openxmlformats.org/markup-compatibility/2006" xmlns="" id="{6D2C8BE0-B0D2-4978-A1B5-FFF5137A4C82}"/>
                 </a:ext>
               </a:extLst>
             </p:cNvPr>
@@ -12385,10 +12396,10 @@
         </p:nvGrpSpPr>
         <p:grpSpPr>
           <a:xfrm>
-            <a:off x="-135759" y="84696"/>
-            <a:ext cx="13568884" cy="7834716"/>
-            <a:chOff x="-135759" y="84696"/>
-            <a:chExt cx="13568884" cy="7834716"/>
+            <a:off x="-135759" y="27546"/>
+            <a:ext cx="13568884" cy="7891866"/>
+            <a:chOff x="-135759" y="27546"/>
+            <a:chExt cx="13568884" cy="7891866"/>
           </a:xfrm>
         </p:grpSpPr>
         <p:sp>
@@ -12474,7 +12485,7 @@
             <p:cNvPr id="7" name="Rectangle 6">
               <a:extLst>
                 <a:ext uri="{FF2B5EF4-FFF2-40B4-BE49-F238E27FC236}">
-                  <a16:creationId xmlns="" xmlns:mc="http://schemas.openxmlformats.org/markup-compatibility/2006" xmlns:a14="http://schemas.microsoft.com/office/drawing/2010/main" xmlns:a16="http://schemas.microsoft.com/office/drawing/2014/main" id="{6D2C8BE0-B0D2-4978-A1B5-FFF5137A4C82}"/>
+                  <a16:creationId xmlns:a16="http://schemas.microsoft.com/office/drawing/2014/main" xmlns:a14="http://schemas.microsoft.com/office/drawing/2010/main" xmlns:mc="http://schemas.openxmlformats.org/markup-compatibility/2006" xmlns="" id="{6D2C8BE0-B0D2-4978-A1B5-FFF5137A4C82}"/>
                 </a:ext>
               </a:extLst>
             </p:cNvPr>
@@ -12483,7 +12494,7 @@
           </p:nvSpPr>
           <p:spPr>
             <a:xfrm>
-              <a:off x="3943623" y="84696"/>
+              <a:off x="3943623" y="27546"/>
               <a:ext cx="5025042" cy="551195"/>
             </a:xfrm>
             <a:prstGeom prst="rect">
@@ -12525,7 +12536,27 @@
                   <a:latin typeface="Cambria Math" panose="02040503050406030204" pitchFamily="18" charset="0"/>
                   <a:ea typeface="Cambria Math" panose="02040503050406030204" pitchFamily="18" charset="0"/>
                 </a:rPr>
-                <a:t>States Sequence Estimation and Posterior Probability</a:t>
+                <a:t>States Sequence Estimation and </a:t>
+              </a:r>
+              <a:r>
+                <a:rPr lang="en-US" sz="2400" dirty="0" smtClean="0">
+                  <a:solidFill>
+                    <a:schemeClr val="tx1"/>
+                  </a:solidFill>
+                  <a:latin typeface="Cambria Math" panose="02040503050406030204" pitchFamily="18" charset="0"/>
+                  <a:ea typeface="Cambria Math" panose="02040503050406030204" pitchFamily="18" charset="0"/>
+                </a:rPr>
+                <a:t>Posterior </a:t>
+              </a:r>
+              <a:r>
+                <a:rPr lang="en-US" sz="2400" dirty="0" smtClean="0">
+                  <a:solidFill>
+                    <a:schemeClr val="tx1"/>
+                  </a:solidFill>
+                  <a:latin typeface="Cambria Math" panose="02040503050406030204" pitchFamily="18" charset="0"/>
+                  <a:ea typeface="Cambria Math" panose="02040503050406030204" pitchFamily="18" charset="0"/>
+                </a:rPr>
+                <a:t>Probability</a:t>
               </a:r>
               <a:endParaRPr lang="en-US" sz="2400" dirty="0">
                 <a:solidFill>
@@ -12542,7 +12573,7 @@
             <p:cNvPr id="8" name="Rectangle 7">
               <a:extLst>
                 <a:ext uri="{FF2B5EF4-FFF2-40B4-BE49-F238E27FC236}">
-                  <a16:creationId xmlns="" xmlns:mc="http://schemas.openxmlformats.org/markup-compatibility/2006" xmlns:a14="http://schemas.microsoft.com/office/drawing/2010/main" xmlns:a16="http://schemas.microsoft.com/office/drawing/2014/main" id="{6D2C8BE0-B0D2-4978-A1B5-FFF5137A4C82}"/>
+                  <a16:creationId xmlns:a16="http://schemas.microsoft.com/office/drawing/2014/main" xmlns:a14="http://schemas.microsoft.com/office/drawing/2010/main" xmlns:mc="http://schemas.openxmlformats.org/markup-compatibility/2006" xmlns="" id="{6D2C8BE0-B0D2-4978-A1B5-FFF5137A4C82}"/>
                 </a:ext>
               </a:extLst>
             </p:cNvPr>
@@ -12610,7 +12641,7 @@
             <p:cNvPr id="9" name="Rectangle 8">
               <a:extLst>
                 <a:ext uri="{FF2B5EF4-FFF2-40B4-BE49-F238E27FC236}">
-                  <a16:creationId xmlns="" xmlns:mc="http://schemas.openxmlformats.org/markup-compatibility/2006" xmlns:a14="http://schemas.microsoft.com/office/drawing/2010/main" xmlns:a16="http://schemas.microsoft.com/office/drawing/2014/main" id="{6D2C8BE0-B0D2-4978-A1B5-FFF5137A4C82}"/>
+                  <a16:creationId xmlns:a16="http://schemas.microsoft.com/office/drawing/2014/main" xmlns:a14="http://schemas.microsoft.com/office/drawing/2010/main" xmlns:mc="http://schemas.openxmlformats.org/markup-compatibility/2006" xmlns="" id="{6D2C8BE0-B0D2-4978-A1B5-FFF5137A4C82}"/>
                 </a:ext>
               </a:extLst>
             </p:cNvPr>
@@ -12678,7 +12709,7 @@
             <p:cNvPr id="10" name="Rectangle 9">
               <a:extLst>
                 <a:ext uri="{FF2B5EF4-FFF2-40B4-BE49-F238E27FC236}">
-                  <a16:creationId xmlns="" xmlns:mc="http://schemas.openxmlformats.org/markup-compatibility/2006" xmlns:a14="http://schemas.microsoft.com/office/drawing/2010/main" xmlns:a16="http://schemas.microsoft.com/office/drawing/2014/main" id="{6D2C8BE0-B0D2-4978-A1B5-FFF5137A4C82}"/>
+                  <a16:creationId xmlns:a16="http://schemas.microsoft.com/office/drawing/2014/main" xmlns:a14="http://schemas.microsoft.com/office/drawing/2010/main" xmlns:mc="http://schemas.openxmlformats.org/markup-compatibility/2006" xmlns="" id="{6D2C8BE0-B0D2-4978-A1B5-FFF5137A4C82}"/>
                 </a:ext>
               </a:extLst>
             </p:cNvPr>
@@ -12746,7 +12777,7 @@
             <p:cNvPr id="11" name="Rectangle 10">
               <a:extLst>
                 <a:ext uri="{FF2B5EF4-FFF2-40B4-BE49-F238E27FC236}">
-                  <a16:creationId xmlns="" xmlns:mc="http://schemas.openxmlformats.org/markup-compatibility/2006" xmlns:a14="http://schemas.microsoft.com/office/drawing/2010/main" xmlns:a16="http://schemas.microsoft.com/office/drawing/2014/main" id="{6D2C8BE0-B0D2-4978-A1B5-FFF5137A4C82}"/>
+                  <a16:creationId xmlns:a16="http://schemas.microsoft.com/office/drawing/2014/main" xmlns:a14="http://schemas.microsoft.com/office/drawing/2010/main" xmlns:mc="http://schemas.openxmlformats.org/markup-compatibility/2006" xmlns="" id="{6D2C8BE0-B0D2-4978-A1B5-FFF5137A4C82}"/>
                 </a:ext>
               </a:extLst>
             </p:cNvPr>
@@ -12813,7 +12844,7 @@
             <p:cNvPr id="12" name="Rectangle 11">
               <a:extLst>
                 <a:ext uri="{FF2B5EF4-FFF2-40B4-BE49-F238E27FC236}">
-                  <a16:creationId xmlns="" xmlns:mc="http://schemas.openxmlformats.org/markup-compatibility/2006" xmlns:a14="http://schemas.microsoft.com/office/drawing/2010/main" xmlns:a16="http://schemas.microsoft.com/office/drawing/2014/main" id="{6D2C8BE0-B0D2-4978-A1B5-FFF5137A4C82}"/>
+                  <a16:creationId xmlns:a16="http://schemas.microsoft.com/office/drawing/2014/main" xmlns:a14="http://schemas.microsoft.com/office/drawing/2010/main" xmlns:mc="http://schemas.openxmlformats.org/markup-compatibility/2006" xmlns="" id="{6D2C8BE0-B0D2-4978-A1B5-FFF5137A4C82}"/>
                 </a:ext>
               </a:extLst>
             </p:cNvPr>
@@ -12880,7 +12911,7 @@
             <p:cNvPr id="13" name="Rectangle 12">
               <a:extLst>
                 <a:ext uri="{FF2B5EF4-FFF2-40B4-BE49-F238E27FC236}">
-                  <a16:creationId xmlns="" xmlns:mc="http://schemas.openxmlformats.org/markup-compatibility/2006" xmlns:a14="http://schemas.microsoft.com/office/drawing/2010/main" xmlns:a16="http://schemas.microsoft.com/office/drawing/2014/main" id="{6D2C8BE0-B0D2-4978-A1B5-FFF5137A4C82}"/>
+                  <a16:creationId xmlns:a16="http://schemas.microsoft.com/office/drawing/2014/main" xmlns:a14="http://schemas.microsoft.com/office/drawing/2010/main" xmlns:mc="http://schemas.openxmlformats.org/markup-compatibility/2006" xmlns="" id="{6D2C8BE0-B0D2-4978-A1B5-FFF5137A4C82}"/>
                 </a:ext>
               </a:extLst>
             </p:cNvPr>
@@ -12947,7 +12978,7 @@
             <p:cNvPr id="14" name="Rectangle 13">
               <a:extLst>
                 <a:ext uri="{FF2B5EF4-FFF2-40B4-BE49-F238E27FC236}">
-                  <a16:creationId xmlns="" xmlns:mc="http://schemas.openxmlformats.org/markup-compatibility/2006" xmlns:a14="http://schemas.microsoft.com/office/drawing/2010/main" xmlns:a16="http://schemas.microsoft.com/office/drawing/2014/main" id="{6D2C8BE0-B0D2-4978-A1B5-FFF5137A4C82}"/>
+                  <a16:creationId xmlns:a16="http://schemas.microsoft.com/office/drawing/2014/main" xmlns:a14="http://schemas.microsoft.com/office/drawing/2010/main" xmlns:mc="http://schemas.openxmlformats.org/markup-compatibility/2006" xmlns="" id="{6D2C8BE0-B0D2-4978-A1B5-FFF5137A4C82}"/>
                 </a:ext>
               </a:extLst>
             </p:cNvPr>
@@ -13043,7 +13074,7 @@
             <p:cNvPr id="16" name="Rectangle 15">
               <a:extLst>
                 <a:ext uri="{FF2B5EF4-FFF2-40B4-BE49-F238E27FC236}">
-                  <a16:creationId xmlns="" xmlns:mc="http://schemas.openxmlformats.org/markup-compatibility/2006" xmlns:a14="http://schemas.microsoft.com/office/drawing/2010/main" xmlns:a16="http://schemas.microsoft.com/office/drawing/2014/main" id="{6D2C8BE0-B0D2-4978-A1B5-FFF5137A4C82}"/>
+                  <a16:creationId xmlns:a16="http://schemas.microsoft.com/office/drawing/2014/main" xmlns:a14="http://schemas.microsoft.com/office/drawing/2010/main" xmlns:mc="http://schemas.openxmlformats.org/markup-compatibility/2006" xmlns="" id="{6D2C8BE0-B0D2-4978-A1B5-FFF5137A4C82}"/>
                 </a:ext>
               </a:extLst>
             </p:cNvPr>
@@ -13129,7 +13160,7 @@
             <p:cNvPr id="17" name="Rectangle 16">
               <a:extLst>
                 <a:ext uri="{FF2B5EF4-FFF2-40B4-BE49-F238E27FC236}">
-                  <a16:creationId xmlns="" xmlns:mc="http://schemas.openxmlformats.org/markup-compatibility/2006" xmlns:a14="http://schemas.microsoft.com/office/drawing/2010/main" xmlns:a16="http://schemas.microsoft.com/office/drawing/2014/main" id="{6D2C8BE0-B0D2-4978-A1B5-FFF5137A4C82}"/>
+                  <a16:creationId xmlns:a16="http://schemas.microsoft.com/office/drawing/2014/main" xmlns:a14="http://schemas.microsoft.com/office/drawing/2010/main" xmlns:mc="http://schemas.openxmlformats.org/markup-compatibility/2006" xmlns="" id="{6D2C8BE0-B0D2-4978-A1B5-FFF5137A4C82}"/>
                 </a:ext>
               </a:extLst>
             </p:cNvPr>
@@ -13225,7 +13256,7 @@
             <p:cNvPr id="25" name="Rectangle 24">
               <a:extLst>
                 <a:ext uri="{FF2B5EF4-FFF2-40B4-BE49-F238E27FC236}">
-                  <a16:creationId xmlns="" xmlns:mc="http://schemas.openxmlformats.org/markup-compatibility/2006" xmlns:a14="http://schemas.microsoft.com/office/drawing/2010/main" xmlns:a16="http://schemas.microsoft.com/office/drawing/2014/main" id="{6D2C8BE0-B0D2-4978-A1B5-FFF5137A4C82}"/>
+                  <a16:creationId xmlns:a16="http://schemas.microsoft.com/office/drawing/2014/main" xmlns:a14="http://schemas.microsoft.com/office/drawing/2010/main" xmlns:mc="http://schemas.openxmlformats.org/markup-compatibility/2006" xmlns="" id="{6D2C8BE0-B0D2-4978-A1B5-FFF5137A4C82}"/>
                 </a:ext>
               </a:extLst>
             </p:cNvPr>
@@ -13293,7 +13324,7 @@
             <p:cNvPr id="29" name="Rectangle 28">
               <a:extLst>
                 <a:ext uri="{FF2B5EF4-FFF2-40B4-BE49-F238E27FC236}">
-                  <a16:creationId xmlns="" xmlns:mc="http://schemas.openxmlformats.org/markup-compatibility/2006" xmlns:a14="http://schemas.microsoft.com/office/drawing/2010/main" xmlns:a16="http://schemas.microsoft.com/office/drawing/2014/main" id="{6D2C8BE0-B0D2-4978-A1B5-FFF5137A4C82}"/>
+                  <a16:creationId xmlns:a16="http://schemas.microsoft.com/office/drawing/2014/main" xmlns:a14="http://schemas.microsoft.com/office/drawing/2010/main" xmlns:mc="http://schemas.openxmlformats.org/markup-compatibility/2006" xmlns="" id="{6D2C8BE0-B0D2-4978-A1B5-FFF5137A4C82}"/>
                 </a:ext>
               </a:extLst>
             </p:cNvPr>

</xml_diff>

<commit_message>
Small edits before submission. WOOHOO!
</commit_message>
<xml_diff>
--- a/Help/Figures3.pptx
+++ b/Help/Figures3.pptx
@@ -173,10 +173,9 @@
           </a:lstStyle>
           <a:p>
             <a:r>
-              <a:rPr lang="en-US" smtClean="0"/>
+              <a:rPr lang="en-US"/>
               <a:t>Click to edit Master title style</a:t>
             </a:r>
-            <a:endParaRPr lang="en-US"/>
           </a:p>
         </p:txBody>
       </p:sp>
@@ -238,10 +237,9 @@
           </a:lstStyle>
           <a:p>
             <a:r>
-              <a:rPr lang="en-US" smtClean="0"/>
+              <a:rPr lang="en-US"/>
               <a:t>Click to edit Master subtitle style</a:t>
             </a:r>
-            <a:endParaRPr lang="en-US"/>
           </a:p>
         </p:txBody>
       </p:sp>
@@ -262,7 +260,7 @@
           <a:p>
             <a:fld id="{054E8CB3-1D98-4ECD-B6B7-C0FB8C78DDA1}" type="datetimeFigureOut">
               <a:rPr lang="en-US" smtClean="0"/>
-              <a:t>5/1/2020</a:t>
+              <a:t>5/8/2020</a:t>
             </a:fld>
             <a:endParaRPr lang="en-US"/>
           </a:p>
@@ -356,10 +354,9 @@
           <a:lstStyle/>
           <a:p>
             <a:r>
-              <a:rPr lang="en-US" smtClean="0"/>
+              <a:rPr lang="en-US"/>
               <a:t>Click to edit Master title style</a:t>
             </a:r>
-            <a:endParaRPr lang="en-US"/>
           </a:p>
         </p:txBody>
       </p:sp>
@@ -380,38 +377,37 @@
           <a:p>
             <a:pPr lvl="0"/>
             <a:r>
-              <a:rPr lang="en-US" smtClean="0"/>
+              <a:rPr lang="en-US"/>
               <a:t>Click to edit Master text styles</a:t>
             </a:r>
           </a:p>
           <a:p>
             <a:pPr lvl="1"/>
             <a:r>
-              <a:rPr lang="en-US" smtClean="0"/>
+              <a:rPr lang="en-US"/>
               <a:t>Second level</a:t>
             </a:r>
           </a:p>
           <a:p>
             <a:pPr lvl="2"/>
             <a:r>
-              <a:rPr lang="en-US" smtClean="0"/>
+              <a:rPr lang="en-US"/>
               <a:t>Third level</a:t>
             </a:r>
           </a:p>
           <a:p>
             <a:pPr lvl="3"/>
             <a:r>
-              <a:rPr lang="en-US" smtClean="0"/>
+              <a:rPr lang="en-US"/>
               <a:t>Fourth level</a:t>
             </a:r>
           </a:p>
           <a:p>
             <a:pPr lvl="4"/>
             <a:r>
-              <a:rPr lang="en-US" smtClean="0"/>
+              <a:rPr lang="en-US"/>
               <a:t>Fifth level</a:t>
             </a:r>
-            <a:endParaRPr lang="en-US"/>
           </a:p>
         </p:txBody>
       </p:sp>
@@ -432,7 +428,7 @@
           <a:p>
             <a:fld id="{054E8CB3-1D98-4ECD-B6B7-C0FB8C78DDA1}" type="datetimeFigureOut">
               <a:rPr lang="en-US" smtClean="0"/>
-              <a:t>5/1/2020</a:t>
+              <a:t>5/8/2020</a:t>
             </a:fld>
             <a:endParaRPr lang="en-US"/>
           </a:p>
@@ -531,10 +527,9 @@
           <a:lstStyle/>
           <a:p>
             <a:r>
-              <a:rPr lang="en-US" smtClean="0"/>
+              <a:rPr lang="en-US"/>
               <a:t>Click to edit Master title style</a:t>
             </a:r>
-            <a:endParaRPr lang="en-US"/>
           </a:p>
         </p:txBody>
       </p:sp>
@@ -560,38 +555,37 @@
           <a:p>
             <a:pPr lvl="0"/>
             <a:r>
-              <a:rPr lang="en-US" smtClean="0"/>
+              <a:rPr lang="en-US"/>
               <a:t>Click to edit Master text styles</a:t>
             </a:r>
           </a:p>
           <a:p>
             <a:pPr lvl="1"/>
             <a:r>
-              <a:rPr lang="en-US" smtClean="0"/>
+              <a:rPr lang="en-US"/>
               <a:t>Second level</a:t>
             </a:r>
           </a:p>
           <a:p>
             <a:pPr lvl="2"/>
             <a:r>
-              <a:rPr lang="en-US" smtClean="0"/>
+              <a:rPr lang="en-US"/>
               <a:t>Third level</a:t>
             </a:r>
           </a:p>
           <a:p>
             <a:pPr lvl="3"/>
             <a:r>
-              <a:rPr lang="en-US" smtClean="0"/>
+              <a:rPr lang="en-US"/>
               <a:t>Fourth level</a:t>
             </a:r>
           </a:p>
           <a:p>
             <a:pPr lvl="4"/>
             <a:r>
-              <a:rPr lang="en-US" smtClean="0"/>
+              <a:rPr lang="en-US"/>
               <a:t>Fifth level</a:t>
             </a:r>
-            <a:endParaRPr lang="en-US"/>
           </a:p>
         </p:txBody>
       </p:sp>
@@ -612,7 +606,7 @@
           <a:p>
             <a:fld id="{054E8CB3-1D98-4ECD-B6B7-C0FB8C78DDA1}" type="datetimeFigureOut">
               <a:rPr lang="en-US" smtClean="0"/>
-              <a:t>5/1/2020</a:t>
+              <a:t>5/8/2020</a:t>
             </a:fld>
             <a:endParaRPr lang="en-US"/>
           </a:p>
@@ -706,10 +700,9 @@
           <a:lstStyle/>
           <a:p>
             <a:r>
-              <a:rPr lang="en-US" smtClean="0"/>
+              <a:rPr lang="en-US"/>
               <a:t>Click to edit Master title style</a:t>
             </a:r>
-            <a:endParaRPr lang="en-US"/>
           </a:p>
         </p:txBody>
       </p:sp>
@@ -730,38 +723,37 @@
           <a:p>
             <a:pPr lvl="0"/>
             <a:r>
-              <a:rPr lang="en-US" smtClean="0"/>
+              <a:rPr lang="en-US"/>
               <a:t>Click to edit Master text styles</a:t>
             </a:r>
           </a:p>
           <a:p>
             <a:pPr lvl="1"/>
             <a:r>
-              <a:rPr lang="en-US" smtClean="0"/>
+              <a:rPr lang="en-US"/>
               <a:t>Second level</a:t>
             </a:r>
           </a:p>
           <a:p>
             <a:pPr lvl="2"/>
             <a:r>
-              <a:rPr lang="en-US" smtClean="0"/>
+              <a:rPr lang="en-US"/>
               <a:t>Third level</a:t>
             </a:r>
           </a:p>
           <a:p>
             <a:pPr lvl="3"/>
             <a:r>
-              <a:rPr lang="en-US" smtClean="0"/>
+              <a:rPr lang="en-US"/>
               <a:t>Fourth level</a:t>
             </a:r>
           </a:p>
           <a:p>
             <a:pPr lvl="4"/>
             <a:r>
-              <a:rPr lang="en-US" smtClean="0"/>
+              <a:rPr lang="en-US"/>
               <a:t>Fifth level</a:t>
             </a:r>
-            <a:endParaRPr lang="en-US"/>
           </a:p>
         </p:txBody>
       </p:sp>
@@ -782,7 +774,7 @@
           <a:p>
             <a:fld id="{054E8CB3-1D98-4ECD-B6B7-C0FB8C78DDA1}" type="datetimeFigureOut">
               <a:rPr lang="en-US" smtClean="0"/>
-              <a:t>5/1/2020</a:t>
+              <a:t>5/8/2020</a:t>
             </a:fld>
             <a:endParaRPr lang="en-US"/>
           </a:p>
@@ -885,10 +877,9 @@
           </a:lstStyle>
           <a:p>
             <a:r>
-              <a:rPr lang="en-US" smtClean="0"/>
+              <a:rPr lang="en-US"/>
               <a:t>Click to edit Master title style</a:t>
             </a:r>
-            <a:endParaRPr lang="en-US"/>
           </a:p>
         </p:txBody>
       </p:sp>
@@ -1005,7 +996,7 @@
           <a:p>
             <a:pPr lvl="0"/>
             <a:r>
-              <a:rPr lang="en-US" smtClean="0"/>
+              <a:rPr lang="en-US"/>
               <a:t>Click to edit Master text styles</a:t>
             </a:r>
           </a:p>
@@ -1028,7 +1019,7 @@
           <a:p>
             <a:fld id="{054E8CB3-1D98-4ECD-B6B7-C0FB8C78DDA1}" type="datetimeFigureOut">
               <a:rPr lang="en-US" smtClean="0"/>
-              <a:t>5/1/2020</a:t>
+              <a:t>5/8/2020</a:t>
             </a:fld>
             <a:endParaRPr lang="en-US"/>
           </a:p>
@@ -1122,10 +1113,9 @@
           <a:lstStyle/>
           <a:p>
             <a:r>
-              <a:rPr lang="en-US" smtClean="0"/>
+              <a:rPr lang="en-US"/>
               <a:t>Click to edit Master title style</a:t>
             </a:r>
-            <a:endParaRPr lang="en-US"/>
           </a:p>
         </p:txBody>
       </p:sp>
@@ -1151,38 +1141,37 @@
           <a:p>
             <a:pPr lvl="0"/>
             <a:r>
-              <a:rPr lang="en-US" smtClean="0"/>
+              <a:rPr lang="en-US"/>
               <a:t>Click to edit Master text styles</a:t>
             </a:r>
           </a:p>
           <a:p>
             <a:pPr lvl="1"/>
             <a:r>
-              <a:rPr lang="en-US" smtClean="0"/>
+              <a:rPr lang="en-US"/>
               <a:t>Second level</a:t>
             </a:r>
           </a:p>
           <a:p>
             <a:pPr lvl="2"/>
             <a:r>
-              <a:rPr lang="en-US" smtClean="0"/>
+              <a:rPr lang="en-US"/>
               <a:t>Third level</a:t>
             </a:r>
           </a:p>
           <a:p>
             <a:pPr lvl="3"/>
             <a:r>
-              <a:rPr lang="en-US" smtClean="0"/>
+              <a:rPr lang="en-US"/>
               <a:t>Fourth level</a:t>
             </a:r>
           </a:p>
           <a:p>
             <a:pPr lvl="4"/>
             <a:r>
-              <a:rPr lang="en-US" smtClean="0"/>
+              <a:rPr lang="en-US"/>
               <a:t>Fifth level</a:t>
             </a:r>
-            <a:endParaRPr lang="en-US"/>
           </a:p>
         </p:txBody>
       </p:sp>
@@ -1208,38 +1197,37 @@
           <a:p>
             <a:pPr lvl="0"/>
             <a:r>
-              <a:rPr lang="en-US" smtClean="0"/>
+              <a:rPr lang="en-US"/>
               <a:t>Click to edit Master text styles</a:t>
             </a:r>
           </a:p>
           <a:p>
             <a:pPr lvl="1"/>
             <a:r>
-              <a:rPr lang="en-US" smtClean="0"/>
+              <a:rPr lang="en-US"/>
               <a:t>Second level</a:t>
             </a:r>
           </a:p>
           <a:p>
             <a:pPr lvl="2"/>
             <a:r>
-              <a:rPr lang="en-US" smtClean="0"/>
+              <a:rPr lang="en-US"/>
               <a:t>Third level</a:t>
             </a:r>
           </a:p>
           <a:p>
             <a:pPr lvl="3"/>
             <a:r>
-              <a:rPr lang="en-US" smtClean="0"/>
+              <a:rPr lang="en-US"/>
               <a:t>Fourth level</a:t>
             </a:r>
           </a:p>
           <a:p>
             <a:pPr lvl="4"/>
             <a:r>
-              <a:rPr lang="en-US" smtClean="0"/>
+              <a:rPr lang="en-US"/>
               <a:t>Fifth level</a:t>
             </a:r>
-            <a:endParaRPr lang="en-US"/>
           </a:p>
         </p:txBody>
       </p:sp>
@@ -1260,7 +1248,7 @@
           <a:p>
             <a:fld id="{054E8CB3-1D98-4ECD-B6B7-C0FB8C78DDA1}" type="datetimeFigureOut">
               <a:rPr lang="en-US" smtClean="0"/>
-              <a:t>5/1/2020</a:t>
+              <a:t>5/8/2020</a:t>
             </a:fld>
             <a:endParaRPr lang="en-US"/>
           </a:p>
@@ -1359,10 +1347,9 @@
           <a:lstStyle/>
           <a:p>
             <a:r>
-              <a:rPr lang="en-US" smtClean="0"/>
+              <a:rPr lang="en-US"/>
               <a:t>Click to edit Master title style</a:t>
             </a:r>
-            <a:endParaRPr lang="en-US"/>
           </a:p>
         </p:txBody>
       </p:sp>
@@ -1425,7 +1412,7 @@
           <a:p>
             <a:pPr lvl="0"/>
             <a:r>
-              <a:rPr lang="en-US" smtClean="0"/>
+              <a:rPr lang="en-US"/>
               <a:t>Click to edit Master text styles</a:t>
             </a:r>
           </a:p>
@@ -1453,38 +1440,37 @@
           <a:p>
             <a:pPr lvl="0"/>
             <a:r>
-              <a:rPr lang="en-US" smtClean="0"/>
+              <a:rPr lang="en-US"/>
               <a:t>Click to edit Master text styles</a:t>
             </a:r>
           </a:p>
           <a:p>
             <a:pPr lvl="1"/>
             <a:r>
-              <a:rPr lang="en-US" smtClean="0"/>
+              <a:rPr lang="en-US"/>
               <a:t>Second level</a:t>
             </a:r>
           </a:p>
           <a:p>
             <a:pPr lvl="2"/>
             <a:r>
-              <a:rPr lang="en-US" smtClean="0"/>
+              <a:rPr lang="en-US"/>
               <a:t>Third level</a:t>
             </a:r>
           </a:p>
           <a:p>
             <a:pPr lvl="3"/>
             <a:r>
-              <a:rPr lang="en-US" smtClean="0"/>
+              <a:rPr lang="en-US"/>
               <a:t>Fourth level</a:t>
             </a:r>
           </a:p>
           <a:p>
             <a:pPr lvl="4"/>
             <a:r>
-              <a:rPr lang="en-US" smtClean="0"/>
+              <a:rPr lang="en-US"/>
               <a:t>Fifth level</a:t>
             </a:r>
-            <a:endParaRPr lang="en-US"/>
           </a:p>
         </p:txBody>
       </p:sp>
@@ -1547,7 +1533,7 @@
           <a:p>
             <a:pPr lvl="0"/>
             <a:r>
-              <a:rPr lang="en-US" smtClean="0"/>
+              <a:rPr lang="en-US"/>
               <a:t>Click to edit Master text styles</a:t>
             </a:r>
           </a:p>
@@ -1575,38 +1561,37 @@
           <a:p>
             <a:pPr lvl="0"/>
             <a:r>
-              <a:rPr lang="en-US" smtClean="0"/>
+              <a:rPr lang="en-US"/>
               <a:t>Click to edit Master text styles</a:t>
             </a:r>
           </a:p>
           <a:p>
             <a:pPr lvl="1"/>
             <a:r>
-              <a:rPr lang="en-US" smtClean="0"/>
+              <a:rPr lang="en-US"/>
               <a:t>Second level</a:t>
             </a:r>
           </a:p>
           <a:p>
             <a:pPr lvl="2"/>
             <a:r>
-              <a:rPr lang="en-US" smtClean="0"/>
+              <a:rPr lang="en-US"/>
               <a:t>Third level</a:t>
             </a:r>
           </a:p>
           <a:p>
             <a:pPr lvl="3"/>
             <a:r>
-              <a:rPr lang="en-US" smtClean="0"/>
+              <a:rPr lang="en-US"/>
               <a:t>Fourth level</a:t>
             </a:r>
           </a:p>
           <a:p>
             <a:pPr lvl="4"/>
             <a:r>
-              <a:rPr lang="en-US" smtClean="0"/>
+              <a:rPr lang="en-US"/>
               <a:t>Fifth level</a:t>
             </a:r>
-            <a:endParaRPr lang="en-US"/>
           </a:p>
         </p:txBody>
       </p:sp>
@@ -1627,7 +1612,7 @@
           <a:p>
             <a:fld id="{054E8CB3-1D98-4ECD-B6B7-C0FB8C78DDA1}" type="datetimeFigureOut">
               <a:rPr lang="en-US" smtClean="0"/>
-              <a:t>5/1/2020</a:t>
+              <a:t>5/8/2020</a:t>
             </a:fld>
             <a:endParaRPr lang="en-US"/>
           </a:p>
@@ -1721,10 +1706,9 @@
           <a:lstStyle/>
           <a:p>
             <a:r>
-              <a:rPr lang="en-US" smtClean="0"/>
+              <a:rPr lang="en-US"/>
               <a:t>Click to edit Master title style</a:t>
             </a:r>
-            <a:endParaRPr lang="en-US"/>
           </a:p>
         </p:txBody>
       </p:sp>
@@ -1745,7 +1729,7 @@
           <a:p>
             <a:fld id="{054E8CB3-1D98-4ECD-B6B7-C0FB8C78DDA1}" type="datetimeFigureOut">
               <a:rPr lang="en-US" smtClean="0"/>
-              <a:t>5/1/2020</a:t>
+              <a:t>5/8/2020</a:t>
             </a:fld>
             <a:endParaRPr lang="en-US"/>
           </a:p>
@@ -1840,7 +1824,7 @@
           <a:p>
             <a:fld id="{054E8CB3-1D98-4ECD-B6B7-C0FB8C78DDA1}" type="datetimeFigureOut">
               <a:rPr lang="en-US" smtClean="0"/>
-              <a:t>5/1/2020</a:t>
+              <a:t>5/8/2020</a:t>
             </a:fld>
             <a:endParaRPr lang="en-US"/>
           </a:p>
@@ -1943,10 +1927,9 @@
           </a:lstStyle>
           <a:p>
             <a:r>
-              <a:rPr lang="en-US" smtClean="0"/>
+              <a:rPr lang="en-US"/>
               <a:t>Click to edit Master title style</a:t>
             </a:r>
-            <a:endParaRPr lang="en-US"/>
           </a:p>
         </p:txBody>
       </p:sp>
@@ -2000,38 +1983,37 @@
           <a:p>
             <a:pPr lvl="0"/>
             <a:r>
-              <a:rPr lang="en-US" smtClean="0"/>
+              <a:rPr lang="en-US"/>
               <a:t>Click to edit Master text styles</a:t>
             </a:r>
           </a:p>
           <a:p>
             <a:pPr lvl="1"/>
             <a:r>
-              <a:rPr lang="en-US" smtClean="0"/>
+              <a:rPr lang="en-US"/>
               <a:t>Second level</a:t>
             </a:r>
           </a:p>
           <a:p>
             <a:pPr lvl="2"/>
             <a:r>
-              <a:rPr lang="en-US" smtClean="0"/>
+              <a:rPr lang="en-US"/>
               <a:t>Third level</a:t>
             </a:r>
           </a:p>
           <a:p>
             <a:pPr lvl="3"/>
             <a:r>
-              <a:rPr lang="en-US" smtClean="0"/>
+              <a:rPr lang="en-US"/>
               <a:t>Fourth level</a:t>
             </a:r>
           </a:p>
           <a:p>
             <a:pPr lvl="4"/>
             <a:r>
-              <a:rPr lang="en-US" smtClean="0"/>
+              <a:rPr lang="en-US"/>
               <a:t>Fifth level</a:t>
             </a:r>
-            <a:endParaRPr lang="en-US"/>
           </a:p>
         </p:txBody>
       </p:sp>
@@ -2094,7 +2076,7 @@
           <a:p>
             <a:pPr lvl="0"/>
             <a:r>
-              <a:rPr lang="en-US" smtClean="0"/>
+              <a:rPr lang="en-US"/>
               <a:t>Click to edit Master text styles</a:t>
             </a:r>
           </a:p>
@@ -2117,7 +2099,7 @@
           <a:p>
             <a:fld id="{054E8CB3-1D98-4ECD-B6B7-C0FB8C78DDA1}" type="datetimeFigureOut">
               <a:rPr lang="en-US" smtClean="0"/>
-              <a:t>5/1/2020</a:t>
+              <a:t>5/8/2020</a:t>
             </a:fld>
             <a:endParaRPr lang="en-US"/>
           </a:p>
@@ -2220,10 +2202,9 @@
           </a:lstStyle>
           <a:p>
             <a:r>
-              <a:rPr lang="en-US" smtClean="0"/>
+              <a:rPr lang="en-US"/>
               <a:t>Click to edit Master title style</a:t>
             </a:r>
-            <a:endParaRPr lang="en-US"/>
           </a:p>
         </p:txBody>
       </p:sp>
@@ -2347,7 +2328,7 @@
           <a:p>
             <a:pPr lvl="0"/>
             <a:r>
-              <a:rPr lang="en-US" smtClean="0"/>
+              <a:rPr lang="en-US"/>
               <a:t>Click to edit Master text styles</a:t>
             </a:r>
           </a:p>
@@ -2370,7 +2351,7 @@
           <a:p>
             <a:fld id="{054E8CB3-1D98-4ECD-B6B7-C0FB8C78DDA1}" type="datetimeFigureOut">
               <a:rPr lang="en-US" smtClean="0"/>
-              <a:t>5/1/2020</a:t>
+              <a:t>5/8/2020</a:t>
             </a:fld>
             <a:endParaRPr lang="en-US"/>
           </a:p>
@@ -2479,10 +2460,9 @@
           <a:lstStyle/>
           <a:p>
             <a:r>
-              <a:rPr lang="en-US" smtClean="0"/>
+              <a:rPr lang="en-US"/>
               <a:t>Click to edit Master title style</a:t>
             </a:r>
-            <a:endParaRPr lang="en-US"/>
           </a:p>
         </p:txBody>
       </p:sp>
@@ -2513,38 +2493,37 @@
           <a:p>
             <a:pPr lvl="0"/>
             <a:r>
-              <a:rPr lang="en-US" smtClean="0"/>
+              <a:rPr lang="en-US"/>
               <a:t>Click to edit Master text styles</a:t>
             </a:r>
           </a:p>
           <a:p>
             <a:pPr lvl="1"/>
             <a:r>
-              <a:rPr lang="en-US" smtClean="0"/>
+              <a:rPr lang="en-US"/>
               <a:t>Second level</a:t>
             </a:r>
           </a:p>
           <a:p>
             <a:pPr lvl="2"/>
             <a:r>
-              <a:rPr lang="en-US" smtClean="0"/>
+              <a:rPr lang="en-US"/>
               <a:t>Third level</a:t>
             </a:r>
           </a:p>
           <a:p>
             <a:pPr lvl="3"/>
             <a:r>
-              <a:rPr lang="en-US" smtClean="0"/>
+              <a:rPr lang="en-US"/>
               <a:t>Fourth level</a:t>
             </a:r>
           </a:p>
           <a:p>
             <a:pPr lvl="4"/>
             <a:r>
-              <a:rPr lang="en-US" smtClean="0"/>
+              <a:rPr lang="en-US"/>
               <a:t>Fifth level</a:t>
             </a:r>
-            <a:endParaRPr lang="en-US"/>
           </a:p>
         </p:txBody>
       </p:sp>
@@ -2583,7 +2562,7 @@
           <a:p>
             <a:fld id="{054E8CB3-1D98-4ECD-B6B7-C0FB8C78DDA1}" type="datetimeFigureOut">
               <a:rPr lang="en-US" smtClean="0"/>
-              <a:t>5/1/2020</a:t>
+              <a:t>5/8/2020</a:t>
             </a:fld>
             <a:endParaRPr lang="en-US"/>
           </a:p>
@@ -3021,7 +3000,7 @@
               <p:cNvPr id="30" name="Rectangle 29">
                 <a:extLst>
                   <a:ext uri="{FF2B5EF4-FFF2-40B4-BE49-F238E27FC236}">
-                    <a16:creationId xmlns:a16="http://schemas.microsoft.com/office/drawing/2014/main" xmlns:a14="http://schemas.microsoft.com/office/drawing/2010/main" xmlns:mc="http://schemas.openxmlformats.org/markup-compatibility/2006" xmlns="" id="{6D2C8BE0-B0D2-4978-A1B5-FFF5137A4C82}"/>
+                    <a16:creationId xmlns:a16="http://schemas.microsoft.com/office/drawing/2014/main" id="{6D2C8BE0-B0D2-4978-A1B5-FFF5137A4C82}"/>
                   </a:ext>
                 </a:extLst>
               </p:cNvPr>
@@ -3064,7 +3043,7 @@
               <a:lstStyle/>
               <a:p>
                 <a:pPr algn="ctr"/>
-                <a:endParaRPr lang="en-US" sz="2000" dirty="0" smtClean="0">
+                <a:endParaRPr lang="en-US" sz="2000" dirty="0">
                   <a:solidFill>
                     <a:schemeClr val="tx1"/>
                   </a:solidFill>
@@ -3234,7 +3213,7 @@
                     <p:cNvPr id="18" name="Rectangle 17">
                       <a:extLst>
                         <a:ext uri="{FF2B5EF4-FFF2-40B4-BE49-F238E27FC236}">
-                          <a16:creationId xmlns:a16="http://schemas.microsoft.com/office/drawing/2014/main" xmlns:a14="http://schemas.microsoft.com/office/drawing/2010/main" xmlns:mc="http://schemas.openxmlformats.org/markup-compatibility/2006" xmlns="" id="{2E36643D-EEA2-42A8-BBCF-DC12D9FC8BA4}"/>
+                          <a16:creationId xmlns:a16="http://schemas.microsoft.com/office/drawing/2014/main" id="{2E36643D-EEA2-42A8-BBCF-DC12D9FC8BA4}"/>
                         </a:ext>
                       </a:extLst>
                     </p:cNvPr>
@@ -3300,7 +3279,7 @@
                     <p:cNvPr id="19" name="Rectangle 18">
                       <a:extLst>
                         <a:ext uri="{FF2B5EF4-FFF2-40B4-BE49-F238E27FC236}">
-                          <a16:creationId xmlns:a16="http://schemas.microsoft.com/office/drawing/2014/main" xmlns:a14="http://schemas.microsoft.com/office/drawing/2010/main" xmlns:mc="http://schemas.openxmlformats.org/markup-compatibility/2006" xmlns="" id="{2E36643D-EEA2-42A8-BBCF-DC12D9FC8BA4}"/>
+                          <a16:creationId xmlns:a16="http://schemas.microsoft.com/office/drawing/2014/main" id="{2E36643D-EEA2-42A8-BBCF-DC12D9FC8BA4}"/>
                         </a:ext>
                       </a:extLst>
                     </p:cNvPr>
@@ -3342,7 +3321,7 @@
                     <a:p>
                       <a:pPr algn="ctr"/>
                       <a:r>
-                        <a:rPr lang="en-GB" sz="2000" dirty="0" smtClean="0">
+                        <a:rPr lang="en-GB" sz="2000" dirty="0">
                           <a:solidFill>
                             <a:schemeClr val="tx1"/>
                           </a:solidFill>
@@ -3366,7 +3345,7 @@
                     <p:cNvPr id="20" name="Rectangle 19">
                       <a:extLst>
                         <a:ext uri="{FF2B5EF4-FFF2-40B4-BE49-F238E27FC236}">
-                          <a16:creationId xmlns:a16="http://schemas.microsoft.com/office/drawing/2014/main" xmlns:a14="http://schemas.microsoft.com/office/drawing/2010/main" xmlns:mc="http://schemas.openxmlformats.org/markup-compatibility/2006" xmlns="" id="{6D2C8BE0-B0D2-4978-A1B5-FFF5137A4C82}"/>
+                          <a16:creationId xmlns:a16="http://schemas.microsoft.com/office/drawing/2014/main" id="{6D2C8BE0-B0D2-4978-A1B5-FFF5137A4C82}"/>
                         </a:ext>
                       </a:extLst>
                     </p:cNvPr>
@@ -3407,7 +3386,7 @@
                     <a:lstStyle/>
                     <a:p>
                       <a:pPr algn="ctr"/>
-                      <a:endParaRPr lang="en-US" sz="1400" dirty="0" smtClean="0">
+                      <a:endParaRPr lang="en-US" sz="1400" dirty="0">
                         <a:solidFill>
                           <a:schemeClr val="tx1"/>
                         </a:solidFill>
@@ -3417,14 +3396,14 @@
                     </a:p>
                   </p:txBody>
                 </p:sp>
-                <mc:AlternateContent xmlns:mc="http://schemas.openxmlformats.org/markup-compatibility/2006">
-                  <mc:Choice xmlns:a14="http://schemas.microsoft.com/office/drawing/2010/main" Requires="a14">
+                <mc:AlternateContent xmlns:mc="http://schemas.openxmlformats.org/markup-compatibility/2006" xmlns:a14="http://schemas.microsoft.com/office/drawing/2010/main">
+                  <mc:Choice Requires="a14">
                     <p:sp>
                       <p:nvSpPr>
                         <p:cNvPr id="24" name="Rectangle 23">
                           <a:extLst>
                             <a:ext uri="{FF2B5EF4-FFF2-40B4-BE49-F238E27FC236}">
-                              <a16:creationId xmlns:a16="http://schemas.microsoft.com/office/drawing/2014/main" xmlns="" id="{6D2C8BE0-B0D2-4978-A1B5-FFF5137A4C82}"/>
+                              <a16:creationId xmlns:a16="http://schemas.microsoft.com/office/drawing/2014/main" id="{6D2C8BE0-B0D2-4978-A1B5-FFF5137A4C82}"/>
                             </a:ext>
                           </a:extLst>
                         </p:cNvPr>
@@ -3567,7 +3546,7 @@
                       </p:txBody>
                     </p:sp>
                   </mc:Choice>
-                  <mc:Fallback>
+                  <mc:Fallback xmlns="">
                     <p:sp>
                       <p:nvSpPr>
                         <p:cNvPr id="24" name="Rectangle 23">
@@ -3674,7 +3653,7 @@
                           <a:lstStyle/>
                           <a:p>
                             <a:r>
-                              <a:rPr lang="en-US" sz="1400" dirty="0" smtClean="0">
+                              <a:rPr lang="en-US" sz="1400" dirty="0">
                                 <a:solidFill>
                                   <a:schemeClr val="tx1"/>
                                 </a:solidFill>
@@ -3705,45 +3684,8 @@
                                 <a:latin typeface="Cambria Math" panose="02040503050406030204" pitchFamily="18" charset="0"/>
                                 <a:ea typeface="Cambria Math" panose="02040503050406030204" pitchFamily="18" charset="0"/>
                               </a:rPr>
-                              <a:t> on train </a:t>
+                              <a:t> on train sequences (single run)</a:t>
                             </a:r>
-                            <a:r>
-                              <a:rPr lang="en-US" sz="1400" dirty="0" smtClean="0">
-                                <a:solidFill>
-                                  <a:schemeClr val="tx1"/>
-                                </a:solidFill>
-                                <a:latin typeface="Cambria Math" panose="02040503050406030204" pitchFamily="18" charset="0"/>
-                                <a:ea typeface="Cambria Math" panose="02040503050406030204" pitchFamily="18" charset="0"/>
-                              </a:rPr>
-                              <a:t>sequences </a:t>
-                            </a:r>
-                            <a:r>
-                              <a:rPr lang="en-US" sz="1400" dirty="0">
-                                <a:solidFill>
-                                  <a:schemeClr val="tx1"/>
-                                </a:solidFill>
-                                <a:latin typeface="Cambria Math" panose="02040503050406030204" pitchFamily="18" charset="0"/>
-                                <a:ea typeface="Cambria Math" panose="02040503050406030204" pitchFamily="18" charset="0"/>
-                              </a:rPr>
-                              <a:t>(single run</a:t>
-                            </a:r>
-                            <a:r>
-                              <a:rPr lang="en-US" sz="1400" dirty="0" smtClean="0">
-                                <a:solidFill>
-                                  <a:schemeClr val="tx1"/>
-                                </a:solidFill>
-                                <a:latin typeface="Cambria Math" panose="02040503050406030204" pitchFamily="18" charset="0"/>
-                                <a:ea typeface="Cambria Math" panose="02040503050406030204" pitchFamily="18" charset="0"/>
-                              </a:rPr>
-                              <a:t>)</a:t>
-                            </a:r>
-                            <a:endParaRPr lang="en-US" sz="1400" dirty="0">
-                              <a:solidFill>
-                                <a:schemeClr val="tx1"/>
-                              </a:solidFill>
-                              <a:latin typeface="Cambria Math" panose="02040503050406030204" pitchFamily="18" charset="0"/>
-                              <a:ea typeface="Cambria Math" panose="02040503050406030204" pitchFamily="18" charset="0"/>
-                            </a:endParaRPr>
                           </a:p>
                           <a:p>
                             <a:r>
@@ -3778,45 +3720,8 @@
                                 <a:latin typeface="Cambria Math" panose="02040503050406030204" pitchFamily="18" charset="0"/>
                                 <a:ea typeface="Cambria Math" panose="02040503050406030204" pitchFamily="18" charset="0"/>
                               </a:rPr>
-                              <a:t> on test </a:t>
+                              <a:t> on test sequences (single run)</a:t>
                             </a:r>
-                            <a:r>
-                              <a:rPr lang="en-US" sz="1400" dirty="0" smtClean="0">
-                                <a:solidFill>
-                                  <a:schemeClr val="tx1"/>
-                                </a:solidFill>
-                                <a:latin typeface="Cambria Math" panose="02040503050406030204" pitchFamily="18" charset="0"/>
-                                <a:ea typeface="Cambria Math" panose="02040503050406030204" pitchFamily="18" charset="0"/>
-                              </a:rPr>
-                              <a:t>sequences (</a:t>
-                            </a:r>
-                            <a:r>
-                              <a:rPr lang="en-US" sz="1400" dirty="0">
-                                <a:solidFill>
-                                  <a:schemeClr val="tx1"/>
-                                </a:solidFill>
-                                <a:latin typeface="Cambria Math" panose="02040503050406030204" pitchFamily="18" charset="0"/>
-                                <a:ea typeface="Cambria Math" panose="02040503050406030204" pitchFamily="18" charset="0"/>
-                              </a:rPr>
-                              <a:t>single run</a:t>
-                            </a:r>
-                            <a:r>
-                              <a:rPr lang="en-US" sz="1400" dirty="0" smtClean="0">
-                                <a:solidFill>
-                                  <a:schemeClr val="tx1"/>
-                                </a:solidFill>
-                                <a:latin typeface="Cambria Math" panose="02040503050406030204" pitchFamily="18" charset="0"/>
-                                <a:ea typeface="Cambria Math" panose="02040503050406030204" pitchFamily="18" charset="0"/>
-                              </a:rPr>
-                              <a:t>)</a:t>
-                            </a:r>
-                            <a:endParaRPr lang="en-US" sz="1400" dirty="0">
-                              <a:solidFill>
-                                <a:schemeClr val="tx1"/>
-                              </a:solidFill>
-                              <a:latin typeface="Cambria Math" panose="02040503050406030204" pitchFamily="18" charset="0"/>
-                              <a:ea typeface="Cambria Math" panose="02040503050406030204" pitchFamily="18" charset="0"/>
-                            </a:endParaRPr>
                           </a:p>
                           <a:p>
                             <a:r>
@@ -3851,45 +3756,8 @@
                                 <a:latin typeface="Cambria Math" panose="02040503050406030204" pitchFamily="18" charset="0"/>
                                 <a:ea typeface="Cambria Math" panose="02040503050406030204" pitchFamily="18" charset="0"/>
                               </a:rPr>
-                              <a:t> on train </a:t>
+                              <a:t> on train sequences (average of runs)</a:t>
                             </a:r>
-                            <a:r>
-                              <a:rPr lang="en-US" sz="1400" dirty="0" smtClean="0">
-                                <a:solidFill>
-                                  <a:schemeClr val="tx1"/>
-                                </a:solidFill>
-                                <a:latin typeface="Cambria Math" panose="02040503050406030204" pitchFamily="18" charset="0"/>
-                                <a:ea typeface="Cambria Math" panose="02040503050406030204" pitchFamily="18" charset="0"/>
-                              </a:rPr>
-                              <a:t>sequences (</a:t>
-                            </a:r>
-                            <a:r>
-                              <a:rPr lang="en-US" sz="1400" dirty="0">
-                                <a:solidFill>
-                                  <a:schemeClr val="tx1"/>
-                                </a:solidFill>
-                                <a:latin typeface="Cambria Math" panose="02040503050406030204" pitchFamily="18" charset="0"/>
-                                <a:ea typeface="Cambria Math" panose="02040503050406030204" pitchFamily="18" charset="0"/>
-                              </a:rPr>
-                              <a:t>average of runs</a:t>
-                            </a:r>
-                            <a:r>
-                              <a:rPr lang="en-US" sz="1400" dirty="0" smtClean="0">
-                                <a:solidFill>
-                                  <a:schemeClr val="tx1"/>
-                                </a:solidFill>
-                                <a:latin typeface="Cambria Math" panose="02040503050406030204" pitchFamily="18" charset="0"/>
-                                <a:ea typeface="Cambria Math" panose="02040503050406030204" pitchFamily="18" charset="0"/>
-                              </a:rPr>
-                              <a:t>)</a:t>
-                            </a:r>
-                            <a:endParaRPr lang="en-US" sz="1400" dirty="0">
-                              <a:solidFill>
-                                <a:schemeClr val="tx1"/>
-                              </a:solidFill>
-                              <a:latin typeface="Cambria Math" panose="02040503050406030204" pitchFamily="18" charset="0"/>
-                              <a:ea typeface="Cambria Math" panose="02040503050406030204" pitchFamily="18" charset="0"/>
-                            </a:endParaRPr>
                           </a:p>
                           <a:p>
                             <a:r>
@@ -3924,45 +3792,8 @@
                                 <a:latin typeface="Cambria Math" panose="02040503050406030204" pitchFamily="18" charset="0"/>
                                 <a:ea typeface="Cambria Math" panose="02040503050406030204" pitchFamily="18" charset="0"/>
                               </a:rPr>
-                              <a:t> on test </a:t>
+                              <a:t> on test sequences (average of runs)</a:t>
                             </a:r>
-                            <a:r>
-                              <a:rPr lang="en-US" sz="1400" dirty="0" smtClean="0">
-                                <a:solidFill>
-                                  <a:schemeClr val="tx1"/>
-                                </a:solidFill>
-                                <a:latin typeface="Cambria Math" panose="02040503050406030204" pitchFamily="18" charset="0"/>
-                                <a:ea typeface="Cambria Math" panose="02040503050406030204" pitchFamily="18" charset="0"/>
-                              </a:rPr>
-                              <a:t>sequences (</a:t>
-                            </a:r>
-                            <a:r>
-                              <a:rPr lang="en-US" sz="1400" dirty="0">
-                                <a:solidFill>
-                                  <a:schemeClr val="tx1"/>
-                                </a:solidFill>
-                                <a:latin typeface="Cambria Math" panose="02040503050406030204" pitchFamily="18" charset="0"/>
-                                <a:ea typeface="Cambria Math" panose="02040503050406030204" pitchFamily="18" charset="0"/>
-                              </a:rPr>
-                              <a:t>average of runs</a:t>
-                            </a:r>
-                            <a:r>
-                              <a:rPr lang="en-US" sz="1400" dirty="0" smtClean="0">
-                                <a:solidFill>
-                                  <a:schemeClr val="tx1"/>
-                                </a:solidFill>
-                                <a:latin typeface="Cambria Math" panose="02040503050406030204" pitchFamily="18" charset="0"/>
-                                <a:ea typeface="Cambria Math" panose="02040503050406030204" pitchFamily="18" charset="0"/>
-                              </a:rPr>
-                              <a:t>)</a:t>
-                            </a:r>
-                            <a:endParaRPr lang="en-US" sz="1400" dirty="0">
-                              <a:solidFill>
-                                <a:schemeClr val="tx1"/>
-                              </a:solidFill>
-                              <a:latin typeface="Cambria Math" panose="02040503050406030204" pitchFamily="18" charset="0"/>
-                              <a:ea typeface="Cambria Math" panose="02040503050406030204" pitchFamily="18" charset="0"/>
-                            </a:endParaRPr>
                           </a:p>
                           <a:p>
                             <a:r>
@@ -4002,7 +3833,7 @@
                           </a:p>
                           <a:p>
                             <a:r>
-                              <a:rPr lang="en-US" sz="1400" dirty="0" smtClean="0">
+                              <a:rPr lang="en-US" sz="1400" dirty="0">
                                 <a:solidFill>
                                   <a:schemeClr val="tx1"/>
                                 </a:solidFill>
@@ -4375,7 +4206,7 @@
                     <p:cNvPr id="45" name="Rectangle 44">
                       <a:extLst>
                         <a:ext uri="{FF2B5EF4-FFF2-40B4-BE49-F238E27FC236}">
-                          <a16:creationId xmlns:a16="http://schemas.microsoft.com/office/drawing/2014/main" xmlns:a14="http://schemas.microsoft.com/office/drawing/2010/main" xmlns:mc="http://schemas.openxmlformats.org/markup-compatibility/2006" xmlns="" id="{2E36643D-EEA2-42A8-BBCF-DC12D9FC8BA4}"/>
+                          <a16:creationId xmlns:a16="http://schemas.microsoft.com/office/drawing/2014/main" id="{2E36643D-EEA2-42A8-BBCF-DC12D9FC8BA4}"/>
                         </a:ext>
                       </a:extLst>
                     </p:cNvPr>
@@ -4431,7 +4262,7 @@
                     <p:cNvPr id="46" name="Rectangle 45">
                       <a:extLst>
                         <a:ext uri="{FF2B5EF4-FFF2-40B4-BE49-F238E27FC236}">
-                          <a16:creationId xmlns:a16="http://schemas.microsoft.com/office/drawing/2014/main" xmlns:a14="http://schemas.microsoft.com/office/drawing/2010/main" xmlns:mc="http://schemas.openxmlformats.org/markup-compatibility/2006" xmlns="" id="{2E36643D-EEA2-42A8-BBCF-DC12D9FC8BA4}"/>
+                          <a16:creationId xmlns:a16="http://schemas.microsoft.com/office/drawing/2014/main" id="{2E36643D-EEA2-42A8-BBCF-DC12D9FC8BA4}"/>
                         </a:ext>
                       </a:extLst>
                     </p:cNvPr>
@@ -4682,7 +4513,7 @@
               <p:cNvPr id="33" name="Rectangle 32">
                 <a:extLst>
                   <a:ext uri="{FF2B5EF4-FFF2-40B4-BE49-F238E27FC236}">
-                    <a16:creationId xmlns:a16="http://schemas.microsoft.com/office/drawing/2014/main" xmlns:a14="http://schemas.microsoft.com/office/drawing/2010/main" xmlns:mc="http://schemas.openxmlformats.org/markup-compatibility/2006" xmlns="" id="{6D2C8BE0-B0D2-4978-A1B5-FFF5137A4C82}"/>
+                    <a16:creationId xmlns:a16="http://schemas.microsoft.com/office/drawing/2014/main" id="{6D2C8BE0-B0D2-4978-A1B5-FFF5137A4C82}"/>
                   </a:ext>
                 </a:extLst>
               </p:cNvPr>
@@ -4726,16 +4557,6 @@
               <a:p>
                 <a:pPr algn="ctr"/>
                 <a:r>
-                  <a:rPr lang="en-US" sz="2400" dirty="0" smtClean="0">
-                    <a:solidFill>
-                      <a:schemeClr val="tx1"/>
-                    </a:solidFill>
-                    <a:latin typeface="Cambria Math" panose="02040503050406030204" pitchFamily="18" charset="0"/>
-                    <a:ea typeface="Cambria Math" panose="02040503050406030204" pitchFamily="18" charset="0"/>
-                  </a:rPr>
-                  <a:t>Without </a:t>
-                </a:r>
-                <a:r>
                   <a:rPr lang="en-US" sz="2400" dirty="0">
                     <a:solidFill>
                       <a:schemeClr val="tx1"/>
@@ -4743,7 +4564,7 @@
                     <a:latin typeface="Cambria Math" panose="02040503050406030204" pitchFamily="18" charset="0"/>
                     <a:ea typeface="Cambria Math" panose="02040503050406030204" pitchFamily="18" charset="0"/>
                   </a:rPr>
-                  <a:t>Regularization </a:t>
+                  <a:t>Without Regularization </a:t>
                 </a:r>
               </a:p>
             </p:txBody>
@@ -4753,7 +4574,7 @@
               <p:cNvPr id="34" name="Rectangle 33">
                 <a:extLst>
                   <a:ext uri="{FF2B5EF4-FFF2-40B4-BE49-F238E27FC236}">
-                    <a16:creationId xmlns:a16="http://schemas.microsoft.com/office/drawing/2014/main" xmlns:a14="http://schemas.microsoft.com/office/drawing/2010/main" xmlns:mc="http://schemas.openxmlformats.org/markup-compatibility/2006" xmlns="" id="{6D2C8BE0-B0D2-4978-A1B5-FFF5137A4C82}"/>
+                    <a16:creationId xmlns:a16="http://schemas.microsoft.com/office/drawing/2014/main" id="{6D2C8BE0-B0D2-4978-A1B5-FFF5137A4C82}"/>
                   </a:ext>
                 </a:extLst>
               </p:cNvPr>
@@ -4874,13 +4695,6 @@
   <p:clrMapOvr>
     <a:masterClrMapping/>
   </p:clrMapOvr>
-  <p:timing>
-    <p:tnLst>
-      <p:par>
-        <p:cTn id="1" dur="indefinite" restart="never" nodeType="tmRoot"/>
-      </p:par>
-    </p:tnLst>
-  </p:timing>
 </p:sld>
 </file>
 
@@ -4934,7 +4748,7 @@
               <p:cNvPr id="18" name="Rectangle 17">
                 <a:extLst>
                   <a:ext uri="{FF2B5EF4-FFF2-40B4-BE49-F238E27FC236}">
-                    <a16:creationId xmlns:a16="http://schemas.microsoft.com/office/drawing/2014/main" xmlns:a14="http://schemas.microsoft.com/office/drawing/2010/main" xmlns:mc="http://schemas.openxmlformats.org/markup-compatibility/2006" xmlns="" id="{6D2C8BE0-B0D2-4978-A1B5-FFF5137A4C82}"/>
+                    <a16:creationId xmlns:a16="http://schemas.microsoft.com/office/drawing/2014/main" id="{6D2C8BE0-B0D2-4978-A1B5-FFF5137A4C82}"/>
                   </a:ext>
                 </a:extLst>
               </p:cNvPr>
@@ -4977,7 +4791,7 @@
               <a:lstStyle/>
               <a:p>
                 <a:pPr algn="ctr"/>
-                <a:endParaRPr lang="en-US" sz="2000" dirty="0" smtClean="0">
+                <a:endParaRPr lang="en-US" sz="2000" dirty="0">
                   <a:solidFill>
                     <a:schemeClr val="tx1"/>
                   </a:solidFill>
@@ -4995,10 +4809,10 @@
             </p:nvGrpSpPr>
             <p:grpSpPr>
               <a:xfrm>
-                <a:off x="-459028" y="1125563"/>
-                <a:ext cx="12736874" cy="4532145"/>
-                <a:chOff x="-450401" y="1161288"/>
-                <a:chExt cx="12736874" cy="4532145"/>
+                <a:off x="-440740" y="1125563"/>
+                <a:ext cx="12718586" cy="4532145"/>
+                <a:chOff x="-432113" y="1161288"/>
+                <a:chExt cx="12718586" cy="4532145"/>
               </a:xfrm>
               <a:solidFill>
                 <a:schemeClr val="bg1"/>
@@ -5145,7 +4959,7 @@
                 <p:cNvPr id="10" name="Rectangle 9">
                   <a:extLst>
                     <a:ext uri="{FF2B5EF4-FFF2-40B4-BE49-F238E27FC236}">
-                      <a16:creationId xmlns:a16="http://schemas.microsoft.com/office/drawing/2014/main" xmlns:a14="http://schemas.microsoft.com/office/drawing/2010/main" xmlns:mc="http://schemas.openxmlformats.org/markup-compatibility/2006" xmlns="" id="{2E36643D-EEA2-42A8-BBCF-DC12D9FC8BA4}"/>
+                      <a16:creationId xmlns:a16="http://schemas.microsoft.com/office/drawing/2014/main" id="{2E36643D-EEA2-42A8-BBCF-DC12D9FC8BA4}"/>
                     </a:ext>
                   </a:extLst>
                 </p:cNvPr>
@@ -5187,7 +5001,7 @@
                 <a:p>
                   <a:pPr algn="ctr"/>
                   <a:r>
-                    <a:rPr lang="en-US" sz="2000" dirty="0" smtClean="0">
+                    <a:rPr lang="en-US" sz="2000" dirty="0">
                       <a:solidFill>
                         <a:schemeClr val="tx1"/>
                       </a:solidFill>
@@ -5196,13 +5010,6 @@
                     </a:rPr>
                     <a:t>EM Iterations</a:t>
                   </a:r>
-                  <a:endParaRPr lang="en-US" sz="2000" dirty="0">
-                    <a:solidFill>
-                      <a:schemeClr val="tx1"/>
-                    </a:solidFill>
-                    <a:latin typeface="Cambria Math" panose="02040503050406030204" pitchFamily="18" charset="0"/>
-                    <a:ea typeface="Cambria Math" panose="02040503050406030204" pitchFamily="18" charset="0"/>
-                  </a:endParaRPr>
                 </a:p>
               </p:txBody>
             </p:sp>
@@ -5211,7 +5018,7 @@
                 <p:cNvPr id="12" name="Rectangle 11">
                   <a:extLst>
                     <a:ext uri="{FF2B5EF4-FFF2-40B4-BE49-F238E27FC236}">
-                      <a16:creationId xmlns:a16="http://schemas.microsoft.com/office/drawing/2014/main" xmlns:a14="http://schemas.microsoft.com/office/drawing/2010/main" xmlns:mc="http://schemas.openxmlformats.org/markup-compatibility/2006" xmlns="" id="{6D2C8BE0-B0D2-4978-A1B5-FFF5137A4C82}"/>
+                      <a16:creationId xmlns:a16="http://schemas.microsoft.com/office/drawing/2014/main" id="{6D2C8BE0-B0D2-4978-A1B5-FFF5137A4C82}"/>
                     </a:ext>
                   </a:extLst>
                 </p:cNvPr>
@@ -5220,7 +5027,7 @@
               </p:nvSpPr>
               <p:spPr>
                 <a:xfrm>
-                  <a:off x="-450401" y="2320637"/>
+                  <a:off x="-432113" y="2320637"/>
                   <a:ext cx="1648062" cy="2216724"/>
                 </a:xfrm>
                 <a:prstGeom prst="rect">
@@ -5253,7 +5060,7 @@
                 <a:p>
                   <a:pPr algn="ctr"/>
                   <a:r>
-                    <a:rPr lang="en-US" sz="2000" dirty="0" smtClean="0">
+                    <a:rPr lang="en-US" sz="2000" dirty="0">
                       <a:solidFill>
                         <a:schemeClr val="tx1"/>
                       </a:solidFill>
@@ -5309,7 +5116,7 @@
                     <a:lstStyle/>
                     <a:p>
                       <a:r>
-                        <a:rPr lang="en-US" sz="1600" dirty="0" smtClean="0">
+                        <a:rPr lang="en-US" sz="1600" dirty="0">
                           <a:solidFill>
                             <a:schemeClr val="tx1"/>
                           </a:solidFill>
@@ -5357,7 +5164,7 @@
                         </m:oMath>
                       </a14:m>
                       <a:r>
-                        <a:rPr lang="en-US" sz="1600" dirty="0" smtClean="0">
+                        <a:rPr lang="en-US" sz="1600" dirty="0">
                           <a:solidFill>
                             <a:schemeClr val="tx1"/>
                           </a:solidFill>
@@ -5369,7 +5176,7 @@
                     </a:p>
                     <a:p>
                       <a:r>
-                        <a:rPr lang="en-US" sz="1600" dirty="0" smtClean="0">
+                        <a:rPr lang="en-US" sz="1600" dirty="0">
                           <a:solidFill>
                             <a:schemeClr val="tx1"/>
                           </a:solidFill>
@@ -5417,7 +5224,7 @@
                         </m:oMath>
                       </a14:m>
                       <a:r>
-                        <a:rPr lang="en-US" sz="1600" dirty="0" smtClean="0">
+                        <a:rPr lang="en-US" sz="1600" dirty="0">
                           <a:solidFill>
                             <a:schemeClr val="tx1"/>
                           </a:solidFill>
@@ -5426,16 +5233,9 @@
                         </a:rPr>
                         <a:t> (single run)</a:t>
                       </a:r>
-                      <a:endParaRPr lang="en-US" sz="1600" dirty="0">
-                        <a:solidFill>
-                          <a:schemeClr val="tx1"/>
-                        </a:solidFill>
-                        <a:latin typeface="Cambria Math" panose="02040503050406030204" pitchFamily="18" charset="0"/>
-                        <a:ea typeface="Cambria Math" panose="02040503050406030204" pitchFamily="18" charset="0"/>
-                      </a:endParaRPr>
                     </a:p>
                     <a:p>
-                      <a:endParaRPr lang="en-US" sz="1600" dirty="0" smtClean="0">
+                      <a:endParaRPr lang="en-US" sz="1600" dirty="0">
                         <a:solidFill>
                           <a:schemeClr val="tx1"/>
                         </a:solidFill>
@@ -5564,7 +5364,7 @@
                 <p:cNvPr id="19" name="Rectangle 18">
                   <a:extLst>
                     <a:ext uri="{FF2B5EF4-FFF2-40B4-BE49-F238E27FC236}">
-                      <a16:creationId xmlns:a16="http://schemas.microsoft.com/office/drawing/2014/main" xmlns:a14="http://schemas.microsoft.com/office/drawing/2010/main" xmlns:mc="http://schemas.openxmlformats.org/markup-compatibility/2006" xmlns="" id="{2E36643D-EEA2-42A8-BBCF-DC12D9FC8BA4}"/>
+                      <a16:creationId xmlns:a16="http://schemas.microsoft.com/office/drawing/2014/main" id="{2E36643D-EEA2-42A8-BBCF-DC12D9FC8BA4}"/>
                     </a:ext>
                   </a:extLst>
                 </p:cNvPr>
@@ -5606,7 +5406,7 @@
                 <a:p>
                   <a:pPr algn="ctr"/>
                   <a:r>
-                    <a:rPr lang="en-US" sz="2000" dirty="0" smtClean="0">
+                    <a:rPr lang="en-US" sz="2000" dirty="0">
                       <a:solidFill>
                         <a:schemeClr val="tx1"/>
                       </a:solidFill>
@@ -5615,13 +5415,6 @@
                     </a:rPr>
                     <a:t>EM Iterations</a:t>
                   </a:r>
-                  <a:endParaRPr lang="en-US" sz="2000" dirty="0">
-                    <a:solidFill>
-                      <a:schemeClr val="tx1"/>
-                    </a:solidFill>
-                    <a:latin typeface="Cambria Math" panose="02040503050406030204" pitchFamily="18" charset="0"/>
-                    <a:ea typeface="Cambria Math" panose="02040503050406030204" pitchFamily="18" charset="0"/>
-                  </a:endParaRPr>
                 </a:p>
               </p:txBody>
             </p:sp>
@@ -5630,7 +5423,7 @@
                 <p:cNvPr id="20" name="Rectangle 19">
                   <a:extLst>
                     <a:ext uri="{FF2B5EF4-FFF2-40B4-BE49-F238E27FC236}">
-                      <a16:creationId xmlns:a16="http://schemas.microsoft.com/office/drawing/2014/main" xmlns:a14="http://schemas.microsoft.com/office/drawing/2010/main" xmlns:mc="http://schemas.openxmlformats.org/markup-compatibility/2006" xmlns="" id="{6D2C8BE0-B0D2-4978-A1B5-FFF5137A4C82}"/>
+                      <a16:creationId xmlns:a16="http://schemas.microsoft.com/office/drawing/2014/main" id="{6D2C8BE0-B0D2-4978-A1B5-FFF5137A4C82}"/>
                     </a:ext>
                   </a:extLst>
                 </p:cNvPr>
@@ -5671,7 +5464,7 @@
                 <a:lstStyle/>
                 <a:p>
                   <a:pPr algn="ctr"/>
-                  <a:endParaRPr lang="en-US" sz="1400" dirty="0" smtClean="0">
+                  <a:endParaRPr lang="en-US" sz="1400" dirty="0">
                     <a:solidFill>
                       <a:schemeClr val="tx1"/>
                     </a:solidFill>
@@ -5687,7 +5480,7 @@
               <p:cNvPr id="27" name="Rectangle 26">
                 <a:extLst>
                   <a:ext uri="{FF2B5EF4-FFF2-40B4-BE49-F238E27FC236}">
-                    <a16:creationId xmlns:a16="http://schemas.microsoft.com/office/drawing/2014/main" xmlns:a14="http://schemas.microsoft.com/office/drawing/2010/main" xmlns:mc="http://schemas.openxmlformats.org/markup-compatibility/2006" xmlns="" id="{6D2C8BE0-B0D2-4978-A1B5-FFF5137A4C82}"/>
+                    <a16:creationId xmlns:a16="http://schemas.microsoft.com/office/drawing/2014/main" id="{6D2C8BE0-B0D2-4978-A1B5-FFF5137A4C82}"/>
                   </a:ext>
                 </a:extLst>
               </p:cNvPr>
@@ -5731,16 +5524,6 @@
               <a:p>
                 <a:pPr algn="ctr"/>
                 <a:r>
-                  <a:rPr lang="en-US" sz="2400" dirty="0" smtClean="0">
-                    <a:solidFill>
-                      <a:schemeClr val="tx1"/>
-                    </a:solidFill>
-                    <a:latin typeface="Cambria Math" panose="02040503050406030204" pitchFamily="18" charset="0"/>
-                    <a:ea typeface="Cambria Math" panose="02040503050406030204" pitchFamily="18" charset="0"/>
-                  </a:rPr>
-                  <a:t>Without </a:t>
-                </a:r>
-                <a:r>
                   <a:rPr lang="en-US" sz="2400" dirty="0">
                     <a:solidFill>
                       <a:schemeClr val="tx1"/>
@@ -5748,7 +5531,7 @@
                     <a:latin typeface="Cambria Math" panose="02040503050406030204" pitchFamily="18" charset="0"/>
                     <a:ea typeface="Cambria Math" panose="02040503050406030204" pitchFamily="18" charset="0"/>
                   </a:rPr>
-                  <a:t>Regularization </a:t>
+                  <a:t>Without Regularization </a:t>
                 </a:r>
               </a:p>
             </p:txBody>
@@ -5758,7 +5541,7 @@
               <p:cNvPr id="28" name="Rectangle 27">
                 <a:extLst>
                   <a:ext uri="{FF2B5EF4-FFF2-40B4-BE49-F238E27FC236}">
-                    <a16:creationId xmlns:a16="http://schemas.microsoft.com/office/drawing/2014/main" xmlns:a14="http://schemas.microsoft.com/office/drawing/2010/main" xmlns:mc="http://schemas.openxmlformats.org/markup-compatibility/2006" xmlns="" id="{6D2C8BE0-B0D2-4978-A1B5-FFF5137A4C82}"/>
+                    <a16:creationId xmlns:a16="http://schemas.microsoft.com/office/drawing/2014/main" id="{6D2C8BE0-B0D2-4978-A1B5-FFF5137A4C82}"/>
                   </a:ext>
                 </a:extLst>
               </p:cNvPr>
@@ -5879,13 +5662,6 @@
   <p:clrMapOvr>
     <a:masterClrMapping/>
   </p:clrMapOvr>
-  <p:timing>
-    <p:tnLst>
-      <p:par>
-        <p:cTn id="1" dur="indefinite" restart="never" nodeType="tmRoot"/>
-      </p:par>
-    </p:tnLst>
-  </p:timing>
 </p:sld>
 </file>
 
@@ -5925,7 +5701,7 @@
             <p:cNvPr id="61" name="Rectangle 60">
               <a:extLst>
                 <a:ext uri="{FF2B5EF4-FFF2-40B4-BE49-F238E27FC236}">
-                  <a16:creationId xmlns:a16="http://schemas.microsoft.com/office/drawing/2014/main" xmlns:a14="http://schemas.microsoft.com/office/drawing/2010/main" xmlns:mc="http://schemas.openxmlformats.org/markup-compatibility/2006" xmlns="" id="{6D2C8BE0-B0D2-4978-A1B5-FFF5137A4C82}"/>
+                  <a16:creationId xmlns:a16="http://schemas.microsoft.com/office/drawing/2014/main" id="{6D2C8BE0-B0D2-4978-A1B5-FFF5137A4C82}"/>
                 </a:ext>
               </a:extLst>
             </p:cNvPr>
@@ -5968,7 +5744,7 @@
             <a:lstStyle/>
             <a:p>
               <a:pPr algn="ctr"/>
-              <a:endParaRPr lang="en-US" sz="2000" dirty="0" smtClean="0">
+              <a:endParaRPr lang="en-US" sz="2000" dirty="0">
                 <a:solidFill>
                   <a:schemeClr val="tx1"/>
                 </a:solidFill>
@@ -6099,7 +5875,7 @@
                 <p:cNvPr id="37" name="Rectangle 36">
                   <a:extLst>
                     <a:ext uri="{FF2B5EF4-FFF2-40B4-BE49-F238E27FC236}">
-                      <a16:creationId xmlns:a16="http://schemas.microsoft.com/office/drawing/2014/main" xmlns="" id="{2E36643D-EEA2-42A8-BBCF-DC12D9FC8BA4}"/>
+                      <a16:creationId xmlns:a16="http://schemas.microsoft.com/office/drawing/2014/main" id="{2E36643D-EEA2-42A8-BBCF-DC12D9FC8BA4}"/>
                     </a:ext>
                   </a:extLst>
                 </p:cNvPr>
@@ -6235,7 +6011,7 @@
                 <p:cNvPr id="42" name="Rectangle 41">
                   <a:extLst>
                     <a:ext uri="{FF2B5EF4-FFF2-40B4-BE49-F238E27FC236}">
-                      <a16:creationId xmlns:a16="http://schemas.microsoft.com/office/drawing/2014/main" xmlns="" id="{2E36643D-EEA2-42A8-BBCF-DC12D9FC8BA4}"/>
+                      <a16:creationId xmlns:a16="http://schemas.microsoft.com/office/drawing/2014/main" id="{2E36643D-EEA2-42A8-BBCF-DC12D9FC8BA4}"/>
                     </a:ext>
                   </a:extLst>
                 </p:cNvPr>
@@ -6369,7 +6145,7 @@
             <p:cNvPr id="43" name="Rectangle 42">
               <a:extLst>
                 <a:ext uri="{FF2B5EF4-FFF2-40B4-BE49-F238E27FC236}">
-                  <a16:creationId xmlns:a16="http://schemas.microsoft.com/office/drawing/2014/main" xmlns:a14="http://schemas.microsoft.com/office/drawing/2010/main" xmlns:mc="http://schemas.openxmlformats.org/markup-compatibility/2006" xmlns="" id="{6D2C8BE0-B0D2-4978-A1B5-FFF5137A4C82}"/>
+                  <a16:creationId xmlns:a16="http://schemas.microsoft.com/office/drawing/2014/main" id="{6D2C8BE0-B0D2-4978-A1B5-FFF5137A4C82}"/>
                 </a:ext>
               </a:extLst>
             </p:cNvPr>
@@ -6412,7 +6188,7 @@
             <a:lstStyle/>
             <a:p>
               <a:pPr algn="ctr"/>
-              <a:endParaRPr lang="en-US" sz="1400" dirty="0" smtClean="0">
+              <a:endParaRPr lang="en-US" sz="1400" dirty="0">
                 <a:solidFill>
                   <a:schemeClr val="tx1"/>
                 </a:solidFill>
@@ -6489,37 +6265,7 @@
                       <a:latin typeface="Cambria Math" panose="02040503050406030204" pitchFamily="18" charset="0"/>
                       <a:ea typeface="Cambria Math" panose="02040503050406030204" pitchFamily="18" charset="0"/>
                     </a:rPr>
-                    <a:t> value </a:t>
-                  </a:r>
-                  <a:r>
-                    <a:rPr lang="en-US" sz="1400" dirty="0" smtClean="0">
-                      <a:solidFill>
-                        <a:schemeClr val="tx1"/>
-                      </a:solidFill>
-                      <a:latin typeface="Cambria Math" panose="02040503050406030204" pitchFamily="18" charset="0"/>
-                      <a:ea typeface="Cambria Math" panose="02040503050406030204" pitchFamily="18" charset="0"/>
-                    </a:rPr>
-                    <a:t>in the </a:t>
-                  </a:r>
-                  <a:r>
-                    <a:rPr lang="en-US" sz="1400" dirty="0">
-                      <a:solidFill>
-                        <a:schemeClr val="tx1"/>
-                      </a:solidFill>
-                      <a:latin typeface="Cambria Math" panose="02040503050406030204" pitchFamily="18" charset="0"/>
-                      <a:ea typeface="Cambria Math" panose="02040503050406030204" pitchFamily="18" charset="0"/>
-                    </a:rPr>
-                    <a:t>final EM </a:t>
-                  </a:r>
-                  <a:r>
-                    <a:rPr lang="en-US" sz="1400" dirty="0" smtClean="0">
-                      <a:solidFill>
-                        <a:schemeClr val="tx1"/>
-                      </a:solidFill>
-                      <a:latin typeface="Cambria Math" panose="02040503050406030204" pitchFamily="18" charset="0"/>
-                      <a:ea typeface="Cambria Math" panose="02040503050406030204" pitchFamily="18" charset="0"/>
-                    </a:rPr>
-                    <a:t>iteration</a:t>
+                    <a:t> value in the final EM iteration</a:t>
                   </a:r>
                 </a:p>
                 <a:p>
@@ -6545,25 +6291,8 @@
                       <a:latin typeface="Cambria Math" panose="02040503050406030204" pitchFamily="18" charset="0"/>
                       <a:ea typeface="Cambria Math" panose="02040503050406030204" pitchFamily="18" charset="0"/>
                     </a:rPr>
-                    <a:t> value </a:t>
+                    <a:t> value in the non-final EM iterations</a:t>
                   </a:r>
-                  <a:r>
-                    <a:rPr lang="en-US" sz="1400" dirty="0" smtClean="0">
-                      <a:solidFill>
-                        <a:schemeClr val="tx1"/>
-                      </a:solidFill>
-                      <a:latin typeface="Cambria Math" panose="02040503050406030204" pitchFamily="18" charset="0"/>
-                      <a:ea typeface="Cambria Math" panose="02040503050406030204" pitchFamily="18" charset="0"/>
-                    </a:rPr>
-                    <a:t>in the non-final EM iterations</a:t>
-                  </a:r>
-                  <a:endParaRPr lang="en-US" sz="1400" dirty="0">
-                    <a:solidFill>
-                      <a:schemeClr val="tx1"/>
-                    </a:solidFill>
-                    <a:latin typeface="Cambria Math" panose="02040503050406030204" pitchFamily="18" charset="0"/>
-                    <a:ea typeface="Cambria Math" panose="02040503050406030204" pitchFamily="18" charset="0"/>
-                  </a:endParaRPr>
                 </a:p>
               </p:txBody>
             </p:sp>
@@ -6716,14 +6445,14 @@
             </a:p>
           </p:txBody>
         </p:sp>
-        <mc:AlternateContent xmlns:mc="http://schemas.openxmlformats.org/markup-compatibility/2006">
-          <mc:Choice xmlns:a14="http://schemas.microsoft.com/office/drawing/2010/main" Requires="a14">
+        <mc:AlternateContent xmlns:mc="http://schemas.openxmlformats.org/markup-compatibility/2006" xmlns:a14="http://schemas.microsoft.com/office/drawing/2010/main">
+          <mc:Choice Requires="a14">
             <p:sp>
               <p:nvSpPr>
                 <p:cNvPr id="13" name="Rectangle 12">
                   <a:extLst>
                     <a:ext uri="{FF2B5EF4-FFF2-40B4-BE49-F238E27FC236}">
-                      <a16:creationId xmlns:a16="http://schemas.microsoft.com/office/drawing/2014/main" xmlns="" id="{6D2C8BE0-B0D2-4978-A1B5-FFF5137A4C82}"/>
+                      <a16:creationId xmlns:a16="http://schemas.microsoft.com/office/drawing/2014/main" id="{6D2C8BE0-B0D2-4978-A1B5-FFF5137A4C82}"/>
                     </a:ext>
                   </a:extLst>
                 </p:cNvPr>
@@ -6767,7 +6496,7 @@
                 <a:p>
                   <a:pPr algn="ctr"/>
                   <a:r>
-                    <a:rPr lang="en-US" sz="2000" dirty="0" smtClean="0">
+                    <a:rPr lang="en-US" sz="2000" dirty="0">
                       <a:solidFill>
                         <a:schemeClr val="tx1"/>
                       </a:solidFill>
@@ -6816,18 +6545,11 @@
                     </a:rPr>
                     <a:t> Probabilities</a:t>
                   </a:r>
-                  <a:endParaRPr lang="en-US" sz="2000" dirty="0">
-                    <a:solidFill>
-                      <a:schemeClr val="tx1"/>
-                    </a:solidFill>
-                    <a:latin typeface="Cambria Math" panose="02040503050406030204" pitchFamily="18" charset="0"/>
-                    <a:ea typeface="Cambria Math" panose="02040503050406030204" pitchFamily="18" charset="0"/>
-                  </a:endParaRPr>
                 </a:p>
               </p:txBody>
             </p:sp>
           </mc:Choice>
-          <mc:Fallback>
+          <mc:Fallback xmlns="">
             <p:sp>
               <p:nvSpPr>
                 <p:cNvPr id="13" name="Rectangle 12">
@@ -6880,7 +6602,7 @@
             <p:cNvPr id="39" name="Rectangle 38">
               <a:extLst>
                 <a:ext uri="{FF2B5EF4-FFF2-40B4-BE49-F238E27FC236}">
-                  <a16:creationId xmlns:a16="http://schemas.microsoft.com/office/drawing/2014/main" xmlns:a14="http://schemas.microsoft.com/office/drawing/2010/main" xmlns:mc="http://schemas.openxmlformats.org/markup-compatibility/2006" xmlns="" id="{6D2C8BE0-B0D2-4978-A1B5-FFF5137A4C82}"/>
+                  <a16:creationId xmlns:a16="http://schemas.microsoft.com/office/drawing/2014/main" id="{6D2C8BE0-B0D2-4978-A1B5-FFF5137A4C82}"/>
                 </a:ext>
               </a:extLst>
             </p:cNvPr>
@@ -6924,16 +6646,6 @@
             <a:p>
               <a:pPr algn="ctr"/>
               <a:r>
-                <a:rPr lang="en-US" sz="2400" dirty="0" smtClean="0">
-                  <a:solidFill>
-                    <a:schemeClr val="tx1"/>
-                  </a:solidFill>
-                  <a:latin typeface="Cambria Math" panose="02040503050406030204" pitchFamily="18" charset="0"/>
-                  <a:ea typeface="Cambria Math" panose="02040503050406030204" pitchFamily="18" charset="0"/>
-                </a:rPr>
-                <a:t>Without </a:t>
-              </a:r>
-              <a:r>
                 <a:rPr lang="en-US" sz="2400" dirty="0">
                   <a:solidFill>
                     <a:schemeClr val="tx1"/>
@@ -6941,7 +6653,7 @@
                   <a:latin typeface="Cambria Math" panose="02040503050406030204" pitchFamily="18" charset="0"/>
                   <a:ea typeface="Cambria Math" panose="02040503050406030204" pitchFamily="18" charset="0"/>
                 </a:rPr>
-                <a:t>Regularization </a:t>
+                <a:t>Without Regularization </a:t>
               </a:r>
             </a:p>
           </p:txBody>
@@ -6951,7 +6663,7 @@
             <p:cNvPr id="40" name="Rectangle 39">
               <a:extLst>
                 <a:ext uri="{FF2B5EF4-FFF2-40B4-BE49-F238E27FC236}">
-                  <a16:creationId xmlns:a16="http://schemas.microsoft.com/office/drawing/2014/main" xmlns:a14="http://schemas.microsoft.com/office/drawing/2010/main" xmlns:mc="http://schemas.openxmlformats.org/markup-compatibility/2006" xmlns="" id="{6D2C8BE0-B0D2-4978-A1B5-FFF5137A4C82}"/>
+                  <a16:creationId xmlns:a16="http://schemas.microsoft.com/office/drawing/2014/main" id="{6D2C8BE0-B0D2-4978-A1B5-FFF5137A4C82}"/>
                 </a:ext>
               </a:extLst>
             </p:cNvPr>
@@ -7050,18 +6762,13 @@
             <a:p>
               <a:pPr algn="ctr"/>
               <a:r>
-                <a:rPr lang="en-US" sz="2400" b="1" dirty="0" smtClean="0">
+                <a:rPr lang="en-US" sz="2400" b="1" dirty="0">
                   <a:solidFill>
                     <a:schemeClr val="tx1"/>
                   </a:solidFill>
                 </a:rPr>
                 <a:t>A</a:t>
               </a:r>
-              <a:endParaRPr lang="en-US" sz="2400" b="1" dirty="0">
-                <a:solidFill>
-                  <a:schemeClr val="tx1"/>
-                </a:solidFill>
-              </a:endParaRPr>
             </a:p>
           </p:txBody>
         </p:sp>
@@ -7076,13 +6783,6 @@
   <p:clrMapOvr>
     <a:masterClrMapping/>
   </p:clrMapOvr>
-  <p:timing>
-    <p:tnLst>
-      <p:par>
-        <p:cTn id="1" dur="indefinite" restart="never" nodeType="tmRoot"/>
-      </p:par>
-    </p:tnLst>
-  </p:timing>
 </p:sld>
 </file>
 
@@ -7122,7 +6822,7 @@
             <p:cNvPr id="33" name="Rectangle 32">
               <a:extLst>
                 <a:ext uri="{FF2B5EF4-FFF2-40B4-BE49-F238E27FC236}">
-                  <a16:creationId xmlns:a16="http://schemas.microsoft.com/office/drawing/2014/main" xmlns:a14="http://schemas.microsoft.com/office/drawing/2010/main" xmlns:mc="http://schemas.openxmlformats.org/markup-compatibility/2006" xmlns="" id="{6D2C8BE0-B0D2-4978-A1B5-FFF5137A4C82}"/>
+                  <a16:creationId xmlns:a16="http://schemas.microsoft.com/office/drawing/2014/main" id="{6D2C8BE0-B0D2-4978-A1B5-FFF5137A4C82}"/>
                 </a:ext>
               </a:extLst>
             </p:cNvPr>
@@ -7165,7 +6865,7 @@
             <a:lstStyle/>
             <a:p>
               <a:pPr algn="ctr"/>
-              <a:endParaRPr lang="en-US" sz="2000" dirty="0" smtClean="0">
+              <a:endParaRPr lang="en-US" sz="2000" dirty="0">
                 <a:solidFill>
                   <a:schemeClr val="tx1"/>
                 </a:solidFill>
@@ -7268,18 +6968,13 @@
             <a:p>
               <a:pPr algn="ctr"/>
               <a:r>
-                <a:rPr lang="en-US" b="1" dirty="0" smtClean="0">
+                <a:rPr lang="en-US" b="1" dirty="0">
                   <a:solidFill>
                     <a:schemeClr val="tx1"/>
                   </a:solidFill>
                 </a:rPr>
                 <a:t>C</a:t>
               </a:r>
-              <a:endParaRPr lang="en-US" b="1" dirty="0">
-                <a:solidFill>
-                  <a:schemeClr val="tx1"/>
-                </a:solidFill>
-              </a:endParaRPr>
             </a:p>
           </p:txBody>
         </p:sp>
@@ -7288,7 +6983,7 @@
             <p:cNvPr id="46" name="Rectangle 45">
               <a:extLst>
                 <a:ext uri="{FF2B5EF4-FFF2-40B4-BE49-F238E27FC236}">
-                  <a16:creationId xmlns:a16="http://schemas.microsoft.com/office/drawing/2014/main" xmlns:a14="http://schemas.microsoft.com/office/drawing/2010/main" xmlns:mc="http://schemas.openxmlformats.org/markup-compatibility/2006" xmlns="" id="{2E36643D-EEA2-42A8-BBCF-DC12D9FC8BA4}"/>
+                  <a16:creationId xmlns:a16="http://schemas.microsoft.com/office/drawing/2014/main" id="{2E36643D-EEA2-42A8-BBCF-DC12D9FC8BA4}"/>
                 </a:ext>
               </a:extLst>
             </p:cNvPr>
@@ -7346,7 +7041,7 @@
             <p:cNvPr id="47" name="Rectangle 46">
               <a:extLst>
                 <a:ext uri="{FF2B5EF4-FFF2-40B4-BE49-F238E27FC236}">
-                  <a16:creationId xmlns:a16="http://schemas.microsoft.com/office/drawing/2014/main" xmlns:a14="http://schemas.microsoft.com/office/drawing/2010/main" xmlns:mc="http://schemas.openxmlformats.org/markup-compatibility/2006" xmlns="" id="{2E36643D-EEA2-42A8-BBCF-DC12D9FC8BA4}"/>
+                  <a16:creationId xmlns:a16="http://schemas.microsoft.com/office/drawing/2014/main" id="{2E36643D-EEA2-42A8-BBCF-DC12D9FC8BA4}"/>
                 </a:ext>
               </a:extLst>
             </p:cNvPr>
@@ -7390,7 +7085,7 @@
             <a:p>
               <a:pPr algn="ctr"/>
               <a:r>
-                <a:rPr lang="en-US" sz="1200" dirty="0" smtClean="0">
+                <a:rPr lang="en-US" sz="1200" dirty="0">
                   <a:solidFill>
                     <a:schemeClr val="tx1"/>
                   </a:solidFill>
@@ -7399,13 +7094,6 @@
                 </a:rPr>
                 <a:t>EM Iterations</a:t>
               </a:r>
-              <a:endParaRPr lang="en-US" sz="1200" dirty="0">
-                <a:solidFill>
-                  <a:schemeClr val="tx1"/>
-                </a:solidFill>
-                <a:latin typeface="Cambria Math" panose="02040503050406030204" pitchFamily="18" charset="0"/>
-                <a:ea typeface="Cambria Math" panose="02040503050406030204" pitchFamily="18" charset="0"/>
-              </a:endParaRPr>
             </a:p>
           </p:txBody>
         </p:sp>
@@ -7414,7 +7102,7 @@
             <p:cNvPr id="48" name="Rectangle 47">
               <a:extLst>
                 <a:ext uri="{FF2B5EF4-FFF2-40B4-BE49-F238E27FC236}">
-                  <a16:creationId xmlns:a16="http://schemas.microsoft.com/office/drawing/2014/main" xmlns:a14="http://schemas.microsoft.com/office/drawing/2010/main" xmlns:mc="http://schemas.openxmlformats.org/markup-compatibility/2006" xmlns="" id="{2E36643D-EEA2-42A8-BBCF-DC12D9FC8BA4}"/>
+                  <a16:creationId xmlns:a16="http://schemas.microsoft.com/office/drawing/2014/main" id="{2E36643D-EEA2-42A8-BBCF-DC12D9FC8BA4}"/>
                 </a:ext>
               </a:extLst>
             </p:cNvPr>
@@ -7482,7 +7170,7 @@
             <p:cNvPr id="49" name="Rectangle 48">
               <a:extLst>
                 <a:ext uri="{FF2B5EF4-FFF2-40B4-BE49-F238E27FC236}">
-                  <a16:creationId xmlns:a16="http://schemas.microsoft.com/office/drawing/2014/main" xmlns:a14="http://schemas.microsoft.com/office/drawing/2010/main" xmlns:mc="http://schemas.openxmlformats.org/markup-compatibility/2006" xmlns="" id="{2E36643D-EEA2-42A8-BBCF-DC12D9FC8BA4}"/>
+                  <a16:creationId xmlns:a16="http://schemas.microsoft.com/office/drawing/2014/main" id="{2E36643D-EEA2-42A8-BBCF-DC12D9FC8BA4}"/>
                 </a:ext>
               </a:extLst>
             </p:cNvPr>
@@ -7526,7 +7214,7 @@
             <a:p>
               <a:pPr algn="ctr"/>
               <a:r>
-                <a:rPr lang="en-GB" sz="1400" dirty="0" smtClean="0">
+                <a:rPr lang="en-GB" sz="1400" dirty="0">
                   <a:solidFill>
                     <a:schemeClr val="tx1"/>
                   </a:solidFill>
@@ -7550,7 +7238,7 @@
             <p:cNvPr id="50" name="Rectangle 49">
               <a:extLst>
                 <a:ext uri="{FF2B5EF4-FFF2-40B4-BE49-F238E27FC236}">
-                  <a16:creationId xmlns:a16="http://schemas.microsoft.com/office/drawing/2014/main" xmlns:a14="http://schemas.microsoft.com/office/drawing/2010/main" xmlns:mc="http://schemas.openxmlformats.org/markup-compatibility/2006" xmlns="" id="{6D2C8BE0-B0D2-4978-A1B5-FFF5137A4C82}"/>
+                  <a16:creationId xmlns:a16="http://schemas.microsoft.com/office/drawing/2014/main" id="{6D2C8BE0-B0D2-4978-A1B5-FFF5137A4C82}"/>
                 </a:ext>
               </a:extLst>
             </p:cNvPr>
@@ -7593,7 +7281,7 @@
             <a:lstStyle/>
             <a:p>
               <a:pPr algn="ctr"/>
-              <a:endParaRPr lang="en-US" sz="1400" dirty="0" smtClean="0">
+              <a:endParaRPr lang="en-US" sz="1400" dirty="0">
                 <a:solidFill>
                   <a:schemeClr val="tx1"/>
                 </a:solidFill>
@@ -7608,7 +7296,7 @@
             <p:cNvPr id="53" name="Rectangle 52">
               <a:extLst>
                 <a:ext uri="{FF2B5EF4-FFF2-40B4-BE49-F238E27FC236}">
-                  <a16:creationId xmlns:a16="http://schemas.microsoft.com/office/drawing/2014/main" xmlns:a14="http://schemas.microsoft.com/office/drawing/2010/main" xmlns:mc="http://schemas.openxmlformats.org/markup-compatibility/2006" xmlns="" id="{2E36643D-EEA2-42A8-BBCF-DC12D9FC8BA4}"/>
+                  <a16:creationId xmlns:a16="http://schemas.microsoft.com/office/drawing/2014/main" id="{2E36643D-EEA2-42A8-BBCF-DC12D9FC8BA4}"/>
                 </a:ext>
               </a:extLst>
             </p:cNvPr>
@@ -7666,7 +7354,7 @@
             <p:cNvPr id="54" name="Rectangle 53">
               <a:extLst>
                 <a:ext uri="{FF2B5EF4-FFF2-40B4-BE49-F238E27FC236}">
-                  <a16:creationId xmlns:a16="http://schemas.microsoft.com/office/drawing/2014/main" xmlns:a14="http://schemas.microsoft.com/office/drawing/2010/main" xmlns:mc="http://schemas.openxmlformats.org/markup-compatibility/2006" xmlns="" id="{2E36643D-EEA2-42A8-BBCF-DC12D9FC8BA4}"/>
+                  <a16:creationId xmlns:a16="http://schemas.microsoft.com/office/drawing/2014/main" id="{2E36643D-EEA2-42A8-BBCF-DC12D9FC8BA4}"/>
                 </a:ext>
               </a:extLst>
             </p:cNvPr>
@@ -7831,16 +7519,6 @@
                 <a:lstStyle/>
                 <a:p>
                   <a:r>
-                    <a:rPr lang="en-US" sz="1400" dirty="0" smtClean="0">
-                      <a:solidFill>
-                        <a:schemeClr val="tx1"/>
-                      </a:solidFill>
-                      <a:latin typeface="Cambria Math" panose="02040503050406030204" pitchFamily="18" charset="0"/>
-                      <a:ea typeface="Cambria Math" panose="02040503050406030204" pitchFamily="18" charset="0"/>
-                    </a:rPr>
-                    <a:t>Viterbi train </a:t>
-                  </a:r>
-                  <a:r>
                     <a:rPr lang="en-US" sz="1400" dirty="0">
                       <a:solidFill>
                         <a:schemeClr val="tx1"/>
@@ -7848,37 +7526,7 @@
                       <a:latin typeface="Cambria Math" panose="02040503050406030204" pitchFamily="18" charset="0"/>
                       <a:ea typeface="Cambria Math" panose="02040503050406030204" pitchFamily="18" charset="0"/>
                     </a:rPr>
-                    <a:t>e</a:t>
-                  </a:r>
-                  <a:r>
-                    <a:rPr lang="en-US" sz="1400" dirty="0" smtClean="0">
-                      <a:solidFill>
-                        <a:schemeClr val="tx1"/>
-                      </a:solidFill>
-                      <a:latin typeface="Cambria Math" panose="02040503050406030204" pitchFamily="18" charset="0"/>
-                      <a:ea typeface="Cambria Math" panose="02040503050406030204" pitchFamily="18" charset="0"/>
-                    </a:rPr>
-                    <a:t>rror </a:t>
-                  </a:r>
-                  <a:r>
-                    <a:rPr lang="en-US" sz="1400" dirty="0">
-                      <a:solidFill>
-                        <a:schemeClr val="tx1"/>
-                      </a:solidFill>
-                      <a:latin typeface="Cambria Math" panose="02040503050406030204" pitchFamily="18" charset="0"/>
-                      <a:ea typeface="Cambria Math" panose="02040503050406030204" pitchFamily="18" charset="0"/>
-                    </a:rPr>
-                    <a:t>with </a:t>
-                  </a:r>
-                  <a:r>
-                    <a:rPr lang="en-US" sz="1400" dirty="0" smtClean="0">
-                      <a:solidFill>
-                        <a:schemeClr val="tx1"/>
-                      </a:solidFill>
-                      <a:latin typeface="Cambria Math" panose="02040503050406030204" pitchFamily="18" charset="0"/>
-                      <a:ea typeface="Cambria Math" panose="02040503050406030204" pitchFamily="18" charset="0"/>
-                    </a:rPr>
-                    <a:t>learned </a:t>
+                    <a:t>Viterbi train error with learned </a:t>
                   </a:r>
                   <a14:m>
                     <m:oMath xmlns:m="http://schemas.openxmlformats.org/officeDocument/2006/math">
@@ -7895,7 +7543,7 @@
                     </m:oMath>
                   </a14:m>
                   <a:r>
-                    <a:rPr lang="en-US" sz="1400" dirty="0" smtClean="0">
+                    <a:rPr lang="en-US" sz="1400" dirty="0">
                       <a:solidFill>
                         <a:schemeClr val="tx1"/>
                       </a:solidFill>
@@ -7907,16 +7555,6 @@
                 </a:p>
                 <a:p>
                   <a:r>
-                    <a:rPr lang="en-US" sz="1400" dirty="0" smtClean="0">
-                      <a:solidFill>
-                        <a:schemeClr val="tx1"/>
-                      </a:solidFill>
-                      <a:latin typeface="Cambria Math" panose="02040503050406030204" pitchFamily="18" charset="0"/>
-                      <a:ea typeface="Cambria Math" panose="02040503050406030204" pitchFamily="18" charset="0"/>
-                    </a:rPr>
-                    <a:t>Viterbi test error </a:t>
-                  </a:r>
-                  <a:r>
                     <a:rPr lang="en-US" sz="1400" dirty="0">
                       <a:solidFill>
                         <a:schemeClr val="tx1"/>
@@ -7924,17 +7562,7 @@
                       <a:latin typeface="Cambria Math" panose="02040503050406030204" pitchFamily="18" charset="0"/>
                       <a:ea typeface="Cambria Math" panose="02040503050406030204" pitchFamily="18" charset="0"/>
                     </a:rPr>
-                    <a:t>with </a:t>
-                  </a:r>
-                  <a:r>
-                    <a:rPr lang="en-US" sz="1400" dirty="0" smtClean="0">
-                      <a:solidFill>
-                        <a:schemeClr val="tx1"/>
-                      </a:solidFill>
-                      <a:latin typeface="Cambria Math" panose="02040503050406030204" pitchFamily="18" charset="0"/>
-                      <a:ea typeface="Cambria Math" panose="02040503050406030204" pitchFamily="18" charset="0"/>
-                    </a:rPr>
-                    <a:t>learned </a:t>
+                    <a:t>Viterbi test error with learned </a:t>
                   </a:r>
                   <a14:m>
                     <m:oMath xmlns:m="http://schemas.openxmlformats.org/officeDocument/2006/math">
@@ -7951,7 +7579,7 @@
                     </m:oMath>
                   </a14:m>
                   <a:r>
-                    <a:rPr lang="en-US" sz="1400" dirty="0" smtClean="0">
+                    <a:rPr lang="en-US" sz="1400" dirty="0">
                       <a:solidFill>
                         <a:schemeClr val="tx1"/>
                       </a:solidFill>
@@ -7963,16 +7591,6 @@
                 </a:p>
                 <a:p>
                   <a:r>
-                    <a:rPr lang="en-US" sz="1400" dirty="0" smtClean="0">
-                      <a:solidFill>
-                        <a:schemeClr val="tx1"/>
-                      </a:solidFill>
-                      <a:latin typeface="Cambria Math" panose="02040503050406030204" pitchFamily="18" charset="0"/>
-                      <a:ea typeface="Cambria Math" panose="02040503050406030204" pitchFamily="18" charset="0"/>
-                    </a:rPr>
-                    <a:t>Viterbi train error </a:t>
-                  </a:r>
-                  <a:r>
                     <a:rPr lang="en-US" sz="1400" dirty="0">
                       <a:solidFill>
                         <a:schemeClr val="tx1"/>
@@ -7980,17 +7598,7 @@
                       <a:latin typeface="Cambria Math" panose="02040503050406030204" pitchFamily="18" charset="0"/>
                       <a:ea typeface="Cambria Math" panose="02040503050406030204" pitchFamily="18" charset="0"/>
                     </a:rPr>
-                    <a:t>with </a:t>
-                  </a:r>
-                  <a:r>
-                    <a:rPr lang="en-US" sz="1400" dirty="0" smtClean="0">
-                      <a:solidFill>
-                        <a:schemeClr val="tx1"/>
-                      </a:solidFill>
-                      <a:latin typeface="Cambria Math" panose="02040503050406030204" pitchFamily="18" charset="0"/>
-                      <a:ea typeface="Cambria Math" panose="02040503050406030204" pitchFamily="18" charset="0"/>
-                    </a:rPr>
-                    <a:t>learned </a:t>
+                    <a:t>Viterbi train error with learned </a:t>
                   </a:r>
                   <a14:m>
                     <m:oMath xmlns:m="http://schemas.openxmlformats.org/officeDocument/2006/math">
@@ -8007,7 +7615,7 @@
                     </m:oMath>
                   </a14:m>
                   <a:r>
-                    <a:rPr lang="en-US" sz="1400" dirty="0" smtClean="0">
+                    <a:rPr lang="en-US" sz="1400" dirty="0">
                       <a:solidFill>
                         <a:schemeClr val="tx1"/>
                       </a:solidFill>
@@ -8016,25 +7624,8 @@
                     </a:rPr>
                     <a:t> (average of runs)</a:t>
                   </a:r>
-                  <a:endParaRPr lang="en-US" sz="1400" dirty="0">
-                    <a:solidFill>
-                      <a:schemeClr val="tx1"/>
-                    </a:solidFill>
-                    <a:latin typeface="Cambria Math" panose="02040503050406030204" pitchFamily="18" charset="0"/>
-                    <a:ea typeface="Cambria Math" panose="02040503050406030204" pitchFamily="18" charset="0"/>
-                  </a:endParaRPr>
                 </a:p>
                 <a:p>
-                  <a:r>
-                    <a:rPr lang="en-US" sz="1400" dirty="0" smtClean="0">
-                      <a:solidFill>
-                        <a:schemeClr val="tx1"/>
-                      </a:solidFill>
-                      <a:latin typeface="Cambria Math" panose="02040503050406030204" pitchFamily="18" charset="0"/>
-                      <a:ea typeface="Cambria Math" panose="02040503050406030204" pitchFamily="18" charset="0"/>
-                    </a:rPr>
-                    <a:t>Viterbi test error </a:t>
-                  </a:r>
                   <a:r>
                     <a:rPr lang="en-US" sz="1400" dirty="0">
                       <a:solidFill>
@@ -8043,17 +7634,7 @@
                       <a:latin typeface="Cambria Math" panose="02040503050406030204" pitchFamily="18" charset="0"/>
                       <a:ea typeface="Cambria Math" panose="02040503050406030204" pitchFamily="18" charset="0"/>
                     </a:rPr>
-                    <a:t>with </a:t>
-                  </a:r>
-                  <a:r>
-                    <a:rPr lang="en-US" sz="1400" dirty="0" smtClean="0">
-                      <a:solidFill>
-                        <a:schemeClr val="tx1"/>
-                      </a:solidFill>
-                      <a:latin typeface="Cambria Math" panose="02040503050406030204" pitchFamily="18" charset="0"/>
-                      <a:ea typeface="Cambria Math" panose="02040503050406030204" pitchFamily="18" charset="0"/>
-                    </a:rPr>
-                    <a:t>learned </a:t>
+                    <a:t>Viterbi test error with learned </a:t>
                   </a:r>
                   <a14:m>
                     <m:oMath xmlns:m="http://schemas.openxmlformats.org/officeDocument/2006/math">
@@ -8070,7 +7651,7 @@
                     </m:oMath>
                   </a14:m>
                   <a:r>
-                    <a:rPr lang="en-US" sz="1400" dirty="0" smtClean="0">
+                    <a:rPr lang="en-US" sz="1400" dirty="0">
                       <a:solidFill>
                         <a:schemeClr val="tx1"/>
                       </a:solidFill>
@@ -8082,16 +7663,6 @@
                 </a:p>
                 <a:p>
                   <a:r>
-                    <a:rPr lang="en-US" sz="1400" dirty="0" smtClean="0">
-                      <a:solidFill>
-                        <a:schemeClr val="tx1"/>
-                      </a:solidFill>
-                      <a:latin typeface="Cambria Math" panose="02040503050406030204" pitchFamily="18" charset="0"/>
-                      <a:ea typeface="Cambria Math" panose="02040503050406030204" pitchFamily="18" charset="0"/>
-                    </a:rPr>
-                    <a:t>Viterbi train error </a:t>
-                  </a:r>
-                  <a:r>
                     <a:rPr lang="en-US" sz="1400" dirty="0">
                       <a:solidFill>
                         <a:schemeClr val="tx1"/>
@@ -8099,17 +7670,7 @@
                       <a:latin typeface="Cambria Math" panose="02040503050406030204" pitchFamily="18" charset="0"/>
                       <a:ea typeface="Cambria Math" panose="02040503050406030204" pitchFamily="18" charset="0"/>
                     </a:rPr>
-                    <a:t>with </a:t>
-                  </a:r>
-                  <a:r>
-                    <a:rPr lang="en-US" sz="1400" dirty="0" smtClean="0">
-                      <a:solidFill>
-                        <a:schemeClr val="tx1"/>
-                      </a:solidFill>
-                      <a:latin typeface="Cambria Math" panose="02040503050406030204" pitchFamily="18" charset="0"/>
-                      <a:ea typeface="Cambria Math" panose="02040503050406030204" pitchFamily="18" charset="0"/>
-                    </a:rPr>
-                    <a:t>true </a:t>
+                    <a:t>Viterbi train error with true </a:t>
                   </a:r>
                   <a14:m>
                     <m:oMath xmlns:m="http://schemas.openxmlformats.org/officeDocument/2006/math">
@@ -8125,7 +7686,7 @@
                       </m:r>
                     </m:oMath>
                   </a14:m>
-                  <a:endParaRPr lang="en-US" sz="1400" dirty="0" smtClean="0">
+                  <a:endParaRPr lang="en-US" sz="1400" dirty="0">
                     <a:solidFill>
                       <a:schemeClr val="tx1"/>
                     </a:solidFill>
@@ -8142,27 +7703,7 @@
                       <a:latin typeface="Cambria Math" panose="02040503050406030204" pitchFamily="18" charset="0"/>
                       <a:ea typeface="Cambria Math" panose="02040503050406030204" pitchFamily="18" charset="0"/>
                     </a:rPr>
-                    <a:t>Viterbi </a:t>
-                  </a:r>
-                  <a:r>
-                    <a:rPr lang="en-US" sz="1400" dirty="0" smtClean="0">
-                      <a:solidFill>
-                        <a:schemeClr val="tx1"/>
-                      </a:solidFill>
-                      <a:latin typeface="Cambria Math" panose="02040503050406030204" pitchFamily="18" charset="0"/>
-                      <a:ea typeface="Cambria Math" panose="02040503050406030204" pitchFamily="18" charset="0"/>
-                    </a:rPr>
-                    <a:t>test error </a:t>
-                  </a:r>
-                  <a:r>
-                    <a:rPr lang="en-US" sz="1400" dirty="0">
-                      <a:solidFill>
-                        <a:schemeClr val="tx1"/>
-                      </a:solidFill>
-                      <a:latin typeface="Cambria Math" panose="02040503050406030204" pitchFamily="18" charset="0"/>
-                      <a:ea typeface="Cambria Math" panose="02040503050406030204" pitchFamily="18" charset="0"/>
-                    </a:rPr>
-                    <a:t>with true </a:t>
+                    <a:t>Viterbi test error with true </a:t>
                   </a:r>
                   <a14:m>
                     <m:oMath xmlns:m="http://schemas.openxmlformats.org/officeDocument/2006/math">
@@ -8536,7 +8077,7 @@
             <p:cNvPr id="66" name="Rectangle 65">
               <a:extLst>
                 <a:ext uri="{FF2B5EF4-FFF2-40B4-BE49-F238E27FC236}">
-                  <a16:creationId xmlns:mc="http://schemas.openxmlformats.org/markup-compatibility/2006" xmlns:a14="http://schemas.microsoft.com/office/drawing/2010/main" xmlns:a16="http://schemas.microsoft.com/office/drawing/2014/main" xmlns="" id="{6D2C8BE0-B0D2-4978-A1B5-FFF5137A4C82}"/>
+                  <a16:creationId xmlns:a16="http://schemas.microsoft.com/office/drawing/2014/main" id="{6D2C8BE0-B0D2-4978-A1B5-FFF5137A4C82}"/>
                 </a:ext>
               </a:extLst>
             </p:cNvPr>
@@ -8594,7 +8135,7 @@
             <p:cNvPr id="67" name="Rectangle 66">
               <a:extLst>
                 <a:ext uri="{FF2B5EF4-FFF2-40B4-BE49-F238E27FC236}">
-                  <a16:creationId xmlns:mc="http://schemas.openxmlformats.org/markup-compatibility/2006" xmlns:a14="http://schemas.microsoft.com/office/drawing/2010/main" xmlns:a16="http://schemas.microsoft.com/office/drawing/2014/main" xmlns="" id="{6D2C8BE0-B0D2-4978-A1B5-FFF5137A4C82}"/>
+                  <a16:creationId xmlns:a16="http://schemas.microsoft.com/office/drawing/2014/main" id="{6D2C8BE0-B0D2-4978-A1B5-FFF5137A4C82}"/>
                 </a:ext>
               </a:extLst>
             </p:cNvPr>
@@ -8652,7 +8193,7 @@
             <p:cNvPr id="52" name="Rectangle 51">
               <a:extLst>
                 <a:ext uri="{FF2B5EF4-FFF2-40B4-BE49-F238E27FC236}">
-                  <a16:creationId xmlns:a16="http://schemas.microsoft.com/office/drawing/2014/main" xmlns:a14="http://schemas.microsoft.com/office/drawing/2010/main" xmlns:mc="http://schemas.openxmlformats.org/markup-compatibility/2006" xmlns="" id="{6D2C8BE0-B0D2-4978-A1B5-FFF5137A4C82}"/>
+                  <a16:creationId xmlns:a16="http://schemas.microsoft.com/office/drawing/2014/main" id="{6D2C8BE0-B0D2-4978-A1B5-FFF5137A4C82}"/>
                 </a:ext>
               </a:extLst>
             </p:cNvPr>
@@ -8713,7 +8254,7 @@
             <p:cNvPr id="51" name="Rectangle 50">
               <a:extLst>
                 <a:ext uri="{FF2B5EF4-FFF2-40B4-BE49-F238E27FC236}">
-                  <a16:creationId xmlns:a16="http://schemas.microsoft.com/office/drawing/2014/main" xmlns:a14="http://schemas.microsoft.com/office/drawing/2010/main" xmlns:mc="http://schemas.openxmlformats.org/markup-compatibility/2006" xmlns="" id="{6D2C8BE0-B0D2-4978-A1B5-FFF5137A4C82}"/>
+                  <a16:creationId xmlns:a16="http://schemas.microsoft.com/office/drawing/2014/main" id="{6D2C8BE0-B0D2-4978-A1B5-FFF5137A4C82}"/>
                 </a:ext>
               </a:extLst>
             </p:cNvPr>
@@ -8757,16 +8298,6 @@
             <a:p>
               <a:pPr algn="ctr"/>
               <a:r>
-                <a:rPr lang="en-US" sz="1400" dirty="0" smtClean="0">
-                  <a:solidFill>
-                    <a:schemeClr val="tx1"/>
-                  </a:solidFill>
-                  <a:latin typeface="Cambria Math" panose="02040503050406030204" pitchFamily="18" charset="0"/>
-                  <a:ea typeface="Cambria Math" panose="02040503050406030204" pitchFamily="18" charset="0"/>
-                </a:rPr>
-                <a:t>Without </a:t>
-              </a:r>
-              <a:r>
                 <a:rPr lang="en-US" sz="1400" dirty="0">
                   <a:solidFill>
                     <a:schemeClr val="tx1"/>
@@ -8774,7 +8305,7 @@
                   <a:latin typeface="Cambria Math" panose="02040503050406030204" pitchFamily="18" charset="0"/>
                   <a:ea typeface="Cambria Math" panose="02040503050406030204" pitchFamily="18" charset="0"/>
                 </a:rPr>
-                <a:t>Regularization </a:t>
+                <a:t>Without Regularization </a:t>
               </a:r>
             </a:p>
           </p:txBody>
@@ -8784,7 +8315,7 @@
             <p:cNvPr id="57" name="Rectangle 56">
               <a:extLst>
                 <a:ext uri="{FF2B5EF4-FFF2-40B4-BE49-F238E27FC236}">
-                  <a16:creationId xmlns:mc="http://schemas.openxmlformats.org/markup-compatibility/2006" xmlns:a14="http://schemas.microsoft.com/office/drawing/2010/main" xmlns:a16="http://schemas.microsoft.com/office/drawing/2014/main" xmlns="" id="{6D2C8BE0-B0D2-4978-A1B5-FFF5137A4C82}"/>
+                  <a16:creationId xmlns:a16="http://schemas.microsoft.com/office/drawing/2014/main" id="{6D2C8BE0-B0D2-4978-A1B5-FFF5137A4C82}"/>
                 </a:ext>
               </a:extLst>
             </p:cNvPr>
@@ -8828,32 +8359,15 @@
             <a:p>
               <a:pPr algn="ctr"/>
               <a:r>
-                <a:rPr lang="en-US" sz="2000" dirty="0" smtClean="0">
+                <a:rPr lang="en-US" sz="2000" dirty="0">
                   <a:solidFill>
                     <a:schemeClr val="tx1"/>
                   </a:solidFill>
                   <a:latin typeface="Cambria Math" panose="02040503050406030204" pitchFamily="18" charset="0"/>
                   <a:ea typeface="Cambria Math" panose="02040503050406030204" pitchFamily="18" charset="0"/>
                 </a:rPr>
-                <a:t>Misclassification </a:t>
+                <a:t>Misclassification Rate</a:t>
               </a:r>
-              <a:r>
-                <a:rPr lang="en-US" sz="2000" dirty="0" smtClean="0">
-                  <a:solidFill>
-                    <a:schemeClr val="tx1"/>
-                  </a:solidFill>
-                  <a:latin typeface="Cambria Math" panose="02040503050406030204" pitchFamily="18" charset="0"/>
-                  <a:ea typeface="Cambria Math" panose="02040503050406030204" pitchFamily="18" charset="0"/>
-                </a:rPr>
-                <a:t>Rate</a:t>
-              </a:r>
-              <a:endParaRPr lang="en-US" sz="2000" dirty="0">
-                <a:solidFill>
-                  <a:schemeClr val="tx1"/>
-                </a:solidFill>
-                <a:latin typeface="Cambria Math" panose="02040503050406030204" pitchFamily="18" charset="0"/>
-                <a:ea typeface="Cambria Math" panose="02040503050406030204" pitchFamily="18" charset="0"/>
-              </a:endParaRPr>
             </a:p>
           </p:txBody>
         </p:sp>
@@ -8862,7 +8376,7 @@
             <p:cNvPr id="30" name="Rectangle 29">
               <a:extLst>
                 <a:ext uri="{FF2B5EF4-FFF2-40B4-BE49-F238E27FC236}">
-                  <a16:creationId xmlns:a16="http://schemas.microsoft.com/office/drawing/2014/main" xmlns:a14="http://schemas.microsoft.com/office/drawing/2010/main" xmlns:mc="http://schemas.openxmlformats.org/markup-compatibility/2006" xmlns="" id="{2E36643D-EEA2-42A8-BBCF-DC12D9FC8BA4}"/>
+                  <a16:creationId xmlns:a16="http://schemas.microsoft.com/office/drawing/2014/main" id="{2E36643D-EEA2-42A8-BBCF-DC12D9FC8BA4}"/>
                 </a:ext>
               </a:extLst>
             </p:cNvPr>
@@ -8930,7 +8444,7 @@
             <p:cNvPr id="31" name="Rectangle 30">
               <a:extLst>
                 <a:ext uri="{FF2B5EF4-FFF2-40B4-BE49-F238E27FC236}">
-                  <a16:creationId xmlns:a16="http://schemas.microsoft.com/office/drawing/2014/main" xmlns:a14="http://schemas.microsoft.com/office/drawing/2010/main" xmlns:mc="http://schemas.openxmlformats.org/markup-compatibility/2006" xmlns="" id="{2E36643D-EEA2-42A8-BBCF-DC12D9FC8BA4}"/>
+                  <a16:creationId xmlns:a16="http://schemas.microsoft.com/office/drawing/2014/main" id="{2E36643D-EEA2-42A8-BBCF-DC12D9FC8BA4}"/>
                 </a:ext>
               </a:extLst>
             </p:cNvPr>
@@ -8974,7 +8488,7 @@
             <a:p>
               <a:pPr algn="ctr"/>
               <a:r>
-                <a:rPr lang="en-GB" sz="2000" dirty="0" smtClean="0">
+                <a:rPr lang="en-GB" sz="2000" dirty="0">
                   <a:solidFill>
                     <a:schemeClr val="tx1"/>
                   </a:solidFill>
@@ -8998,7 +8512,7 @@
             <p:cNvPr id="34" name="Rectangle 33">
               <a:extLst>
                 <a:ext uri="{FF2B5EF4-FFF2-40B4-BE49-F238E27FC236}">
-                  <a16:creationId xmlns:a16="http://schemas.microsoft.com/office/drawing/2014/main" xmlns:a14="http://schemas.microsoft.com/office/drawing/2010/main" xmlns:mc="http://schemas.openxmlformats.org/markup-compatibility/2006" xmlns="" id="{6D2C8BE0-B0D2-4978-A1B5-FFF5137A4C82}"/>
+                  <a16:creationId xmlns:a16="http://schemas.microsoft.com/office/drawing/2014/main" id="{6D2C8BE0-B0D2-4978-A1B5-FFF5137A4C82}"/>
                 </a:ext>
               </a:extLst>
             </p:cNvPr>
@@ -9042,16 +8556,6 @@
             <a:p>
               <a:pPr algn="ctr"/>
               <a:r>
-                <a:rPr lang="en-US" sz="2400" dirty="0" smtClean="0">
-                  <a:solidFill>
-                    <a:schemeClr val="tx1"/>
-                  </a:solidFill>
-                  <a:latin typeface="Cambria Math" panose="02040503050406030204" pitchFamily="18" charset="0"/>
-                  <a:ea typeface="Cambria Math" panose="02040503050406030204" pitchFamily="18" charset="0"/>
-                </a:rPr>
-                <a:t>Without </a:t>
-              </a:r>
-              <a:r>
                 <a:rPr lang="en-US" sz="2400" dirty="0">
                   <a:solidFill>
                     <a:schemeClr val="tx1"/>
@@ -9059,7 +8563,7 @@
                   <a:latin typeface="Cambria Math" panose="02040503050406030204" pitchFamily="18" charset="0"/>
                   <a:ea typeface="Cambria Math" panose="02040503050406030204" pitchFamily="18" charset="0"/>
                 </a:rPr>
-                <a:t>Regularization </a:t>
+                <a:t>Without Regularization </a:t>
               </a:r>
             </a:p>
           </p:txBody>
@@ -9069,7 +8573,7 @@
             <p:cNvPr id="35" name="Rectangle 34">
               <a:extLst>
                 <a:ext uri="{FF2B5EF4-FFF2-40B4-BE49-F238E27FC236}">
-                  <a16:creationId xmlns:a16="http://schemas.microsoft.com/office/drawing/2014/main" xmlns:a14="http://schemas.microsoft.com/office/drawing/2010/main" xmlns:mc="http://schemas.openxmlformats.org/markup-compatibility/2006" xmlns="" id="{6D2C8BE0-B0D2-4978-A1B5-FFF5137A4C82}"/>
+                  <a16:creationId xmlns:a16="http://schemas.microsoft.com/office/drawing/2014/main" id="{6D2C8BE0-B0D2-4978-A1B5-FFF5137A4C82}"/>
                 </a:ext>
               </a:extLst>
             </p:cNvPr>
@@ -9168,18 +8672,13 @@
             <a:p>
               <a:pPr algn="ctr"/>
               <a:r>
-                <a:rPr lang="en-US" sz="2400" b="1" dirty="0" smtClean="0">
+                <a:rPr lang="en-US" sz="2400" b="1" dirty="0">
                   <a:solidFill>
                     <a:schemeClr val="tx1"/>
                   </a:solidFill>
                 </a:rPr>
                 <a:t>B</a:t>
               </a:r>
-              <a:endParaRPr lang="en-US" sz="2400" b="1" dirty="0">
-                <a:solidFill>
-                  <a:schemeClr val="tx1"/>
-                </a:solidFill>
-              </a:endParaRPr>
             </a:p>
           </p:txBody>
         </p:sp>
@@ -9194,13 +8693,6 @@
   <p:clrMapOvr>
     <a:masterClrMapping/>
   </p:clrMapOvr>
-  <p:timing>
-    <p:tnLst>
-      <p:par>
-        <p:cTn id="1" dur="indefinite" restart="never" nodeType="tmRoot"/>
-      </p:par>
-    </p:tnLst>
-  </p:timing>
 </p:sld>
 </file>
 
@@ -9283,7 +8775,7 @@
               <p:cNvPr id="6" name="Rectangle 5">
                 <a:extLst>
                   <a:ext uri="{FF2B5EF4-FFF2-40B4-BE49-F238E27FC236}">
-                    <a16:creationId xmlns:a16="http://schemas.microsoft.com/office/drawing/2014/main" xmlns:a14="http://schemas.microsoft.com/office/drawing/2010/main" xmlns:mc="http://schemas.openxmlformats.org/markup-compatibility/2006" xmlns="" id="{6D2C8BE0-B0D2-4978-A1B5-FFF5137A4C82}"/>
+                    <a16:creationId xmlns:a16="http://schemas.microsoft.com/office/drawing/2014/main" id="{6D2C8BE0-B0D2-4978-A1B5-FFF5137A4C82}"/>
                   </a:ext>
                 </a:extLst>
               </p:cNvPr>
@@ -9325,7 +8817,7 @@
               <a:p>
                 <a:pPr algn="ctr"/>
                 <a:r>
-                  <a:rPr lang="en-US" sz="2000" dirty="0" smtClean="0">
+                  <a:rPr lang="en-US" sz="2000" dirty="0">
                     <a:solidFill>
                       <a:schemeClr val="tx1"/>
                     </a:solidFill>
@@ -9342,7 +8834,7 @@
               <p:cNvPr id="7" name="Rectangle 6">
                 <a:extLst>
                   <a:ext uri="{FF2B5EF4-FFF2-40B4-BE49-F238E27FC236}">
-                    <a16:creationId xmlns:a16="http://schemas.microsoft.com/office/drawing/2014/main" xmlns:a14="http://schemas.microsoft.com/office/drawing/2010/main" xmlns:mc="http://schemas.openxmlformats.org/markup-compatibility/2006" xmlns="" id="{6D2C8BE0-B0D2-4978-A1B5-FFF5137A4C82}"/>
+                    <a16:creationId xmlns:a16="http://schemas.microsoft.com/office/drawing/2014/main" id="{6D2C8BE0-B0D2-4978-A1B5-FFF5137A4C82}"/>
                   </a:ext>
                 </a:extLst>
               </p:cNvPr>
@@ -9385,7 +8877,7 @@
               <a:lstStyle/>
               <a:p>
                 <a:pPr algn="ctr"/>
-                <a:endParaRPr lang="en-US" sz="2000" dirty="0" smtClean="0">
+                <a:endParaRPr lang="en-US" sz="2000" dirty="0">
                   <a:solidFill>
                     <a:schemeClr val="tx1"/>
                   </a:solidFill>
@@ -9400,7 +8892,7 @@
               <p:cNvPr id="8" name="Rectangle 7">
                 <a:extLst>
                   <a:ext uri="{FF2B5EF4-FFF2-40B4-BE49-F238E27FC236}">
-                    <a16:creationId xmlns:a16="http://schemas.microsoft.com/office/drawing/2014/main" xmlns:a14="http://schemas.microsoft.com/office/drawing/2010/main" xmlns:mc="http://schemas.openxmlformats.org/markup-compatibility/2006" xmlns="" id="{6D2C8BE0-B0D2-4978-A1B5-FFF5137A4C82}"/>
+                    <a16:creationId xmlns:a16="http://schemas.microsoft.com/office/drawing/2014/main" id="{6D2C8BE0-B0D2-4978-A1B5-FFF5137A4C82}"/>
                   </a:ext>
                 </a:extLst>
               </p:cNvPr>
@@ -9444,7 +8936,7 @@
               <a:p>
                 <a:pPr algn="ctr"/>
                 <a:r>
-                  <a:rPr lang="en-US" sz="2000" dirty="0" smtClean="0">
+                  <a:rPr lang="en-US" sz="2000" dirty="0">
                     <a:solidFill>
                       <a:schemeClr val="tx1"/>
                     </a:solidFill>
@@ -9462,7 +8954,7 @@
             <p:cNvPr id="10" name="Rectangle 9">
               <a:extLst>
                 <a:ext uri="{FF2B5EF4-FFF2-40B4-BE49-F238E27FC236}">
-                  <a16:creationId xmlns:a16="http://schemas.microsoft.com/office/drawing/2014/main" xmlns:a14="http://schemas.microsoft.com/office/drawing/2010/main" xmlns:mc="http://schemas.openxmlformats.org/markup-compatibility/2006" xmlns="" id="{6D2C8BE0-B0D2-4978-A1B5-FFF5137A4C82}"/>
+                  <a16:creationId xmlns:a16="http://schemas.microsoft.com/office/drawing/2014/main" id="{6D2C8BE0-B0D2-4978-A1B5-FFF5137A4C82}"/>
                 </a:ext>
               </a:extLst>
             </p:cNvPr>
@@ -9505,7 +8997,7 @@
             <a:lstStyle/>
             <a:p>
               <a:pPr algn="ctr"/>
-              <a:endParaRPr lang="en-US" sz="2000" dirty="0" smtClean="0">
+              <a:endParaRPr lang="en-US" sz="2000" dirty="0">
                 <a:solidFill>
                   <a:schemeClr val="tx1"/>
                 </a:solidFill>
@@ -9798,7 +9290,7 @@
                       </m:oMath>
                     </m:oMathPara>
                   </a14:m>
-                  <a:endParaRPr lang="en-US" sz="2000" b="0" dirty="0" smtClean="0">
+                  <a:endParaRPr lang="en-US" sz="2000" b="0" dirty="0">
                     <a:latin typeface="Cambria Math" panose="02040503050406030204" pitchFamily="18" charset="0"/>
                     <a:ea typeface="Cambria Math" panose="02040503050406030204" pitchFamily="18" charset="0"/>
                   </a:endParaRPr>
@@ -9806,16 +9298,12 @@
                 <a:p>
                   <a:pPr algn="ctr"/>
                   <a:r>
-                    <a:rPr lang="en-US" sz="2000" dirty="0" smtClean="0">
+                    <a:rPr lang="en-US" sz="2000" dirty="0">
                       <a:latin typeface="Cambria Math" panose="02040503050406030204" pitchFamily="18" charset="0"/>
                       <a:ea typeface="Cambria Math" panose="02040503050406030204" pitchFamily="18" charset="0"/>
                     </a:rPr>
                     <a:t>DNase</a:t>
                   </a:r>
-                  <a:endParaRPr lang="en-US" sz="2000" dirty="0">
-                    <a:latin typeface="Cambria Math" panose="02040503050406030204" pitchFamily="18" charset="0"/>
-                    <a:ea typeface="Cambria Math" panose="02040503050406030204" pitchFamily="18" charset="0"/>
-                  </a:endParaRPr>
                 </a:p>
               </p:txBody>
             </p:sp>
@@ -9980,7 +9468,7 @@
                       </m:oMath>
                     </m:oMathPara>
                   </a14:m>
-                  <a:endParaRPr lang="en-US" sz="2000" b="0" dirty="0" smtClean="0">
+                  <a:endParaRPr lang="en-US" sz="2000" b="0" dirty="0">
                     <a:latin typeface="Cambria Math" panose="02040503050406030204" pitchFamily="18" charset="0"/>
                     <a:ea typeface="Cambria Math" panose="02040503050406030204" pitchFamily="18" charset="0"/>
                   </a:endParaRPr>
@@ -10266,16 +9754,12 @@
             <a:p>
               <a:pPr algn="ctr"/>
               <a:r>
-                <a:rPr lang="en-US" sz="2000" dirty="0" smtClean="0">
+                <a:rPr lang="en-US" sz="2000" dirty="0">
                   <a:latin typeface="Cambria Math" panose="02040503050406030204" pitchFamily="18" charset="0"/>
                   <a:ea typeface="Cambria Math" panose="02040503050406030204" pitchFamily="18" charset="0"/>
                 </a:rPr>
                 <a:t>Position In DNA Sequence</a:t>
               </a:r>
-              <a:endParaRPr lang="en-US" sz="2000" dirty="0">
-                <a:latin typeface="Cambria Math" panose="02040503050406030204" pitchFamily="18" charset="0"/>
-                <a:ea typeface="Cambria Math" panose="02040503050406030204" pitchFamily="18" charset="0"/>
-              </a:endParaRPr>
             </a:p>
           </p:txBody>
         </p:sp>
@@ -10358,16 +9842,12 @@
             <a:p>
               <a:pPr algn="ctr"/>
               <a:r>
-                <a:rPr lang="en-US" sz="1600" dirty="0" smtClean="0">
+                <a:rPr lang="en-US" sz="1600" dirty="0">
                   <a:latin typeface="Cambria Math" panose="02040503050406030204" pitchFamily="18" charset="0"/>
                   <a:ea typeface="Cambria Math" panose="02040503050406030204" pitchFamily="18" charset="0"/>
                 </a:rPr>
                 <a:t>Viterbi Path</a:t>
               </a:r>
-              <a:endParaRPr lang="en-US" sz="1600" dirty="0">
-                <a:latin typeface="Cambria Math" panose="02040503050406030204" pitchFamily="18" charset="0"/>
-                <a:ea typeface="Cambria Math" panose="02040503050406030204" pitchFamily="18" charset="0"/>
-              </a:endParaRPr>
             </a:p>
           </p:txBody>
         </p:sp>
@@ -10397,87 +9877,44 @@
             <a:lstStyle/>
             <a:p>
               <a:r>
-                <a:rPr lang="en-US" sz="1600" dirty="0" smtClean="0">
+                <a:rPr lang="en-US" sz="1600" dirty="0">
                   <a:latin typeface="Cambria Math" panose="02040503050406030204" pitchFamily="18" charset="0"/>
                   <a:ea typeface="Cambria Math" panose="02040503050406030204" pitchFamily="18" charset="0"/>
                 </a:rPr>
-                <a:t>H1 </a:t>
+                <a:t>H1 BMP4 Derived </a:t>
+              </a:r>
+              <a:r>
+                <a:rPr lang="en-US" sz="1600" dirty="0" err="1">
+                  <a:latin typeface="Cambria Math" panose="02040503050406030204" pitchFamily="18" charset="0"/>
+                  <a:ea typeface="Cambria Math" panose="02040503050406030204" pitchFamily="18" charset="0"/>
+                </a:rPr>
+                <a:t>Mesendoderm</a:t>
               </a:r>
               <a:r>
                 <a:rPr lang="en-US" sz="1600" dirty="0">
                   <a:latin typeface="Cambria Math" panose="02040503050406030204" pitchFamily="18" charset="0"/>
                   <a:ea typeface="Cambria Math" panose="02040503050406030204" pitchFamily="18" charset="0"/>
                 </a:rPr>
-                <a:t>BMP4 Derived </a:t>
+                <a:t> Cultured Cells (E004) </a:t>
               </a:r>
-              <a:r>
-                <a:rPr lang="en-US" sz="1600" dirty="0" err="1" smtClean="0">
-                  <a:latin typeface="Cambria Math" panose="02040503050406030204" pitchFamily="18" charset="0"/>
-                  <a:ea typeface="Cambria Math" panose="02040503050406030204" pitchFamily="18" charset="0"/>
-                </a:rPr>
-                <a:t>Mesendoderm</a:t>
-              </a:r>
-              <a:r>
-                <a:rPr lang="en-US" sz="1600" dirty="0" smtClean="0">
-                  <a:latin typeface="Cambria Math" panose="02040503050406030204" pitchFamily="18" charset="0"/>
-                  <a:ea typeface="Cambria Math" panose="02040503050406030204" pitchFamily="18" charset="0"/>
-                </a:rPr>
-                <a:t> </a:t>
-              </a:r>
+            </a:p>
+            <a:p>
               <a:r>
                 <a:rPr lang="en-US" sz="1600" dirty="0">
                   <a:latin typeface="Cambria Math" panose="02040503050406030204" pitchFamily="18" charset="0"/>
                   <a:ea typeface="Cambria Math" panose="02040503050406030204" pitchFamily="18" charset="0"/>
                 </a:rPr>
-                <a:t>Cultured </a:t>
+                <a:t>Fetal Adrenal Gland (E080)</a:t>
               </a:r>
-              <a:r>
-                <a:rPr lang="en-US" sz="1600" dirty="0" smtClean="0">
-                  <a:latin typeface="Cambria Math" panose="02040503050406030204" pitchFamily="18" charset="0"/>
-                  <a:ea typeface="Cambria Math" panose="02040503050406030204" pitchFamily="18" charset="0"/>
-                </a:rPr>
-                <a:t>Cells (E004) </a:t>
-              </a:r>
-              <a:endParaRPr lang="en-US" sz="1600" dirty="0">
-                <a:latin typeface="Cambria Math" panose="02040503050406030204" pitchFamily="18" charset="0"/>
-                <a:ea typeface="Cambria Math" panose="02040503050406030204" pitchFamily="18" charset="0"/>
-              </a:endParaRPr>
             </a:p>
             <a:p>
-              <a:r>
-                <a:rPr lang="en-US" sz="1600" dirty="0" smtClean="0">
-                  <a:latin typeface="Cambria Math" panose="02040503050406030204" pitchFamily="18" charset="0"/>
-                  <a:ea typeface="Cambria Math" panose="02040503050406030204" pitchFamily="18" charset="0"/>
-                </a:rPr>
-                <a:t>Fetal </a:t>
-              </a:r>
               <a:r>
                 <a:rPr lang="en-US" sz="1600" dirty="0">
                   <a:latin typeface="Cambria Math" panose="02040503050406030204" pitchFamily="18" charset="0"/>
                   <a:ea typeface="Cambria Math" panose="02040503050406030204" pitchFamily="18" charset="0"/>
                 </a:rPr>
-                <a:t>Adrenal </a:t>
-              </a:r>
-              <a:r>
-                <a:rPr lang="en-US" sz="1600" dirty="0" smtClean="0">
-                  <a:latin typeface="Cambria Math" panose="02040503050406030204" pitchFamily="18" charset="0"/>
-                  <a:ea typeface="Cambria Math" panose="02040503050406030204" pitchFamily="18" charset="0"/>
-                </a:rPr>
-                <a:t>Gland (E080)</a:t>
-              </a:r>
-            </a:p>
-            <a:p>
-              <a:r>
-                <a:rPr lang="en-US" sz="1600" dirty="0" smtClean="0">
-                  <a:latin typeface="Cambria Math" panose="02040503050406030204" pitchFamily="18" charset="0"/>
-                  <a:ea typeface="Cambria Math" panose="02040503050406030204" pitchFamily="18" charset="0"/>
-                </a:rPr>
                 <a:t>Background</a:t>
               </a:r>
-              <a:endParaRPr lang="en-US" sz="1600" dirty="0">
-                <a:latin typeface="Cambria Math" panose="02040503050406030204" pitchFamily="18" charset="0"/>
-                <a:ea typeface="Cambria Math" panose="02040503050406030204" pitchFamily="18" charset="0"/>
-              </a:endParaRPr>
             </a:p>
           </p:txBody>
         </p:sp>
@@ -10538,13 +9975,6 @@
   <p:clrMapOvr>
     <a:masterClrMapping/>
   </p:clrMapOvr>
-  <p:timing>
-    <p:tnLst>
-      <p:par>
-        <p:cTn id="1" dur="indefinite" restart="never" nodeType="tmRoot"/>
-      </p:par>
-    </p:tnLst>
-  </p:timing>
 </p:sld>
 </file>
 
@@ -10745,7 +10175,7 @@
                       </m:oMath>
                     </m:oMathPara>
                   </a14:m>
-                  <a:endParaRPr lang="en-US" sz="2000" b="0" dirty="0" smtClean="0">
+                  <a:endParaRPr lang="en-US" sz="2000" b="0" dirty="0">
                     <a:latin typeface="Cambria Math" panose="02040503050406030204" pitchFamily="18" charset="0"/>
                     <a:ea typeface="Cambria Math" panose="02040503050406030204" pitchFamily="18" charset="0"/>
                   </a:endParaRPr>
@@ -10753,16 +10183,12 @@
                 <a:p>
                   <a:pPr algn="ctr"/>
                   <a:r>
-                    <a:rPr lang="en-US" sz="2000" dirty="0" smtClean="0">
+                    <a:rPr lang="en-US" sz="2000" dirty="0">
                       <a:latin typeface="Cambria Math" panose="02040503050406030204" pitchFamily="18" charset="0"/>
                       <a:ea typeface="Cambria Math" panose="02040503050406030204" pitchFamily="18" charset="0"/>
                     </a:rPr>
                     <a:t>DNase</a:t>
                   </a:r>
-                  <a:endParaRPr lang="en-US" sz="2000" dirty="0">
-                    <a:latin typeface="Cambria Math" panose="02040503050406030204" pitchFamily="18" charset="0"/>
-                    <a:ea typeface="Cambria Math" panose="02040503050406030204" pitchFamily="18" charset="0"/>
-                  </a:endParaRPr>
                 </a:p>
               </p:txBody>
             </p:sp>
@@ -10927,7 +10353,7 @@
                       </m:oMath>
                     </m:oMathPara>
                   </a14:m>
-                  <a:endParaRPr lang="en-US" sz="2000" b="0" dirty="0" smtClean="0">
+                  <a:endParaRPr lang="en-US" sz="2000" b="0" dirty="0">
                     <a:latin typeface="Cambria Math" panose="02040503050406030204" pitchFamily="18" charset="0"/>
                     <a:ea typeface="Cambria Math" panose="02040503050406030204" pitchFamily="18" charset="0"/>
                   </a:endParaRPr>
@@ -11020,16 +10446,12 @@
             <a:p>
               <a:pPr algn="ctr"/>
               <a:r>
-                <a:rPr lang="en-US" sz="2000" dirty="0" smtClean="0">
+                <a:rPr lang="en-US" sz="2000" dirty="0">
                   <a:latin typeface="Cambria Math" panose="02040503050406030204" pitchFamily="18" charset="0"/>
                   <a:ea typeface="Cambria Math" panose="02040503050406030204" pitchFamily="18" charset="0"/>
                 </a:rPr>
                 <a:t>Position In DNA Sequence</a:t>
               </a:r>
-              <a:endParaRPr lang="en-US" sz="2000" dirty="0">
-                <a:latin typeface="Cambria Math" panose="02040503050406030204" pitchFamily="18" charset="0"/>
-                <a:ea typeface="Cambria Math" panose="02040503050406030204" pitchFamily="18" charset="0"/>
-              </a:endParaRPr>
             </a:p>
           </p:txBody>
         </p:sp>
@@ -11064,16 +10486,12 @@
             <a:p>
               <a:pPr algn="ctr"/>
               <a:r>
-                <a:rPr lang="en-US" sz="1600" dirty="0" smtClean="0">
+                <a:rPr lang="en-US" sz="1600" dirty="0">
                   <a:latin typeface="Cambria Math" panose="02040503050406030204" pitchFamily="18" charset="0"/>
                   <a:ea typeface="Cambria Math" panose="02040503050406030204" pitchFamily="18" charset="0"/>
                 </a:rPr>
                 <a:t>Viterbi Path</a:t>
               </a:r>
-              <a:endParaRPr lang="en-US" sz="1600" dirty="0">
-                <a:latin typeface="Cambria Math" panose="02040503050406030204" pitchFamily="18" charset="0"/>
-                <a:ea typeface="Cambria Math" panose="02040503050406030204" pitchFamily="18" charset="0"/>
-              </a:endParaRPr>
             </a:p>
           </p:txBody>
         </p:sp>
@@ -11244,13 +10662,6 @@
   <p:clrMapOvr>
     <a:masterClrMapping/>
   </p:clrMapOvr>
-  <p:timing>
-    <p:tnLst>
-      <p:par>
-        <p:cTn id="1" dur="indefinite" restart="never" nodeType="tmRoot"/>
-      </p:par>
-    </p:tnLst>
-  </p:timing>
 </p:sld>
 </file>
 
@@ -11431,7 +10842,7 @@
             <p:cNvPr id="7" name="Rectangle 6">
               <a:extLst>
                 <a:ext uri="{FF2B5EF4-FFF2-40B4-BE49-F238E27FC236}">
-                  <a16:creationId xmlns:a16="http://schemas.microsoft.com/office/drawing/2014/main" xmlns:a14="http://schemas.microsoft.com/office/drawing/2010/main" xmlns:mc="http://schemas.openxmlformats.org/markup-compatibility/2006" xmlns="" id="{6D2C8BE0-B0D2-4978-A1B5-FFF5137A4C82}"/>
+                  <a16:creationId xmlns:a16="http://schemas.microsoft.com/office/drawing/2014/main" id="{6D2C8BE0-B0D2-4978-A1B5-FFF5137A4C82}"/>
                 </a:ext>
               </a:extLst>
             </p:cNvPr>
@@ -11475,7 +10886,7 @@
             <a:p>
               <a:pPr algn="ctr"/>
               <a:r>
-                <a:rPr lang="en-US" sz="2400" dirty="0" smtClean="0">
+                <a:rPr lang="en-US" sz="2400" dirty="0">
                   <a:solidFill>
                     <a:schemeClr val="tx1"/>
                   </a:solidFill>
@@ -11484,13 +10895,6 @@
                 </a:rPr>
                 <a:t>True States and Posterior Probability</a:t>
               </a:r>
-              <a:endParaRPr lang="en-US" sz="2400" dirty="0">
-                <a:solidFill>
-                  <a:schemeClr val="tx1"/>
-                </a:solidFill>
-                <a:latin typeface="Cambria Math" panose="02040503050406030204" pitchFamily="18" charset="0"/>
-                <a:ea typeface="Cambria Math" panose="02040503050406030204" pitchFamily="18" charset="0"/>
-              </a:endParaRPr>
             </a:p>
           </p:txBody>
         </p:sp>
@@ -11499,7 +10903,7 @@
             <p:cNvPr id="8" name="Rectangle 7">
               <a:extLst>
                 <a:ext uri="{FF2B5EF4-FFF2-40B4-BE49-F238E27FC236}">
-                  <a16:creationId xmlns:a16="http://schemas.microsoft.com/office/drawing/2014/main" xmlns:a14="http://schemas.microsoft.com/office/drawing/2010/main" xmlns:mc="http://schemas.openxmlformats.org/markup-compatibility/2006" xmlns="" id="{6D2C8BE0-B0D2-4978-A1B5-FFF5137A4C82}"/>
+                  <a16:creationId xmlns:a16="http://schemas.microsoft.com/office/drawing/2014/main" id="{6D2C8BE0-B0D2-4978-A1B5-FFF5137A4C82}"/>
                 </a:ext>
               </a:extLst>
             </p:cNvPr>
@@ -11543,7 +10947,7 @@
             <a:p>
               <a:pPr algn="ctr"/>
               <a:r>
-                <a:rPr lang="en-US" sz="2000" dirty="0" smtClean="0">
+                <a:rPr lang="en-US" sz="2000" dirty="0">
                   <a:solidFill>
                     <a:schemeClr val="tx1"/>
                   </a:solidFill>
@@ -11552,13 +10956,6 @@
                 </a:rPr>
                 <a:t>Sequence 1</a:t>
               </a:r>
-              <a:endParaRPr lang="en-US" sz="2000" dirty="0">
-                <a:solidFill>
-                  <a:schemeClr val="tx1"/>
-                </a:solidFill>
-                <a:latin typeface="Cambria Math" panose="02040503050406030204" pitchFamily="18" charset="0"/>
-                <a:ea typeface="Cambria Math" panose="02040503050406030204" pitchFamily="18" charset="0"/>
-              </a:endParaRPr>
             </a:p>
           </p:txBody>
         </p:sp>
@@ -11567,7 +10964,7 @@
             <p:cNvPr id="9" name="Rectangle 8">
               <a:extLst>
                 <a:ext uri="{FF2B5EF4-FFF2-40B4-BE49-F238E27FC236}">
-                  <a16:creationId xmlns:a16="http://schemas.microsoft.com/office/drawing/2014/main" xmlns:a14="http://schemas.microsoft.com/office/drawing/2010/main" xmlns:mc="http://schemas.openxmlformats.org/markup-compatibility/2006" xmlns="" id="{6D2C8BE0-B0D2-4978-A1B5-FFF5137A4C82}"/>
+                  <a16:creationId xmlns:a16="http://schemas.microsoft.com/office/drawing/2014/main" id="{6D2C8BE0-B0D2-4978-A1B5-FFF5137A4C82}"/>
                 </a:ext>
               </a:extLst>
             </p:cNvPr>
@@ -11611,7 +11008,7 @@
             <a:p>
               <a:pPr algn="ctr"/>
               <a:r>
-                <a:rPr lang="en-US" sz="2000" dirty="0" smtClean="0">
+                <a:rPr lang="en-US" sz="2000" dirty="0">
                   <a:solidFill>
                     <a:schemeClr val="tx1"/>
                   </a:solidFill>
@@ -11620,13 +11017,6 @@
                 </a:rPr>
                 <a:t>Sequence 2</a:t>
               </a:r>
-              <a:endParaRPr lang="en-US" sz="2000" dirty="0">
-                <a:solidFill>
-                  <a:schemeClr val="tx1"/>
-                </a:solidFill>
-                <a:latin typeface="Cambria Math" panose="02040503050406030204" pitchFamily="18" charset="0"/>
-                <a:ea typeface="Cambria Math" panose="02040503050406030204" pitchFamily="18" charset="0"/>
-              </a:endParaRPr>
             </a:p>
           </p:txBody>
         </p:sp>
@@ -11635,7 +11025,7 @@
             <p:cNvPr id="10" name="Rectangle 9">
               <a:extLst>
                 <a:ext uri="{FF2B5EF4-FFF2-40B4-BE49-F238E27FC236}">
-                  <a16:creationId xmlns:a16="http://schemas.microsoft.com/office/drawing/2014/main" xmlns:a14="http://schemas.microsoft.com/office/drawing/2010/main" xmlns:mc="http://schemas.openxmlformats.org/markup-compatibility/2006" xmlns="" id="{6D2C8BE0-B0D2-4978-A1B5-FFF5137A4C82}"/>
+                  <a16:creationId xmlns:a16="http://schemas.microsoft.com/office/drawing/2014/main" id="{6D2C8BE0-B0D2-4978-A1B5-FFF5137A4C82}"/>
                 </a:ext>
               </a:extLst>
             </p:cNvPr>
@@ -11679,7 +11069,7 @@
             <a:p>
               <a:pPr algn="ctr"/>
               <a:r>
-                <a:rPr lang="en-US" sz="2000" dirty="0" smtClean="0">
+                <a:rPr lang="en-US" sz="2000" dirty="0">
                   <a:solidFill>
                     <a:schemeClr val="tx1"/>
                   </a:solidFill>
@@ -11688,13 +11078,6 @@
                 </a:rPr>
                 <a:t>Sequence 3</a:t>
               </a:r>
-              <a:endParaRPr lang="en-US" sz="2000" dirty="0">
-                <a:solidFill>
-                  <a:schemeClr val="tx1"/>
-                </a:solidFill>
-                <a:latin typeface="Cambria Math" panose="02040503050406030204" pitchFamily="18" charset="0"/>
-                <a:ea typeface="Cambria Math" panose="02040503050406030204" pitchFamily="18" charset="0"/>
-              </a:endParaRPr>
             </a:p>
           </p:txBody>
         </p:sp>
@@ -11703,7 +11086,7 @@
             <p:cNvPr id="11" name="Rectangle 10">
               <a:extLst>
                 <a:ext uri="{FF2B5EF4-FFF2-40B4-BE49-F238E27FC236}">
-                  <a16:creationId xmlns:a16="http://schemas.microsoft.com/office/drawing/2014/main" xmlns:a14="http://schemas.microsoft.com/office/drawing/2010/main" xmlns:mc="http://schemas.openxmlformats.org/markup-compatibility/2006" xmlns="" id="{6D2C8BE0-B0D2-4978-A1B5-FFF5137A4C82}"/>
+                  <a16:creationId xmlns:a16="http://schemas.microsoft.com/office/drawing/2014/main" id="{6D2C8BE0-B0D2-4978-A1B5-FFF5137A4C82}"/>
                 </a:ext>
               </a:extLst>
             </p:cNvPr>
@@ -11746,7 +11129,7 @@
             <a:lstStyle/>
             <a:p>
               <a:r>
-                <a:rPr lang="en-US" sz="2000" dirty="0" smtClean="0">
+                <a:rPr lang="en-US" sz="2000" dirty="0">
                   <a:solidFill>
                     <a:schemeClr val="tx1"/>
                   </a:solidFill>
@@ -11755,13 +11138,6 @@
                 </a:rPr>
                 <a:t>Posterior Probability</a:t>
               </a:r>
-              <a:endParaRPr lang="en-US" sz="2000" dirty="0">
-                <a:solidFill>
-                  <a:schemeClr val="tx1"/>
-                </a:solidFill>
-                <a:latin typeface="Cambria Math" panose="02040503050406030204" pitchFamily="18" charset="0"/>
-                <a:ea typeface="Cambria Math" panose="02040503050406030204" pitchFamily="18" charset="0"/>
-              </a:endParaRPr>
             </a:p>
           </p:txBody>
         </p:sp>
@@ -11770,7 +11146,7 @@
             <p:cNvPr id="12" name="Rectangle 11">
               <a:extLst>
                 <a:ext uri="{FF2B5EF4-FFF2-40B4-BE49-F238E27FC236}">
-                  <a16:creationId xmlns:a16="http://schemas.microsoft.com/office/drawing/2014/main" xmlns:a14="http://schemas.microsoft.com/office/drawing/2010/main" xmlns:mc="http://schemas.openxmlformats.org/markup-compatibility/2006" xmlns="" id="{6D2C8BE0-B0D2-4978-A1B5-FFF5137A4C82}"/>
+                  <a16:creationId xmlns:a16="http://schemas.microsoft.com/office/drawing/2014/main" id="{6D2C8BE0-B0D2-4978-A1B5-FFF5137A4C82}"/>
                 </a:ext>
               </a:extLst>
             </p:cNvPr>
@@ -11813,7 +11189,7 @@
             <a:lstStyle/>
             <a:p>
               <a:r>
-                <a:rPr lang="en-US" sz="2000" dirty="0" smtClean="0">
+                <a:rPr lang="en-US" sz="2000" dirty="0">
                   <a:solidFill>
                     <a:schemeClr val="tx1"/>
                   </a:solidFill>
@@ -11822,13 +11198,6 @@
                 </a:rPr>
                 <a:t>Posterior Probability</a:t>
               </a:r>
-              <a:endParaRPr lang="en-US" sz="2000" dirty="0">
-                <a:solidFill>
-                  <a:schemeClr val="tx1"/>
-                </a:solidFill>
-                <a:latin typeface="Cambria Math" panose="02040503050406030204" pitchFamily="18" charset="0"/>
-                <a:ea typeface="Cambria Math" panose="02040503050406030204" pitchFamily="18" charset="0"/>
-              </a:endParaRPr>
             </a:p>
           </p:txBody>
         </p:sp>
@@ -11837,7 +11206,7 @@
             <p:cNvPr id="13" name="Rectangle 12">
               <a:extLst>
                 <a:ext uri="{FF2B5EF4-FFF2-40B4-BE49-F238E27FC236}">
-                  <a16:creationId xmlns:a16="http://schemas.microsoft.com/office/drawing/2014/main" xmlns:a14="http://schemas.microsoft.com/office/drawing/2010/main" xmlns:mc="http://schemas.openxmlformats.org/markup-compatibility/2006" xmlns="" id="{6D2C8BE0-B0D2-4978-A1B5-FFF5137A4C82}"/>
+                  <a16:creationId xmlns:a16="http://schemas.microsoft.com/office/drawing/2014/main" id="{6D2C8BE0-B0D2-4978-A1B5-FFF5137A4C82}"/>
                 </a:ext>
               </a:extLst>
             </p:cNvPr>
@@ -11880,7 +11249,7 @@
             <a:lstStyle/>
             <a:p>
               <a:r>
-                <a:rPr lang="en-US" sz="2000" dirty="0" smtClean="0">
+                <a:rPr lang="en-US" sz="2000" dirty="0">
                   <a:solidFill>
                     <a:schemeClr val="tx1"/>
                   </a:solidFill>
@@ -11889,13 +11258,6 @@
                 </a:rPr>
                 <a:t>Posterior Probability</a:t>
               </a:r>
-              <a:endParaRPr lang="en-US" sz="2000" dirty="0">
-                <a:solidFill>
-                  <a:schemeClr val="tx1"/>
-                </a:solidFill>
-                <a:latin typeface="Cambria Math" panose="02040503050406030204" pitchFamily="18" charset="0"/>
-                <a:ea typeface="Cambria Math" panose="02040503050406030204" pitchFamily="18" charset="0"/>
-              </a:endParaRPr>
             </a:p>
           </p:txBody>
         </p:sp>
@@ -11904,7 +11266,7 @@
             <p:cNvPr id="14" name="Rectangle 13">
               <a:extLst>
                 <a:ext uri="{FF2B5EF4-FFF2-40B4-BE49-F238E27FC236}">
-                  <a16:creationId xmlns:a16="http://schemas.microsoft.com/office/drawing/2014/main" xmlns:a14="http://schemas.microsoft.com/office/drawing/2010/main" xmlns:mc="http://schemas.openxmlformats.org/markup-compatibility/2006" xmlns="" id="{6D2C8BE0-B0D2-4978-A1B5-FFF5137A4C82}"/>
+                  <a16:creationId xmlns:a16="http://schemas.microsoft.com/office/drawing/2014/main" id="{6D2C8BE0-B0D2-4978-A1B5-FFF5137A4C82}"/>
                 </a:ext>
               </a:extLst>
             </p:cNvPr>
@@ -11956,18 +11318,8 @@
                 </a:rPr>
                 <a:t>Viterbi estimation</a:t>
               </a:r>
-              <a:r>
-                <a:rPr lang="en-US" sz="1600" dirty="0" smtClean="0">
-                  <a:solidFill>
-                    <a:schemeClr val="tx1"/>
-                  </a:solidFill>
-                  <a:latin typeface="Cambria Math" panose="02040503050406030204" pitchFamily="18" charset="0"/>
-                  <a:ea typeface="Cambria Math" panose="02040503050406030204" pitchFamily="18" charset="0"/>
-                </a:rPr>
-                <a:t/>
-              </a:r>
               <a:br>
-                <a:rPr lang="en-US" sz="1600" dirty="0" smtClean="0">
+                <a:rPr lang="en-US" sz="1600" dirty="0">
                   <a:solidFill>
                     <a:schemeClr val="tx1"/>
                   </a:solidFill>
@@ -11976,7 +11328,7 @@
                 </a:rPr>
               </a:br>
               <a:r>
-                <a:rPr lang="en-US" sz="1600" dirty="0" smtClean="0">
+                <a:rPr lang="en-US" sz="1600" dirty="0">
                   <a:solidFill>
                     <a:schemeClr val="tx1"/>
                   </a:solidFill>
@@ -11985,13 +11337,6 @@
                 </a:rPr>
                 <a:t>Real states</a:t>
               </a:r>
-              <a:endParaRPr lang="en-US" sz="1600" dirty="0">
-                <a:solidFill>
-                  <a:schemeClr val="tx1"/>
-                </a:solidFill>
-                <a:latin typeface="Cambria Math" panose="02040503050406030204" pitchFamily="18" charset="0"/>
-                <a:ea typeface="Cambria Math" panose="02040503050406030204" pitchFamily="18" charset="0"/>
-              </a:endParaRPr>
             </a:p>
           </p:txBody>
         </p:sp>
@@ -12000,7 +11345,7 @@
             <p:cNvPr id="16" name="Rectangle 15">
               <a:extLst>
                 <a:ext uri="{FF2B5EF4-FFF2-40B4-BE49-F238E27FC236}">
-                  <a16:creationId xmlns:a16="http://schemas.microsoft.com/office/drawing/2014/main" xmlns:a14="http://schemas.microsoft.com/office/drawing/2010/main" xmlns:mc="http://schemas.openxmlformats.org/markup-compatibility/2006" xmlns="" id="{6D2C8BE0-B0D2-4978-A1B5-FFF5137A4C82}"/>
+                  <a16:creationId xmlns:a16="http://schemas.microsoft.com/office/drawing/2014/main" id="{6D2C8BE0-B0D2-4978-A1B5-FFF5137A4C82}"/>
                 </a:ext>
               </a:extLst>
             </p:cNvPr>
@@ -12043,7 +11388,7 @@
             <a:lstStyle/>
             <a:p>
               <a:r>
-                <a:rPr lang="en-US" sz="1600" dirty="0" smtClean="0">
+                <a:rPr lang="en-US" sz="1600" dirty="0">
                   <a:solidFill>
                     <a:schemeClr val="tx1"/>
                   </a:solidFill>
@@ -12053,7 +11398,7 @@
                 <a:t>Viterbi estimation</a:t>
               </a:r>
               <a:br>
-                <a:rPr lang="en-US" sz="1600" dirty="0" smtClean="0">
+                <a:rPr lang="en-US" sz="1600" dirty="0">
                   <a:solidFill>
                     <a:schemeClr val="tx1"/>
                   </a:solidFill>
@@ -12062,7 +11407,7 @@
                 </a:rPr>
               </a:br>
               <a:r>
-                <a:rPr lang="en-US" sz="1600" dirty="0" smtClean="0">
+                <a:rPr lang="en-US" sz="1600" dirty="0">
                   <a:solidFill>
                     <a:schemeClr val="tx1"/>
                   </a:solidFill>
@@ -12071,13 +11416,6 @@
                 </a:rPr>
                 <a:t>Real states</a:t>
               </a:r>
-              <a:endParaRPr lang="en-US" sz="1600" dirty="0">
-                <a:solidFill>
-                  <a:schemeClr val="tx1"/>
-                </a:solidFill>
-                <a:latin typeface="Cambria Math" panose="02040503050406030204" pitchFamily="18" charset="0"/>
-                <a:ea typeface="Cambria Math" panose="02040503050406030204" pitchFamily="18" charset="0"/>
-              </a:endParaRPr>
             </a:p>
           </p:txBody>
         </p:sp>
@@ -12086,7 +11424,7 @@
             <p:cNvPr id="17" name="Rectangle 16">
               <a:extLst>
                 <a:ext uri="{FF2B5EF4-FFF2-40B4-BE49-F238E27FC236}">
-                  <a16:creationId xmlns:a16="http://schemas.microsoft.com/office/drawing/2014/main" xmlns:a14="http://schemas.microsoft.com/office/drawing/2010/main" xmlns:mc="http://schemas.openxmlformats.org/markup-compatibility/2006" xmlns="" id="{6D2C8BE0-B0D2-4978-A1B5-FFF5137A4C82}"/>
+                  <a16:creationId xmlns:a16="http://schemas.microsoft.com/office/drawing/2014/main" id="{6D2C8BE0-B0D2-4978-A1B5-FFF5137A4C82}"/>
                 </a:ext>
               </a:extLst>
             </p:cNvPr>
@@ -12138,18 +11476,8 @@
                 </a:rPr>
                 <a:t>Viterbi estimation</a:t>
               </a:r>
-              <a:r>
-                <a:rPr lang="en-US" sz="1600" dirty="0" smtClean="0">
-                  <a:solidFill>
-                    <a:schemeClr val="tx1"/>
-                  </a:solidFill>
-                  <a:latin typeface="Cambria Math" panose="02040503050406030204" pitchFamily="18" charset="0"/>
-                  <a:ea typeface="Cambria Math" panose="02040503050406030204" pitchFamily="18" charset="0"/>
-                </a:rPr>
-                <a:t/>
-              </a:r>
               <a:br>
-                <a:rPr lang="en-US" sz="1600" dirty="0" smtClean="0">
+                <a:rPr lang="en-US" sz="1600" dirty="0">
                   <a:solidFill>
                     <a:schemeClr val="tx1"/>
                   </a:solidFill>
@@ -12158,7 +11486,7 @@
                 </a:rPr>
               </a:br>
               <a:r>
-                <a:rPr lang="en-US" sz="1600" dirty="0" smtClean="0">
+                <a:rPr lang="en-US" sz="1600" dirty="0">
                   <a:solidFill>
                     <a:schemeClr val="tx1"/>
                   </a:solidFill>
@@ -12167,13 +11495,6 @@
                 </a:rPr>
                 <a:t>Real states</a:t>
               </a:r>
-              <a:endParaRPr lang="en-US" sz="1600" dirty="0">
-                <a:solidFill>
-                  <a:schemeClr val="tx1"/>
-                </a:solidFill>
-                <a:latin typeface="Cambria Math" panose="02040503050406030204" pitchFamily="18" charset="0"/>
-                <a:ea typeface="Cambria Math" panose="02040503050406030204" pitchFamily="18" charset="0"/>
-              </a:endParaRPr>
             </a:p>
           </p:txBody>
         </p:sp>
@@ -12287,7 +11608,7 @@
             <p:cNvPr id="25" name="Rectangle 24">
               <a:extLst>
                 <a:ext uri="{FF2B5EF4-FFF2-40B4-BE49-F238E27FC236}">
-                  <a16:creationId xmlns:a16="http://schemas.microsoft.com/office/drawing/2014/main" xmlns:a14="http://schemas.microsoft.com/office/drawing/2010/main" xmlns:mc="http://schemas.openxmlformats.org/markup-compatibility/2006" xmlns="" id="{6D2C8BE0-B0D2-4978-A1B5-FFF5137A4C82}"/>
+                  <a16:creationId xmlns:a16="http://schemas.microsoft.com/office/drawing/2014/main" id="{6D2C8BE0-B0D2-4978-A1B5-FFF5137A4C82}"/>
                 </a:ext>
               </a:extLst>
             </p:cNvPr>
@@ -12331,7 +11652,7 @@
             <a:p>
               <a:pPr algn="ctr"/>
               <a:r>
-                <a:rPr lang="en-US" sz="2000" dirty="0" smtClean="0">
+                <a:rPr lang="en-US" sz="2000" dirty="0">
                   <a:solidFill>
                     <a:schemeClr val="tx1"/>
                   </a:solidFill>
@@ -12340,13 +11661,6 @@
                 </a:rPr>
                 <a:t>Position in Sequence</a:t>
               </a:r>
-              <a:endParaRPr lang="en-US" sz="2000" dirty="0">
-                <a:solidFill>
-                  <a:schemeClr val="tx1"/>
-                </a:solidFill>
-                <a:latin typeface="Cambria Math" panose="02040503050406030204" pitchFamily="18" charset="0"/>
-                <a:ea typeface="Cambria Math" panose="02040503050406030204" pitchFamily="18" charset="0"/>
-              </a:endParaRPr>
             </a:p>
           </p:txBody>
         </p:sp>
@@ -12361,13 +11675,6 @@
   <p:clrMapOvr>
     <a:masterClrMapping/>
   </p:clrMapOvr>
-  <p:timing>
-    <p:tnLst>
-      <p:par>
-        <p:cTn id="1" dur="indefinite" restart="never" nodeType="tmRoot"/>
-      </p:par>
-    </p:tnLst>
-  </p:timing>
 </p:sld>
 </file>
 
@@ -12390,16 +11697,22 @@
       </p:grpSpPr>
       <p:grpSp>
         <p:nvGrpSpPr>
-          <p:cNvPr id="15" name="Group 14"/>
+          <p:cNvPr id="2" name="Group 1">
+            <a:extLst>
+              <a:ext uri="{FF2B5EF4-FFF2-40B4-BE49-F238E27FC236}">
+                <a16:creationId xmlns:a16="http://schemas.microsoft.com/office/drawing/2014/main" id="{B756CA50-3DD7-4ADD-A3EE-9A3F66FF6428}"/>
+              </a:ext>
+            </a:extLst>
+          </p:cNvPr>
           <p:cNvGrpSpPr/>
           <p:nvPr/>
         </p:nvGrpSpPr>
         <p:grpSpPr>
           <a:xfrm>
-            <a:off x="-135759" y="27546"/>
-            <a:ext cx="13568884" cy="7891866"/>
-            <a:chOff x="-135759" y="27546"/>
-            <a:chExt cx="13568884" cy="7891866"/>
+            <a:off x="-574175" y="-146080"/>
+            <a:ext cx="14007300" cy="7341458"/>
+            <a:chOff x="-574175" y="-146080"/>
+            <a:chExt cx="14007300" cy="7341458"/>
           </a:xfrm>
         </p:grpSpPr>
         <p:sp>
@@ -12485,7 +11798,7 @@
             <p:cNvPr id="7" name="Rectangle 6">
               <a:extLst>
                 <a:ext uri="{FF2B5EF4-FFF2-40B4-BE49-F238E27FC236}">
-                  <a16:creationId xmlns:a16="http://schemas.microsoft.com/office/drawing/2014/main" xmlns:a14="http://schemas.microsoft.com/office/drawing/2010/main" xmlns:mc="http://schemas.openxmlformats.org/markup-compatibility/2006" xmlns="" id="{6D2C8BE0-B0D2-4978-A1B5-FFF5137A4C82}"/>
+                  <a16:creationId xmlns:a16="http://schemas.microsoft.com/office/drawing/2014/main" id="{6D2C8BE0-B0D2-4978-A1B5-FFF5137A4C82}"/>
                 </a:ext>
               </a:extLst>
             </p:cNvPr>
@@ -12494,8 +11807,8 @@
           </p:nvSpPr>
           <p:spPr>
             <a:xfrm>
-              <a:off x="3943623" y="27546"/>
-              <a:ext cx="5025042" cy="551195"/>
+              <a:off x="3943623" y="-146080"/>
+              <a:ext cx="5025042" cy="807006"/>
             </a:xfrm>
             <a:prstGeom prst="rect">
               <a:avLst/>
@@ -12529,42 +11842,15 @@
             <a:p>
               <a:pPr algn="ctr"/>
               <a:r>
-                <a:rPr lang="en-US" sz="2400" dirty="0" smtClean="0">
+                <a:rPr lang="en-US" sz="2400" dirty="0">
                   <a:solidFill>
                     <a:schemeClr val="tx1"/>
                   </a:solidFill>
                   <a:latin typeface="Cambria Math" panose="02040503050406030204" pitchFamily="18" charset="0"/>
                   <a:ea typeface="Cambria Math" panose="02040503050406030204" pitchFamily="18" charset="0"/>
                 </a:rPr>
-                <a:t>States Sequence Estimation and </a:t>
+                <a:t>Hidden Sequence Estimation and Posterior Probability</a:t>
               </a:r>
-              <a:r>
-                <a:rPr lang="en-US" sz="2400" dirty="0" smtClean="0">
-                  <a:solidFill>
-                    <a:schemeClr val="tx1"/>
-                  </a:solidFill>
-                  <a:latin typeface="Cambria Math" panose="02040503050406030204" pitchFamily="18" charset="0"/>
-                  <a:ea typeface="Cambria Math" panose="02040503050406030204" pitchFamily="18" charset="0"/>
-                </a:rPr>
-                <a:t>Posterior </a:t>
-              </a:r>
-              <a:r>
-                <a:rPr lang="en-US" sz="2400" dirty="0" smtClean="0">
-                  <a:solidFill>
-                    <a:schemeClr val="tx1"/>
-                  </a:solidFill>
-                  <a:latin typeface="Cambria Math" panose="02040503050406030204" pitchFamily="18" charset="0"/>
-                  <a:ea typeface="Cambria Math" panose="02040503050406030204" pitchFamily="18" charset="0"/>
-                </a:rPr>
-                <a:t>Probability</a:t>
-              </a:r>
-              <a:endParaRPr lang="en-US" sz="2400" dirty="0">
-                <a:solidFill>
-                  <a:schemeClr val="tx1"/>
-                </a:solidFill>
-                <a:latin typeface="Cambria Math" panose="02040503050406030204" pitchFamily="18" charset="0"/>
-                <a:ea typeface="Cambria Math" panose="02040503050406030204" pitchFamily="18" charset="0"/>
-              </a:endParaRPr>
             </a:p>
           </p:txBody>
         </p:sp>
@@ -12573,7 +11859,7 @@
             <p:cNvPr id="8" name="Rectangle 7">
               <a:extLst>
                 <a:ext uri="{FF2B5EF4-FFF2-40B4-BE49-F238E27FC236}">
-                  <a16:creationId xmlns:a16="http://schemas.microsoft.com/office/drawing/2014/main" xmlns:a14="http://schemas.microsoft.com/office/drawing/2010/main" xmlns:mc="http://schemas.openxmlformats.org/markup-compatibility/2006" xmlns="" id="{6D2C8BE0-B0D2-4978-A1B5-FFF5137A4C82}"/>
+                  <a16:creationId xmlns:a16="http://schemas.microsoft.com/office/drawing/2014/main" id="{6D2C8BE0-B0D2-4978-A1B5-FFF5137A4C82}"/>
                 </a:ext>
               </a:extLst>
             </p:cNvPr>
@@ -12582,7 +11868,7 @@
           </p:nvSpPr>
           <p:spPr>
             <a:xfrm>
-              <a:off x="-135758" y="1032303"/>
+              <a:off x="-144636" y="979035"/>
               <a:ext cx="1494571" cy="545185"/>
             </a:xfrm>
             <a:prstGeom prst="rect">
@@ -12617,7 +11903,7 @@
             <a:p>
               <a:pPr algn="ctr"/>
               <a:r>
-                <a:rPr lang="en-US" sz="2000" dirty="0" smtClean="0">
+                <a:rPr lang="en-US" sz="2000" dirty="0">
                   <a:solidFill>
                     <a:schemeClr val="tx1"/>
                   </a:solidFill>
@@ -12626,13 +11912,6 @@
                 </a:rPr>
                 <a:t>Sequence 1</a:t>
               </a:r>
-              <a:endParaRPr lang="en-US" sz="2000" dirty="0">
-                <a:solidFill>
-                  <a:schemeClr val="tx1"/>
-                </a:solidFill>
-                <a:latin typeface="Cambria Math" panose="02040503050406030204" pitchFamily="18" charset="0"/>
-                <a:ea typeface="Cambria Math" panose="02040503050406030204" pitchFamily="18" charset="0"/>
-              </a:endParaRPr>
             </a:p>
           </p:txBody>
         </p:sp>
@@ -12641,7 +11920,7 @@
             <p:cNvPr id="9" name="Rectangle 8">
               <a:extLst>
                 <a:ext uri="{FF2B5EF4-FFF2-40B4-BE49-F238E27FC236}">
-                  <a16:creationId xmlns:a16="http://schemas.microsoft.com/office/drawing/2014/main" xmlns:a14="http://schemas.microsoft.com/office/drawing/2010/main" xmlns:mc="http://schemas.openxmlformats.org/markup-compatibility/2006" xmlns="" id="{6D2C8BE0-B0D2-4978-A1B5-FFF5137A4C82}"/>
+                  <a16:creationId xmlns:a16="http://schemas.microsoft.com/office/drawing/2014/main" id="{6D2C8BE0-B0D2-4978-A1B5-FFF5137A4C82}"/>
                 </a:ext>
               </a:extLst>
             </p:cNvPr>
@@ -12650,7 +11929,7 @@
           </p:nvSpPr>
           <p:spPr>
             <a:xfrm>
-              <a:off x="-135758" y="2935483"/>
+              <a:off x="-144636" y="2864459"/>
               <a:ext cx="1494571" cy="492369"/>
             </a:xfrm>
             <a:prstGeom prst="rect">
@@ -12685,7 +11964,7 @@
             <a:p>
               <a:pPr algn="ctr"/>
               <a:r>
-                <a:rPr lang="en-US" sz="2000" dirty="0" smtClean="0">
+                <a:rPr lang="en-US" sz="2000" dirty="0">
                   <a:solidFill>
                     <a:schemeClr val="tx1"/>
                   </a:solidFill>
@@ -12694,13 +11973,6 @@
                 </a:rPr>
                 <a:t>Sequence 2</a:t>
               </a:r>
-              <a:endParaRPr lang="en-US" sz="2000" dirty="0">
-                <a:solidFill>
-                  <a:schemeClr val="tx1"/>
-                </a:solidFill>
-                <a:latin typeface="Cambria Math" panose="02040503050406030204" pitchFamily="18" charset="0"/>
-                <a:ea typeface="Cambria Math" panose="02040503050406030204" pitchFamily="18" charset="0"/>
-              </a:endParaRPr>
             </a:p>
           </p:txBody>
         </p:sp>
@@ -12709,7 +11981,7 @@
             <p:cNvPr id="10" name="Rectangle 9">
               <a:extLst>
                 <a:ext uri="{FF2B5EF4-FFF2-40B4-BE49-F238E27FC236}">
-                  <a16:creationId xmlns:a16="http://schemas.microsoft.com/office/drawing/2014/main" xmlns:a14="http://schemas.microsoft.com/office/drawing/2010/main" xmlns:mc="http://schemas.openxmlformats.org/markup-compatibility/2006" xmlns="" id="{6D2C8BE0-B0D2-4978-A1B5-FFF5137A4C82}"/>
+                  <a16:creationId xmlns:a16="http://schemas.microsoft.com/office/drawing/2014/main" id="{6D2C8BE0-B0D2-4978-A1B5-FFF5137A4C82}"/>
                 </a:ext>
               </a:extLst>
             </p:cNvPr>
@@ -12718,8 +11990,8 @@
           </p:nvSpPr>
           <p:spPr>
             <a:xfrm>
-              <a:off x="-135758" y="4794473"/>
-              <a:ext cx="1494571" cy="492369"/>
+              <a:off x="-144636" y="4389142"/>
+              <a:ext cx="1494571" cy="1160982"/>
             </a:xfrm>
             <a:prstGeom prst="rect">
               <a:avLst/>
@@ -12753,7 +12025,7 @@
             <a:p>
               <a:pPr algn="ctr"/>
               <a:r>
-                <a:rPr lang="en-US" sz="2000" dirty="0" smtClean="0">
+                <a:rPr lang="en-US" sz="2000" dirty="0">
                   <a:solidFill>
                     <a:schemeClr val="tx1"/>
                   </a:solidFill>
@@ -12762,13 +12034,6 @@
                 </a:rPr>
                 <a:t>Sequence 3</a:t>
               </a:r>
-              <a:endParaRPr lang="en-US" sz="2000" dirty="0">
-                <a:solidFill>
-                  <a:schemeClr val="tx1"/>
-                </a:solidFill>
-                <a:latin typeface="Cambria Math" panose="02040503050406030204" pitchFamily="18" charset="0"/>
-                <a:ea typeface="Cambria Math" panose="02040503050406030204" pitchFamily="18" charset="0"/>
-              </a:endParaRPr>
             </a:p>
           </p:txBody>
         </p:sp>
@@ -12777,7 +12042,7 @@
             <p:cNvPr id="11" name="Rectangle 10">
               <a:extLst>
                 <a:ext uri="{FF2B5EF4-FFF2-40B4-BE49-F238E27FC236}">
-                  <a16:creationId xmlns:a16="http://schemas.microsoft.com/office/drawing/2014/main" xmlns:a14="http://schemas.microsoft.com/office/drawing/2010/main" xmlns:mc="http://schemas.openxmlformats.org/markup-compatibility/2006" xmlns="" id="{6D2C8BE0-B0D2-4978-A1B5-FFF5137A4C82}"/>
+                  <a16:creationId xmlns:a16="http://schemas.microsoft.com/office/drawing/2014/main" id="{6D2C8BE0-B0D2-4978-A1B5-FFF5137A4C82}"/>
                 </a:ext>
               </a:extLst>
             </p:cNvPr>
@@ -12820,7 +12085,7 @@
             <a:lstStyle/>
             <a:p>
               <a:r>
-                <a:rPr lang="en-US" sz="2000" dirty="0" smtClean="0">
+                <a:rPr lang="en-US" sz="2000" dirty="0">
                   <a:solidFill>
                     <a:schemeClr val="tx1"/>
                   </a:solidFill>
@@ -12829,13 +12094,6 @@
                 </a:rPr>
                 <a:t>Posterior Probability</a:t>
               </a:r>
-              <a:endParaRPr lang="en-US" sz="2000" dirty="0">
-                <a:solidFill>
-                  <a:schemeClr val="tx1"/>
-                </a:solidFill>
-                <a:latin typeface="Cambria Math" panose="02040503050406030204" pitchFamily="18" charset="0"/>
-                <a:ea typeface="Cambria Math" panose="02040503050406030204" pitchFamily="18" charset="0"/>
-              </a:endParaRPr>
             </a:p>
           </p:txBody>
         </p:sp>
@@ -12844,7 +12102,7 @@
             <p:cNvPr id="12" name="Rectangle 11">
               <a:extLst>
                 <a:ext uri="{FF2B5EF4-FFF2-40B4-BE49-F238E27FC236}">
-                  <a16:creationId xmlns:a16="http://schemas.microsoft.com/office/drawing/2014/main" xmlns:a14="http://schemas.microsoft.com/office/drawing/2010/main" xmlns:mc="http://schemas.openxmlformats.org/markup-compatibility/2006" xmlns="" id="{6D2C8BE0-B0D2-4978-A1B5-FFF5137A4C82}"/>
+                  <a16:creationId xmlns:a16="http://schemas.microsoft.com/office/drawing/2014/main" id="{6D2C8BE0-B0D2-4978-A1B5-FFF5137A4C82}"/>
                 </a:ext>
               </a:extLst>
             </p:cNvPr>
@@ -12887,7 +12145,7 @@
             <a:lstStyle/>
             <a:p>
               <a:r>
-                <a:rPr lang="en-US" sz="2000" dirty="0" smtClean="0">
+                <a:rPr lang="en-US" sz="2000" dirty="0">
                   <a:solidFill>
                     <a:schemeClr val="tx1"/>
                   </a:solidFill>
@@ -12896,13 +12154,6 @@
                 </a:rPr>
                 <a:t>Posterior Probability</a:t>
               </a:r>
-              <a:endParaRPr lang="en-US" sz="2000" dirty="0">
-                <a:solidFill>
-                  <a:schemeClr val="tx1"/>
-                </a:solidFill>
-                <a:latin typeface="Cambria Math" panose="02040503050406030204" pitchFamily="18" charset="0"/>
-                <a:ea typeface="Cambria Math" panose="02040503050406030204" pitchFamily="18" charset="0"/>
-              </a:endParaRPr>
             </a:p>
           </p:txBody>
         </p:sp>
@@ -12911,7 +12162,7 @@
             <p:cNvPr id="13" name="Rectangle 12">
               <a:extLst>
                 <a:ext uri="{FF2B5EF4-FFF2-40B4-BE49-F238E27FC236}">
-                  <a16:creationId xmlns:a16="http://schemas.microsoft.com/office/drawing/2014/main" xmlns:a14="http://schemas.microsoft.com/office/drawing/2010/main" xmlns:mc="http://schemas.openxmlformats.org/markup-compatibility/2006" xmlns="" id="{6D2C8BE0-B0D2-4978-A1B5-FFF5137A4C82}"/>
+                  <a16:creationId xmlns:a16="http://schemas.microsoft.com/office/drawing/2014/main" id="{6D2C8BE0-B0D2-4978-A1B5-FFF5137A4C82}"/>
                 </a:ext>
               </a:extLst>
             </p:cNvPr>
@@ -12954,7 +12205,7 @@
             <a:lstStyle/>
             <a:p>
               <a:r>
-                <a:rPr lang="en-US" sz="2000" dirty="0" smtClean="0">
+                <a:rPr lang="en-US" sz="2000" dirty="0">
                   <a:solidFill>
                     <a:schemeClr val="tx1"/>
                   </a:solidFill>
@@ -12963,13 +12214,6 @@
                 </a:rPr>
                 <a:t>Posterior Probability</a:t>
               </a:r>
-              <a:endParaRPr lang="en-US" sz="2000" dirty="0">
-                <a:solidFill>
-                  <a:schemeClr val="tx1"/>
-                </a:solidFill>
-                <a:latin typeface="Cambria Math" panose="02040503050406030204" pitchFamily="18" charset="0"/>
-                <a:ea typeface="Cambria Math" panose="02040503050406030204" pitchFamily="18" charset="0"/>
-              </a:endParaRPr>
             </a:p>
           </p:txBody>
         </p:sp>
@@ -12978,7 +12222,7 @@
             <p:cNvPr id="14" name="Rectangle 13">
               <a:extLst>
                 <a:ext uri="{FF2B5EF4-FFF2-40B4-BE49-F238E27FC236}">
-                  <a16:creationId xmlns:a16="http://schemas.microsoft.com/office/drawing/2014/main" xmlns:a14="http://schemas.microsoft.com/office/drawing/2010/main" xmlns:mc="http://schemas.openxmlformats.org/markup-compatibility/2006" xmlns="" id="{6D2C8BE0-B0D2-4978-A1B5-FFF5137A4C82}"/>
+                  <a16:creationId xmlns:a16="http://schemas.microsoft.com/office/drawing/2014/main" id="{6D2C8BE0-B0D2-4978-A1B5-FFF5137A4C82}"/>
                 </a:ext>
               </a:extLst>
             </p:cNvPr>
@@ -13030,18 +12274,8 @@
                 </a:rPr>
                 <a:t>Viterbi estimation</a:t>
               </a:r>
-              <a:r>
-                <a:rPr lang="en-US" sz="1600" dirty="0" smtClean="0">
-                  <a:solidFill>
-                    <a:schemeClr val="tx1"/>
-                  </a:solidFill>
-                  <a:latin typeface="Cambria Math" panose="02040503050406030204" pitchFamily="18" charset="0"/>
-                  <a:ea typeface="Cambria Math" panose="02040503050406030204" pitchFamily="18" charset="0"/>
-                </a:rPr>
-                <a:t/>
-              </a:r>
               <a:br>
-                <a:rPr lang="en-US" sz="1600" dirty="0" smtClean="0">
+                <a:rPr lang="en-US" sz="1600" dirty="0">
                   <a:solidFill>
                     <a:schemeClr val="tx1"/>
                   </a:solidFill>
@@ -13050,7 +12284,7 @@
                 </a:rPr>
               </a:br>
               <a:r>
-                <a:rPr lang="en-US" sz="1600" dirty="0" smtClean="0">
+                <a:rPr lang="en-US" sz="1600" dirty="0">
                   <a:solidFill>
                     <a:schemeClr val="tx1"/>
                   </a:solidFill>
@@ -13059,13 +12293,6 @@
                 </a:rPr>
                 <a:t>Real states</a:t>
               </a:r>
-              <a:endParaRPr lang="en-US" sz="1600" dirty="0">
-                <a:solidFill>
-                  <a:schemeClr val="tx1"/>
-                </a:solidFill>
-                <a:latin typeface="Cambria Math" panose="02040503050406030204" pitchFamily="18" charset="0"/>
-                <a:ea typeface="Cambria Math" panose="02040503050406030204" pitchFamily="18" charset="0"/>
-              </a:endParaRPr>
             </a:p>
           </p:txBody>
         </p:sp>
@@ -13074,7 +12301,7 @@
             <p:cNvPr id="16" name="Rectangle 15">
               <a:extLst>
                 <a:ext uri="{FF2B5EF4-FFF2-40B4-BE49-F238E27FC236}">
-                  <a16:creationId xmlns:a16="http://schemas.microsoft.com/office/drawing/2014/main" xmlns:a14="http://schemas.microsoft.com/office/drawing/2010/main" xmlns:mc="http://schemas.openxmlformats.org/markup-compatibility/2006" xmlns="" id="{6D2C8BE0-B0D2-4978-A1B5-FFF5137A4C82}"/>
+                  <a16:creationId xmlns:a16="http://schemas.microsoft.com/office/drawing/2014/main" id="{6D2C8BE0-B0D2-4978-A1B5-FFF5137A4C82}"/>
                 </a:ext>
               </a:extLst>
             </p:cNvPr>
@@ -13117,7 +12344,7 @@
             <a:lstStyle/>
             <a:p>
               <a:r>
-                <a:rPr lang="en-US" sz="1600" dirty="0" smtClean="0">
+                <a:rPr lang="en-US" sz="1600" dirty="0">
                   <a:solidFill>
                     <a:schemeClr val="tx1"/>
                   </a:solidFill>
@@ -13127,7 +12354,7 @@
                 <a:t>Viterbi estimation</a:t>
               </a:r>
               <a:br>
-                <a:rPr lang="en-US" sz="1600" dirty="0" smtClean="0">
+                <a:rPr lang="en-US" sz="1600" dirty="0">
                   <a:solidFill>
                     <a:schemeClr val="tx1"/>
                   </a:solidFill>
@@ -13136,7 +12363,7 @@
                 </a:rPr>
               </a:br>
               <a:r>
-                <a:rPr lang="en-US" sz="1600" dirty="0" smtClean="0">
+                <a:rPr lang="en-US" sz="1600" dirty="0">
                   <a:solidFill>
                     <a:schemeClr val="tx1"/>
                   </a:solidFill>
@@ -13145,13 +12372,6 @@
                 </a:rPr>
                 <a:t>Real states</a:t>
               </a:r>
-              <a:endParaRPr lang="en-US" sz="1600" dirty="0">
-                <a:solidFill>
-                  <a:schemeClr val="tx1"/>
-                </a:solidFill>
-                <a:latin typeface="Cambria Math" panose="02040503050406030204" pitchFamily="18" charset="0"/>
-                <a:ea typeface="Cambria Math" panose="02040503050406030204" pitchFamily="18" charset="0"/>
-              </a:endParaRPr>
             </a:p>
           </p:txBody>
         </p:sp>
@@ -13160,7 +12380,7 @@
             <p:cNvPr id="17" name="Rectangle 16">
               <a:extLst>
                 <a:ext uri="{FF2B5EF4-FFF2-40B4-BE49-F238E27FC236}">
-                  <a16:creationId xmlns:a16="http://schemas.microsoft.com/office/drawing/2014/main" xmlns:a14="http://schemas.microsoft.com/office/drawing/2010/main" xmlns:mc="http://schemas.openxmlformats.org/markup-compatibility/2006" xmlns="" id="{6D2C8BE0-B0D2-4978-A1B5-FFF5137A4C82}"/>
+                  <a16:creationId xmlns:a16="http://schemas.microsoft.com/office/drawing/2014/main" id="{6D2C8BE0-B0D2-4978-A1B5-FFF5137A4C82}"/>
                 </a:ext>
               </a:extLst>
             </p:cNvPr>
@@ -13212,18 +12432,8 @@
                 </a:rPr>
                 <a:t>Viterbi estimation</a:t>
               </a:r>
-              <a:r>
-                <a:rPr lang="en-US" sz="1600" dirty="0" smtClean="0">
-                  <a:solidFill>
-                    <a:schemeClr val="tx1"/>
-                  </a:solidFill>
-                  <a:latin typeface="Cambria Math" panose="02040503050406030204" pitchFamily="18" charset="0"/>
-                  <a:ea typeface="Cambria Math" panose="02040503050406030204" pitchFamily="18" charset="0"/>
-                </a:rPr>
-                <a:t/>
-              </a:r>
               <a:br>
-                <a:rPr lang="en-US" sz="1600" dirty="0" smtClean="0">
+                <a:rPr lang="en-US" sz="1600" dirty="0">
                   <a:solidFill>
                     <a:schemeClr val="tx1"/>
                   </a:solidFill>
@@ -13232,7 +12442,7 @@
                 </a:rPr>
               </a:br>
               <a:r>
-                <a:rPr lang="en-US" sz="1600" dirty="0" smtClean="0">
+                <a:rPr lang="en-US" sz="1600" dirty="0">
                   <a:solidFill>
                     <a:schemeClr val="tx1"/>
                   </a:solidFill>
@@ -13241,13 +12451,6 @@
                 </a:rPr>
                 <a:t>Real states</a:t>
               </a:r>
-              <a:endParaRPr lang="en-US" sz="1600" dirty="0">
-                <a:solidFill>
-                  <a:schemeClr val="tx1"/>
-                </a:solidFill>
-                <a:latin typeface="Cambria Math" panose="02040503050406030204" pitchFamily="18" charset="0"/>
-                <a:ea typeface="Cambria Math" panose="02040503050406030204" pitchFamily="18" charset="0"/>
-              </a:endParaRPr>
             </a:p>
           </p:txBody>
         </p:sp>
@@ -13256,7 +12459,7 @@
             <p:cNvPr id="25" name="Rectangle 24">
               <a:extLst>
                 <a:ext uri="{FF2B5EF4-FFF2-40B4-BE49-F238E27FC236}">
-                  <a16:creationId xmlns:a16="http://schemas.microsoft.com/office/drawing/2014/main" xmlns:a14="http://schemas.microsoft.com/office/drawing/2010/main" xmlns:mc="http://schemas.openxmlformats.org/markup-compatibility/2006" xmlns="" id="{6D2C8BE0-B0D2-4978-A1B5-FFF5137A4C82}"/>
+                  <a16:creationId xmlns:a16="http://schemas.microsoft.com/office/drawing/2014/main" id="{6D2C8BE0-B0D2-4978-A1B5-FFF5137A4C82}"/>
                 </a:ext>
               </a:extLst>
             </p:cNvPr>
@@ -13300,7 +12503,7 @@
             <a:p>
               <a:pPr algn="ctr"/>
               <a:r>
-                <a:rPr lang="en-US" sz="2000" dirty="0" smtClean="0">
+                <a:rPr lang="en-US" sz="2000" dirty="0">
                   <a:solidFill>
                     <a:schemeClr val="tx1"/>
                   </a:solidFill>
@@ -13309,13 +12512,6 @@
                 </a:rPr>
                 <a:t>Position in Sequence</a:t>
               </a:r>
-              <a:endParaRPr lang="en-US" sz="2000" dirty="0">
-                <a:solidFill>
-                  <a:schemeClr val="tx1"/>
-                </a:solidFill>
-                <a:latin typeface="Cambria Math" panose="02040503050406030204" pitchFamily="18" charset="0"/>
-                <a:ea typeface="Cambria Math" panose="02040503050406030204" pitchFamily="18" charset="0"/>
-              </a:endParaRPr>
             </a:p>
           </p:txBody>
         </p:sp>
@@ -13324,7 +12520,7 @@
             <p:cNvPr id="29" name="Rectangle 28">
               <a:extLst>
                 <a:ext uri="{FF2B5EF4-FFF2-40B4-BE49-F238E27FC236}">
-                  <a16:creationId xmlns:a16="http://schemas.microsoft.com/office/drawing/2014/main" xmlns:a14="http://schemas.microsoft.com/office/drawing/2010/main" xmlns:mc="http://schemas.openxmlformats.org/markup-compatibility/2006" xmlns="" id="{6D2C8BE0-B0D2-4978-A1B5-FFF5137A4C82}"/>
+                  <a16:creationId xmlns:a16="http://schemas.microsoft.com/office/drawing/2014/main" id="{6D2C8BE0-B0D2-4978-A1B5-FFF5137A4C82}"/>
                 </a:ext>
               </a:extLst>
             </p:cNvPr>
@@ -13333,7 +12529,7 @@
           </p:nvSpPr>
           <p:spPr>
             <a:xfrm>
-              <a:off x="-135759" y="5386263"/>
+              <a:off x="-128139" y="5386263"/>
               <a:ext cx="1494571" cy="1260928"/>
             </a:xfrm>
             <a:prstGeom prst="rect">
@@ -13385,10 +12581,10 @@
           </p:nvGrpSpPr>
           <p:grpSpPr>
             <a:xfrm>
-              <a:off x="156440" y="6103530"/>
-              <a:ext cx="4199598" cy="1815882"/>
+              <a:off x="-574175" y="5379496"/>
+              <a:ext cx="1929812" cy="1815882"/>
               <a:chOff x="2231136" y="6855275"/>
-              <a:chExt cx="4199598" cy="1815882"/>
+              <a:chExt cx="1929812" cy="1815882"/>
             </a:xfrm>
           </p:grpSpPr>
           <p:sp>
@@ -13399,8 +12595,8 @@
             </p:nvSpPr>
             <p:spPr>
               <a:xfrm>
-                <a:off x="2820470" y="6855275"/>
-                <a:ext cx="3610264" cy="1815882"/>
+                <a:off x="2811592" y="6855275"/>
+                <a:ext cx="1349356" cy="1815882"/>
               </a:xfrm>
               <a:prstGeom prst="rect">
                 <a:avLst/>
@@ -13417,11 +12613,11 @@
               <a:lstStyle/>
               <a:p>
                 <a:r>
-                  <a:rPr lang="en-US" sz="1600" dirty="0" smtClean="0">
+                  <a:rPr lang="en-US" sz="1600" dirty="0">
                     <a:latin typeface="Cambria Math" panose="02040503050406030204" pitchFamily="18" charset="0"/>
                     <a:ea typeface="Cambria Math" panose="02040503050406030204" pitchFamily="18" charset="0"/>
                   </a:rPr>
-                  <a:t>Enhancer type 1</a:t>
+                  <a:t>Enhancer 1</a:t>
                 </a:r>
               </a:p>
               <a:p>
@@ -13430,7 +12626,7 @@
                     <a:latin typeface="Cambria Math" panose="02040503050406030204" pitchFamily="18" charset="0"/>
                     <a:ea typeface="Cambria Math" panose="02040503050406030204" pitchFamily="18" charset="0"/>
                   </a:rPr>
-                  <a:t>Enhancer type 2</a:t>
+                  <a:t>Enhancer 2</a:t>
                 </a:r>
               </a:p>
               <a:p>
@@ -13439,19 +12635,8 @@
                     <a:latin typeface="Cambria Math" panose="02040503050406030204" pitchFamily="18" charset="0"/>
                     <a:ea typeface="Cambria Math" panose="02040503050406030204" pitchFamily="18" charset="0"/>
                   </a:rPr>
-                  <a:t>Enhancer type </a:t>
+                  <a:t>Enhancer 3</a:t>
                 </a:r>
-                <a:r>
-                  <a:rPr lang="en-US" sz="1600" dirty="0" smtClean="0">
-                    <a:latin typeface="Cambria Math" panose="02040503050406030204" pitchFamily="18" charset="0"/>
-                    <a:ea typeface="Cambria Math" panose="02040503050406030204" pitchFamily="18" charset="0"/>
-                  </a:rPr>
-                  <a:t>3</a:t>
-                </a:r>
-                <a:endParaRPr lang="en-US" sz="1600" dirty="0">
-                  <a:latin typeface="Cambria Math" panose="02040503050406030204" pitchFamily="18" charset="0"/>
-                  <a:ea typeface="Cambria Math" panose="02040503050406030204" pitchFamily="18" charset="0"/>
-                </a:endParaRPr>
               </a:p>
               <a:p>
                 <a:r>
@@ -13459,36 +12644,21 @@
                     <a:latin typeface="Cambria Math" panose="02040503050406030204" pitchFamily="18" charset="0"/>
                     <a:ea typeface="Cambria Math" panose="02040503050406030204" pitchFamily="18" charset="0"/>
                   </a:rPr>
-                  <a:t>Enhancer type </a:t>
+                  <a:t>Enhancer 4</a:t>
                 </a:r>
+              </a:p>
+              <a:p>
                 <a:r>
-                  <a:rPr lang="en-US" sz="1600" dirty="0" smtClean="0">
+                  <a:rPr lang="en-US" sz="1600" dirty="0">
                     <a:latin typeface="Cambria Math" panose="02040503050406030204" pitchFamily="18" charset="0"/>
                     <a:ea typeface="Cambria Math" panose="02040503050406030204" pitchFamily="18" charset="0"/>
                   </a:rPr>
-                  <a:t>4</a:t>
+                  <a:t>Background</a:t>
                 </a:r>
-                <a:endParaRPr lang="en-US" sz="1600" dirty="0">
-                  <a:latin typeface="Cambria Math" panose="02040503050406030204" pitchFamily="18" charset="0"/>
-                  <a:ea typeface="Cambria Math" panose="02040503050406030204" pitchFamily="18" charset="0"/>
-                </a:endParaRPr>
               </a:p>
               <a:p>
                 <a:r>
-                  <a:rPr lang="en-US" sz="1600" dirty="0" smtClean="0">
-                    <a:latin typeface="Cambria Math" panose="02040503050406030204" pitchFamily="18" charset="0"/>
-                    <a:ea typeface="Cambria Math" panose="02040503050406030204" pitchFamily="18" charset="0"/>
-                  </a:rPr>
-                  <a:t>Background state</a:t>
-                </a:r>
-                <a:endParaRPr lang="en-US" sz="1600" dirty="0">
-                  <a:latin typeface="Cambria Math" panose="02040503050406030204" pitchFamily="18" charset="0"/>
-                  <a:ea typeface="Cambria Math" panose="02040503050406030204" pitchFamily="18" charset="0"/>
-                </a:endParaRPr>
-              </a:p>
-              <a:p>
-                <a:r>
-                  <a:rPr lang="en-US" sz="1600" dirty="0" smtClean="0">
+                  <a:rPr lang="en-US" sz="1600" dirty="0">
                     <a:latin typeface="Cambria Math" panose="02040503050406030204" pitchFamily="18" charset="0"/>
                     <a:ea typeface="Cambria Math" panose="02040503050406030204" pitchFamily="18" charset="0"/>
                   </a:rPr>
@@ -13497,16 +12667,12 @@
               </a:p>
               <a:p>
                 <a:r>
-                  <a:rPr lang="en-US" sz="1600" dirty="0" smtClean="0">
+                  <a:rPr lang="en-US" sz="1600" dirty="0">
                     <a:latin typeface="Cambria Math" panose="02040503050406030204" pitchFamily="18" charset="0"/>
                     <a:ea typeface="Cambria Math" panose="02040503050406030204" pitchFamily="18" charset="0"/>
                   </a:rPr>
                   <a:t>TFBS</a:t>
                 </a:r>
-                <a:endParaRPr lang="en-US" sz="1600" dirty="0">
-                  <a:latin typeface="Cambria Math" panose="02040503050406030204" pitchFamily="18" charset="0"/>
-                  <a:ea typeface="Cambria Math" panose="02040503050406030204" pitchFamily="18" charset="0"/>
-                </a:endParaRPr>
               </a:p>
             </p:txBody>
           </p:sp>
@@ -13844,13 +13010,6 @@
   <p:clrMapOvr>
     <a:masterClrMapping/>
   </p:clrMapOvr>
-  <p:timing>
-    <p:tnLst>
-      <p:par>
-        <p:cTn id="1" dur="indefinite" restart="never" nodeType="tmRoot"/>
-      </p:par>
-    </p:tnLst>
-  </p:timing>
 </p:sld>
 </file>
 

</xml_diff>